<commit_message>
create ID-VGS and ID-VDS specific figure
</commit_message>
<xml_diff>
--- a/design_project1.pptx
+++ b/design_project1.pptx
@@ -1,6 +1,6 @@
 
 <file path=ppt/presentation.xml><?xml version="1.0" encoding="utf-8"?>
-<p:presentation xmlns:a="http://schemas.openxmlformats.org/drawingml/2006/main" xmlns:r="http://schemas.openxmlformats.org/officeDocument/2006/relationships" xmlns:p="http://schemas.openxmlformats.org/presentationml/2006/main" saveSubsetFonts="1">
+<p:presentation xmlns:a="http://schemas.openxmlformats.org/drawingml/2006/main" xmlns:r="http://schemas.openxmlformats.org/officeDocument/2006/relationships" xmlns:p="http://schemas.openxmlformats.org/presentationml/2006/main" showSpecialPlsOnTitleSld="0" saveSubsetFonts="1">
   <p:sldMasterIdLst>
     <p:sldMasterId id="2147483648" r:id="rId1"/>
   </p:sldMasterIdLst>
@@ -112,7 +112,24 @@
       </a:defRPr>
     </a:lvl9pPr>
   </p:defaultTextStyle>
+  <p:extLst>
+    <p:ext uri="{EFAFB233-063F-42B5-8137-9DF3F51BA10A}">
+      <p15:sldGuideLst xmlns:p15="http://schemas.microsoft.com/office/powerpoint/2012/main"/>
+    </p:ext>
+  </p:extLst>
 </p:presentation>
+</file>
+
+<file path=ppt/commentAuthors.xml><?xml version="1.0" encoding="utf-8"?>
+<p:cmAuthorLst xmlns:a="http://schemas.openxmlformats.org/drawingml/2006/main" xmlns:r="http://schemas.openxmlformats.org/officeDocument/2006/relationships" xmlns:p="http://schemas.openxmlformats.org/presentationml/2006/main">
+  <p:cmAuthor id="1" name="saito yohei" initials="sy" lastIdx="0" clrIdx="0">
+    <p:extLst>
+      <p:ext uri="{19B8F6BF-5375-455C-9EA6-DF929625EA0E}">
+        <p15:presenceInfo xmlns:p15="http://schemas.microsoft.com/office/powerpoint/2012/main" userId="2d0fe52bdf4fe7ad" providerId="Windows Live"/>
+      </p:ext>
+    </p:extLst>
+  </p:cmAuthor>
+</p:cmAuthorLst>
 </file>
 
 <file path=ppt/notesMasters/notesMaster1.xml><?xml version="1.0" encoding="utf-8"?>
@@ -624,11 +641,174 @@
           <a:bodyPr/>
           <a:lstStyle/>
           <a:p>
+            <a:pPr marL="0" marR="0" lvl="0" indent="0" algn="l" defTabSz="914400" rtl="0" eaLnBrk="1" fontAlgn="auto" latinLnBrk="0" hangingPunct="1">
+              <a:lnSpc>
+                <a:spcPct val="100000"/>
+              </a:lnSpc>
+              <a:spcBef>
+                <a:spcPts val="0"/>
+              </a:spcBef>
+              <a:spcAft>
+                <a:spcPts val="0"/>
+              </a:spcAft>
+              <a:buClrTx/>
+              <a:buSzTx/>
+              <a:buFontTx/>
+              <a:buNone/>
+              <a:tabLst/>
+              <a:defRPr/>
+            </a:pPr>
+            <a:r>
+              <a:rPr lang="en-US" altLang="ja-JP" dirty="0"/>
+              <a:t>FET</a:t>
+            </a:r>
+            <a:r>
+              <a:rPr lang="ja-JP" altLang="ja-JP" dirty="0"/>
+              <a:t>は、印加される電圧</a:t>
+            </a:r>
+            <a:r>
+              <a:rPr lang="en-US" altLang="ja-JP" dirty="0"/>
+              <a:t>VGS</a:t>
+            </a:r>
+            <a:r>
+              <a:rPr lang="ja-JP" altLang="ja-JP" dirty="0"/>
+              <a:t>と</a:t>
+            </a:r>
+            <a:r>
+              <a:rPr lang="en-US" altLang="ja-JP" dirty="0"/>
+              <a:t>VDS</a:t>
+            </a:r>
+            <a:r>
+              <a:rPr lang="ja-JP" altLang="ja-JP" dirty="0"/>
+              <a:t>によってドレイン電流</a:t>
+            </a:r>
+            <a:r>
+              <a:rPr lang="en-US" altLang="ja-JP" dirty="0"/>
+              <a:t>ID</a:t>
+            </a:r>
+            <a:r>
+              <a:rPr lang="ja-JP" altLang="ja-JP" dirty="0"/>
+              <a:t>が変化するが、通常</a:t>
+            </a:r>
+            <a:r>
+              <a:rPr lang="en-US" altLang="ja-JP" dirty="0"/>
+              <a:t>FET</a:t>
+            </a:r>
+            <a:r>
+              <a:rPr lang="ja-JP" altLang="ja-JP" dirty="0"/>
+              <a:t>を増幅回路として使用する際は、</a:t>
+            </a:r>
+            <a:r>
+              <a:rPr lang="en-US" altLang="ja-JP" dirty="0"/>
+              <a:t>ID</a:t>
+            </a:r>
+            <a:r>
+              <a:rPr lang="ja-JP" altLang="ja-JP" dirty="0"/>
+              <a:t>が</a:t>
+            </a:r>
+            <a:r>
+              <a:rPr lang="en-US" altLang="ja-JP" dirty="0"/>
+              <a:t>VDS</a:t>
+            </a:r>
+            <a:r>
+              <a:rPr lang="ja-JP" altLang="ja-JP" dirty="0" err="1"/>
+              <a:t>に依</a:t>
+            </a:r>
+            <a:r>
+              <a:rPr lang="ja-JP" altLang="ja-JP" dirty="0"/>
+              <a:t>存しない飽和領域で、</a:t>
+            </a:r>
+            <a:r>
+              <a:rPr lang="en-US" altLang="ja-JP" dirty="0"/>
+              <a:t>VDD</a:t>
+            </a:r>
+            <a:r>
+              <a:rPr lang="ja-JP" altLang="ja-JP" dirty="0"/>
+              <a:t>とドレイン抵抗</a:t>
+            </a:r>
+            <a:r>
+              <a:rPr lang="en-US" altLang="ja-JP" dirty="0"/>
+              <a:t>RD</a:t>
+            </a:r>
+            <a:r>
+              <a:rPr lang="ja-JP" altLang="ja-JP" dirty="0"/>
+              <a:t>により決定される、</a:t>
+            </a:r>
+            <a:r>
+              <a:rPr lang="en-US" altLang="ja-JP" dirty="0"/>
+              <a:t>VGS</a:t>
+            </a:r>
+            <a:r>
+              <a:rPr lang="ja-JP" altLang="ja-JP" dirty="0"/>
+              <a:t>＝</a:t>
+            </a:r>
+            <a:r>
+              <a:rPr lang="en-US" altLang="ja-JP" dirty="0"/>
+              <a:t>VGSA</a:t>
+            </a:r>
+            <a:r>
+              <a:rPr lang="ja-JP" altLang="ja-JP" dirty="0"/>
+              <a:t>となる動作点付近で動作させる。</a:t>
+            </a:r>
+            <a:endParaRPr kumimoji="1" lang="en-US" altLang="ja-JP" dirty="0"/>
+          </a:p>
+          <a:p>
             <a:r>
               <a:rPr kumimoji="1" lang="ja-JP" altLang="en-US" dirty="0"/>
-              <a:t>口頭での回路の説明</a:t>
-            </a:r>
-            <a:endParaRPr kumimoji="1" lang="en-US" altLang="ja-JP" dirty="0"/>
+              <a:t>ゲート－ソース間電圧</a:t>
+            </a:r>
+            <a:r>
+              <a:rPr kumimoji="1" lang="en-US" altLang="ja-JP" dirty="0"/>
+              <a:t>VGS</a:t>
+            </a:r>
+            <a:r>
+              <a:rPr kumimoji="1" lang="ja-JP" altLang="en-US" dirty="0"/>
+              <a:t>及びドレイン－ソース電圧</a:t>
+            </a:r>
+            <a:r>
+              <a:rPr kumimoji="1" lang="en-US" altLang="ja-JP" dirty="0"/>
+              <a:t>VDS</a:t>
+            </a:r>
+            <a:r>
+              <a:rPr kumimoji="1" lang="ja-JP" altLang="en-US" dirty="0"/>
+              <a:t>によってドレイン電流</a:t>
+            </a:r>
+            <a:r>
+              <a:rPr kumimoji="1" lang="en-US" altLang="ja-JP" dirty="0"/>
+              <a:t>ID</a:t>
+            </a:r>
+            <a:r>
+              <a:rPr kumimoji="1" lang="ja-JP" altLang="en-US" dirty="0"/>
+              <a:t>が変化するが、通常</a:t>
+            </a:r>
+            <a:r>
+              <a:rPr kumimoji="1" lang="en-US" altLang="ja-JP" dirty="0"/>
+              <a:t>ID</a:t>
+            </a:r>
+            <a:r>
+              <a:rPr kumimoji="1" lang="ja-JP" altLang="en-US" dirty="0"/>
+              <a:t>が</a:t>
+            </a:r>
+            <a:r>
+              <a:rPr kumimoji="1" lang="en-US" altLang="ja-JP" dirty="0"/>
+              <a:t>VDS</a:t>
+            </a:r>
+            <a:r>
+              <a:rPr kumimoji="1" lang="ja-JP" altLang="en-US" dirty="0" err="1"/>
+              <a:t>に依</a:t>
+            </a:r>
+            <a:r>
+              <a:rPr kumimoji="1" lang="ja-JP" altLang="en-US" dirty="0"/>
+              <a:t>存しない飽和領域の</a:t>
+            </a:r>
+            <a:r>
+              <a:rPr kumimoji="1" lang="en-US" altLang="ja-JP" dirty="0"/>
+              <a:t>VGS=VGSA</a:t>
+            </a:r>
+            <a:r>
+              <a:rPr kumimoji="1" lang="ja-JP" altLang="en-US" dirty="0"/>
+              <a:t>となる動作点で使用する</a:t>
+            </a:r>
           </a:p>
         </p:txBody>
       </p:sp>
@@ -649,6 +829,94 @@
           <a:p>
             <a:fld id="{2FC66951-6E0B-49E0-B97F-BAE217EB5937}" type="slidenum">
               <a:rPr kumimoji="1" lang="ja-JP" altLang="en-US" smtClean="0"/>
+              <a:t>3</a:t>
+            </a:fld>
+            <a:endParaRPr kumimoji="1" lang="ja-JP" altLang="en-US"/>
+          </a:p>
+        </p:txBody>
+      </p:sp>
+    </p:spTree>
+    <p:extLst>
+      <p:ext uri="{BB962C8B-B14F-4D97-AF65-F5344CB8AC3E}">
+        <p14:creationId xmlns:p14="http://schemas.microsoft.com/office/powerpoint/2010/main" val="1821417718"/>
+      </p:ext>
+    </p:extLst>
+  </p:cSld>
+  <p:clrMapOvr>
+    <a:masterClrMapping/>
+  </p:clrMapOvr>
+</p:notes>
+</file>
+
+<file path=ppt/notesSlides/notesSlide3.xml><?xml version="1.0" encoding="utf-8"?>
+<p:notes xmlns:a="http://schemas.openxmlformats.org/drawingml/2006/main" xmlns:r="http://schemas.openxmlformats.org/officeDocument/2006/relationships" xmlns:p="http://schemas.openxmlformats.org/presentationml/2006/main">
+  <p:cSld>
+    <p:spTree>
+      <p:nvGrpSpPr>
+        <p:cNvPr id="1" name=""/>
+        <p:cNvGrpSpPr/>
+        <p:nvPr/>
+      </p:nvGrpSpPr>
+      <p:grpSpPr>
+        <a:xfrm>
+          <a:off x="0" y="0"/>
+          <a:ext cx="0" cy="0"/>
+          <a:chOff x="0" y="0"/>
+          <a:chExt cx="0" cy="0"/>
+        </a:xfrm>
+      </p:grpSpPr>
+      <p:sp>
+        <p:nvSpPr>
+          <p:cNvPr id="2" name="スライド イメージ プレースホルダー 1"/>
+          <p:cNvSpPr>
+            <a:spLocks noGrp="1" noRot="1" noChangeAspect="1"/>
+          </p:cNvSpPr>
+          <p:nvPr>
+            <p:ph type="sldImg"/>
+          </p:nvPr>
+        </p:nvSpPr>
+        <p:spPr/>
+      </p:sp>
+      <p:sp>
+        <p:nvSpPr>
+          <p:cNvPr id="3" name="ノート プレースホルダー 2"/>
+          <p:cNvSpPr>
+            <a:spLocks noGrp="1"/>
+          </p:cNvSpPr>
+          <p:nvPr>
+            <p:ph type="body" idx="1"/>
+          </p:nvPr>
+        </p:nvSpPr>
+        <p:spPr/>
+        <p:txBody>
+          <a:bodyPr/>
+          <a:lstStyle/>
+          <a:p>
+            <a:r>
+              <a:rPr kumimoji="1" lang="ja-JP" altLang="en-US" dirty="0"/>
+              <a:t>口頭での回路の説明</a:t>
+            </a:r>
+            <a:endParaRPr kumimoji="1" lang="en-US" altLang="ja-JP" dirty="0"/>
+          </a:p>
+        </p:txBody>
+      </p:sp>
+      <p:sp>
+        <p:nvSpPr>
+          <p:cNvPr id="4" name="スライド番号プレースホルダー 3"/>
+          <p:cNvSpPr>
+            <a:spLocks noGrp="1"/>
+          </p:cNvSpPr>
+          <p:nvPr>
+            <p:ph type="sldNum" sz="quarter" idx="10"/>
+          </p:nvPr>
+        </p:nvSpPr>
+        <p:spPr/>
+        <p:txBody>
+          <a:bodyPr/>
+          <a:lstStyle/>
+          <a:p>
+            <a:fld id="{2FC66951-6E0B-49E0-B97F-BAE217EB5937}" type="slidenum">
+              <a:rPr kumimoji="1" lang="ja-JP" altLang="en-US" smtClean="0"/>
               <a:t>4</a:t>
             </a:fld>
             <a:endParaRPr kumimoji="1" lang="ja-JP" altLang="en-US"/>
@@ -668,7 +936,7 @@
 </p:notes>
 </file>
 
-<file path=ppt/notesSlides/notesSlide3.xml><?xml version="1.0" encoding="utf-8"?>
+<file path=ppt/notesSlides/notesSlide4.xml><?xml version="1.0" encoding="utf-8"?>
 <p:notes xmlns:a="http://schemas.openxmlformats.org/drawingml/2006/main" xmlns:r="http://schemas.openxmlformats.org/officeDocument/2006/relationships" xmlns:p="http://schemas.openxmlformats.org/presentationml/2006/main">
   <p:cSld>
     <p:spTree>
@@ -913,7 +1181,7 @@
           <a:bodyPr/>
           <a:lstStyle/>
           <a:p>
-            <a:fld id="{24D008D8-3DED-43F5-B364-BF08DFFD863D}" type="datetimeFigureOut">
+            <a:fld id="{F296C609-7B84-4C43-8CFD-5EA14E647490}" type="datetime1">
               <a:rPr kumimoji="1" lang="ja-JP" altLang="en-US" smtClean="0"/>
               <a:t>2018/7/23</a:t>
             </a:fld>
@@ -1143,7 +1411,7 @@
           <a:bodyPr/>
           <a:lstStyle/>
           <a:p>
-            <a:fld id="{24D008D8-3DED-43F5-B364-BF08DFFD863D}" type="datetimeFigureOut">
+            <a:fld id="{87628EC1-3CDE-4B02-8EF5-17A88DD54341}" type="datetime1">
               <a:rPr kumimoji="1" lang="ja-JP" altLang="en-US" smtClean="0"/>
               <a:t>2018/7/23</a:t>
             </a:fld>
@@ -1383,7 +1651,7 @@
           <a:bodyPr/>
           <a:lstStyle/>
           <a:p>
-            <a:fld id="{24D008D8-3DED-43F5-B364-BF08DFFD863D}" type="datetimeFigureOut">
+            <a:fld id="{CE76FF37-6D07-4288-8D66-53DA1B394B44}" type="datetime1">
               <a:rPr kumimoji="1" lang="ja-JP" altLang="en-US" smtClean="0"/>
               <a:t>2018/7/23</a:t>
             </a:fld>
@@ -1613,7 +1881,7 @@
           <a:bodyPr/>
           <a:lstStyle/>
           <a:p>
-            <a:fld id="{24D008D8-3DED-43F5-B364-BF08DFFD863D}" type="datetimeFigureOut">
+            <a:fld id="{AD7B014D-31EF-42A5-80A7-992ED5B8E74C}" type="datetime1">
               <a:rPr kumimoji="1" lang="ja-JP" altLang="en-US" smtClean="0"/>
               <a:t>2018/7/23</a:t>
             </a:fld>
@@ -1888,7 +2156,7 @@
           <a:bodyPr/>
           <a:lstStyle/>
           <a:p>
-            <a:fld id="{24D008D8-3DED-43F5-B364-BF08DFFD863D}" type="datetimeFigureOut">
+            <a:fld id="{C7E34C9E-6B52-4B03-A8A9-3F8CE33CEAEE}" type="datetime1">
               <a:rPr kumimoji="1" lang="ja-JP" altLang="en-US" smtClean="0"/>
               <a:t>2018/7/23</a:t>
             </a:fld>
@@ -2217,7 +2485,7 @@
           <a:bodyPr/>
           <a:lstStyle/>
           <a:p>
-            <a:fld id="{24D008D8-3DED-43F5-B364-BF08DFFD863D}" type="datetimeFigureOut">
+            <a:fld id="{7E7BA0FB-0B2D-4B9E-AB21-203796E19E65}" type="datetime1">
               <a:rPr kumimoji="1" lang="ja-JP" altLang="en-US" smtClean="0"/>
               <a:t>2018/7/23</a:t>
             </a:fld>
@@ -2693,7 +2961,7 @@
           <a:bodyPr/>
           <a:lstStyle/>
           <a:p>
-            <a:fld id="{24D008D8-3DED-43F5-B364-BF08DFFD863D}" type="datetimeFigureOut">
+            <a:fld id="{8EB259B3-6152-46F0-8BE9-3D5D4371B791}" type="datetime1">
               <a:rPr kumimoji="1" lang="ja-JP" altLang="en-US" smtClean="0"/>
               <a:t>2018/7/23</a:t>
             </a:fld>
@@ -2834,7 +3102,7 @@
           <a:bodyPr/>
           <a:lstStyle/>
           <a:p>
-            <a:fld id="{24D008D8-3DED-43F5-B364-BF08DFFD863D}" type="datetimeFigureOut">
+            <a:fld id="{84903DF1-5D8C-4604-95B5-96A46DDF0AC5}" type="datetime1">
               <a:rPr kumimoji="1" lang="ja-JP" altLang="en-US" smtClean="0"/>
               <a:t>2018/7/23</a:t>
             </a:fld>
@@ -2947,7 +3215,7 @@
           <a:bodyPr/>
           <a:lstStyle/>
           <a:p>
-            <a:fld id="{24D008D8-3DED-43F5-B364-BF08DFFD863D}" type="datetimeFigureOut">
+            <a:fld id="{E64BA686-B6C5-43CD-B45D-2CF7EFAFF25F}" type="datetime1">
               <a:rPr kumimoji="1" lang="ja-JP" altLang="en-US" smtClean="0"/>
               <a:t>2018/7/23</a:t>
             </a:fld>
@@ -3290,7 +3558,7 @@
           <a:bodyPr/>
           <a:lstStyle/>
           <a:p>
-            <a:fld id="{24D008D8-3DED-43F5-B364-BF08DFFD863D}" type="datetimeFigureOut">
+            <a:fld id="{CA45621E-F791-441B-BE38-976D5BBF8D8E}" type="datetime1">
               <a:rPr kumimoji="1" lang="ja-JP" altLang="en-US" smtClean="0"/>
               <a:t>2018/7/23</a:t>
             </a:fld>
@@ -3578,7 +3846,7 @@
           <a:bodyPr/>
           <a:lstStyle/>
           <a:p>
-            <a:fld id="{24D008D8-3DED-43F5-B364-BF08DFFD863D}" type="datetimeFigureOut">
+            <a:fld id="{BA6B8648-787A-4C01-A9AB-F85FE165AF21}" type="datetime1">
               <a:rPr kumimoji="1" lang="ja-JP" altLang="en-US" smtClean="0"/>
               <a:t>2018/7/23</a:t>
             </a:fld>
@@ -3851,7 +4119,7 @@
             </a:lvl1pPr>
           </a:lstStyle>
           <a:p>
-            <a:fld id="{24D008D8-3DED-43F5-B364-BF08DFFD863D}" type="datetimeFigureOut">
+            <a:fld id="{93480959-3A38-4811-9BA4-CF4810DE627A}" type="datetime1">
               <a:rPr kumimoji="1" lang="ja-JP" altLang="en-US" smtClean="0"/>
               <a:t>2018/7/23</a:t>
             </a:fld>
@@ -3970,6 +4238,7 @@
     <p:sldLayoutId id="2147483658" r:id="rId10"/>
     <p:sldLayoutId id="2147483659" r:id="rId11"/>
   </p:sldLayoutIdLst>
+  <p:hf hdr="0" ftr="0" dt="0"/>
   <p:txStyles>
     <p:titleStyle>
       <a:lvl1pPr algn="l" defTabSz="914400" rtl="0" eaLnBrk="1" latinLnBrk="0" hangingPunct="1">
@@ -4478,10 +4747,10 @@
         </p:nvGrpSpPr>
         <p:grpSpPr>
           <a:xfrm>
-            <a:off x="6194277" y="900630"/>
-            <a:ext cx="5159522" cy="5759433"/>
-            <a:chOff x="7718017" y="2292967"/>
-            <a:chExt cx="3893581" cy="4346298"/>
+            <a:off x="5814237" y="601303"/>
+            <a:ext cx="5159522" cy="5796518"/>
+            <a:chOff x="7440040" y="2187254"/>
+            <a:chExt cx="3893581" cy="4374284"/>
           </a:xfrm>
         </p:grpSpPr>
         <p:pic>
@@ -4506,7 +4775,7 @@
           </p:blipFill>
           <p:spPr>
             <a:xfrm>
-              <a:off x="8340391" y="2292967"/>
+              <a:off x="8216992" y="2187254"/>
               <a:ext cx="2438400" cy="4055577"/>
             </a:xfrm>
             <a:prstGeom prst="rect">
@@ -4528,7 +4797,7 @@
           </p:nvSpPr>
           <p:spPr>
             <a:xfrm>
-              <a:off x="7718017" y="6151518"/>
+              <a:off x="7440040" y="6073791"/>
               <a:ext cx="3893581" cy="487747"/>
             </a:xfrm>
             <a:prstGeom prst="rect">
@@ -4753,6 +5022,35 @@
           </p:txBody>
         </p:sp>
       </p:grpSp>
+      <p:sp>
+        <p:nvSpPr>
+          <p:cNvPr id="12" name="スライド番号プレースホルダー 11">
+            <a:extLst>
+              <a:ext uri="{FF2B5EF4-FFF2-40B4-BE49-F238E27FC236}">
+                <a16:creationId xmlns:a16="http://schemas.microsoft.com/office/drawing/2014/main" id="{0CCE4305-AB0D-499A-A6A8-2333153CC42F}"/>
+              </a:ext>
+            </a:extLst>
+          </p:cNvPr>
+          <p:cNvSpPr>
+            <a:spLocks noGrp="1"/>
+          </p:cNvSpPr>
+          <p:nvPr>
+            <p:ph type="sldNum" sz="quarter" idx="12"/>
+          </p:nvPr>
+        </p:nvSpPr>
+        <p:spPr/>
+        <p:txBody>
+          <a:bodyPr/>
+          <a:lstStyle/>
+          <a:p>
+            <a:fld id="{EC2563BA-9F6D-4C2C-B042-56816E50B4B9}" type="slidenum">
+              <a:rPr kumimoji="1" lang="ja-JP" altLang="en-US" smtClean="0"/>
+              <a:t>2</a:t>
+            </a:fld>
+            <a:endParaRPr kumimoji="1" lang="ja-JP" altLang="en-US"/>
+          </a:p>
+        </p:txBody>
+      </p:sp>
     </p:spTree>
     <p:extLst>
       <p:ext uri="{BB962C8B-B14F-4D97-AF65-F5344CB8AC3E}">
@@ -4799,24 +5097,37 @@
             <p:ph type="title"/>
           </p:nvPr>
         </p:nvSpPr>
-        <p:spPr/>
+        <p:spPr>
+          <a:xfrm>
+            <a:off x="838200" y="365125"/>
+            <a:ext cx="10515600" cy="1325563"/>
+          </a:xfrm>
+        </p:spPr>
         <p:txBody>
           <a:bodyPr/>
           <a:lstStyle/>
           <a:p>
             <a:r>
               <a:rPr kumimoji="1" lang="ja-JP" altLang="en-US" dirty="0"/>
-              <a:t>実験原理</a:t>
+              <a:t>実験原理・</a:t>
+            </a:r>
+            <a:r>
+              <a:rPr kumimoji="1" lang="en-US" altLang="ja-JP" dirty="0"/>
+              <a:t>FET</a:t>
+            </a:r>
+            <a:r>
+              <a:rPr kumimoji="1" lang="ja-JP" altLang="en-US" dirty="0"/>
+              <a:t>の静特性</a:t>
             </a:r>
           </a:p>
         </p:txBody>
       </p:sp>
       <p:sp>
         <p:nvSpPr>
-          <p:cNvPr id="3" name="コンテンツ プレースホルダー 2">
+          <p:cNvPr id="6" name="スライド番号プレースホルダー 5">
             <a:extLst>
               <a:ext uri="{FF2B5EF4-FFF2-40B4-BE49-F238E27FC236}">
-                <a16:creationId xmlns:a16="http://schemas.microsoft.com/office/drawing/2014/main" id="{7CA53ECD-2AC3-45FF-9D16-B171F6874312}"/>
+                <a16:creationId xmlns:a16="http://schemas.microsoft.com/office/drawing/2014/main" id="{28A50B05-C29C-4468-8345-C09B746C50BD}"/>
               </a:ext>
             </a:extLst>
           </p:cNvPr>
@@ -4824,7 +5135,7 @@
             <a:spLocks noGrp="1"/>
           </p:cNvSpPr>
           <p:nvPr>
-            <p:ph idx="1"/>
+            <p:ph type="sldNum" sz="quarter" idx="12"/>
           </p:nvPr>
         </p:nvSpPr>
         <p:spPr/>
@@ -4832,10 +5143,1974 @@
           <a:bodyPr/>
           <a:lstStyle/>
           <a:p>
-            <a:pPr marL="0" indent="0">
-              <a:buNone/>
-            </a:pPr>
-            <a:endParaRPr kumimoji="1" lang="ja-JP" altLang="en-US" dirty="0"/>
+            <a:fld id="{EC2563BA-9F6D-4C2C-B042-56816E50B4B9}" type="slidenum">
+              <a:rPr kumimoji="1" lang="ja-JP" altLang="en-US" smtClean="0"/>
+              <a:t>3</a:t>
+            </a:fld>
+            <a:endParaRPr kumimoji="1" lang="ja-JP" altLang="en-US"/>
+          </a:p>
+        </p:txBody>
+      </p:sp>
+      <p:grpSp>
+        <p:nvGrpSpPr>
+          <p:cNvPr id="239" name="グループ化 238">
+            <a:extLst>
+              <a:ext uri="{FF2B5EF4-FFF2-40B4-BE49-F238E27FC236}">
+                <a16:creationId xmlns:a16="http://schemas.microsoft.com/office/drawing/2014/main" id="{1EC38BCB-8FCD-4C65-BA57-C20F3E5F2EFF}"/>
+              </a:ext>
+            </a:extLst>
+          </p:cNvPr>
+          <p:cNvGrpSpPr/>
+          <p:nvPr/>
+        </p:nvGrpSpPr>
+        <p:grpSpPr>
+          <a:xfrm>
+            <a:off x="2100865" y="1352655"/>
+            <a:ext cx="9691084" cy="4995618"/>
+            <a:chOff x="1748440" y="1989347"/>
+            <a:chExt cx="7917758" cy="3724766"/>
+          </a:xfrm>
+        </p:grpSpPr>
+        <p:sp>
+          <p:nvSpPr>
+            <p:cNvPr id="22" name="テキスト ボックス 21">
+              <a:extLst>
+                <a:ext uri="{FF2B5EF4-FFF2-40B4-BE49-F238E27FC236}">
+                  <a16:creationId xmlns:a16="http://schemas.microsoft.com/office/drawing/2014/main" id="{ECD085B9-4B7B-415E-803A-F33854E09DBB}"/>
+                </a:ext>
+              </a:extLst>
+            </p:cNvPr>
+            <p:cNvSpPr txBox="1"/>
+            <p:nvPr/>
+          </p:nvSpPr>
+          <p:spPr>
+            <a:xfrm>
+              <a:off x="1748440" y="1989347"/>
+              <a:ext cx="1179576" cy="461665"/>
+            </a:xfrm>
+            <a:prstGeom prst="rect">
+              <a:avLst/>
+            </a:prstGeom>
+            <a:noFill/>
+          </p:spPr>
+          <p:txBody>
+            <a:bodyPr wrap="square" rtlCol="0">
+              <a:spAutoFit/>
+            </a:bodyPr>
+            <a:lstStyle/>
+            <a:p>
+              <a:r>
+                <a:rPr kumimoji="1" lang="en-US" altLang="ja-JP" sz="2400" dirty="0">
+                  <a:latin typeface="Times New Roman" panose="02020603050405020304" pitchFamily="18" charset="0"/>
+                  <a:cs typeface="Times New Roman" panose="02020603050405020304" pitchFamily="18" charset="0"/>
+                </a:rPr>
+                <a:t>I</a:t>
+              </a:r>
+              <a:r>
+                <a:rPr kumimoji="1" lang="en-US" altLang="ja-JP" dirty="0">
+                  <a:latin typeface="Times New Roman" panose="02020603050405020304" pitchFamily="18" charset="0"/>
+                  <a:cs typeface="Times New Roman" panose="02020603050405020304" pitchFamily="18" charset="0"/>
+                </a:rPr>
+                <a:t>D</a:t>
+              </a:r>
+              <a:endParaRPr kumimoji="1" lang="ja-JP" altLang="en-US" sz="2400" dirty="0">
+                <a:latin typeface="Times New Roman" panose="02020603050405020304" pitchFamily="18" charset="0"/>
+                <a:cs typeface="Times New Roman" panose="02020603050405020304" pitchFamily="18" charset="0"/>
+              </a:endParaRPr>
+            </a:p>
+          </p:txBody>
+        </p:sp>
+        <p:grpSp>
+          <p:nvGrpSpPr>
+            <p:cNvPr id="238" name="グループ化 237">
+              <a:extLst>
+                <a:ext uri="{FF2B5EF4-FFF2-40B4-BE49-F238E27FC236}">
+                  <a16:creationId xmlns:a16="http://schemas.microsoft.com/office/drawing/2014/main" id="{8B412F70-488E-4EFC-B4BD-E8D866DE4562}"/>
+                </a:ext>
+              </a:extLst>
+            </p:cNvPr>
+            <p:cNvGrpSpPr/>
+            <p:nvPr/>
+          </p:nvGrpSpPr>
+          <p:grpSpPr>
+            <a:xfrm>
+              <a:off x="2157886" y="1992731"/>
+              <a:ext cx="7508312" cy="3721382"/>
+              <a:chOff x="2157886" y="1992731"/>
+              <a:chExt cx="6003429" cy="2975509"/>
+            </a:xfrm>
+          </p:grpSpPr>
+          <p:cxnSp>
+            <p:nvCxnSpPr>
+              <p:cNvPr id="132" name="直線コネクタ 131">
+                <a:extLst>
+                  <a:ext uri="{FF2B5EF4-FFF2-40B4-BE49-F238E27FC236}">
+                    <a16:creationId xmlns:a16="http://schemas.microsoft.com/office/drawing/2014/main" id="{FA9E682C-CCEB-4D8E-BBE1-70A914B709BB}"/>
+                  </a:ext>
+                </a:extLst>
+              </p:cNvPr>
+              <p:cNvCxnSpPr>
+                <a:cxnSpLocks/>
+              </p:cNvCxnSpPr>
+              <p:nvPr/>
+            </p:nvCxnSpPr>
+            <p:spPr>
+              <a:xfrm>
+                <a:off x="4826122" y="2597105"/>
+                <a:ext cx="2003303" cy="1679312"/>
+              </a:xfrm>
+              <a:prstGeom prst="line">
+                <a:avLst/>
+              </a:prstGeom>
+              <a:ln w="19050">
+                <a:solidFill>
+                  <a:srgbClr val="00B0F0"/>
+                </a:solidFill>
+              </a:ln>
+            </p:spPr>
+            <p:style>
+              <a:lnRef idx="1">
+                <a:schemeClr val="accent1"/>
+              </a:lnRef>
+              <a:fillRef idx="0">
+                <a:schemeClr val="accent1"/>
+              </a:fillRef>
+              <a:effectRef idx="0">
+                <a:schemeClr val="accent1"/>
+              </a:effectRef>
+              <a:fontRef idx="minor">
+                <a:schemeClr val="tx1"/>
+              </a:fontRef>
+            </p:style>
+          </p:cxnSp>
+          <p:cxnSp>
+            <p:nvCxnSpPr>
+              <p:cNvPr id="16" name="コネクタ: カギ線 15">
+                <a:extLst>
+                  <a:ext uri="{FF2B5EF4-FFF2-40B4-BE49-F238E27FC236}">
+                    <a16:creationId xmlns:a16="http://schemas.microsoft.com/office/drawing/2014/main" id="{3C31A690-594E-4107-8245-237A51A39835}"/>
+                  </a:ext>
+                </a:extLst>
+              </p:cNvPr>
+              <p:cNvCxnSpPr>
+                <a:cxnSpLocks/>
+              </p:cNvCxnSpPr>
+              <p:nvPr/>
+            </p:nvCxnSpPr>
+            <p:spPr>
+              <a:xfrm>
+                <a:off x="4828786" y="2268831"/>
+                <a:ext cx="2230027" cy="2012848"/>
+              </a:xfrm>
+              <a:prstGeom prst="bentConnector3">
+                <a:avLst>
+                  <a:gd name="adj1" fmla="val -187"/>
+                </a:avLst>
+              </a:prstGeom>
+              <a:ln w="38100">
+                <a:solidFill>
+                  <a:schemeClr val="tx1"/>
+                </a:solidFill>
+                <a:headEnd type="triangle"/>
+                <a:tailEnd type="triangle"/>
+              </a:ln>
+            </p:spPr>
+            <p:style>
+              <a:lnRef idx="1">
+                <a:schemeClr val="accent1"/>
+              </a:lnRef>
+              <a:fillRef idx="0">
+                <a:schemeClr val="accent1"/>
+              </a:fillRef>
+              <a:effectRef idx="0">
+                <a:schemeClr val="accent1"/>
+              </a:effectRef>
+              <a:fontRef idx="minor">
+                <a:schemeClr val="tx1"/>
+              </a:fontRef>
+            </p:style>
+          </p:cxnSp>
+          <p:cxnSp>
+            <p:nvCxnSpPr>
+              <p:cNvPr id="17" name="コネクタ: カギ線 16">
+                <a:extLst>
+                  <a:ext uri="{FF2B5EF4-FFF2-40B4-BE49-F238E27FC236}">
+                    <a16:creationId xmlns:a16="http://schemas.microsoft.com/office/drawing/2014/main" id="{6764C93D-8F07-444D-9ECA-C6864EE0934E}"/>
+                  </a:ext>
+                </a:extLst>
+              </p:cNvPr>
+              <p:cNvCxnSpPr>
+                <a:cxnSpLocks/>
+              </p:cNvCxnSpPr>
+              <p:nvPr/>
+            </p:nvCxnSpPr>
+            <p:spPr>
+              <a:xfrm rot="16200000" flipH="1">
+                <a:off x="1966029" y="2417301"/>
+                <a:ext cx="2050971" cy="1667257"/>
+              </a:xfrm>
+              <a:prstGeom prst="bentConnector3">
+                <a:avLst>
+                  <a:gd name="adj1" fmla="val 99925"/>
+                </a:avLst>
+              </a:prstGeom>
+              <a:ln w="38100">
+                <a:solidFill>
+                  <a:schemeClr val="tx1"/>
+                </a:solidFill>
+                <a:headEnd type="triangle"/>
+                <a:tailEnd type="triangle"/>
+              </a:ln>
+            </p:spPr>
+            <p:style>
+              <a:lnRef idx="1">
+                <a:schemeClr val="accent1"/>
+              </a:lnRef>
+              <a:fillRef idx="0">
+                <a:schemeClr val="accent1"/>
+              </a:fillRef>
+              <a:effectRef idx="0">
+                <a:schemeClr val="accent1"/>
+              </a:effectRef>
+              <a:fontRef idx="minor">
+                <a:schemeClr val="tx1"/>
+              </a:fontRef>
+            </p:style>
+          </p:cxnSp>
+          <p:sp>
+            <p:nvSpPr>
+              <p:cNvPr id="23" name="テキスト ボックス 22">
+                <a:extLst>
+                  <a:ext uri="{FF2B5EF4-FFF2-40B4-BE49-F238E27FC236}">
+                    <a16:creationId xmlns:a16="http://schemas.microsoft.com/office/drawing/2014/main" id="{4F81E0C0-77E7-4FB3-84AB-BA019F3F1773}"/>
+                  </a:ext>
+                </a:extLst>
+              </p:cNvPr>
+              <p:cNvSpPr txBox="1"/>
+              <p:nvPr/>
+            </p:nvSpPr>
+            <p:spPr>
+              <a:xfrm>
+                <a:off x="4403251" y="1992731"/>
+                <a:ext cx="1179576" cy="461665"/>
+              </a:xfrm>
+              <a:prstGeom prst="rect">
+                <a:avLst/>
+              </a:prstGeom>
+              <a:noFill/>
+            </p:spPr>
+            <p:txBody>
+              <a:bodyPr wrap="square" rtlCol="0">
+                <a:spAutoFit/>
+              </a:bodyPr>
+              <a:lstStyle/>
+              <a:p>
+                <a:r>
+                  <a:rPr kumimoji="1" lang="en-US" altLang="ja-JP" sz="2400" dirty="0">
+                    <a:latin typeface="Times New Roman" panose="02020603050405020304" pitchFamily="18" charset="0"/>
+                    <a:cs typeface="Times New Roman" panose="02020603050405020304" pitchFamily="18" charset="0"/>
+                  </a:rPr>
+                  <a:t>I</a:t>
+                </a:r>
+                <a:r>
+                  <a:rPr kumimoji="1" lang="en-US" altLang="ja-JP" dirty="0">
+                    <a:latin typeface="Times New Roman" panose="02020603050405020304" pitchFamily="18" charset="0"/>
+                    <a:cs typeface="Times New Roman" panose="02020603050405020304" pitchFamily="18" charset="0"/>
+                  </a:rPr>
+                  <a:t>D</a:t>
+                </a:r>
+                <a:endParaRPr kumimoji="1" lang="ja-JP" altLang="en-US" sz="2400" dirty="0">
+                  <a:latin typeface="Times New Roman" panose="02020603050405020304" pitchFamily="18" charset="0"/>
+                  <a:cs typeface="Times New Roman" panose="02020603050405020304" pitchFamily="18" charset="0"/>
+                </a:endParaRPr>
+              </a:p>
+            </p:txBody>
+          </p:sp>
+          <p:sp>
+            <p:nvSpPr>
+              <p:cNvPr id="24" name="テキスト ボックス 23">
+                <a:extLst>
+                  <a:ext uri="{FF2B5EF4-FFF2-40B4-BE49-F238E27FC236}">
+                    <a16:creationId xmlns:a16="http://schemas.microsoft.com/office/drawing/2014/main" id="{FD8FB351-16BA-450C-8921-2FA6D05C3840}"/>
+                  </a:ext>
+                </a:extLst>
+              </p:cNvPr>
+              <p:cNvSpPr txBox="1"/>
+              <p:nvPr/>
+            </p:nvSpPr>
+            <p:spPr>
+              <a:xfrm>
+                <a:off x="6981739" y="4050847"/>
+                <a:ext cx="1179576" cy="461665"/>
+              </a:xfrm>
+              <a:prstGeom prst="rect">
+                <a:avLst/>
+              </a:prstGeom>
+              <a:noFill/>
+            </p:spPr>
+            <p:txBody>
+              <a:bodyPr wrap="square" rtlCol="0">
+                <a:spAutoFit/>
+              </a:bodyPr>
+              <a:lstStyle/>
+              <a:p>
+                <a:r>
+                  <a:rPr kumimoji="1" lang="en-US" altLang="ja-JP" sz="2400" dirty="0">
+                    <a:latin typeface="Times New Roman" panose="02020603050405020304" pitchFamily="18" charset="0"/>
+                    <a:cs typeface="Times New Roman" panose="02020603050405020304" pitchFamily="18" charset="0"/>
+                  </a:rPr>
+                  <a:t>V</a:t>
+                </a:r>
+                <a:r>
+                  <a:rPr kumimoji="1" lang="en-US" altLang="ja-JP" dirty="0">
+                    <a:latin typeface="Times New Roman" panose="02020603050405020304" pitchFamily="18" charset="0"/>
+                    <a:cs typeface="Times New Roman" panose="02020603050405020304" pitchFamily="18" charset="0"/>
+                  </a:rPr>
+                  <a:t>DS</a:t>
+                </a:r>
+                <a:endParaRPr kumimoji="1" lang="ja-JP" altLang="en-US" sz="2400" dirty="0">
+                  <a:latin typeface="Times New Roman" panose="02020603050405020304" pitchFamily="18" charset="0"/>
+                  <a:cs typeface="Times New Roman" panose="02020603050405020304" pitchFamily="18" charset="0"/>
+                </a:endParaRPr>
+              </a:p>
+            </p:txBody>
+          </p:sp>
+          <p:sp>
+            <p:nvSpPr>
+              <p:cNvPr id="29" name="テキスト ボックス 28">
+                <a:extLst>
+                  <a:ext uri="{FF2B5EF4-FFF2-40B4-BE49-F238E27FC236}">
+                    <a16:creationId xmlns:a16="http://schemas.microsoft.com/office/drawing/2014/main" id="{C0ACA7E7-9A54-4C9C-9600-50C5A30E5B98}"/>
+                  </a:ext>
+                </a:extLst>
+              </p:cNvPr>
+              <p:cNvSpPr txBox="1"/>
+              <p:nvPr/>
+            </p:nvSpPr>
+            <p:spPr>
+              <a:xfrm>
+                <a:off x="3813463" y="4028119"/>
+                <a:ext cx="1179576" cy="461665"/>
+              </a:xfrm>
+              <a:prstGeom prst="rect">
+                <a:avLst/>
+              </a:prstGeom>
+              <a:noFill/>
+            </p:spPr>
+            <p:txBody>
+              <a:bodyPr wrap="square" rtlCol="0">
+                <a:spAutoFit/>
+              </a:bodyPr>
+              <a:lstStyle/>
+              <a:p>
+                <a:r>
+                  <a:rPr kumimoji="1" lang="en-US" altLang="ja-JP" sz="2400" dirty="0">
+                    <a:latin typeface="Times New Roman" panose="02020603050405020304" pitchFamily="18" charset="0"/>
+                    <a:cs typeface="Times New Roman" panose="02020603050405020304" pitchFamily="18" charset="0"/>
+                  </a:rPr>
+                  <a:t>V</a:t>
+                </a:r>
+                <a:r>
+                  <a:rPr kumimoji="1" lang="en-US" altLang="ja-JP" dirty="0">
+                    <a:latin typeface="Times New Roman" panose="02020603050405020304" pitchFamily="18" charset="0"/>
+                    <a:cs typeface="Times New Roman" panose="02020603050405020304" pitchFamily="18" charset="0"/>
+                  </a:rPr>
+                  <a:t>GS</a:t>
+                </a:r>
+                <a:endParaRPr kumimoji="1" lang="ja-JP" altLang="en-US" sz="2400" dirty="0">
+                  <a:latin typeface="Times New Roman" panose="02020603050405020304" pitchFamily="18" charset="0"/>
+                  <a:cs typeface="Times New Roman" panose="02020603050405020304" pitchFamily="18" charset="0"/>
+                </a:endParaRPr>
+              </a:p>
+            </p:txBody>
+          </p:sp>
+          <p:sp>
+            <p:nvSpPr>
+              <p:cNvPr id="40" name="テキスト ボックス 39">
+                <a:extLst>
+                  <a:ext uri="{FF2B5EF4-FFF2-40B4-BE49-F238E27FC236}">
+                    <a16:creationId xmlns:a16="http://schemas.microsoft.com/office/drawing/2014/main" id="{2623552A-D856-4A2A-A21B-4292D145B62F}"/>
+                  </a:ext>
+                </a:extLst>
+              </p:cNvPr>
+              <p:cNvSpPr txBox="1"/>
+              <p:nvPr/>
+            </p:nvSpPr>
+            <p:spPr>
+              <a:xfrm>
+                <a:off x="6391951" y="4393036"/>
+                <a:ext cx="1179576" cy="461665"/>
+              </a:xfrm>
+              <a:prstGeom prst="rect">
+                <a:avLst/>
+              </a:prstGeom>
+              <a:noFill/>
+            </p:spPr>
+            <p:txBody>
+              <a:bodyPr wrap="square" rtlCol="0">
+                <a:spAutoFit/>
+              </a:bodyPr>
+              <a:lstStyle/>
+              <a:p>
+                <a:r>
+                  <a:rPr kumimoji="1" lang="en-US" altLang="ja-JP" sz="2400" dirty="0">
+                    <a:latin typeface="Times New Roman" panose="02020603050405020304" pitchFamily="18" charset="0"/>
+                    <a:cs typeface="Times New Roman" panose="02020603050405020304" pitchFamily="18" charset="0"/>
+                  </a:rPr>
+                  <a:t>V</a:t>
+                </a:r>
+                <a:r>
+                  <a:rPr kumimoji="1" lang="en-US" altLang="ja-JP" dirty="0">
+                    <a:latin typeface="Times New Roman" panose="02020603050405020304" pitchFamily="18" charset="0"/>
+                    <a:cs typeface="Times New Roman" panose="02020603050405020304" pitchFamily="18" charset="0"/>
+                  </a:rPr>
+                  <a:t>D</a:t>
+                </a:r>
+                <a:r>
+                  <a:rPr kumimoji="1" lang="en-US" altLang="ja-JP" sz="2400" dirty="0">
+                    <a:latin typeface="Times New Roman" panose="02020603050405020304" pitchFamily="18" charset="0"/>
+                    <a:cs typeface="Times New Roman" panose="02020603050405020304" pitchFamily="18" charset="0"/>
+                  </a:rPr>
+                  <a:t>(t)</a:t>
+                </a:r>
+                <a:endParaRPr kumimoji="1" lang="ja-JP" altLang="en-US" sz="2400" dirty="0">
+                  <a:latin typeface="Times New Roman" panose="02020603050405020304" pitchFamily="18" charset="0"/>
+                  <a:cs typeface="Times New Roman" panose="02020603050405020304" pitchFamily="18" charset="0"/>
+                </a:endParaRPr>
+              </a:p>
+            </p:txBody>
+          </p:sp>
+          <p:sp>
+            <p:nvSpPr>
+              <p:cNvPr id="83" name="テキスト ボックス 82">
+                <a:extLst>
+                  <a:ext uri="{FF2B5EF4-FFF2-40B4-BE49-F238E27FC236}">
+                    <a16:creationId xmlns:a16="http://schemas.microsoft.com/office/drawing/2014/main" id="{AA4E35AF-9763-4CA1-A266-20638B005CF5}"/>
+                  </a:ext>
+                </a:extLst>
+              </p:cNvPr>
+              <p:cNvSpPr txBox="1"/>
+              <p:nvPr/>
+            </p:nvSpPr>
+            <p:spPr>
+              <a:xfrm>
+                <a:off x="3094562" y="4693011"/>
+                <a:ext cx="1179576" cy="275229"/>
+              </a:xfrm>
+              <a:prstGeom prst="rect">
+                <a:avLst/>
+              </a:prstGeom>
+              <a:noFill/>
+            </p:spPr>
+            <p:txBody>
+              <a:bodyPr wrap="square" rtlCol="0">
+                <a:spAutoFit/>
+              </a:bodyPr>
+              <a:lstStyle/>
+              <a:p>
+                <a:r>
+                  <a:rPr kumimoji="1" lang="en-US" altLang="ja-JP" sz="2400" dirty="0">
+                    <a:solidFill>
+                      <a:srgbClr val="FF0000"/>
+                    </a:solidFill>
+                    <a:latin typeface="Times New Roman" panose="02020603050405020304" pitchFamily="18" charset="0"/>
+                    <a:cs typeface="Times New Roman" panose="02020603050405020304" pitchFamily="18" charset="0"/>
+                  </a:rPr>
+                  <a:t>V</a:t>
+                </a:r>
+                <a:r>
+                  <a:rPr kumimoji="1" lang="en-US" altLang="ja-JP" dirty="0">
+                    <a:solidFill>
+                      <a:srgbClr val="FF0000"/>
+                    </a:solidFill>
+                    <a:latin typeface="Times New Roman" panose="02020603050405020304" pitchFamily="18" charset="0"/>
+                    <a:cs typeface="Times New Roman" panose="02020603050405020304" pitchFamily="18" charset="0"/>
+                  </a:rPr>
+                  <a:t>G</a:t>
+                </a:r>
+                <a:r>
+                  <a:rPr kumimoji="1" lang="en-US" altLang="ja-JP" sz="2400" dirty="0">
+                    <a:solidFill>
+                      <a:srgbClr val="FF0000"/>
+                    </a:solidFill>
+                    <a:latin typeface="Times New Roman" panose="02020603050405020304" pitchFamily="18" charset="0"/>
+                    <a:cs typeface="Times New Roman" panose="02020603050405020304" pitchFamily="18" charset="0"/>
+                  </a:rPr>
+                  <a:t>(t)</a:t>
+                </a:r>
+                <a:endParaRPr kumimoji="1" lang="ja-JP" altLang="en-US" sz="2400" dirty="0">
+                  <a:solidFill>
+                    <a:srgbClr val="FF0000"/>
+                  </a:solidFill>
+                  <a:latin typeface="Times New Roman" panose="02020603050405020304" pitchFamily="18" charset="0"/>
+                  <a:cs typeface="Times New Roman" panose="02020603050405020304" pitchFamily="18" charset="0"/>
+                </a:endParaRPr>
+              </a:p>
+            </p:txBody>
+          </p:sp>
+          <p:sp>
+            <p:nvSpPr>
+              <p:cNvPr id="121" name="フリーフォーム: 図形 120">
+                <a:extLst>
+                  <a:ext uri="{FF2B5EF4-FFF2-40B4-BE49-F238E27FC236}">
+                    <a16:creationId xmlns:a16="http://schemas.microsoft.com/office/drawing/2014/main" id="{75F76D0C-E2D0-47CB-9D6E-0BBB849BFAB3}"/>
+                  </a:ext>
+                </a:extLst>
+              </p:cNvPr>
+              <p:cNvSpPr/>
+              <p:nvPr/>
+            </p:nvSpPr>
+            <p:spPr>
+              <a:xfrm>
+                <a:off x="2165507" y="2559050"/>
+                <a:ext cx="1179576" cy="1722628"/>
+              </a:xfrm>
+              <a:custGeom>
+                <a:avLst/>
+                <a:gdLst>
+                  <a:gd name="connsiteX0" fmla="*/ 0 w 2600325"/>
+                  <a:gd name="connsiteY0" fmla="*/ 4410075 h 4410075"/>
+                  <a:gd name="connsiteX1" fmla="*/ 885825 w 2600325"/>
+                  <a:gd name="connsiteY1" fmla="*/ 4381500 h 4410075"/>
+                  <a:gd name="connsiteX2" fmla="*/ 1447800 w 2600325"/>
+                  <a:gd name="connsiteY2" fmla="*/ 4276725 h 4410075"/>
+                  <a:gd name="connsiteX3" fmla="*/ 1990725 w 2600325"/>
+                  <a:gd name="connsiteY3" fmla="*/ 3571875 h 4410075"/>
+                  <a:gd name="connsiteX4" fmla="*/ 2371725 w 2600325"/>
+                  <a:gd name="connsiteY4" fmla="*/ 1943100 h 4410075"/>
+                  <a:gd name="connsiteX5" fmla="*/ 2600325 w 2600325"/>
+                  <a:gd name="connsiteY5" fmla="*/ 0 h 4410075"/>
+                </a:gdLst>
+                <a:ahLst/>
+                <a:cxnLst>
+                  <a:cxn ang="0">
+                    <a:pos x="connsiteX0" y="connsiteY0"/>
+                  </a:cxn>
+                  <a:cxn ang="0">
+                    <a:pos x="connsiteX1" y="connsiteY1"/>
+                  </a:cxn>
+                  <a:cxn ang="0">
+                    <a:pos x="connsiteX2" y="connsiteY2"/>
+                  </a:cxn>
+                  <a:cxn ang="0">
+                    <a:pos x="connsiteX3" y="connsiteY3"/>
+                  </a:cxn>
+                  <a:cxn ang="0">
+                    <a:pos x="connsiteX4" y="connsiteY4"/>
+                  </a:cxn>
+                  <a:cxn ang="0">
+                    <a:pos x="connsiteX5" y="connsiteY5"/>
+                  </a:cxn>
+                </a:cxnLst>
+                <a:rect l="l" t="t" r="r" b="b"/>
+                <a:pathLst>
+                  <a:path w="2600325" h="4410075">
+                    <a:moveTo>
+                      <a:pt x="0" y="4410075"/>
+                    </a:moveTo>
+                    <a:cubicBezTo>
+                      <a:pt x="322262" y="4406900"/>
+                      <a:pt x="644525" y="4403725"/>
+                      <a:pt x="885825" y="4381500"/>
+                    </a:cubicBezTo>
+                    <a:cubicBezTo>
+                      <a:pt x="1127125" y="4359275"/>
+                      <a:pt x="1263650" y="4411663"/>
+                      <a:pt x="1447800" y="4276725"/>
+                    </a:cubicBezTo>
+                    <a:cubicBezTo>
+                      <a:pt x="1631950" y="4141787"/>
+                      <a:pt x="1836738" y="3960812"/>
+                      <a:pt x="1990725" y="3571875"/>
+                    </a:cubicBezTo>
+                    <a:cubicBezTo>
+                      <a:pt x="2144712" y="3182938"/>
+                      <a:pt x="2270125" y="2538412"/>
+                      <a:pt x="2371725" y="1943100"/>
+                    </a:cubicBezTo>
+                    <a:cubicBezTo>
+                      <a:pt x="2473325" y="1347788"/>
+                      <a:pt x="2536825" y="673894"/>
+                      <a:pt x="2600325" y="0"/>
+                    </a:cubicBezTo>
+                  </a:path>
+                </a:pathLst>
+              </a:custGeom>
+              <a:noFill/>
+              <a:ln w="28575">
+                <a:solidFill>
+                  <a:schemeClr val="tx1"/>
+                </a:solidFill>
+              </a:ln>
+            </p:spPr>
+            <p:style>
+              <a:lnRef idx="2">
+                <a:schemeClr val="accent1">
+                  <a:shade val="50000"/>
+                </a:schemeClr>
+              </a:lnRef>
+              <a:fillRef idx="1">
+                <a:schemeClr val="accent1"/>
+              </a:fillRef>
+              <a:effectRef idx="0">
+                <a:schemeClr val="accent1"/>
+              </a:effectRef>
+              <a:fontRef idx="minor">
+                <a:schemeClr val="lt1"/>
+              </a:fontRef>
+            </p:style>
+            <p:txBody>
+              <a:bodyPr rtlCol="0" anchor="ctr"/>
+              <a:lstStyle/>
+              <a:p>
+                <a:pPr algn="ctr"/>
+                <a:endParaRPr kumimoji="1" lang="ja-JP" altLang="en-US" dirty="0"/>
+              </a:p>
+            </p:txBody>
+          </p:sp>
+          <p:sp>
+            <p:nvSpPr>
+              <p:cNvPr id="126" name="フリーフォーム: 図形 125">
+                <a:extLst>
+                  <a:ext uri="{FF2B5EF4-FFF2-40B4-BE49-F238E27FC236}">
+                    <a16:creationId xmlns:a16="http://schemas.microsoft.com/office/drawing/2014/main" id="{55CC3D4C-1C12-4BE2-BE23-67EB512AE15D}"/>
+                  </a:ext>
+                </a:extLst>
+              </p:cNvPr>
+              <p:cNvSpPr/>
+              <p:nvPr/>
+            </p:nvSpPr>
+            <p:spPr>
+              <a:xfrm>
+                <a:off x="4844030" y="3623725"/>
+                <a:ext cx="2137709" cy="652693"/>
+              </a:xfrm>
+              <a:custGeom>
+                <a:avLst/>
+                <a:gdLst>
+                  <a:gd name="connsiteX0" fmla="*/ 0 w 5076825"/>
+                  <a:gd name="connsiteY0" fmla="*/ 1838325 h 1838325"/>
+                  <a:gd name="connsiteX1" fmla="*/ 200025 w 5076825"/>
+                  <a:gd name="connsiteY1" fmla="*/ 914400 h 1838325"/>
+                  <a:gd name="connsiteX2" fmla="*/ 590550 w 5076825"/>
+                  <a:gd name="connsiteY2" fmla="*/ 304800 h 1838325"/>
+                  <a:gd name="connsiteX3" fmla="*/ 1295400 w 5076825"/>
+                  <a:gd name="connsiteY3" fmla="*/ 95250 h 1838325"/>
+                  <a:gd name="connsiteX4" fmla="*/ 2876550 w 5076825"/>
+                  <a:gd name="connsiteY4" fmla="*/ 47625 h 1838325"/>
+                  <a:gd name="connsiteX5" fmla="*/ 5076825 w 5076825"/>
+                  <a:gd name="connsiteY5" fmla="*/ 0 h 1838325"/>
+                </a:gdLst>
+                <a:ahLst/>
+                <a:cxnLst>
+                  <a:cxn ang="0">
+                    <a:pos x="connsiteX0" y="connsiteY0"/>
+                  </a:cxn>
+                  <a:cxn ang="0">
+                    <a:pos x="connsiteX1" y="connsiteY1"/>
+                  </a:cxn>
+                  <a:cxn ang="0">
+                    <a:pos x="connsiteX2" y="connsiteY2"/>
+                  </a:cxn>
+                  <a:cxn ang="0">
+                    <a:pos x="connsiteX3" y="connsiteY3"/>
+                  </a:cxn>
+                  <a:cxn ang="0">
+                    <a:pos x="connsiteX4" y="connsiteY4"/>
+                  </a:cxn>
+                  <a:cxn ang="0">
+                    <a:pos x="connsiteX5" y="connsiteY5"/>
+                  </a:cxn>
+                </a:cxnLst>
+                <a:rect l="l" t="t" r="r" b="b"/>
+                <a:pathLst>
+                  <a:path w="5076825" h="1838325">
+                    <a:moveTo>
+                      <a:pt x="0" y="1838325"/>
+                    </a:moveTo>
+                    <a:cubicBezTo>
+                      <a:pt x="50800" y="1504156"/>
+                      <a:pt x="101600" y="1169987"/>
+                      <a:pt x="200025" y="914400"/>
+                    </a:cubicBezTo>
+                    <a:cubicBezTo>
+                      <a:pt x="298450" y="658813"/>
+                      <a:pt x="407988" y="441325"/>
+                      <a:pt x="590550" y="304800"/>
+                    </a:cubicBezTo>
+                    <a:cubicBezTo>
+                      <a:pt x="773112" y="168275"/>
+                      <a:pt x="914400" y="138112"/>
+                      <a:pt x="1295400" y="95250"/>
+                    </a:cubicBezTo>
+                    <a:cubicBezTo>
+                      <a:pt x="1676400" y="52388"/>
+                      <a:pt x="2876550" y="47625"/>
+                      <a:pt x="2876550" y="47625"/>
+                    </a:cubicBezTo>
+                    <a:lnTo>
+                      <a:pt x="5076825" y="0"/>
+                    </a:lnTo>
+                  </a:path>
+                </a:pathLst>
+              </a:custGeom>
+              <a:noFill/>
+              <a:ln w="28575">
+                <a:solidFill>
+                  <a:schemeClr val="tx1"/>
+                </a:solidFill>
+              </a:ln>
+            </p:spPr>
+            <p:style>
+              <a:lnRef idx="2">
+                <a:schemeClr val="accent1">
+                  <a:shade val="50000"/>
+                </a:schemeClr>
+              </a:lnRef>
+              <a:fillRef idx="1">
+                <a:schemeClr val="accent1"/>
+              </a:fillRef>
+              <a:effectRef idx="0">
+                <a:schemeClr val="accent1"/>
+              </a:effectRef>
+              <a:fontRef idx="minor">
+                <a:schemeClr val="lt1"/>
+              </a:fontRef>
+            </p:style>
+            <p:txBody>
+              <a:bodyPr rtlCol="0" anchor="ctr"/>
+              <a:lstStyle/>
+              <a:p>
+                <a:pPr algn="ctr"/>
+                <a:endParaRPr kumimoji="1" lang="ja-JP" altLang="en-US"/>
+              </a:p>
+            </p:txBody>
+          </p:sp>
+          <p:sp>
+            <p:nvSpPr>
+              <p:cNvPr id="127" name="フリーフォーム: 図形 126">
+                <a:extLst>
+                  <a:ext uri="{FF2B5EF4-FFF2-40B4-BE49-F238E27FC236}">
+                    <a16:creationId xmlns:a16="http://schemas.microsoft.com/office/drawing/2014/main" id="{0C207EFA-1FDA-4334-8BC1-234EE7ED8728}"/>
+                  </a:ext>
+                </a:extLst>
+              </p:cNvPr>
+              <p:cNvSpPr/>
+              <p:nvPr/>
+            </p:nvSpPr>
+            <p:spPr>
+              <a:xfrm>
+                <a:off x="4841366" y="3430834"/>
+                <a:ext cx="2137709" cy="840966"/>
+              </a:xfrm>
+              <a:custGeom>
+                <a:avLst/>
+                <a:gdLst>
+                  <a:gd name="connsiteX0" fmla="*/ 0 w 5076825"/>
+                  <a:gd name="connsiteY0" fmla="*/ 1838325 h 1838325"/>
+                  <a:gd name="connsiteX1" fmla="*/ 200025 w 5076825"/>
+                  <a:gd name="connsiteY1" fmla="*/ 914400 h 1838325"/>
+                  <a:gd name="connsiteX2" fmla="*/ 590550 w 5076825"/>
+                  <a:gd name="connsiteY2" fmla="*/ 304800 h 1838325"/>
+                  <a:gd name="connsiteX3" fmla="*/ 1295400 w 5076825"/>
+                  <a:gd name="connsiteY3" fmla="*/ 95250 h 1838325"/>
+                  <a:gd name="connsiteX4" fmla="*/ 2876550 w 5076825"/>
+                  <a:gd name="connsiteY4" fmla="*/ 47625 h 1838325"/>
+                  <a:gd name="connsiteX5" fmla="*/ 5076825 w 5076825"/>
+                  <a:gd name="connsiteY5" fmla="*/ 0 h 1838325"/>
+                </a:gdLst>
+                <a:ahLst/>
+                <a:cxnLst>
+                  <a:cxn ang="0">
+                    <a:pos x="connsiteX0" y="connsiteY0"/>
+                  </a:cxn>
+                  <a:cxn ang="0">
+                    <a:pos x="connsiteX1" y="connsiteY1"/>
+                  </a:cxn>
+                  <a:cxn ang="0">
+                    <a:pos x="connsiteX2" y="connsiteY2"/>
+                  </a:cxn>
+                  <a:cxn ang="0">
+                    <a:pos x="connsiteX3" y="connsiteY3"/>
+                  </a:cxn>
+                  <a:cxn ang="0">
+                    <a:pos x="connsiteX4" y="connsiteY4"/>
+                  </a:cxn>
+                  <a:cxn ang="0">
+                    <a:pos x="connsiteX5" y="connsiteY5"/>
+                  </a:cxn>
+                </a:cxnLst>
+                <a:rect l="l" t="t" r="r" b="b"/>
+                <a:pathLst>
+                  <a:path w="5076825" h="1838325">
+                    <a:moveTo>
+                      <a:pt x="0" y="1838325"/>
+                    </a:moveTo>
+                    <a:cubicBezTo>
+                      <a:pt x="50800" y="1504156"/>
+                      <a:pt x="101600" y="1169987"/>
+                      <a:pt x="200025" y="914400"/>
+                    </a:cubicBezTo>
+                    <a:cubicBezTo>
+                      <a:pt x="298450" y="658813"/>
+                      <a:pt x="407988" y="441325"/>
+                      <a:pt x="590550" y="304800"/>
+                    </a:cubicBezTo>
+                    <a:cubicBezTo>
+                      <a:pt x="773112" y="168275"/>
+                      <a:pt x="914400" y="138112"/>
+                      <a:pt x="1295400" y="95250"/>
+                    </a:cubicBezTo>
+                    <a:cubicBezTo>
+                      <a:pt x="1676400" y="52388"/>
+                      <a:pt x="2876550" y="47625"/>
+                      <a:pt x="2876550" y="47625"/>
+                    </a:cubicBezTo>
+                    <a:lnTo>
+                      <a:pt x="5076825" y="0"/>
+                    </a:lnTo>
+                  </a:path>
+                </a:pathLst>
+              </a:custGeom>
+              <a:noFill/>
+              <a:ln w="28575">
+                <a:solidFill>
+                  <a:schemeClr val="tx1"/>
+                </a:solidFill>
+              </a:ln>
+            </p:spPr>
+            <p:style>
+              <a:lnRef idx="2">
+                <a:schemeClr val="accent1">
+                  <a:shade val="50000"/>
+                </a:schemeClr>
+              </a:lnRef>
+              <a:fillRef idx="1">
+                <a:schemeClr val="accent1"/>
+              </a:fillRef>
+              <a:effectRef idx="0">
+                <a:schemeClr val="accent1"/>
+              </a:effectRef>
+              <a:fontRef idx="minor">
+                <a:schemeClr val="lt1"/>
+              </a:fontRef>
+            </p:style>
+            <p:txBody>
+              <a:bodyPr rtlCol="0" anchor="ctr"/>
+              <a:lstStyle/>
+              <a:p>
+                <a:pPr algn="ctr"/>
+                <a:endParaRPr kumimoji="1" lang="ja-JP" altLang="en-US"/>
+              </a:p>
+            </p:txBody>
+          </p:sp>
+          <p:sp>
+            <p:nvSpPr>
+              <p:cNvPr id="128" name="フリーフォーム: 図形 127">
+                <a:extLst>
+                  <a:ext uri="{FF2B5EF4-FFF2-40B4-BE49-F238E27FC236}">
+                    <a16:creationId xmlns:a16="http://schemas.microsoft.com/office/drawing/2014/main" id="{96D6F749-AE47-43A2-B779-875778B9413E}"/>
+                  </a:ext>
+                </a:extLst>
+              </p:cNvPr>
+              <p:cNvSpPr/>
+              <p:nvPr/>
+            </p:nvSpPr>
+            <p:spPr>
+              <a:xfrm>
+                <a:off x="4844031" y="3234969"/>
+                <a:ext cx="2122465" cy="1045467"/>
+              </a:xfrm>
+              <a:custGeom>
+                <a:avLst/>
+                <a:gdLst>
+                  <a:gd name="connsiteX0" fmla="*/ 0 w 5076825"/>
+                  <a:gd name="connsiteY0" fmla="*/ 1838325 h 1838325"/>
+                  <a:gd name="connsiteX1" fmla="*/ 200025 w 5076825"/>
+                  <a:gd name="connsiteY1" fmla="*/ 914400 h 1838325"/>
+                  <a:gd name="connsiteX2" fmla="*/ 590550 w 5076825"/>
+                  <a:gd name="connsiteY2" fmla="*/ 304800 h 1838325"/>
+                  <a:gd name="connsiteX3" fmla="*/ 1295400 w 5076825"/>
+                  <a:gd name="connsiteY3" fmla="*/ 95250 h 1838325"/>
+                  <a:gd name="connsiteX4" fmla="*/ 2876550 w 5076825"/>
+                  <a:gd name="connsiteY4" fmla="*/ 47625 h 1838325"/>
+                  <a:gd name="connsiteX5" fmla="*/ 5076825 w 5076825"/>
+                  <a:gd name="connsiteY5" fmla="*/ 0 h 1838325"/>
+                </a:gdLst>
+                <a:ahLst/>
+                <a:cxnLst>
+                  <a:cxn ang="0">
+                    <a:pos x="connsiteX0" y="connsiteY0"/>
+                  </a:cxn>
+                  <a:cxn ang="0">
+                    <a:pos x="connsiteX1" y="connsiteY1"/>
+                  </a:cxn>
+                  <a:cxn ang="0">
+                    <a:pos x="connsiteX2" y="connsiteY2"/>
+                  </a:cxn>
+                  <a:cxn ang="0">
+                    <a:pos x="connsiteX3" y="connsiteY3"/>
+                  </a:cxn>
+                  <a:cxn ang="0">
+                    <a:pos x="connsiteX4" y="connsiteY4"/>
+                  </a:cxn>
+                  <a:cxn ang="0">
+                    <a:pos x="connsiteX5" y="connsiteY5"/>
+                  </a:cxn>
+                </a:cxnLst>
+                <a:rect l="l" t="t" r="r" b="b"/>
+                <a:pathLst>
+                  <a:path w="5076825" h="1838325">
+                    <a:moveTo>
+                      <a:pt x="0" y="1838325"/>
+                    </a:moveTo>
+                    <a:cubicBezTo>
+                      <a:pt x="50800" y="1504156"/>
+                      <a:pt x="101600" y="1169987"/>
+                      <a:pt x="200025" y="914400"/>
+                    </a:cubicBezTo>
+                    <a:cubicBezTo>
+                      <a:pt x="298450" y="658813"/>
+                      <a:pt x="407988" y="441325"/>
+                      <a:pt x="590550" y="304800"/>
+                    </a:cubicBezTo>
+                    <a:cubicBezTo>
+                      <a:pt x="773112" y="168275"/>
+                      <a:pt x="914400" y="138112"/>
+                      <a:pt x="1295400" y="95250"/>
+                    </a:cubicBezTo>
+                    <a:cubicBezTo>
+                      <a:pt x="1676400" y="52388"/>
+                      <a:pt x="2876550" y="47625"/>
+                      <a:pt x="2876550" y="47625"/>
+                    </a:cubicBezTo>
+                    <a:lnTo>
+                      <a:pt x="5076825" y="0"/>
+                    </a:lnTo>
+                  </a:path>
+                </a:pathLst>
+              </a:custGeom>
+              <a:noFill/>
+              <a:ln w="28575">
+                <a:solidFill>
+                  <a:schemeClr val="tx1"/>
+                </a:solidFill>
+              </a:ln>
+            </p:spPr>
+            <p:style>
+              <a:lnRef idx="2">
+                <a:schemeClr val="accent1">
+                  <a:shade val="50000"/>
+                </a:schemeClr>
+              </a:lnRef>
+              <a:fillRef idx="1">
+                <a:schemeClr val="accent1"/>
+              </a:fillRef>
+              <a:effectRef idx="0">
+                <a:schemeClr val="accent1"/>
+              </a:effectRef>
+              <a:fontRef idx="minor">
+                <a:schemeClr val="lt1"/>
+              </a:fontRef>
+            </p:style>
+            <p:txBody>
+              <a:bodyPr rtlCol="0" anchor="ctr"/>
+              <a:lstStyle/>
+              <a:p>
+                <a:pPr algn="ctr"/>
+                <a:endParaRPr kumimoji="1" lang="ja-JP" altLang="en-US" dirty="0"/>
+              </a:p>
+            </p:txBody>
+          </p:sp>
+          <p:sp>
+            <p:nvSpPr>
+              <p:cNvPr id="130" name="楕円 129">
+                <a:extLst>
+                  <a:ext uri="{FF2B5EF4-FFF2-40B4-BE49-F238E27FC236}">
+                    <a16:creationId xmlns:a16="http://schemas.microsoft.com/office/drawing/2014/main" id="{238DD4E8-32F9-44CB-9627-3481C6551A8E}"/>
+                  </a:ext>
+                </a:extLst>
+              </p:cNvPr>
+              <p:cNvSpPr/>
+              <p:nvPr/>
+            </p:nvSpPr>
+            <p:spPr>
+              <a:xfrm>
+                <a:off x="5836727" y="3430894"/>
+                <a:ext cx="45719" cy="50122"/>
+              </a:xfrm>
+              <a:prstGeom prst="ellipse">
+                <a:avLst/>
+              </a:prstGeom>
+              <a:solidFill>
+                <a:srgbClr val="C00000"/>
+              </a:solidFill>
+              <a:ln>
+                <a:solidFill>
+                  <a:srgbClr val="FF0000"/>
+                </a:solidFill>
+              </a:ln>
+            </p:spPr>
+            <p:style>
+              <a:lnRef idx="2">
+                <a:schemeClr val="accent1">
+                  <a:shade val="50000"/>
+                </a:schemeClr>
+              </a:lnRef>
+              <a:fillRef idx="1">
+                <a:schemeClr val="accent1"/>
+              </a:fillRef>
+              <a:effectRef idx="0">
+                <a:schemeClr val="accent1"/>
+              </a:effectRef>
+              <a:fontRef idx="minor">
+                <a:schemeClr val="lt1"/>
+              </a:fontRef>
+            </p:style>
+            <p:txBody>
+              <a:bodyPr rtlCol="0" anchor="ctr"/>
+              <a:lstStyle/>
+              <a:p>
+                <a:pPr algn="ctr"/>
+                <a:endParaRPr kumimoji="1" lang="ja-JP" altLang="en-US"/>
+              </a:p>
+            </p:txBody>
+          </p:sp>
+          <p:sp>
+            <p:nvSpPr>
+              <p:cNvPr id="134" name="楕円 133">
+                <a:extLst>
+                  <a:ext uri="{FF2B5EF4-FFF2-40B4-BE49-F238E27FC236}">
+                    <a16:creationId xmlns:a16="http://schemas.microsoft.com/office/drawing/2014/main" id="{9D1DE136-68F2-4075-8A4E-E0FCF33BA115}"/>
+                  </a:ext>
+                </a:extLst>
+              </p:cNvPr>
+              <p:cNvSpPr/>
+              <p:nvPr/>
+            </p:nvSpPr>
+            <p:spPr>
+              <a:xfrm>
+                <a:off x="3179602" y="3422501"/>
+                <a:ext cx="45719" cy="50122"/>
+              </a:xfrm>
+              <a:prstGeom prst="ellipse">
+                <a:avLst/>
+              </a:prstGeom>
+              <a:solidFill>
+                <a:srgbClr val="C00000"/>
+              </a:solidFill>
+              <a:ln>
+                <a:solidFill>
+                  <a:srgbClr val="FF0000"/>
+                </a:solidFill>
+              </a:ln>
+            </p:spPr>
+            <p:style>
+              <a:lnRef idx="2">
+                <a:schemeClr val="accent1">
+                  <a:shade val="50000"/>
+                </a:schemeClr>
+              </a:lnRef>
+              <a:fillRef idx="1">
+                <a:schemeClr val="accent1"/>
+              </a:fillRef>
+              <a:effectRef idx="0">
+                <a:schemeClr val="accent1"/>
+              </a:effectRef>
+              <a:fontRef idx="minor">
+                <a:schemeClr val="lt1"/>
+              </a:fontRef>
+            </p:style>
+            <p:txBody>
+              <a:bodyPr rtlCol="0" anchor="ctr"/>
+              <a:lstStyle/>
+              <a:p>
+                <a:pPr algn="ctr"/>
+                <a:endParaRPr kumimoji="1" lang="ja-JP" altLang="en-US"/>
+              </a:p>
+            </p:txBody>
+          </p:sp>
+          <p:cxnSp>
+            <p:nvCxnSpPr>
+              <p:cNvPr id="157" name="直線コネクタ 156">
+                <a:extLst>
+                  <a:ext uri="{FF2B5EF4-FFF2-40B4-BE49-F238E27FC236}">
+                    <a16:creationId xmlns:a16="http://schemas.microsoft.com/office/drawing/2014/main" id="{C9D74E10-CC8A-4077-9BAB-5DE2CA35C937}"/>
+                  </a:ext>
+                </a:extLst>
+              </p:cNvPr>
+              <p:cNvCxnSpPr>
+                <a:cxnSpLocks/>
+                <a:stCxn id="134" idx="4"/>
+              </p:cNvCxnSpPr>
+              <p:nvPr/>
+            </p:nvCxnSpPr>
+            <p:spPr>
+              <a:xfrm>
+                <a:off x="3202461" y="3472623"/>
+                <a:ext cx="4236" cy="1244428"/>
+              </a:xfrm>
+              <a:prstGeom prst="line">
+                <a:avLst/>
+              </a:prstGeom>
+              <a:ln w="12700">
+                <a:solidFill>
+                  <a:srgbClr val="FF0000"/>
+                </a:solidFill>
+                <a:prstDash val="lgDash"/>
+              </a:ln>
+            </p:spPr>
+            <p:style>
+              <a:lnRef idx="1">
+                <a:schemeClr val="accent1"/>
+              </a:lnRef>
+              <a:fillRef idx="0">
+                <a:schemeClr val="accent1"/>
+              </a:fillRef>
+              <a:effectRef idx="0">
+                <a:schemeClr val="accent1"/>
+              </a:effectRef>
+              <a:fontRef idx="minor">
+                <a:schemeClr val="tx1"/>
+              </a:fontRef>
+            </p:style>
+          </p:cxnSp>
+          <p:cxnSp>
+            <p:nvCxnSpPr>
+              <p:cNvPr id="161" name="直線コネクタ 160">
+                <a:extLst>
+                  <a:ext uri="{FF2B5EF4-FFF2-40B4-BE49-F238E27FC236}">
+                    <a16:creationId xmlns:a16="http://schemas.microsoft.com/office/drawing/2014/main" id="{2439F843-93F0-4E87-AAAE-4F45E510DF6D}"/>
+                  </a:ext>
+                </a:extLst>
+              </p:cNvPr>
+              <p:cNvCxnSpPr>
+                <a:cxnSpLocks/>
+              </p:cNvCxnSpPr>
+              <p:nvPr/>
+            </p:nvCxnSpPr>
+            <p:spPr>
+              <a:xfrm>
+                <a:off x="3249705" y="3265126"/>
+                <a:ext cx="0" cy="1395741"/>
+              </a:xfrm>
+              <a:prstGeom prst="line">
+                <a:avLst/>
+              </a:prstGeom>
+              <a:ln w="12700">
+                <a:solidFill>
+                  <a:schemeClr val="tx1"/>
+                </a:solidFill>
+                <a:prstDash val="lgDash"/>
+              </a:ln>
+            </p:spPr>
+            <p:style>
+              <a:lnRef idx="1">
+                <a:schemeClr val="accent1"/>
+              </a:lnRef>
+              <a:fillRef idx="0">
+                <a:schemeClr val="accent1"/>
+              </a:fillRef>
+              <a:effectRef idx="0">
+                <a:schemeClr val="accent1"/>
+              </a:effectRef>
+              <a:fontRef idx="minor">
+                <a:schemeClr val="tx1"/>
+              </a:fontRef>
+            </p:style>
+          </p:cxnSp>
+          <p:cxnSp>
+            <p:nvCxnSpPr>
+              <p:cNvPr id="162" name="直線コネクタ 161">
+                <a:extLst>
+                  <a:ext uri="{FF2B5EF4-FFF2-40B4-BE49-F238E27FC236}">
+                    <a16:creationId xmlns:a16="http://schemas.microsoft.com/office/drawing/2014/main" id="{349BF2C7-FC74-4261-843B-CAC62FC02302}"/>
+                  </a:ext>
+                </a:extLst>
+              </p:cNvPr>
+              <p:cNvCxnSpPr>
+                <a:cxnSpLocks/>
+              </p:cNvCxnSpPr>
+              <p:nvPr/>
+            </p:nvCxnSpPr>
+            <p:spPr>
+              <a:xfrm flipV="1">
+                <a:off x="3162295" y="3623725"/>
+                <a:ext cx="0" cy="999577"/>
+              </a:xfrm>
+              <a:prstGeom prst="line">
+                <a:avLst/>
+              </a:prstGeom>
+              <a:ln w="12700">
+                <a:solidFill>
+                  <a:schemeClr val="tx1"/>
+                </a:solidFill>
+                <a:prstDash val="lgDash"/>
+              </a:ln>
+            </p:spPr>
+            <p:style>
+              <a:lnRef idx="1">
+                <a:schemeClr val="accent1"/>
+              </a:lnRef>
+              <a:fillRef idx="0">
+                <a:schemeClr val="accent1"/>
+              </a:fillRef>
+              <a:effectRef idx="0">
+                <a:schemeClr val="accent1"/>
+              </a:effectRef>
+              <a:fontRef idx="minor">
+                <a:schemeClr val="tx1"/>
+              </a:fontRef>
+            </p:style>
+          </p:cxnSp>
+          <p:cxnSp>
+            <p:nvCxnSpPr>
+              <p:cNvPr id="182" name="直線コネクタ 181">
+                <a:extLst>
+                  <a:ext uri="{FF2B5EF4-FFF2-40B4-BE49-F238E27FC236}">
+                    <a16:creationId xmlns:a16="http://schemas.microsoft.com/office/drawing/2014/main" id="{5A17386B-494E-4737-A2B8-063D3DDB0178}"/>
+                  </a:ext>
+                </a:extLst>
+              </p:cNvPr>
+              <p:cNvCxnSpPr>
+                <a:stCxn id="121" idx="4"/>
+                <a:endCxn id="121" idx="4"/>
+              </p:cNvCxnSpPr>
+              <p:nvPr/>
+            </p:nvCxnSpPr>
+            <p:spPr>
+              <a:xfrm>
+                <a:off x="3241385" y="3318048"/>
+                <a:ext cx="0" cy="0"/>
+              </a:xfrm>
+              <a:prstGeom prst="line">
+                <a:avLst/>
+              </a:prstGeom>
+            </p:spPr>
+            <p:style>
+              <a:lnRef idx="1">
+                <a:schemeClr val="accent1"/>
+              </a:lnRef>
+              <a:fillRef idx="0">
+                <a:schemeClr val="accent1"/>
+              </a:fillRef>
+              <a:effectRef idx="0">
+                <a:schemeClr val="accent1"/>
+              </a:effectRef>
+              <a:fontRef idx="minor">
+                <a:schemeClr val="tx1"/>
+              </a:fontRef>
+            </p:style>
+          </p:cxnSp>
+          <p:cxnSp>
+            <p:nvCxnSpPr>
+              <p:cNvPr id="187" name="直線コネクタ 186">
+                <a:extLst>
+                  <a:ext uri="{FF2B5EF4-FFF2-40B4-BE49-F238E27FC236}">
+                    <a16:creationId xmlns:a16="http://schemas.microsoft.com/office/drawing/2014/main" id="{29051D43-327B-497A-A608-E1A758E0366A}"/>
+                  </a:ext>
+                </a:extLst>
+              </p:cNvPr>
+              <p:cNvCxnSpPr>
+                <a:cxnSpLocks/>
+              </p:cNvCxnSpPr>
+              <p:nvPr/>
+            </p:nvCxnSpPr>
+            <p:spPr>
+              <a:xfrm flipV="1">
+                <a:off x="3255172" y="3267113"/>
+                <a:ext cx="2374102" cy="1835"/>
+              </a:xfrm>
+              <a:prstGeom prst="line">
+                <a:avLst/>
+              </a:prstGeom>
+              <a:ln w="12700">
+                <a:solidFill>
+                  <a:schemeClr val="tx1"/>
+                </a:solidFill>
+                <a:prstDash val="lgDash"/>
+              </a:ln>
+            </p:spPr>
+            <p:style>
+              <a:lnRef idx="1">
+                <a:schemeClr val="accent1"/>
+              </a:lnRef>
+              <a:fillRef idx="0">
+                <a:schemeClr val="accent1"/>
+              </a:fillRef>
+              <a:effectRef idx="0">
+                <a:schemeClr val="accent1"/>
+              </a:effectRef>
+              <a:fontRef idx="minor">
+                <a:schemeClr val="tx1"/>
+              </a:fontRef>
+            </p:style>
+          </p:cxnSp>
+          <p:cxnSp>
+            <p:nvCxnSpPr>
+              <p:cNvPr id="193" name="直線コネクタ 192">
+                <a:extLst>
+                  <a:ext uri="{FF2B5EF4-FFF2-40B4-BE49-F238E27FC236}">
+                    <a16:creationId xmlns:a16="http://schemas.microsoft.com/office/drawing/2014/main" id="{0059B305-6872-46D7-9C02-19D1F7A6E80E}"/>
+                  </a:ext>
+                </a:extLst>
+              </p:cNvPr>
+              <p:cNvCxnSpPr>
+                <a:cxnSpLocks/>
+                <a:stCxn id="130" idx="2"/>
+                <a:endCxn id="134" idx="6"/>
+              </p:cNvCxnSpPr>
+              <p:nvPr/>
+            </p:nvCxnSpPr>
+            <p:spPr>
+              <a:xfrm flipH="1" flipV="1">
+                <a:off x="3225321" y="3447562"/>
+                <a:ext cx="2611406" cy="8393"/>
+              </a:xfrm>
+              <a:prstGeom prst="line">
+                <a:avLst/>
+              </a:prstGeom>
+              <a:ln w="12700">
+                <a:solidFill>
+                  <a:srgbClr val="FF0000"/>
+                </a:solidFill>
+                <a:prstDash val="lgDash"/>
+              </a:ln>
+            </p:spPr>
+            <p:style>
+              <a:lnRef idx="1">
+                <a:schemeClr val="accent1"/>
+              </a:lnRef>
+              <a:fillRef idx="0">
+                <a:schemeClr val="accent1"/>
+              </a:fillRef>
+              <a:effectRef idx="0">
+                <a:schemeClr val="accent1"/>
+              </a:effectRef>
+              <a:fontRef idx="minor">
+                <a:schemeClr val="tx1"/>
+              </a:fontRef>
+            </p:style>
+          </p:cxnSp>
+          <p:cxnSp>
+            <p:nvCxnSpPr>
+              <p:cNvPr id="206" name="直線コネクタ 205">
+                <a:extLst>
+                  <a:ext uri="{FF2B5EF4-FFF2-40B4-BE49-F238E27FC236}">
+                    <a16:creationId xmlns:a16="http://schemas.microsoft.com/office/drawing/2014/main" id="{A14D13DE-8BA0-485E-B4BD-4392227CB76B}"/>
+                  </a:ext>
+                </a:extLst>
+              </p:cNvPr>
+              <p:cNvCxnSpPr>
+                <a:cxnSpLocks/>
+                <a:endCxn id="126" idx="4"/>
+              </p:cNvCxnSpPr>
+              <p:nvPr/>
+            </p:nvCxnSpPr>
+            <p:spPr>
+              <a:xfrm>
+                <a:off x="3153705" y="3634509"/>
+                <a:ext cx="2901560" cy="6125"/>
+              </a:xfrm>
+              <a:prstGeom prst="line">
+                <a:avLst/>
+              </a:prstGeom>
+              <a:ln w="12700">
+                <a:solidFill>
+                  <a:schemeClr val="tx1"/>
+                </a:solidFill>
+                <a:prstDash val="lgDash"/>
+              </a:ln>
+            </p:spPr>
+            <p:style>
+              <a:lnRef idx="1">
+                <a:schemeClr val="accent1"/>
+              </a:lnRef>
+              <a:fillRef idx="0">
+                <a:schemeClr val="accent1"/>
+              </a:fillRef>
+              <a:effectRef idx="0">
+                <a:schemeClr val="accent1"/>
+              </a:effectRef>
+              <a:fontRef idx="minor">
+                <a:schemeClr val="tx1"/>
+              </a:fontRef>
+            </p:style>
+          </p:cxnSp>
+          <p:cxnSp>
+            <p:nvCxnSpPr>
+              <p:cNvPr id="214" name="直線コネクタ 213">
+                <a:extLst>
+                  <a:ext uri="{FF2B5EF4-FFF2-40B4-BE49-F238E27FC236}">
+                    <a16:creationId xmlns:a16="http://schemas.microsoft.com/office/drawing/2014/main" id="{00AF44CD-B6B0-4007-B260-52861BCCDE1B}"/>
+                  </a:ext>
+                </a:extLst>
+              </p:cNvPr>
+              <p:cNvCxnSpPr>
+                <a:cxnSpLocks/>
+              </p:cNvCxnSpPr>
+              <p:nvPr/>
+            </p:nvCxnSpPr>
+            <p:spPr>
+              <a:xfrm>
+                <a:off x="5629274" y="3224869"/>
+                <a:ext cx="0" cy="1395741"/>
+              </a:xfrm>
+              <a:prstGeom prst="line">
+                <a:avLst/>
+              </a:prstGeom>
+              <a:ln w="12700">
+                <a:solidFill>
+                  <a:schemeClr val="tx1"/>
+                </a:solidFill>
+                <a:prstDash val="lgDash"/>
+              </a:ln>
+            </p:spPr>
+            <p:style>
+              <a:lnRef idx="1">
+                <a:schemeClr val="accent1"/>
+              </a:lnRef>
+              <a:fillRef idx="0">
+                <a:schemeClr val="accent1"/>
+              </a:fillRef>
+              <a:effectRef idx="0">
+                <a:schemeClr val="accent1"/>
+              </a:effectRef>
+              <a:fontRef idx="minor">
+                <a:schemeClr val="tx1"/>
+              </a:fontRef>
+            </p:style>
+          </p:cxnSp>
+          <p:cxnSp>
+            <p:nvCxnSpPr>
+              <p:cNvPr id="215" name="直線コネクタ 214">
+                <a:extLst>
+                  <a:ext uri="{FF2B5EF4-FFF2-40B4-BE49-F238E27FC236}">
+                    <a16:creationId xmlns:a16="http://schemas.microsoft.com/office/drawing/2014/main" id="{5AA07DBF-BFA3-444C-8883-E0A40BAD68B1}"/>
+                  </a:ext>
+                </a:extLst>
+              </p:cNvPr>
+              <p:cNvCxnSpPr>
+                <a:cxnSpLocks/>
+              </p:cNvCxnSpPr>
+              <p:nvPr/>
+            </p:nvCxnSpPr>
+            <p:spPr>
+              <a:xfrm flipV="1">
+                <a:off x="6069542" y="3545012"/>
+                <a:ext cx="4091" cy="1078856"/>
+              </a:xfrm>
+              <a:prstGeom prst="line">
+                <a:avLst/>
+              </a:prstGeom>
+              <a:ln w="12700">
+                <a:solidFill>
+                  <a:schemeClr val="tx1"/>
+                </a:solidFill>
+                <a:prstDash val="lgDash"/>
+              </a:ln>
+            </p:spPr>
+            <p:style>
+              <a:lnRef idx="1">
+                <a:schemeClr val="accent1"/>
+              </a:lnRef>
+              <a:fillRef idx="0">
+                <a:schemeClr val="accent1"/>
+              </a:fillRef>
+              <a:effectRef idx="0">
+                <a:schemeClr val="accent1"/>
+              </a:effectRef>
+              <a:fontRef idx="minor">
+                <a:schemeClr val="tx1"/>
+              </a:fontRef>
+            </p:style>
+          </p:cxnSp>
+          <p:grpSp>
+            <p:nvGrpSpPr>
+              <p:cNvPr id="226" name="グループ化 225">
+                <a:extLst>
+                  <a:ext uri="{FF2B5EF4-FFF2-40B4-BE49-F238E27FC236}">
+                    <a16:creationId xmlns:a16="http://schemas.microsoft.com/office/drawing/2014/main" id="{BFB77EF8-3E98-4669-B5BC-BDB684FED7B6}"/>
+                  </a:ext>
+                </a:extLst>
+              </p:cNvPr>
+              <p:cNvGrpSpPr/>
+              <p:nvPr/>
+            </p:nvGrpSpPr>
+            <p:grpSpPr>
+              <a:xfrm>
+                <a:off x="3405094" y="3265126"/>
+                <a:ext cx="113578" cy="371134"/>
+                <a:chOff x="3311525" y="3264174"/>
+                <a:chExt cx="301151" cy="371134"/>
+              </a:xfrm>
+            </p:grpSpPr>
+            <p:sp>
+              <p:nvSpPr>
+                <p:cNvPr id="227" name="円弧 226">
+                  <a:extLst>
+                    <a:ext uri="{FF2B5EF4-FFF2-40B4-BE49-F238E27FC236}">
+                      <a16:creationId xmlns:a16="http://schemas.microsoft.com/office/drawing/2014/main" id="{76022FB1-1352-4649-975F-7D5C047A89B4}"/>
+                    </a:ext>
+                  </a:extLst>
+                </p:cNvPr>
+                <p:cNvSpPr/>
+                <p:nvPr/>
+              </p:nvSpPr>
+              <p:spPr>
+                <a:xfrm>
+                  <a:off x="3311525" y="3267113"/>
+                  <a:ext cx="150981" cy="368195"/>
+                </a:xfrm>
+                <a:prstGeom prst="arc">
+                  <a:avLst>
+                    <a:gd name="adj1" fmla="val 10855447"/>
+                    <a:gd name="adj2" fmla="val 0"/>
+                  </a:avLst>
+                </a:prstGeom>
+                <a:ln w="19050">
+                  <a:solidFill>
+                    <a:srgbClr val="0070C0"/>
+                  </a:solidFill>
+                </a:ln>
+              </p:spPr>
+              <p:style>
+                <a:lnRef idx="1">
+                  <a:schemeClr val="accent1"/>
+                </a:lnRef>
+                <a:fillRef idx="0">
+                  <a:schemeClr val="accent1"/>
+                </a:fillRef>
+                <a:effectRef idx="0">
+                  <a:schemeClr val="accent1"/>
+                </a:effectRef>
+                <a:fontRef idx="minor">
+                  <a:schemeClr val="tx1"/>
+                </a:fontRef>
+              </p:style>
+              <p:txBody>
+                <a:bodyPr rtlCol="0" anchor="ctr"/>
+                <a:lstStyle/>
+                <a:p>
+                  <a:pPr algn="ctr"/>
+                  <a:endParaRPr kumimoji="1" lang="ja-JP" altLang="en-US"/>
+                </a:p>
+              </p:txBody>
+            </p:sp>
+            <p:sp>
+              <p:nvSpPr>
+                <p:cNvPr id="228" name="円弧 227">
+                  <a:extLst>
+                    <a:ext uri="{FF2B5EF4-FFF2-40B4-BE49-F238E27FC236}">
+                      <a16:creationId xmlns:a16="http://schemas.microsoft.com/office/drawing/2014/main" id="{7A839DDD-855C-4E61-BFDC-2317FAF169FB}"/>
+                    </a:ext>
+                  </a:extLst>
+                </p:cNvPr>
+                <p:cNvSpPr/>
+                <p:nvPr/>
+              </p:nvSpPr>
+              <p:spPr>
+                <a:xfrm flipV="1">
+                  <a:off x="3461695" y="3264174"/>
+                  <a:ext cx="150981" cy="368194"/>
+                </a:xfrm>
+                <a:prstGeom prst="arc">
+                  <a:avLst>
+                    <a:gd name="adj1" fmla="val 10855447"/>
+                    <a:gd name="adj2" fmla="val 0"/>
+                  </a:avLst>
+                </a:prstGeom>
+                <a:ln w="19050">
+                  <a:solidFill>
+                    <a:srgbClr val="0070C0"/>
+                  </a:solidFill>
+                </a:ln>
+              </p:spPr>
+              <p:style>
+                <a:lnRef idx="1">
+                  <a:schemeClr val="accent1"/>
+                </a:lnRef>
+                <a:fillRef idx="0">
+                  <a:schemeClr val="accent1"/>
+                </a:fillRef>
+                <a:effectRef idx="0">
+                  <a:schemeClr val="accent1"/>
+                </a:effectRef>
+                <a:fontRef idx="minor">
+                  <a:schemeClr val="tx1"/>
+                </a:fontRef>
+              </p:style>
+              <p:txBody>
+                <a:bodyPr rtlCol="0" anchor="ctr"/>
+                <a:lstStyle/>
+                <a:p>
+                  <a:pPr algn="ctr"/>
+                  <a:endParaRPr kumimoji="1" lang="ja-JP" altLang="en-US"/>
+                </a:p>
+              </p:txBody>
+            </p:sp>
+          </p:grpSp>
+          <p:grpSp>
+            <p:nvGrpSpPr>
+              <p:cNvPr id="232" name="グループ化 231">
+                <a:extLst>
+                  <a:ext uri="{FF2B5EF4-FFF2-40B4-BE49-F238E27FC236}">
+                    <a16:creationId xmlns:a16="http://schemas.microsoft.com/office/drawing/2014/main" id="{ACEADBC4-4D51-44C0-8D60-C265A9152FBA}"/>
+                  </a:ext>
+                </a:extLst>
+              </p:cNvPr>
+              <p:cNvGrpSpPr/>
+              <p:nvPr/>
+            </p:nvGrpSpPr>
+            <p:grpSpPr>
+              <a:xfrm rot="5400000" flipV="1">
+                <a:off x="3149560" y="4477222"/>
+                <a:ext cx="113578" cy="88107"/>
+                <a:chOff x="3311525" y="3264174"/>
+                <a:chExt cx="301151" cy="371134"/>
+              </a:xfrm>
+            </p:grpSpPr>
+            <p:sp>
+              <p:nvSpPr>
+                <p:cNvPr id="233" name="円弧 232">
+                  <a:extLst>
+                    <a:ext uri="{FF2B5EF4-FFF2-40B4-BE49-F238E27FC236}">
+                      <a16:creationId xmlns:a16="http://schemas.microsoft.com/office/drawing/2014/main" id="{A79CD0AB-7194-49BF-BF0A-0DA36F555FCE}"/>
+                    </a:ext>
+                  </a:extLst>
+                </p:cNvPr>
+                <p:cNvSpPr/>
+                <p:nvPr/>
+              </p:nvSpPr>
+              <p:spPr>
+                <a:xfrm>
+                  <a:off x="3311525" y="3267113"/>
+                  <a:ext cx="150981" cy="368195"/>
+                </a:xfrm>
+                <a:prstGeom prst="arc">
+                  <a:avLst>
+                    <a:gd name="adj1" fmla="val 10855447"/>
+                    <a:gd name="adj2" fmla="val 0"/>
+                  </a:avLst>
+                </a:prstGeom>
+                <a:ln w="19050">
+                  <a:solidFill>
+                    <a:srgbClr val="0070C0"/>
+                  </a:solidFill>
+                </a:ln>
+              </p:spPr>
+              <p:style>
+                <a:lnRef idx="1">
+                  <a:schemeClr val="accent1"/>
+                </a:lnRef>
+                <a:fillRef idx="0">
+                  <a:schemeClr val="accent1"/>
+                </a:fillRef>
+                <a:effectRef idx="0">
+                  <a:schemeClr val="accent1"/>
+                </a:effectRef>
+                <a:fontRef idx="minor">
+                  <a:schemeClr val="tx1"/>
+                </a:fontRef>
+              </p:style>
+              <p:txBody>
+                <a:bodyPr rtlCol="0" anchor="ctr"/>
+                <a:lstStyle/>
+                <a:p>
+                  <a:pPr algn="ctr"/>
+                  <a:endParaRPr kumimoji="1" lang="ja-JP" altLang="en-US"/>
+                </a:p>
+              </p:txBody>
+            </p:sp>
+            <p:sp>
+              <p:nvSpPr>
+                <p:cNvPr id="234" name="円弧 233">
+                  <a:extLst>
+                    <a:ext uri="{FF2B5EF4-FFF2-40B4-BE49-F238E27FC236}">
+                      <a16:creationId xmlns:a16="http://schemas.microsoft.com/office/drawing/2014/main" id="{FE3B7570-7937-40AA-867B-0EBE06C82F0E}"/>
+                    </a:ext>
+                  </a:extLst>
+                </p:cNvPr>
+                <p:cNvSpPr/>
+                <p:nvPr/>
+              </p:nvSpPr>
+              <p:spPr>
+                <a:xfrm flipV="1">
+                  <a:off x="3461695" y="3264174"/>
+                  <a:ext cx="150981" cy="368194"/>
+                </a:xfrm>
+                <a:prstGeom prst="arc">
+                  <a:avLst>
+                    <a:gd name="adj1" fmla="val 10855447"/>
+                    <a:gd name="adj2" fmla="val 0"/>
+                  </a:avLst>
+                </a:prstGeom>
+                <a:ln w="19050">
+                  <a:solidFill>
+                    <a:srgbClr val="0070C0"/>
+                  </a:solidFill>
+                </a:ln>
+              </p:spPr>
+              <p:style>
+                <a:lnRef idx="1">
+                  <a:schemeClr val="accent1"/>
+                </a:lnRef>
+                <a:fillRef idx="0">
+                  <a:schemeClr val="accent1"/>
+                </a:fillRef>
+                <a:effectRef idx="0">
+                  <a:schemeClr val="accent1"/>
+                </a:effectRef>
+                <a:fontRef idx="minor">
+                  <a:schemeClr val="tx1"/>
+                </a:fontRef>
+              </p:style>
+              <p:txBody>
+                <a:bodyPr rtlCol="0" anchor="ctr"/>
+                <a:lstStyle/>
+                <a:p>
+                  <a:pPr algn="ctr"/>
+                  <a:endParaRPr kumimoji="1" lang="ja-JP" altLang="en-US"/>
+                </a:p>
+              </p:txBody>
+            </p:sp>
+          </p:grpSp>
+          <p:grpSp>
+            <p:nvGrpSpPr>
+              <p:cNvPr id="235" name="グループ化 234">
+                <a:extLst>
+                  <a:ext uri="{FF2B5EF4-FFF2-40B4-BE49-F238E27FC236}">
+                    <a16:creationId xmlns:a16="http://schemas.microsoft.com/office/drawing/2014/main" id="{E5ED8F29-E552-49AB-9D1A-20E8D503F6DA}"/>
+                  </a:ext>
+                </a:extLst>
+              </p:cNvPr>
+              <p:cNvGrpSpPr/>
+              <p:nvPr/>
+            </p:nvGrpSpPr>
+            <p:grpSpPr>
+              <a:xfrm rot="16200000" flipV="1">
+                <a:off x="5794664" y="4284853"/>
+                <a:ext cx="113578" cy="444359"/>
+                <a:chOff x="3311525" y="3264174"/>
+                <a:chExt cx="301151" cy="371134"/>
+              </a:xfrm>
+            </p:grpSpPr>
+            <p:sp>
+              <p:nvSpPr>
+                <p:cNvPr id="236" name="円弧 235">
+                  <a:extLst>
+                    <a:ext uri="{FF2B5EF4-FFF2-40B4-BE49-F238E27FC236}">
+                      <a16:creationId xmlns:a16="http://schemas.microsoft.com/office/drawing/2014/main" id="{E8E04E86-BB17-4ED4-9BB0-1A3E60672505}"/>
+                    </a:ext>
+                  </a:extLst>
+                </p:cNvPr>
+                <p:cNvSpPr/>
+                <p:nvPr/>
+              </p:nvSpPr>
+              <p:spPr>
+                <a:xfrm>
+                  <a:off x="3311525" y="3267113"/>
+                  <a:ext cx="150981" cy="368195"/>
+                </a:xfrm>
+                <a:prstGeom prst="arc">
+                  <a:avLst>
+                    <a:gd name="adj1" fmla="val 10855447"/>
+                    <a:gd name="adj2" fmla="val 0"/>
+                  </a:avLst>
+                </a:prstGeom>
+                <a:ln w="19050">
+                  <a:solidFill>
+                    <a:srgbClr val="0070C0"/>
+                  </a:solidFill>
+                </a:ln>
+              </p:spPr>
+              <p:style>
+                <a:lnRef idx="1">
+                  <a:schemeClr val="accent1"/>
+                </a:lnRef>
+                <a:fillRef idx="0">
+                  <a:schemeClr val="accent1"/>
+                </a:fillRef>
+                <a:effectRef idx="0">
+                  <a:schemeClr val="accent1"/>
+                </a:effectRef>
+                <a:fontRef idx="minor">
+                  <a:schemeClr val="tx1"/>
+                </a:fontRef>
+              </p:style>
+              <p:txBody>
+                <a:bodyPr rtlCol="0" anchor="ctr"/>
+                <a:lstStyle/>
+                <a:p>
+                  <a:pPr algn="ctr"/>
+                  <a:endParaRPr kumimoji="1" lang="ja-JP" altLang="en-US"/>
+                </a:p>
+              </p:txBody>
+            </p:sp>
+            <p:sp>
+              <p:nvSpPr>
+                <p:cNvPr id="237" name="円弧 236">
+                  <a:extLst>
+                    <a:ext uri="{FF2B5EF4-FFF2-40B4-BE49-F238E27FC236}">
+                      <a16:creationId xmlns:a16="http://schemas.microsoft.com/office/drawing/2014/main" id="{91360C54-4195-4D23-84BE-2559F7F0F683}"/>
+                    </a:ext>
+                  </a:extLst>
+                </p:cNvPr>
+                <p:cNvSpPr/>
+                <p:nvPr/>
+              </p:nvSpPr>
+              <p:spPr>
+                <a:xfrm flipV="1">
+                  <a:off x="3461695" y="3264174"/>
+                  <a:ext cx="150981" cy="368194"/>
+                </a:xfrm>
+                <a:prstGeom prst="arc">
+                  <a:avLst>
+                    <a:gd name="adj1" fmla="val 10855447"/>
+                    <a:gd name="adj2" fmla="val 0"/>
+                  </a:avLst>
+                </a:prstGeom>
+                <a:ln w="19050">
+                  <a:solidFill>
+                    <a:srgbClr val="0070C0"/>
+                  </a:solidFill>
+                </a:ln>
+              </p:spPr>
+              <p:style>
+                <a:lnRef idx="1">
+                  <a:schemeClr val="accent1"/>
+                </a:lnRef>
+                <a:fillRef idx="0">
+                  <a:schemeClr val="accent1"/>
+                </a:fillRef>
+                <a:effectRef idx="0">
+                  <a:schemeClr val="accent1"/>
+                </a:effectRef>
+                <a:fontRef idx="minor">
+                  <a:schemeClr val="tx1"/>
+                </a:fontRef>
+              </p:style>
+              <p:txBody>
+                <a:bodyPr rtlCol="0" anchor="ctr"/>
+                <a:lstStyle/>
+                <a:p>
+                  <a:pPr algn="ctr"/>
+                  <a:endParaRPr kumimoji="1" lang="ja-JP" altLang="en-US"/>
+                </a:p>
+              </p:txBody>
+            </p:sp>
+          </p:grpSp>
+          <p:cxnSp>
+            <p:nvCxnSpPr>
+              <p:cNvPr id="221" name="直線コネクタ 220">
+                <a:extLst>
+                  <a:ext uri="{FF2B5EF4-FFF2-40B4-BE49-F238E27FC236}">
+                    <a16:creationId xmlns:a16="http://schemas.microsoft.com/office/drawing/2014/main" id="{0E1C7BB2-81FC-4F56-9394-D4AF6182AB09}"/>
+                  </a:ext>
+                </a:extLst>
+              </p:cNvPr>
+              <p:cNvCxnSpPr>
+                <a:cxnSpLocks/>
+              </p:cNvCxnSpPr>
+              <p:nvPr/>
+            </p:nvCxnSpPr>
+            <p:spPr>
+              <a:xfrm>
+                <a:off x="5858473" y="3366161"/>
+                <a:ext cx="0" cy="1414330"/>
+              </a:xfrm>
+              <a:prstGeom prst="line">
+                <a:avLst/>
+              </a:prstGeom>
+              <a:ln w="12700">
+                <a:solidFill>
+                  <a:srgbClr val="FF0000"/>
+                </a:solidFill>
+                <a:prstDash val="lgDash"/>
+              </a:ln>
+            </p:spPr>
+            <p:style>
+              <a:lnRef idx="1">
+                <a:schemeClr val="accent1"/>
+              </a:lnRef>
+              <a:fillRef idx="0">
+                <a:schemeClr val="accent1"/>
+              </a:fillRef>
+              <a:effectRef idx="0">
+                <a:schemeClr val="accent1"/>
+              </a:effectRef>
+              <a:fontRef idx="minor">
+                <a:schemeClr val="tx1"/>
+              </a:fontRef>
+            </p:style>
+          </p:cxnSp>
+        </p:grpSp>
+      </p:grpSp>
+      <p:sp>
+        <p:nvSpPr>
+          <p:cNvPr id="249" name="テキスト ボックス 248">
+            <a:extLst>
+              <a:ext uri="{FF2B5EF4-FFF2-40B4-BE49-F238E27FC236}">
+                <a16:creationId xmlns:a16="http://schemas.microsoft.com/office/drawing/2014/main" id="{60C58F57-1D32-4424-8E58-20AEC31EF286}"/>
+              </a:ext>
+            </a:extLst>
+          </p:cNvPr>
+          <p:cNvSpPr txBox="1"/>
+          <p:nvPr/>
+        </p:nvSpPr>
+        <p:spPr>
+          <a:xfrm>
+            <a:off x="7887426" y="5873645"/>
+            <a:ext cx="1805673" cy="461665"/>
+          </a:xfrm>
+          <a:prstGeom prst="rect">
+            <a:avLst/>
+          </a:prstGeom>
+          <a:noFill/>
+        </p:spPr>
+        <p:txBody>
+          <a:bodyPr wrap="square" rtlCol="0">
+            <a:spAutoFit/>
+          </a:bodyPr>
+          <a:lstStyle/>
+          <a:p>
+            <a:r>
+              <a:rPr kumimoji="1" lang="en-US" altLang="ja-JP" sz="2400" dirty="0">
+                <a:solidFill>
+                  <a:srgbClr val="FF0000"/>
+                </a:solidFill>
+                <a:latin typeface="Times New Roman" panose="02020603050405020304" pitchFamily="18" charset="0"/>
+                <a:cs typeface="Times New Roman" panose="02020603050405020304" pitchFamily="18" charset="0"/>
+              </a:rPr>
+              <a:t>V</a:t>
+            </a:r>
+            <a:r>
+              <a:rPr kumimoji="1" lang="en-US" altLang="ja-JP" dirty="0">
+                <a:solidFill>
+                  <a:srgbClr val="FF0000"/>
+                </a:solidFill>
+                <a:latin typeface="Times New Roman" panose="02020603050405020304" pitchFamily="18" charset="0"/>
+                <a:cs typeface="Times New Roman" panose="02020603050405020304" pitchFamily="18" charset="0"/>
+              </a:rPr>
+              <a:t>D</a:t>
+            </a:r>
+            <a:r>
+              <a:rPr kumimoji="1" lang="en-US" altLang="ja-JP" sz="2400" dirty="0">
+                <a:solidFill>
+                  <a:srgbClr val="FF0000"/>
+                </a:solidFill>
+                <a:latin typeface="Times New Roman" panose="02020603050405020304" pitchFamily="18" charset="0"/>
+                <a:cs typeface="Times New Roman" panose="02020603050405020304" pitchFamily="18" charset="0"/>
+              </a:rPr>
+              <a:t>(t)</a:t>
+            </a:r>
+            <a:endParaRPr kumimoji="1" lang="ja-JP" altLang="en-US" sz="2400" dirty="0">
+              <a:solidFill>
+                <a:srgbClr val="FF0000"/>
+              </a:solidFill>
+              <a:latin typeface="Times New Roman" panose="02020603050405020304" pitchFamily="18" charset="0"/>
+              <a:cs typeface="Times New Roman" panose="02020603050405020304" pitchFamily="18" charset="0"/>
+            </a:endParaRPr>
           </a:p>
         </p:txBody>
       </p:sp>
@@ -4916,8 +7191,8 @@
         </p:nvGrpSpPr>
         <p:grpSpPr>
           <a:xfrm>
-            <a:off x="2340142" y="1690688"/>
-            <a:ext cx="7511716" cy="4542600"/>
+            <a:off x="2734176" y="1690688"/>
+            <a:ext cx="6723647" cy="3988217"/>
             <a:chOff x="2530642" y="1690688"/>
             <a:chExt cx="7511716" cy="4542600"/>
           </a:xfrm>
@@ -5005,6 +7280,35 @@
           </p:txBody>
         </p:sp>
       </p:grpSp>
+      <p:sp>
+        <p:nvSpPr>
+          <p:cNvPr id="8" name="スライド番号プレースホルダー 7">
+            <a:extLst>
+              <a:ext uri="{FF2B5EF4-FFF2-40B4-BE49-F238E27FC236}">
+                <a16:creationId xmlns:a16="http://schemas.microsoft.com/office/drawing/2014/main" id="{4B3EEF23-284C-4601-8BF5-B0198319D67F}"/>
+              </a:ext>
+            </a:extLst>
+          </p:cNvPr>
+          <p:cNvSpPr>
+            <a:spLocks noGrp="1"/>
+          </p:cNvSpPr>
+          <p:nvPr>
+            <p:ph type="sldNum" sz="quarter" idx="12"/>
+          </p:nvPr>
+        </p:nvSpPr>
+        <p:spPr/>
+        <p:txBody>
+          <a:bodyPr/>
+          <a:lstStyle/>
+          <a:p>
+            <a:fld id="{EC2563BA-9F6D-4C2C-B042-56816E50B4B9}" type="slidenum">
+              <a:rPr kumimoji="1" lang="ja-JP" altLang="en-US" smtClean="0"/>
+              <a:t>4</a:t>
+            </a:fld>
+            <a:endParaRPr kumimoji="1" lang="ja-JP" altLang="en-US"/>
+          </a:p>
+        </p:txBody>
+      </p:sp>
     </p:spTree>
     <p:extLst>
       <p:ext uri="{BB962C8B-B14F-4D97-AF65-F5344CB8AC3E}">
@@ -5035,36 +7339,8 @@
           <a:chExt cx="0" cy="0"/>
         </a:xfrm>
       </p:grpSpPr>
-      <p:sp>
-        <p:nvSpPr>
-          <p:cNvPr id="2" name="タイトル 1">
-            <a:extLst>
-              <a:ext uri="{FF2B5EF4-FFF2-40B4-BE49-F238E27FC236}">
-                <a16:creationId xmlns:a16="http://schemas.microsoft.com/office/drawing/2014/main" id="{1C88A7AA-3742-409B-A93D-7E6575C37E1C}"/>
-              </a:ext>
-            </a:extLst>
-          </p:cNvPr>
-          <p:cNvSpPr>
-            <a:spLocks noGrp="1"/>
-          </p:cNvSpPr>
-          <p:nvPr>
-            <p:ph type="title"/>
-          </p:nvPr>
-        </p:nvSpPr>
-        <p:spPr/>
-        <p:txBody>
-          <a:bodyPr/>
-          <a:lstStyle/>
-          <a:p>
-            <a:r>
-              <a:rPr kumimoji="1" lang="ja-JP" altLang="en-US" dirty="0"/>
-              <a:t>実験手順</a:t>
-            </a:r>
-          </a:p>
-        </p:txBody>
-      </p:sp>
-      <mc:AlternateContent xmlns:mc="http://schemas.openxmlformats.org/markup-compatibility/2006">
-        <mc:Choice xmlns:a14="http://schemas.microsoft.com/office/drawing/2010/main" Requires="a14">
+      <mc:AlternateContent xmlns:mc="http://schemas.openxmlformats.org/markup-compatibility/2006" xmlns:a14="http://schemas.microsoft.com/office/drawing/2010/main">
+        <mc:Choice Requires="a14">
           <p:sp>
             <p:nvSpPr>
               <p:cNvPr id="3" name="コンテンツ プレースホルダー 2">
@@ -5078,21 +7354,126 @@
                 <a:spLocks noGrp="1"/>
               </p:cNvSpPr>
               <p:nvPr>
-                <p:ph idx="1"/>
+                <p:ph sz="half" idx="1"/>
               </p:nvPr>
             </p:nvSpPr>
             <p:spPr>
               <a:xfrm>
-                <a:off x="838200" y="1825625"/>
-                <a:ext cx="10515600" cy="4351338"/>
+                <a:off x="564775" y="1499387"/>
+                <a:ext cx="11498888" cy="4351338"/>
               </a:xfrm>
             </p:spPr>
             <p:txBody>
-              <a:bodyPr/>
+              <a:bodyPr>
+                <a:normAutofit/>
+              </a:bodyPr>
               <a:lstStyle/>
               <a:p>
+                <a:pPr marL="457200" indent="-457200">
+                  <a:buFont typeface="+mj-lt"/>
+                  <a:buAutoNum type="arabicPeriod"/>
+                </a:pPr>
                 <a14:m>
                   <m:oMath xmlns:m="http://schemas.openxmlformats.org/officeDocument/2006/math">
+                    <m:sSub>
+                      <m:sSubPr>
+                        <m:ctrlPr>
+                          <a:rPr lang="en-US" altLang="ja-JP" sz="2400" i="1" smtClean="0">
+                            <a:latin typeface="Cambria Math" panose="02040503050406030204" pitchFamily="18" charset="0"/>
+                          </a:rPr>
+                        </m:ctrlPr>
+                      </m:sSubPr>
+                      <m:e>
+                        <m:r>
+                          <a:rPr lang="en-US" altLang="ja-JP" sz="2400" i="1">
+                            <a:latin typeface="Cambria Math" panose="02040503050406030204" pitchFamily="18" charset="0"/>
+                          </a:rPr>
+                          <m:t>𝐶</m:t>
+                        </m:r>
+                      </m:e>
+                      <m:sub>
+                        <m:r>
+                          <a:rPr lang="en-US" altLang="ja-JP" sz="2400" i="1">
+                            <a:latin typeface="Cambria Math" panose="02040503050406030204" pitchFamily="18" charset="0"/>
+                          </a:rPr>
+                          <m:t>𝑖𝑛</m:t>
+                        </m:r>
+                      </m:sub>
+                    </m:sSub>
+                    <m:r>
+                      <a:rPr lang="en-US" altLang="ja-JP" sz="2400" i="1">
+                        <a:latin typeface="Cambria Math" panose="02040503050406030204" pitchFamily="18" charset="0"/>
+                      </a:rPr>
+                      <m:t>=</m:t>
+                    </m:r>
+                    <m:sSub>
+                      <m:sSubPr>
+                        <m:ctrlPr>
+                          <a:rPr lang="en-US" altLang="ja-JP" sz="2400" i="1">
+                            <a:latin typeface="Cambria Math" panose="02040503050406030204" pitchFamily="18" charset="0"/>
+                          </a:rPr>
+                        </m:ctrlPr>
+                      </m:sSubPr>
+                      <m:e>
+                        <m:r>
+                          <a:rPr lang="en-US" altLang="ja-JP" sz="2400" i="1">
+                            <a:latin typeface="Cambria Math" panose="02040503050406030204" pitchFamily="18" charset="0"/>
+                          </a:rPr>
+                          <m:t>𝐶</m:t>
+                        </m:r>
+                      </m:e>
+                      <m:sub>
+                        <m:r>
+                          <a:rPr lang="en-US" altLang="ja-JP" sz="2400" i="1">
+                            <a:latin typeface="Cambria Math" panose="02040503050406030204" pitchFamily="18" charset="0"/>
+                          </a:rPr>
+                          <m:t>𝑜𝑢𝑡</m:t>
+                        </m:r>
+                      </m:sub>
+                    </m:sSub>
+                    <m:r>
+                      <a:rPr lang="en-US" altLang="ja-JP" sz="2400" i="1" smtClean="0">
+                        <a:latin typeface="Cambria Math" panose="02040503050406030204" pitchFamily="18" charset="0"/>
+                      </a:rPr>
+                      <m:t>=</m:t>
+                    </m:r>
+                    <m:r>
+                      <a:rPr lang="en-US" altLang="ja-JP" sz="2400" i="1">
+                        <a:latin typeface="Cambria Math" panose="02040503050406030204" pitchFamily="18" charset="0"/>
+                      </a:rPr>
+                      <m:t>100</m:t>
+                    </m:r>
+                    <m:d>
+                      <m:dPr>
+                        <m:begChr m:val="["/>
+                        <m:endChr m:val="]"/>
+                        <m:ctrlPr>
+                          <a:rPr lang="en-US" altLang="ja-JP" sz="2400" i="1">
+                            <a:latin typeface="Cambria Math" panose="02040503050406030204" pitchFamily="18" charset="0"/>
+                          </a:rPr>
+                        </m:ctrlPr>
+                      </m:dPr>
+                      <m:e>
+                        <m:r>
+                          <a:rPr lang="en-US" altLang="ja-JP" sz="2400" i="1">
+                            <a:latin typeface="Cambria Math" panose="02040503050406030204" pitchFamily="18" charset="0"/>
+                          </a:rPr>
+                          <m:t>𝜇</m:t>
+                        </m:r>
+                        <m:r>
+                          <a:rPr lang="en-US" altLang="ja-JP" sz="2400" i="1">
+                            <a:latin typeface="Cambria Math" panose="02040503050406030204" pitchFamily="18" charset="0"/>
+                          </a:rPr>
+                          <m:t>𝐹</m:t>
+                        </m:r>
+                      </m:e>
+                    </m:d>
+                    <m:r>
+                      <a:rPr lang="en-US" altLang="ja-JP" sz="2400" b="0" i="1" smtClean="0">
+                        <a:latin typeface="Cambria Math" panose="02040503050406030204" pitchFamily="18" charset="0"/>
+                      </a:rPr>
+                      <m:t>,  </m:t>
+                    </m:r>
                     <m:sSub>
                       <m:sSubPr>
                         <m:ctrlPr>
@@ -5156,100 +7537,13 @@
                       <a:rPr lang="en-US" altLang="ja-JP" sz="2400" i="1">
                         <a:latin typeface="Cambria Math" panose="02040503050406030204" pitchFamily="18" charset="0"/>
                       </a:rPr>
-                      <m:t>, </m:t>
+                      <m:t>,</m:t>
                     </m:r>
-                    <m:sSub>
-                      <m:sSubPr>
-                        <m:ctrlPr>
-                          <a:rPr lang="en-US" altLang="ja-JP" sz="2400" i="1">
-                            <a:latin typeface="Cambria Math" panose="02040503050406030204" pitchFamily="18" charset="0"/>
-                          </a:rPr>
-                        </m:ctrlPr>
-                      </m:sSubPr>
-                      <m:e>
-                        <m:r>
-                          <a:rPr lang="en-US" altLang="ja-JP" sz="2400" i="1">
-                            <a:latin typeface="Cambria Math" panose="02040503050406030204" pitchFamily="18" charset="0"/>
-                          </a:rPr>
-                          <m:t>𝐶</m:t>
-                        </m:r>
-                      </m:e>
-                      <m:sub>
-                        <m:r>
-                          <a:rPr lang="en-US" altLang="ja-JP" sz="2400" i="1">
-                            <a:latin typeface="Cambria Math" panose="02040503050406030204" pitchFamily="18" charset="0"/>
-                          </a:rPr>
-                          <m:t>𝑖𝑛</m:t>
-                        </m:r>
-                      </m:sub>
-                    </m:sSub>
-                    <m:r>
-                      <a:rPr lang="en-US" altLang="ja-JP" sz="2400" i="1">
-                        <a:latin typeface="Cambria Math" panose="02040503050406030204" pitchFamily="18" charset="0"/>
-                      </a:rPr>
-                      <m:t>=</m:t>
-                    </m:r>
-                    <m:sSub>
-                      <m:sSubPr>
-                        <m:ctrlPr>
-                          <a:rPr lang="en-US" altLang="ja-JP" sz="2400" i="1">
-                            <a:latin typeface="Cambria Math" panose="02040503050406030204" pitchFamily="18" charset="0"/>
-                          </a:rPr>
-                        </m:ctrlPr>
-                      </m:sSubPr>
-                      <m:e>
-                        <m:r>
-                          <a:rPr lang="en-US" altLang="ja-JP" sz="2400" i="1">
-                            <a:latin typeface="Cambria Math" panose="02040503050406030204" pitchFamily="18" charset="0"/>
-                          </a:rPr>
-                          <m:t>𝐶</m:t>
-                        </m:r>
-                      </m:e>
-                      <m:sub>
-                        <m:r>
-                          <a:rPr lang="en-US" altLang="ja-JP" sz="2400" i="1">
-                            <a:latin typeface="Cambria Math" panose="02040503050406030204" pitchFamily="18" charset="0"/>
-                          </a:rPr>
-                          <m:t>𝑜𝑢𝑡</m:t>
-                        </m:r>
-                      </m:sub>
-                    </m:sSub>
-                    <m:r>
-                      <a:rPr lang="en-US" altLang="ja-JP" sz="2400" i="1">
-                        <a:latin typeface="Cambria Math" panose="02040503050406030204" pitchFamily="18" charset="0"/>
-                      </a:rPr>
-                      <m:t>=100</m:t>
-                    </m:r>
-                    <m:d>
-                      <m:dPr>
-                        <m:begChr m:val="["/>
-                        <m:endChr m:val="]"/>
-                        <m:ctrlPr>
-                          <a:rPr lang="en-US" altLang="ja-JP" sz="2400" i="1">
-                            <a:latin typeface="Cambria Math" panose="02040503050406030204" pitchFamily="18" charset="0"/>
-                          </a:rPr>
-                        </m:ctrlPr>
-                      </m:dPr>
-                      <m:e>
-                        <m:r>
-                          <a:rPr lang="en-US" altLang="ja-JP" sz="2400" i="1">
-                            <a:latin typeface="Cambria Math" panose="02040503050406030204" pitchFamily="18" charset="0"/>
-                          </a:rPr>
-                          <m:t>𝜇</m:t>
-                        </m:r>
-                        <m:r>
-                          <a:rPr lang="en-US" altLang="ja-JP" sz="2400" i="1">
-                            <a:latin typeface="Cambria Math" panose="02040503050406030204" pitchFamily="18" charset="0"/>
-                          </a:rPr>
-                          <m:t>𝐹</m:t>
-                        </m:r>
-                      </m:e>
-                    </m:d>
                     <m:r>
                       <a:rPr lang="en-US" altLang="ja-JP" sz="2400" b="0" i="1" smtClean="0">
                         <a:latin typeface="Cambria Math" panose="02040503050406030204" pitchFamily="18" charset="0"/>
                       </a:rPr>
-                      <m:t>, </m:t>
+                      <m:t>   </m:t>
                     </m:r>
                     <m:sSub>
                       <m:sSubPr>
@@ -5363,8 +7657,423 @@
                 </a14:m>
                 <a:r>
                   <a:rPr lang="ja-JP" altLang="en-US" sz="2400" dirty="0"/>
-                  <a:t>として図の回路を作成する。</a:t>
+                  <a:t>で回路を組む</a:t>
                 </a:r>
+                <a:r>
+                  <a:rPr lang="en-US" altLang="ja-JP" sz="2400" dirty="0"/>
+                  <a:t>. </a:t>
+                </a:r>
+                <a:endParaRPr lang="en-US" altLang="ja-JP" sz="2400" b="0" dirty="0">
+                  <a:latin typeface="Cambria Math" panose="02040503050406030204" pitchFamily="18" charset="0"/>
+                </a:endParaRPr>
+              </a:p>
+              <a:p>
+                <a:pPr marL="457200" indent="-457200">
+                  <a:buFont typeface="+mj-lt"/>
+                  <a:buAutoNum type="arabicPeriod"/>
+                </a:pPr>
+                <a14:m>
+                  <m:oMath xmlns:m="http://schemas.openxmlformats.org/officeDocument/2006/math">
+                    <m:sSub>
+                      <m:sSubPr>
+                        <m:ctrlPr>
+                          <a:rPr lang="en-US" altLang="ja-JP" sz="2400" b="0" i="1" smtClean="0">
+                            <a:latin typeface="Cambria Math" panose="02040503050406030204" pitchFamily="18" charset="0"/>
+                          </a:rPr>
+                        </m:ctrlPr>
+                      </m:sSubPr>
+                      <m:e>
+                        <m:r>
+                          <a:rPr lang="en-US" altLang="ja-JP" sz="2400" b="0" i="1" smtClean="0">
+                            <a:latin typeface="Cambria Math" panose="02040503050406030204" pitchFamily="18" charset="0"/>
+                          </a:rPr>
+                          <m:t>𝑣</m:t>
+                        </m:r>
+                      </m:e>
+                      <m:sub>
+                        <m:r>
+                          <a:rPr lang="en-US" altLang="ja-JP" sz="2400" b="0" i="1" smtClean="0">
+                            <a:latin typeface="Cambria Math" panose="02040503050406030204" pitchFamily="18" charset="0"/>
+                          </a:rPr>
+                          <m:t>𝑖𝑛</m:t>
+                        </m:r>
+                      </m:sub>
+                    </m:sSub>
+                    <m:d>
+                      <m:dPr>
+                        <m:ctrlPr>
+                          <a:rPr lang="en-US" altLang="ja-JP" sz="2400" b="0" i="1" smtClean="0">
+                            <a:latin typeface="Cambria Math" panose="02040503050406030204" pitchFamily="18" charset="0"/>
+                          </a:rPr>
+                        </m:ctrlPr>
+                      </m:dPr>
+                      <m:e>
+                        <m:r>
+                          <a:rPr lang="en-US" altLang="ja-JP" sz="2400" b="0" i="1" smtClean="0">
+                            <a:latin typeface="Cambria Math" panose="02040503050406030204" pitchFamily="18" charset="0"/>
+                          </a:rPr>
+                          <m:t>𝑡</m:t>
+                        </m:r>
+                      </m:e>
+                    </m:d>
+                    <m:r>
+                      <a:rPr lang="en-US" altLang="ja-JP" sz="2400" b="0" i="1" smtClean="0">
+                        <a:latin typeface="Cambria Math" panose="02040503050406030204" pitchFamily="18" charset="0"/>
+                      </a:rPr>
+                      <m:t>=50</m:t>
+                    </m:r>
+                    <m:d>
+                      <m:dPr>
+                        <m:begChr m:val="["/>
+                        <m:endChr m:val="]"/>
+                        <m:ctrlPr>
+                          <a:rPr lang="en-US" altLang="ja-JP" sz="2400" b="0" i="1" smtClean="0">
+                            <a:latin typeface="Cambria Math" panose="02040503050406030204" pitchFamily="18" charset="0"/>
+                          </a:rPr>
+                        </m:ctrlPr>
+                      </m:dPr>
+                      <m:e>
+                        <m:r>
+                          <a:rPr lang="en-US" altLang="ja-JP" sz="2400" b="0" i="1" smtClean="0">
+                            <a:latin typeface="Cambria Math" panose="02040503050406030204" pitchFamily="18" charset="0"/>
+                          </a:rPr>
+                          <m:t>𝑚</m:t>
+                        </m:r>
+                        <m:sSub>
+                          <m:sSubPr>
+                            <m:ctrlPr>
+                              <a:rPr lang="en-US" altLang="ja-JP" sz="2400" b="0" i="1" smtClean="0">
+                                <a:latin typeface="Cambria Math" panose="02040503050406030204" pitchFamily="18" charset="0"/>
+                              </a:rPr>
+                            </m:ctrlPr>
+                          </m:sSubPr>
+                          <m:e>
+                            <m:r>
+                              <a:rPr lang="en-US" altLang="ja-JP" sz="2400" b="0" i="1" smtClean="0">
+                                <a:latin typeface="Cambria Math" panose="02040503050406030204" pitchFamily="18" charset="0"/>
+                              </a:rPr>
+                              <m:t>𝑉</m:t>
+                            </m:r>
+                          </m:e>
+                          <m:sub>
+                            <m:r>
+                              <a:rPr lang="en-US" altLang="ja-JP" sz="2400" b="0" i="1" smtClean="0">
+                                <a:latin typeface="Cambria Math" panose="02040503050406030204" pitchFamily="18" charset="0"/>
+                              </a:rPr>
+                              <m:t>𝑝𝑝</m:t>
+                            </m:r>
+                          </m:sub>
+                        </m:sSub>
+                      </m:e>
+                    </m:d>
+                    <m:r>
+                      <a:rPr lang="en-US" altLang="ja-JP" sz="2400" b="0" i="1" smtClean="0">
+                        <a:latin typeface="Cambria Math" panose="02040503050406030204" pitchFamily="18" charset="0"/>
+                      </a:rPr>
+                      <m:t>, </m:t>
+                    </m:r>
+                    <m:r>
+                      <a:rPr lang="en-US" altLang="ja-JP" sz="2400" b="0" i="1" smtClean="0">
+                        <a:latin typeface="Cambria Math" panose="02040503050406030204" pitchFamily="18" charset="0"/>
+                      </a:rPr>
+                      <m:t>𝑓</m:t>
+                    </m:r>
+                    <m:r>
+                      <a:rPr lang="en-US" altLang="ja-JP" sz="2400" b="0" i="1" smtClean="0">
+                        <a:latin typeface="Cambria Math" panose="02040503050406030204" pitchFamily="18" charset="0"/>
+                      </a:rPr>
+                      <m:t>=10</m:t>
+                    </m:r>
+                    <m:d>
+                      <m:dPr>
+                        <m:begChr m:val="["/>
+                        <m:endChr m:val="]"/>
+                        <m:ctrlPr>
+                          <a:rPr lang="en-US" altLang="ja-JP" sz="2400" b="0" i="1" smtClean="0">
+                            <a:latin typeface="Cambria Math" panose="02040503050406030204" pitchFamily="18" charset="0"/>
+                          </a:rPr>
+                        </m:ctrlPr>
+                      </m:dPr>
+                      <m:e>
+                        <m:r>
+                          <a:rPr lang="en-US" altLang="ja-JP" sz="2400" b="0" i="1" smtClean="0">
+                            <a:latin typeface="Cambria Math" panose="02040503050406030204" pitchFamily="18" charset="0"/>
+                          </a:rPr>
+                          <m:t>𝑘𝐻𝑧</m:t>
+                        </m:r>
+                      </m:e>
+                    </m:d>
+                  </m:oMath>
+                </a14:m>
+                <a:r>
+                  <a:rPr lang="ja-JP" altLang="en-US" sz="2400" dirty="0"/>
+                  <a:t> として電圧利得</a:t>
+                </a:r>
+                <a14:m>
+                  <m:oMath xmlns:m="http://schemas.openxmlformats.org/officeDocument/2006/math">
+                    <m:sSub>
+                      <m:sSubPr>
+                        <m:ctrlPr>
+                          <a:rPr lang="en-US" altLang="ja-JP" sz="2400" b="0" i="1" smtClean="0">
+                            <a:latin typeface="Cambria Math" panose="02040503050406030204" pitchFamily="18" charset="0"/>
+                          </a:rPr>
+                        </m:ctrlPr>
+                      </m:sSubPr>
+                      <m:e>
+                        <m:r>
+                          <a:rPr lang="en-US" altLang="ja-JP" sz="2400" b="0" i="1" smtClean="0">
+                            <a:latin typeface="Cambria Math" panose="02040503050406030204" pitchFamily="18" charset="0"/>
+                          </a:rPr>
+                          <m:t>𝜂</m:t>
+                        </m:r>
+                      </m:e>
+                      <m:sub>
+                        <m:r>
+                          <a:rPr lang="en-US" altLang="ja-JP" sz="2400" b="0" i="1" smtClean="0">
+                            <a:latin typeface="Cambria Math" panose="02040503050406030204" pitchFamily="18" charset="0"/>
+                          </a:rPr>
+                          <m:t>𝑉</m:t>
+                        </m:r>
+                      </m:sub>
+                    </m:sSub>
+                  </m:oMath>
+                </a14:m>
+                <a:r>
+                  <a:rPr lang="ja-JP" altLang="en-US" sz="2400" dirty="0"/>
+                  <a:t>と位相差</a:t>
+                </a:r>
+                <a14:m>
+                  <m:oMath xmlns:m="http://schemas.openxmlformats.org/officeDocument/2006/math">
+                    <m:r>
+                      <a:rPr lang="en-US" altLang="ja-JP" sz="2400" b="0" i="1" smtClean="0">
+                        <a:latin typeface="Cambria Math" panose="02040503050406030204" pitchFamily="18" charset="0"/>
+                      </a:rPr>
+                      <m:t>𝜃</m:t>
+                    </m:r>
+                  </m:oMath>
+                </a14:m>
+                <a:r>
+                  <a:rPr lang="ja-JP" altLang="en-US" sz="2400" dirty="0"/>
+                  <a:t>を求める</a:t>
+                </a:r>
+                <a:r>
+                  <a:rPr lang="en-US" altLang="ja-JP" sz="2400" dirty="0"/>
+                  <a:t>.</a:t>
+                </a:r>
+              </a:p>
+              <a:p>
+                <a:pPr marL="457200" indent="-457200">
+                  <a:buFont typeface="+mj-lt"/>
+                  <a:buAutoNum type="arabicPeriod"/>
+                </a:pPr>
+                <a14:m>
+                  <m:oMath xmlns:m="http://schemas.openxmlformats.org/officeDocument/2006/math">
+                    <m:r>
+                      <a:rPr lang="en-US" altLang="ja-JP" sz="2400" b="0" i="1" smtClean="0">
+                        <a:latin typeface="Cambria Math" panose="02040503050406030204" pitchFamily="18" charset="0"/>
+                      </a:rPr>
+                      <m:t>𝑓</m:t>
+                    </m:r>
+                    <m:r>
+                      <a:rPr lang="en-US" altLang="ja-JP" sz="2400" b="0" i="1" smtClean="0">
+                        <a:latin typeface="Cambria Math" panose="02040503050406030204" pitchFamily="18" charset="0"/>
+                      </a:rPr>
+                      <m:t>=100, 200, 500, 1</m:t>
+                    </m:r>
+                    <m:r>
+                      <a:rPr lang="en-US" altLang="ja-JP" sz="2400" b="0" i="1" smtClean="0">
+                        <a:latin typeface="Cambria Math" panose="02040503050406030204" pitchFamily="18" charset="0"/>
+                      </a:rPr>
+                      <m:t>𝑘</m:t>
+                    </m:r>
+                    <m:r>
+                      <a:rPr lang="en-US" altLang="ja-JP" sz="2400" b="0" i="1" smtClean="0">
+                        <a:latin typeface="Cambria Math" panose="02040503050406030204" pitchFamily="18" charset="0"/>
+                      </a:rPr>
+                      <m:t>, 4</m:t>
+                    </m:r>
+                    <m:r>
+                      <a:rPr lang="en-US" altLang="ja-JP" sz="2400" b="0" i="1" smtClean="0">
+                        <a:latin typeface="Cambria Math" panose="02040503050406030204" pitchFamily="18" charset="0"/>
+                      </a:rPr>
+                      <m:t>𝑘</m:t>
+                    </m:r>
+                    <m:r>
+                      <a:rPr lang="en-US" altLang="ja-JP" sz="2400" b="0" i="1" smtClean="0">
+                        <a:latin typeface="Cambria Math" panose="02040503050406030204" pitchFamily="18" charset="0"/>
+                      </a:rPr>
+                      <m:t>, 10</m:t>
+                    </m:r>
+                    <m:r>
+                      <a:rPr lang="en-US" altLang="ja-JP" sz="2400" b="0" i="1" smtClean="0">
+                        <a:latin typeface="Cambria Math" panose="02040503050406030204" pitchFamily="18" charset="0"/>
+                      </a:rPr>
+                      <m:t>𝑘</m:t>
+                    </m:r>
+                    <m:r>
+                      <a:rPr lang="en-US" altLang="ja-JP" sz="2400" b="0" i="1" smtClean="0">
+                        <a:latin typeface="Cambria Math" panose="02040503050406030204" pitchFamily="18" charset="0"/>
+                      </a:rPr>
+                      <m:t>, 40</m:t>
+                    </m:r>
+                    <m:r>
+                      <a:rPr lang="en-US" altLang="ja-JP" sz="2400" b="0" i="1" smtClean="0">
+                        <a:latin typeface="Cambria Math" panose="02040503050406030204" pitchFamily="18" charset="0"/>
+                      </a:rPr>
+                      <m:t>𝑘</m:t>
+                    </m:r>
+                    <m:r>
+                      <a:rPr lang="en-US" altLang="ja-JP" sz="2400" b="0" i="1" smtClean="0">
+                        <a:latin typeface="Cambria Math" panose="02040503050406030204" pitchFamily="18" charset="0"/>
+                      </a:rPr>
+                      <m:t>, 100</m:t>
+                    </m:r>
+                    <m:r>
+                      <a:rPr lang="en-US" altLang="ja-JP" sz="2400" b="0" i="1" smtClean="0">
+                        <a:latin typeface="Cambria Math" panose="02040503050406030204" pitchFamily="18" charset="0"/>
+                      </a:rPr>
+                      <m:t>𝑘</m:t>
+                    </m:r>
+                    <m:r>
+                      <a:rPr lang="en-US" altLang="ja-JP" sz="2400" b="0" i="1" smtClean="0">
+                        <a:latin typeface="Cambria Math" panose="02040503050406030204" pitchFamily="18" charset="0"/>
+                      </a:rPr>
+                      <m:t>, 200</m:t>
+                    </m:r>
+                    <m:r>
+                      <a:rPr lang="en-US" altLang="ja-JP" sz="2400" b="0" i="1" smtClean="0">
+                        <a:latin typeface="Cambria Math" panose="02040503050406030204" pitchFamily="18" charset="0"/>
+                      </a:rPr>
+                      <m:t>𝑘</m:t>
+                    </m:r>
+                    <m:r>
+                      <a:rPr lang="en-US" altLang="ja-JP" sz="2400" b="0" i="1" smtClean="0">
+                        <a:latin typeface="Cambria Math" panose="02040503050406030204" pitchFamily="18" charset="0"/>
+                      </a:rPr>
+                      <m:t>, 500</m:t>
+                    </m:r>
+                    <m:r>
+                      <a:rPr lang="en-US" altLang="ja-JP" sz="2400" b="0" i="1" smtClean="0">
+                        <a:latin typeface="Cambria Math" panose="02040503050406030204" pitchFamily="18" charset="0"/>
+                      </a:rPr>
+                      <m:t>𝑘</m:t>
+                    </m:r>
+                    <m:r>
+                      <a:rPr lang="en-US" altLang="ja-JP" sz="2400" b="0" i="1" smtClean="0">
+                        <a:latin typeface="Cambria Math" panose="02040503050406030204" pitchFamily="18" charset="0"/>
+                      </a:rPr>
+                      <m:t>, 1</m:t>
+                    </m:r>
+                    <m:r>
+                      <a:rPr lang="en-US" altLang="ja-JP" sz="2400" b="0" i="1" smtClean="0">
+                        <a:latin typeface="Cambria Math" panose="02040503050406030204" pitchFamily="18" charset="0"/>
+                      </a:rPr>
+                      <m:t>𝑀</m:t>
+                    </m:r>
+                    <m:r>
+                      <a:rPr lang="en-US" altLang="ja-JP" sz="2400" b="0" i="1" smtClean="0">
+                        <a:latin typeface="Cambria Math" panose="02040503050406030204" pitchFamily="18" charset="0"/>
+                      </a:rPr>
+                      <m:t>[</m:t>
+                    </m:r>
+                    <m:r>
+                      <a:rPr lang="en-US" altLang="ja-JP" sz="2400" b="0" i="1" smtClean="0">
+                        <a:latin typeface="Cambria Math" panose="02040503050406030204" pitchFamily="18" charset="0"/>
+                      </a:rPr>
+                      <m:t>𝐻𝑧</m:t>
+                    </m:r>
+                    <m:r>
+                      <a:rPr lang="en-US" altLang="ja-JP" sz="2400" b="0" i="1" smtClean="0">
+                        <a:latin typeface="Cambria Math" panose="02040503050406030204" pitchFamily="18" charset="0"/>
+                      </a:rPr>
+                      <m:t>] </m:t>
+                    </m:r>
+                  </m:oMath>
+                </a14:m>
+                <a:r>
+                  <a:rPr lang="ja-JP" altLang="en-US" sz="2400" dirty="0"/>
+                  <a:t>にて電圧利得</a:t>
+                </a:r>
+                <a:r>
+                  <a:rPr lang="en-US" altLang="ja-JP" sz="2400" dirty="0"/>
+                  <a:t>, </a:t>
+                </a:r>
+                <a:r>
+                  <a:rPr lang="ja-JP" altLang="en-US" sz="2400" dirty="0"/>
+                  <a:t>位相差を求め</a:t>
+                </a:r>
+                <a:r>
+                  <a:rPr lang="en-US" altLang="ja-JP" sz="2400" dirty="0"/>
+                  <a:t>, </a:t>
+                </a:r>
+                <a:r>
+                  <a:rPr lang="ja-JP" altLang="en-US" sz="2400" dirty="0"/>
+                  <a:t>グラフ化する</a:t>
+                </a:r>
+                <a:r>
+                  <a:rPr lang="en-US" altLang="ja-JP" sz="2400" dirty="0"/>
+                  <a:t>. </a:t>
+                </a:r>
+              </a:p>
+              <a:p>
+                <a:pPr marL="457200" indent="-457200">
+                  <a:buFont typeface="+mj-lt"/>
+                  <a:buAutoNum type="arabicPeriod"/>
+                </a:pPr>
+                <a:endParaRPr lang="en-US" altLang="ja-JP" sz="2400" b="0" i="1" dirty="0">
+                  <a:latin typeface="Cambria Math" panose="02040503050406030204" pitchFamily="18" charset="0"/>
+                </a:endParaRPr>
+              </a:p>
+              <a:p>
+                <a:pPr marL="457200" indent="-457200">
+                  <a:buFont typeface="+mj-lt"/>
+                  <a:buAutoNum type="arabicPeriod"/>
+                </a:pPr>
+                <a:endParaRPr lang="en-US" altLang="ja-JP" sz="2400" i="1" dirty="0">
+                  <a:latin typeface="Cambria Math" panose="02040503050406030204" pitchFamily="18" charset="0"/>
+                </a:endParaRPr>
+              </a:p>
+              <a:p>
+                <a:pPr marL="457200" indent="-457200">
+                  <a:buFont typeface="+mj-lt"/>
+                  <a:buAutoNum type="arabicPeriod"/>
+                </a:pPr>
+                <a:endParaRPr lang="en-US" altLang="ja-JP" sz="2400" dirty="0"/>
+              </a:p>
+              <a:p>
+                <a:pPr marL="457200" lvl="1" indent="0">
+                  <a:buNone/>
+                </a:pPr>
+                <a:r>
+                  <a:rPr lang="en-US" altLang="ja-JP" sz="2400" dirty="0"/>
+                  <a:t>	</a:t>
+                </a:r>
+              </a:p>
+              <a:p>
+                <a:pPr marL="0" indent="0">
+                  <a:buNone/>
+                </a:pPr>
+                <a:endParaRPr lang="en-US" altLang="ja-JP" sz="2400" dirty="0"/>
+              </a:p>
+              <a:p>
+                <a:pPr marL="0" indent="0">
+                  <a:buNone/>
+                </a:pPr>
+                <a:endParaRPr lang="en-US" altLang="ja-JP" sz="2400" dirty="0"/>
+              </a:p>
+              <a:p>
+                <a:pPr marL="0" indent="0">
+                  <a:buNone/>
+                </a:pPr>
+                <a:endParaRPr lang="en-US" altLang="ja-JP" sz="2400" dirty="0"/>
+              </a:p>
+              <a:p>
+                <a:pPr marL="0" indent="0">
+                  <a:buNone/>
+                </a:pPr>
+                <a:endParaRPr lang="en-US" altLang="ja-JP" sz="2400" dirty="0"/>
+              </a:p>
+              <a:p>
                 <a:endParaRPr lang="en-US" altLang="ja-JP" sz="2400" dirty="0"/>
               </a:p>
               <a:p>
@@ -5379,7 +8088,7 @@
             </p:txBody>
           </p:sp>
         </mc:Choice>
-        <mc:Fallback>
+        <mc:Fallback xmlns="">
           <p:sp>
             <p:nvSpPr>
               <p:cNvPr id="3" name="コンテンツ プレースホルダー 2">
@@ -5393,18 +8102,18 @@
                 <a:spLocks noGrp="1" noRot="1" noChangeAspect="1" noMove="1" noResize="1" noEditPoints="1" noAdjustHandles="1" noChangeArrowheads="1" noChangeShapeType="1" noTextEdit="1"/>
               </p:cNvSpPr>
               <p:nvPr>
-                <p:ph idx="1"/>
+                <p:ph sz="half" idx="1"/>
               </p:nvPr>
             </p:nvSpPr>
             <p:spPr>
               <a:xfrm>
-                <a:off x="838200" y="1825625"/>
-                <a:ext cx="10515600" cy="4351338"/>
+                <a:off x="564775" y="1499387"/>
+                <a:ext cx="11498888" cy="4351338"/>
               </a:xfrm>
               <a:blipFill>
                 <a:blip r:embed="rId3"/>
                 <a:stretch>
-                  <a:fillRect l="-812" t="-1821" r="-232"/>
+                  <a:fillRect l="-795" t="-2101"/>
                 </a:stretch>
               </a:blipFill>
             </p:spPr>
@@ -5423,6 +8132,694 @@
           </p:sp>
         </mc:Fallback>
       </mc:AlternateContent>
+      <p:sp>
+        <p:nvSpPr>
+          <p:cNvPr id="2" name="タイトル 1">
+            <a:extLst>
+              <a:ext uri="{FF2B5EF4-FFF2-40B4-BE49-F238E27FC236}">
+                <a16:creationId xmlns:a16="http://schemas.microsoft.com/office/drawing/2014/main" id="{1C88A7AA-3742-409B-A93D-7E6575C37E1C}"/>
+              </a:ext>
+            </a:extLst>
+          </p:cNvPr>
+          <p:cNvSpPr>
+            <a:spLocks noGrp="1"/>
+          </p:cNvSpPr>
+          <p:nvPr>
+            <p:ph type="title"/>
+          </p:nvPr>
+        </p:nvSpPr>
+        <p:spPr/>
+        <p:txBody>
+          <a:bodyPr/>
+          <a:lstStyle/>
+          <a:p>
+            <a:r>
+              <a:rPr kumimoji="1" lang="ja-JP" altLang="en-US" dirty="0"/>
+              <a:t>実験手順</a:t>
+            </a:r>
+          </a:p>
+        </p:txBody>
+      </p:sp>
+      <p:grpSp>
+        <p:nvGrpSpPr>
+          <p:cNvPr id="5" name="グループ化 4">
+            <a:extLst>
+              <a:ext uri="{FF2B5EF4-FFF2-40B4-BE49-F238E27FC236}">
+                <a16:creationId xmlns:a16="http://schemas.microsoft.com/office/drawing/2014/main" id="{8B7A77BF-89B4-4F57-B143-E8C9BEC91896}"/>
+              </a:ext>
+            </a:extLst>
+          </p:cNvPr>
+          <p:cNvGrpSpPr/>
+          <p:nvPr/>
+        </p:nvGrpSpPr>
+        <p:grpSpPr>
+          <a:xfrm>
+            <a:off x="6096000" y="3324017"/>
+            <a:ext cx="5377750" cy="2807369"/>
+            <a:chOff x="2530642" y="1690688"/>
+            <a:chExt cx="7511716" cy="4877327"/>
+          </a:xfrm>
+        </p:grpSpPr>
+        <p:pic>
+          <p:nvPicPr>
+            <p:cNvPr id="6" name="図 5">
+              <a:extLst>
+                <a:ext uri="{FF2B5EF4-FFF2-40B4-BE49-F238E27FC236}">
+                  <a16:creationId xmlns:a16="http://schemas.microsoft.com/office/drawing/2014/main" id="{2900B800-6215-4556-A37E-B155C1B3E281}"/>
+                </a:ext>
+              </a:extLst>
+            </p:cNvPr>
+            <p:cNvPicPr>
+              <a:picLocks noChangeAspect="1"/>
+            </p:cNvPicPr>
+            <p:nvPr/>
+          </p:nvPicPr>
+          <p:blipFill>
+            <a:blip r:embed="rId4"/>
+            <a:stretch>
+              <a:fillRect/>
+            </a:stretch>
+          </p:blipFill>
+          <p:spPr>
+            <a:xfrm>
+              <a:off x="2530642" y="1690688"/>
+              <a:ext cx="7511716" cy="4142490"/>
+            </a:xfrm>
+            <a:prstGeom prst="rect">
+              <a:avLst/>
+            </a:prstGeom>
+          </p:spPr>
+        </p:pic>
+        <p:sp>
+          <p:nvSpPr>
+            <p:cNvPr id="7" name="テキスト ボックス 6">
+              <a:extLst>
+                <a:ext uri="{FF2B5EF4-FFF2-40B4-BE49-F238E27FC236}">
+                  <a16:creationId xmlns:a16="http://schemas.microsoft.com/office/drawing/2014/main" id="{CF41C2DB-2732-444F-80DC-342E51F8B7C1}"/>
+                </a:ext>
+              </a:extLst>
+            </p:cNvPr>
+            <p:cNvSpPr txBox="1"/>
+            <p:nvPr/>
+          </p:nvSpPr>
+          <p:spPr>
+            <a:xfrm>
+              <a:off x="3359536" y="6054955"/>
+              <a:ext cx="5853928" cy="513060"/>
+            </a:xfrm>
+            <a:prstGeom prst="rect">
+              <a:avLst/>
+            </a:prstGeom>
+            <a:noFill/>
+          </p:spPr>
+          <p:txBody>
+            <a:bodyPr wrap="square" rtlCol="0">
+              <a:spAutoFit/>
+            </a:bodyPr>
+            <a:lstStyle/>
+            <a:p>
+              <a:r>
+                <a:rPr lang="ja-JP" altLang="en-US" sz="2000" dirty="0"/>
+                <a:t>図 </a:t>
+              </a:r>
+              <a:r>
+                <a:rPr lang="en-US" altLang="ja-JP" sz="2000" dirty="0"/>
+                <a:t>: </a:t>
+              </a:r>
+              <a:r>
+                <a:rPr lang="ja-JP" altLang="en-US" sz="2000" dirty="0"/>
+                <a:t>実験資料より</a:t>
+              </a:r>
+              <a:r>
+                <a:rPr lang="en-US" altLang="ja-JP" sz="2000" dirty="0"/>
+                <a:t>FET</a:t>
+              </a:r>
+              <a:r>
+                <a:rPr lang="ja-JP" altLang="en-US" sz="2000" dirty="0"/>
+                <a:t>の増幅回路</a:t>
+              </a:r>
+              <a:endParaRPr lang="en-US" altLang="ja-JP" sz="2000" dirty="0"/>
+            </a:p>
+          </p:txBody>
+        </p:sp>
+      </p:grpSp>
+      <p:grpSp>
+        <p:nvGrpSpPr>
+          <p:cNvPr id="12" name="グループ化 11">
+            <a:extLst>
+              <a:ext uri="{FF2B5EF4-FFF2-40B4-BE49-F238E27FC236}">
+                <a16:creationId xmlns:a16="http://schemas.microsoft.com/office/drawing/2014/main" id="{93DCABED-6621-4CC3-9034-9CA31733142A}"/>
+              </a:ext>
+            </a:extLst>
+          </p:cNvPr>
+          <p:cNvGrpSpPr/>
+          <p:nvPr/>
+        </p:nvGrpSpPr>
+        <p:grpSpPr>
+          <a:xfrm>
+            <a:off x="1188916" y="3979258"/>
+            <a:ext cx="4282943" cy="1379355"/>
+            <a:chOff x="1223144" y="4186754"/>
+            <a:chExt cx="4282943" cy="1379355"/>
+          </a:xfrm>
+        </p:grpSpPr>
+        <p:sp>
+          <p:nvSpPr>
+            <p:cNvPr id="11" name="四角形: 角を丸くする 10">
+              <a:extLst>
+                <a:ext uri="{FF2B5EF4-FFF2-40B4-BE49-F238E27FC236}">
+                  <a16:creationId xmlns:a16="http://schemas.microsoft.com/office/drawing/2014/main" id="{E41798E5-9CC4-490B-920F-3F34C7EA2893}"/>
+                </a:ext>
+              </a:extLst>
+            </p:cNvPr>
+            <p:cNvSpPr/>
+            <p:nvPr/>
+          </p:nvSpPr>
+          <p:spPr>
+            <a:xfrm>
+              <a:off x="1223144" y="4186754"/>
+              <a:ext cx="4214487" cy="1379355"/>
+            </a:xfrm>
+            <a:prstGeom prst="roundRect">
+              <a:avLst/>
+            </a:prstGeom>
+            <a:solidFill>
+              <a:schemeClr val="tx1"/>
+            </a:solidFill>
+            <a:ln>
+              <a:solidFill>
+                <a:schemeClr val="bg2">
+                  <a:lumMod val="25000"/>
+                </a:schemeClr>
+              </a:solidFill>
+            </a:ln>
+          </p:spPr>
+          <p:style>
+            <a:lnRef idx="2">
+              <a:schemeClr val="accent1">
+                <a:shade val="50000"/>
+              </a:schemeClr>
+            </a:lnRef>
+            <a:fillRef idx="1">
+              <a:schemeClr val="accent1"/>
+            </a:fillRef>
+            <a:effectRef idx="0">
+              <a:schemeClr val="accent1"/>
+            </a:effectRef>
+            <a:fontRef idx="minor">
+              <a:schemeClr val="lt1"/>
+            </a:fontRef>
+          </p:style>
+          <p:txBody>
+            <a:bodyPr rtlCol="0" anchor="ctr"/>
+            <a:lstStyle/>
+            <a:p>
+              <a:pPr algn="ctr"/>
+              <a:endParaRPr kumimoji="1" lang="ja-JP" altLang="en-US"/>
+            </a:p>
+          </p:txBody>
+        </p:sp>
+        <mc:AlternateContent xmlns:mc="http://schemas.openxmlformats.org/markup-compatibility/2006" xmlns:a14="http://schemas.microsoft.com/office/drawing/2010/main">
+          <mc:Choice Requires="a14">
+            <p:sp>
+              <p:nvSpPr>
+                <p:cNvPr id="10" name="テキスト ボックス 9">
+                  <a:extLst>
+                    <a:ext uri="{FF2B5EF4-FFF2-40B4-BE49-F238E27FC236}">
+                      <a16:creationId xmlns:a16="http://schemas.microsoft.com/office/drawing/2014/main" id="{DFA60C72-7F13-4AC6-888F-7849A63BD301}"/>
+                    </a:ext>
+                  </a:extLst>
+                </p:cNvPr>
+                <p:cNvSpPr txBox="1"/>
+                <p:nvPr/>
+              </p:nvSpPr>
+              <p:spPr>
+                <a:xfrm>
+                  <a:off x="1291600" y="4458113"/>
+                  <a:ext cx="4214487" cy="1107996"/>
+                </a:xfrm>
+                <a:prstGeom prst="rect">
+                  <a:avLst/>
+                </a:prstGeom>
+                <a:noFill/>
+              </p:spPr>
+              <p:txBody>
+                <a:bodyPr wrap="none" rtlCol="0">
+                  <a:spAutoFit/>
+                </a:bodyPr>
+                <a:lstStyle/>
+                <a:p>
+                  <a:pPr/>
+                  <a14:m>
+                    <m:oMathPara xmlns:m="http://schemas.openxmlformats.org/officeDocument/2006/math">
+                      <m:oMathParaPr>
+                        <m:jc m:val="left"/>
+                      </m:oMathParaPr>
+                      <m:oMath xmlns:m="http://schemas.openxmlformats.org/officeDocument/2006/math">
+                        <m:sSub>
+                          <m:sSubPr>
+                            <m:ctrlPr>
+                              <a:rPr lang="en-US" altLang="ja-JP" sz="2400" b="0" i="1" smtClean="0">
+                                <a:solidFill>
+                                  <a:schemeClr val="bg1"/>
+                                </a:solidFill>
+                                <a:latin typeface="Cambria Math" panose="02040503050406030204" pitchFamily="18" charset="0"/>
+                              </a:rPr>
+                            </m:ctrlPr>
+                          </m:sSubPr>
+                          <m:e>
+                            <m:r>
+                              <a:rPr lang="en-US" altLang="ja-JP" sz="2400" b="0" i="1" smtClean="0">
+                                <a:solidFill>
+                                  <a:schemeClr val="bg1"/>
+                                </a:solidFill>
+                                <a:latin typeface="Cambria Math" panose="02040503050406030204" pitchFamily="18" charset="0"/>
+                              </a:rPr>
+                              <m:t>𝜂</m:t>
+                            </m:r>
+                          </m:e>
+                          <m:sub>
+                            <m:r>
+                              <a:rPr lang="en-US" altLang="ja-JP" sz="2400" b="0" i="1" smtClean="0">
+                                <a:solidFill>
+                                  <a:schemeClr val="bg1"/>
+                                </a:solidFill>
+                                <a:latin typeface="Cambria Math" panose="02040503050406030204" pitchFamily="18" charset="0"/>
+                              </a:rPr>
+                              <m:t>𝑉</m:t>
+                            </m:r>
+                          </m:sub>
+                        </m:sSub>
+                        <m:r>
+                          <a:rPr lang="en-US" altLang="ja-JP" sz="2400" b="0" i="1" smtClean="0">
+                            <a:solidFill>
+                              <a:schemeClr val="bg1"/>
+                            </a:solidFill>
+                            <a:latin typeface="Cambria Math" panose="02040503050406030204" pitchFamily="18" charset="0"/>
+                          </a:rPr>
+                          <m:t>=20</m:t>
+                        </m:r>
+                        <m:sSub>
+                          <m:sSubPr>
+                            <m:ctrlPr>
+                              <a:rPr lang="en-US" altLang="ja-JP" sz="2400" b="0" i="1" smtClean="0">
+                                <a:solidFill>
+                                  <a:schemeClr val="bg1"/>
+                                </a:solidFill>
+                                <a:latin typeface="Cambria Math" panose="02040503050406030204" pitchFamily="18" charset="0"/>
+                              </a:rPr>
+                            </m:ctrlPr>
+                          </m:sSubPr>
+                          <m:e>
+                            <m:r>
+                              <m:rPr>
+                                <m:sty m:val="p"/>
+                              </m:rPr>
+                              <a:rPr lang="en-US" altLang="ja-JP" sz="2400" b="0" i="0" smtClean="0">
+                                <a:solidFill>
+                                  <a:schemeClr val="bg1"/>
+                                </a:solidFill>
+                                <a:latin typeface="Cambria Math" panose="02040503050406030204" pitchFamily="18" charset="0"/>
+                              </a:rPr>
+                              <m:t>log</m:t>
+                            </m:r>
+                          </m:e>
+                          <m:sub>
+                            <m:r>
+                              <a:rPr lang="en-US" altLang="ja-JP" sz="2400" b="0" i="1" smtClean="0">
+                                <a:solidFill>
+                                  <a:schemeClr val="bg1"/>
+                                </a:solidFill>
+                                <a:latin typeface="Cambria Math" panose="02040503050406030204" pitchFamily="18" charset="0"/>
+                              </a:rPr>
+                              <m:t>10</m:t>
+                            </m:r>
+                          </m:sub>
+                        </m:sSub>
+                        <m:r>
+                          <a:rPr lang="en-US" altLang="ja-JP" sz="2400" b="0" i="1" smtClean="0">
+                            <a:solidFill>
+                              <a:schemeClr val="bg1"/>
+                            </a:solidFill>
+                            <a:latin typeface="Cambria Math" panose="02040503050406030204" pitchFamily="18" charset="0"/>
+                          </a:rPr>
+                          <m:t>|</m:t>
+                        </m:r>
+                        <m:sSub>
+                          <m:sSubPr>
+                            <m:ctrlPr>
+                              <a:rPr lang="en-US" altLang="ja-JP" sz="2400" b="0" i="1" smtClean="0">
+                                <a:solidFill>
+                                  <a:schemeClr val="bg1"/>
+                                </a:solidFill>
+                                <a:latin typeface="Cambria Math" panose="02040503050406030204" pitchFamily="18" charset="0"/>
+                              </a:rPr>
+                            </m:ctrlPr>
+                          </m:sSubPr>
+                          <m:e>
+                            <m:r>
+                              <a:rPr lang="en-US" altLang="ja-JP" sz="2400" b="0" i="1" smtClean="0">
+                                <a:solidFill>
+                                  <a:schemeClr val="bg1"/>
+                                </a:solidFill>
+                                <a:latin typeface="Cambria Math" panose="02040503050406030204" pitchFamily="18" charset="0"/>
+                              </a:rPr>
+                              <m:t>𝑣</m:t>
+                            </m:r>
+                          </m:e>
+                          <m:sub>
+                            <m:r>
+                              <a:rPr lang="en-US" altLang="ja-JP" sz="2400" b="0" i="1" smtClean="0">
+                                <a:solidFill>
+                                  <a:schemeClr val="bg1"/>
+                                </a:solidFill>
+                                <a:latin typeface="Cambria Math" panose="02040503050406030204" pitchFamily="18" charset="0"/>
+                              </a:rPr>
+                              <m:t>𝑜𝑢𝑡</m:t>
+                            </m:r>
+                          </m:sub>
+                        </m:sSub>
+                        <m:d>
+                          <m:dPr>
+                            <m:ctrlPr>
+                              <a:rPr lang="en-US" altLang="ja-JP" sz="2400" b="0" i="1" smtClean="0">
+                                <a:solidFill>
+                                  <a:schemeClr val="bg1"/>
+                                </a:solidFill>
+                                <a:latin typeface="Cambria Math" panose="02040503050406030204" pitchFamily="18" charset="0"/>
+                              </a:rPr>
+                            </m:ctrlPr>
+                          </m:dPr>
+                          <m:e>
+                            <m:r>
+                              <a:rPr lang="en-US" altLang="ja-JP" sz="2400" b="0" i="1" smtClean="0">
+                                <a:solidFill>
+                                  <a:schemeClr val="bg1"/>
+                                </a:solidFill>
+                                <a:latin typeface="Cambria Math" panose="02040503050406030204" pitchFamily="18" charset="0"/>
+                              </a:rPr>
+                              <m:t>𝑡</m:t>
+                            </m:r>
+                          </m:e>
+                        </m:d>
+                        <m:r>
+                          <m:rPr>
+                            <m:lit/>
+                          </m:rPr>
+                          <a:rPr lang="en-US" altLang="ja-JP" sz="2400" b="0" i="1" smtClean="0">
+                            <a:solidFill>
+                              <a:schemeClr val="bg1"/>
+                            </a:solidFill>
+                            <a:latin typeface="Cambria Math" panose="02040503050406030204" pitchFamily="18" charset="0"/>
+                          </a:rPr>
+                          <m:t>/</m:t>
+                        </m:r>
+                        <m:r>
+                          <a:rPr lang="en-US" altLang="ja-JP" sz="2400" b="0" i="1" smtClean="0">
+                            <a:solidFill>
+                              <a:schemeClr val="bg1"/>
+                            </a:solidFill>
+                            <a:latin typeface="Cambria Math" panose="02040503050406030204" pitchFamily="18" charset="0"/>
+                          </a:rPr>
+                          <m:t> </m:t>
+                        </m:r>
+                        <m:sSub>
+                          <m:sSubPr>
+                            <m:ctrlPr>
+                              <a:rPr lang="en-US" altLang="ja-JP" sz="2400" b="0" i="1" smtClean="0">
+                                <a:solidFill>
+                                  <a:schemeClr val="bg1"/>
+                                </a:solidFill>
+                                <a:latin typeface="Cambria Math" panose="02040503050406030204" pitchFamily="18" charset="0"/>
+                              </a:rPr>
+                            </m:ctrlPr>
+                          </m:sSubPr>
+                          <m:e>
+                            <m:r>
+                              <a:rPr lang="en-US" altLang="ja-JP" sz="2400" b="0" i="1" smtClean="0">
+                                <a:solidFill>
+                                  <a:schemeClr val="bg1"/>
+                                </a:solidFill>
+                                <a:latin typeface="Cambria Math" panose="02040503050406030204" pitchFamily="18" charset="0"/>
+                              </a:rPr>
+                              <m:t>𝑣</m:t>
+                            </m:r>
+                          </m:e>
+                          <m:sub>
+                            <m:r>
+                              <a:rPr lang="en-US" altLang="ja-JP" sz="2400" b="0" i="1" smtClean="0">
+                                <a:solidFill>
+                                  <a:schemeClr val="bg1"/>
+                                </a:solidFill>
+                                <a:latin typeface="Cambria Math" panose="02040503050406030204" pitchFamily="18" charset="0"/>
+                              </a:rPr>
+                              <m:t>𝑖𝑛</m:t>
+                            </m:r>
+                          </m:sub>
+                        </m:sSub>
+                        <m:r>
+                          <a:rPr lang="en-US" altLang="ja-JP" sz="2400" b="0" i="1" smtClean="0">
+                            <a:solidFill>
+                              <a:schemeClr val="bg1"/>
+                            </a:solidFill>
+                            <a:latin typeface="Cambria Math" panose="02040503050406030204" pitchFamily="18" charset="0"/>
+                          </a:rPr>
+                          <m:t>(</m:t>
+                        </m:r>
+                        <m:r>
+                          <a:rPr lang="en-US" altLang="ja-JP" sz="2400" b="0" i="1" smtClean="0">
+                            <a:solidFill>
+                              <a:schemeClr val="bg1"/>
+                            </a:solidFill>
+                            <a:latin typeface="Cambria Math" panose="02040503050406030204" pitchFamily="18" charset="0"/>
+                          </a:rPr>
+                          <m:t>𝑡</m:t>
+                        </m:r>
+                        <m:r>
+                          <a:rPr lang="en-US" altLang="ja-JP" sz="2400" b="0" i="1" smtClean="0">
+                            <a:solidFill>
+                              <a:schemeClr val="bg1"/>
+                            </a:solidFill>
+                            <a:latin typeface="Cambria Math" panose="02040503050406030204" pitchFamily="18" charset="0"/>
+                          </a:rPr>
+                          <m:t>) |</m:t>
+                        </m:r>
+                      </m:oMath>
+                    </m:oMathPara>
+                  </a14:m>
+                  <a:endParaRPr lang="en-US" altLang="ja-JP" sz="2400" dirty="0">
+                    <a:solidFill>
+                      <a:schemeClr val="bg1"/>
+                    </a:solidFill>
+                    <a:latin typeface="Calibri" panose="020F0502020204030204" pitchFamily="34" charset="0"/>
+                    <a:cs typeface="Calibri" panose="020F0502020204030204" pitchFamily="34" charset="0"/>
+                  </a:endParaRPr>
+                </a:p>
+                <a:p>
+                  <a14:m>
+                    <m:oMath xmlns:m="http://schemas.openxmlformats.org/officeDocument/2006/math">
+                      <m:r>
+                        <a:rPr lang="en-US" altLang="ja-JP" sz="2400" b="0" i="1" smtClean="0">
+                          <a:solidFill>
+                            <a:schemeClr val="bg1"/>
+                          </a:solidFill>
+                          <a:latin typeface="Cambria Math" panose="02040503050406030204" pitchFamily="18" charset="0"/>
+                        </a:rPr>
+                        <m:t>  </m:t>
+                      </m:r>
+                      <m:r>
+                        <a:rPr lang="en-US" altLang="ja-JP" sz="2400" b="0" i="1" smtClean="0">
+                          <a:solidFill>
+                            <a:schemeClr val="bg1"/>
+                          </a:solidFill>
+                          <a:latin typeface="Cambria Math" panose="02040503050406030204" pitchFamily="18" charset="0"/>
+                        </a:rPr>
+                        <m:t>𝜃</m:t>
+                      </m:r>
+                      <m:r>
+                        <a:rPr lang="en-US" altLang="ja-JP" sz="2400" b="0" i="1" smtClean="0">
+                          <a:solidFill>
+                            <a:schemeClr val="bg1"/>
+                          </a:solidFill>
+                          <a:latin typeface="Cambria Math" panose="02040503050406030204" pitchFamily="18" charset="0"/>
+                        </a:rPr>
+                        <m:t>=</m:t>
+                      </m:r>
+                      <m:r>
+                        <m:rPr>
+                          <m:lit/>
+                        </m:rPr>
+                        <a:rPr lang="en-US" altLang="ja-JP" sz="2400" b="0" i="1" smtClean="0">
+                          <a:solidFill>
+                            <a:schemeClr val="bg1"/>
+                          </a:solidFill>
+                          <a:latin typeface="Cambria Math" panose="02040503050406030204" pitchFamily="18" charset="0"/>
+                        </a:rPr>
+                        <m:t>−</m:t>
+                      </m:r>
+                      <m:r>
+                        <a:rPr lang="en-US" altLang="ja-JP" sz="2400" b="0" i="1" smtClean="0">
+                          <a:solidFill>
+                            <a:schemeClr val="bg1"/>
+                          </a:solidFill>
+                          <a:latin typeface="Cambria Math" panose="02040503050406030204" pitchFamily="18" charset="0"/>
+                        </a:rPr>
+                        <m:t> 360×</m:t>
+                      </m:r>
+                      <m:r>
+                        <m:rPr>
+                          <m:sty m:val="p"/>
+                        </m:rPr>
+                        <a:rPr lang="en-US" altLang="ja-JP" sz="2400" b="0" i="0" smtClean="0">
+                          <a:solidFill>
+                            <a:schemeClr val="bg1"/>
+                          </a:solidFill>
+                          <a:latin typeface="Cambria Math" panose="02040503050406030204" pitchFamily="18" charset="0"/>
+                        </a:rPr>
+                        <m:t>Δ</m:t>
+                      </m:r>
+                      <m:r>
+                        <a:rPr lang="en-US" altLang="ja-JP" sz="2400" b="0" i="1" smtClean="0">
+                          <a:solidFill>
+                            <a:schemeClr val="bg1"/>
+                          </a:solidFill>
+                          <a:latin typeface="Cambria Math" panose="02040503050406030204" pitchFamily="18" charset="0"/>
+                        </a:rPr>
+                        <m:t>𝑇</m:t>
+                      </m:r>
+                      <m:r>
+                        <m:rPr>
+                          <m:lit/>
+                        </m:rPr>
+                        <a:rPr lang="en-US" altLang="ja-JP" sz="2400" b="0" i="1" smtClean="0">
+                          <a:solidFill>
+                            <a:schemeClr val="bg1"/>
+                          </a:solidFill>
+                          <a:latin typeface="Cambria Math" panose="02040503050406030204" pitchFamily="18" charset="0"/>
+                        </a:rPr>
+                        <m:t>/</m:t>
+                      </m:r>
+                      <m:r>
+                        <a:rPr lang="en-US" altLang="ja-JP" sz="2400" b="0" i="1" smtClean="0">
+                          <a:solidFill>
+                            <a:schemeClr val="bg1"/>
+                          </a:solidFill>
+                          <a:latin typeface="Cambria Math" panose="02040503050406030204" pitchFamily="18" charset="0"/>
+                        </a:rPr>
+                        <m:t> </m:t>
+                      </m:r>
+                      <m:r>
+                        <a:rPr lang="en-US" altLang="ja-JP" sz="2400" b="0" i="1" smtClean="0">
+                          <a:solidFill>
+                            <a:schemeClr val="bg1"/>
+                          </a:solidFill>
+                          <a:latin typeface="Cambria Math" panose="02040503050406030204" pitchFamily="18" charset="0"/>
+                        </a:rPr>
+                        <m:t>𝑇</m:t>
+                      </m:r>
+                      <m:r>
+                        <a:rPr lang="en-US" altLang="ja-JP" sz="2400" b="0" i="1" smtClean="0">
+                          <a:solidFill>
+                            <a:schemeClr val="bg1"/>
+                          </a:solidFill>
+                          <a:latin typeface="Cambria Math" panose="02040503050406030204" pitchFamily="18" charset="0"/>
+                        </a:rPr>
+                        <m:t> </m:t>
+                      </m:r>
+                    </m:oMath>
+                  </a14:m>
+                  <a:r>
+                    <a:rPr lang="en-US" altLang="ja-JP" sz="2400" dirty="0">
+                      <a:solidFill>
+                        <a:schemeClr val="bg1"/>
+                      </a:solidFill>
+                      <a:latin typeface="Calibri" panose="020F0502020204030204" pitchFamily="34" charset="0"/>
+                      <a:cs typeface="Calibri" panose="020F0502020204030204" pitchFamily="34" charset="0"/>
+                    </a:rPr>
+                    <a:t> </a:t>
+                  </a:r>
+                </a:p>
+                <a:p>
+                  <a:endParaRPr kumimoji="1" lang="ja-JP" altLang="en-US" dirty="0"/>
+                </a:p>
+              </p:txBody>
+            </p:sp>
+          </mc:Choice>
+          <mc:Fallback xmlns="">
+            <p:sp>
+              <p:nvSpPr>
+                <p:cNvPr id="10" name="テキスト ボックス 9">
+                  <a:extLst>
+                    <a:ext uri="{FF2B5EF4-FFF2-40B4-BE49-F238E27FC236}">
+                      <a16:creationId xmlns:a16="http://schemas.microsoft.com/office/drawing/2014/main" id="{DFA60C72-7F13-4AC6-888F-7849A63BD301}"/>
+                    </a:ext>
+                  </a:extLst>
+                </p:cNvPr>
+                <p:cNvSpPr txBox="1">
+                  <a:spLocks noRot="1" noChangeAspect="1" noMove="1" noResize="1" noEditPoints="1" noAdjustHandles="1" noChangeArrowheads="1" noChangeShapeType="1" noTextEdit="1"/>
+                </p:cNvSpPr>
+                <p:nvPr/>
+              </p:nvSpPr>
+              <p:spPr>
+                <a:xfrm>
+                  <a:off x="1291600" y="4458113"/>
+                  <a:ext cx="4214487" cy="1107996"/>
+                </a:xfrm>
+                <a:prstGeom prst="rect">
+                  <a:avLst/>
+                </a:prstGeom>
+                <a:blipFill>
+                  <a:blip r:embed="rId5"/>
+                  <a:stretch>
+                    <a:fillRect l="-434"/>
+                  </a:stretch>
+                </a:blipFill>
+              </p:spPr>
+              <p:txBody>
+                <a:bodyPr/>
+                <a:lstStyle/>
+                <a:p>
+                  <a:r>
+                    <a:rPr lang="ja-JP" altLang="en-US">
+                      <a:noFill/>
+                    </a:rPr>
+                    <a:t> </a:t>
+                  </a:r>
+                </a:p>
+              </p:txBody>
+            </p:sp>
+          </mc:Fallback>
+        </mc:AlternateContent>
+      </p:grpSp>
+      <p:sp>
+        <p:nvSpPr>
+          <p:cNvPr id="9" name="スライド番号プレースホルダー 8">
+            <a:extLst>
+              <a:ext uri="{FF2B5EF4-FFF2-40B4-BE49-F238E27FC236}">
+                <a16:creationId xmlns:a16="http://schemas.microsoft.com/office/drawing/2014/main" id="{4F8D5866-1505-41F9-9E22-B96157FA22C9}"/>
+              </a:ext>
+            </a:extLst>
+          </p:cNvPr>
+          <p:cNvSpPr>
+            <a:spLocks noGrp="1"/>
+          </p:cNvSpPr>
+          <p:nvPr>
+            <p:ph type="sldNum" sz="quarter" idx="12"/>
+          </p:nvPr>
+        </p:nvSpPr>
+        <p:spPr/>
+        <p:txBody>
+          <a:bodyPr/>
+          <a:lstStyle/>
+          <a:p>
+            <a:fld id="{EC2563BA-9F6D-4C2C-B042-56816E50B4B9}" type="slidenum">
+              <a:rPr kumimoji="1" lang="ja-JP" altLang="en-US" smtClean="0"/>
+              <a:t>5</a:t>
+            </a:fld>
+            <a:endParaRPr kumimoji="1" lang="ja-JP" altLang="en-US"/>
+          </a:p>
+        </p:txBody>
+      </p:sp>
     </p:spTree>
     <p:extLst>
       <p:ext uri="{BB962C8B-B14F-4D97-AF65-F5344CB8AC3E}">
@@ -5499,6 +8896,35 @@
           <a:bodyPr/>
           <a:lstStyle/>
           <a:p>
+            <a:endParaRPr kumimoji="1" lang="ja-JP" altLang="en-US"/>
+          </a:p>
+        </p:txBody>
+      </p:sp>
+      <p:sp>
+        <p:nvSpPr>
+          <p:cNvPr id="6" name="スライド番号プレースホルダー 5">
+            <a:extLst>
+              <a:ext uri="{FF2B5EF4-FFF2-40B4-BE49-F238E27FC236}">
+                <a16:creationId xmlns:a16="http://schemas.microsoft.com/office/drawing/2014/main" id="{8F1B6119-1C2D-4F4A-B773-36039E86DE92}"/>
+              </a:ext>
+            </a:extLst>
+          </p:cNvPr>
+          <p:cNvSpPr>
+            <a:spLocks noGrp="1"/>
+          </p:cNvSpPr>
+          <p:nvPr>
+            <p:ph type="sldNum" sz="quarter" idx="12"/>
+          </p:nvPr>
+        </p:nvSpPr>
+        <p:spPr/>
+        <p:txBody>
+          <a:bodyPr/>
+          <a:lstStyle/>
+          <a:p>
+            <a:fld id="{EC2563BA-9F6D-4C2C-B042-56816E50B4B9}" type="slidenum">
+              <a:rPr kumimoji="1" lang="ja-JP" altLang="en-US" smtClean="0"/>
+              <a:t>6</a:t>
+            </a:fld>
             <a:endParaRPr kumimoji="1" lang="ja-JP" altLang="en-US"/>
           </a:p>
         </p:txBody>

</xml_diff>

<commit_message>
modify symbol to itaric
</commit_message>
<xml_diff>
--- a/design_project1.pptx
+++ b/design_project1.pptx
@@ -5060,15 +5060,7 @@
             </a:pPr>
             <a:r>
               <a:rPr lang="ja-JP" altLang="en-US" dirty="0"/>
-              <a:t>ドレイン電流はゲート電圧と左の図のような関係が</a:t>
-            </a:r>
-            <a:r>
-              <a:rPr lang="ja-JP" altLang="en-US" dirty="0" err="1"/>
-              <a:t>で</a:t>
-            </a:r>
-            <a:r>
-              <a:rPr lang="ja-JP" altLang="en-US" dirty="0"/>
-              <a:t>表される</a:t>
+              <a:t>ドレイン電流はゲート電圧と左の図のような関係で表される</a:t>
             </a:r>
             <a:r>
               <a:rPr lang="en-US" altLang="ja-JP" dirty="0"/>
@@ -5462,13 +5454,35 @@
               <a:defRPr/>
             </a:pPr>
             <a:r>
-              <a:rPr lang="ja-JP" altLang="en-US" dirty="0">
+              <a:rPr lang="en-US" altLang="ja-JP" dirty="0">
+                <a:solidFill>
+                  <a:schemeClr val="bg2">
+                    <a:lumMod val="50000"/>
+                  </a:schemeClr>
+                </a:solidFill>
                 <a:latin typeface="Times New Roman" panose="02020603050405020304" pitchFamily="18" charset="0"/>
                 <a:cs typeface="Times New Roman" panose="02020603050405020304" pitchFamily="18" charset="0"/>
               </a:rPr>
-              <a:t>パラメータからの計算値は飽和領域を仮定していることを強調</a:t>
+              <a:t># </a:t>
+            </a:r>
+            <a:r>
+              <a:rPr lang="ja-JP" altLang="en-US" dirty="0">
+                <a:solidFill>
+                  <a:schemeClr val="bg2">
+                    <a:lumMod val="50000"/>
+                  </a:schemeClr>
+                </a:solidFill>
+                <a:latin typeface="Times New Roman" panose="02020603050405020304" pitchFamily="18" charset="0"/>
+                <a:cs typeface="Times New Roman" panose="02020603050405020304" pitchFamily="18" charset="0"/>
+              </a:rPr>
+              <a:t>スライド読み上げ</a:t>
             </a:r>
             <a:endParaRPr lang="en-US" altLang="ja-JP" dirty="0">
+              <a:solidFill>
+                <a:schemeClr val="bg2">
+                  <a:lumMod val="50000"/>
+                </a:schemeClr>
+              </a:solidFill>
               <a:latin typeface="Times New Roman" panose="02020603050405020304" pitchFamily="18" charset="0"/>
               <a:cs typeface="Times New Roman" panose="02020603050405020304" pitchFamily="18" charset="0"/>
             </a:endParaRPr>
@@ -5496,7 +5510,40 @@
                 <a:latin typeface="Times New Roman" panose="02020603050405020304" pitchFamily="18" charset="0"/>
                 <a:cs typeface="Times New Roman" panose="02020603050405020304" pitchFamily="18" charset="0"/>
               </a:rPr>
-              <a:t>誤差は傾きを線形と仮定して表したことやや測定のアナログ電圧系読み取り誤差による</a:t>
+              <a:t>差は小さく正確な測定ができたといえる</a:t>
+            </a:r>
+            <a:r>
+              <a:rPr lang="en-US" altLang="ja-JP" dirty="0">
+                <a:latin typeface="Times New Roman" panose="02020603050405020304" pitchFamily="18" charset="0"/>
+                <a:cs typeface="Times New Roman" panose="02020603050405020304" pitchFamily="18" charset="0"/>
+              </a:rPr>
+              <a:t>.</a:t>
+            </a:r>
+          </a:p>
+          <a:p>
+            <a:pPr marL="0" marR="0" lvl="0" indent="0" algn="l" defTabSz="914400" rtl="0" eaLnBrk="1" fontAlgn="auto" latinLnBrk="0" hangingPunct="1">
+              <a:lnSpc>
+                <a:spcPct val="100000"/>
+              </a:lnSpc>
+              <a:spcBef>
+                <a:spcPts val="0"/>
+              </a:spcBef>
+              <a:spcAft>
+                <a:spcPts val="0"/>
+              </a:spcAft>
+              <a:buClrTx/>
+              <a:buSzTx/>
+              <a:buFontTx/>
+              <a:buNone/>
+              <a:tabLst/>
+              <a:defRPr/>
+            </a:pPr>
+            <a:r>
+              <a:rPr lang="ja-JP" altLang="en-US" dirty="0">
+                <a:latin typeface="Times New Roman" panose="02020603050405020304" pitchFamily="18" charset="0"/>
+                <a:cs typeface="Times New Roman" panose="02020603050405020304" pitchFamily="18" charset="0"/>
+              </a:rPr>
+              <a:t>この差は傾きを線形と仮定して表したことや測定のアナログ電圧系読み取り誤差による</a:t>
             </a:r>
             <a:r>
               <a:rPr lang="en-US" altLang="ja-JP" dirty="0">
@@ -5517,7 +5564,7 @@
                 <a:latin typeface="Times New Roman" panose="02020603050405020304" pitchFamily="18" charset="0"/>
                 <a:cs typeface="Times New Roman" panose="02020603050405020304" pitchFamily="18" charset="0"/>
               </a:rPr>
-              <a:t>の不正確さ起因するものと考えられる</a:t>
+              <a:t>の不正確さや実験結果の読み取り誤差に起因するものと考えられる</a:t>
             </a:r>
             <a:r>
               <a:rPr lang="en-US" altLang="ja-JP" dirty="0">
@@ -9965,7 +10012,12 @@
             <p:ph type="title"/>
           </p:nvPr>
         </p:nvSpPr>
-        <p:spPr/>
+        <p:spPr>
+          <a:xfrm>
+            <a:off x="838200" y="365125"/>
+            <a:ext cx="10515600" cy="1325563"/>
+          </a:xfrm>
+        </p:spPr>
         <p:txBody>
           <a:bodyPr/>
           <a:lstStyle/>
@@ -10011,1273 +10063,1302 @@
           </a:p>
         </p:txBody>
       </p:sp>
-      <p:sp>
-        <p:nvSpPr>
-          <p:cNvPr id="5" name="正方形/長方形 4">
+      <p:grpSp>
+        <p:nvGrpSpPr>
+          <p:cNvPr id="46" name="グループ化 45">
             <a:extLst>
               <a:ext uri="{FF2B5EF4-FFF2-40B4-BE49-F238E27FC236}">
-                <a16:creationId xmlns:a16="http://schemas.microsoft.com/office/drawing/2014/main" id="{E886429A-267F-40E3-94C1-E86B001FD3EC}"/>
+                <a16:creationId xmlns:a16="http://schemas.microsoft.com/office/drawing/2014/main" id="{08DD743B-3093-4358-A4D2-C7F1B32CF4CB}"/>
               </a:ext>
             </a:extLst>
           </p:cNvPr>
-          <p:cNvSpPr/>
+          <p:cNvGrpSpPr/>
           <p:nvPr/>
-        </p:nvSpPr>
-        <p:spPr>
+        </p:nvGrpSpPr>
+        <p:grpSpPr>
           <a:xfrm>
-            <a:off x="1729987" y="3877305"/>
-            <a:ext cx="3498576" cy="1193846"/>
+            <a:off x="2112048" y="1581528"/>
+            <a:ext cx="7967904" cy="3694944"/>
+            <a:chOff x="1729987" y="2232625"/>
+            <a:chExt cx="7810424" cy="2838526"/>
           </a:xfrm>
-          <a:prstGeom prst="rect">
-            <a:avLst/>
-          </a:prstGeom>
-          <a:solidFill>
-            <a:schemeClr val="accent1">
-              <a:lumMod val="20000"/>
-              <a:lumOff val="80000"/>
-            </a:schemeClr>
-          </a:solidFill>
-          <a:ln w="28575">
+        </p:grpSpPr>
+        <p:sp>
+          <p:nvSpPr>
+            <p:cNvPr id="5" name="正方形/長方形 4">
+              <a:extLst>
+                <a:ext uri="{FF2B5EF4-FFF2-40B4-BE49-F238E27FC236}">
+                  <a16:creationId xmlns:a16="http://schemas.microsoft.com/office/drawing/2014/main" id="{E886429A-267F-40E3-94C1-E86B001FD3EC}"/>
+                </a:ext>
+              </a:extLst>
+            </p:cNvPr>
+            <p:cNvSpPr/>
+            <p:nvPr/>
+          </p:nvSpPr>
+          <p:spPr>
+            <a:xfrm>
+              <a:off x="1729987" y="3877305"/>
+              <a:ext cx="3498576" cy="1193846"/>
+            </a:xfrm>
+            <a:prstGeom prst="rect">
+              <a:avLst/>
+            </a:prstGeom>
             <a:solidFill>
+              <a:schemeClr val="accent1">
+                <a:lumMod val="20000"/>
+                <a:lumOff val="80000"/>
+              </a:schemeClr>
+            </a:solidFill>
+            <a:ln w="28575">
+              <a:solidFill>
+                <a:schemeClr val="tx1"/>
+              </a:solidFill>
+            </a:ln>
+          </p:spPr>
+          <p:style>
+            <a:lnRef idx="2">
+              <a:schemeClr val="accent1">
+                <a:shade val="50000"/>
+              </a:schemeClr>
+            </a:lnRef>
+            <a:fillRef idx="1">
+              <a:schemeClr val="accent1"/>
+            </a:fillRef>
+            <a:effectRef idx="0">
+              <a:schemeClr val="accent1"/>
+            </a:effectRef>
+            <a:fontRef idx="minor">
+              <a:schemeClr val="lt1"/>
+            </a:fontRef>
+          </p:style>
+          <p:txBody>
+            <a:bodyPr rtlCol="0" anchor="ctr"/>
+            <a:lstStyle/>
+            <a:p>
+              <a:pPr algn="ctr"/>
+              <a:endParaRPr kumimoji="1" lang="ja-JP" altLang="en-US" b="1"/>
+            </a:p>
+          </p:txBody>
+        </p:sp>
+        <p:sp>
+          <p:nvSpPr>
+            <p:cNvPr id="6" name="四角形: 上の 2 つの角を丸める 5">
+              <a:extLst>
+                <a:ext uri="{FF2B5EF4-FFF2-40B4-BE49-F238E27FC236}">
+                  <a16:creationId xmlns:a16="http://schemas.microsoft.com/office/drawing/2014/main" id="{3660B88C-772D-410C-B4AA-DAB3035D611B}"/>
+                </a:ext>
+              </a:extLst>
+            </p:cNvPr>
+            <p:cNvSpPr/>
+            <p:nvPr/>
+          </p:nvSpPr>
+          <p:spPr>
+            <a:xfrm rot="10800000">
+              <a:off x="2034125" y="3877307"/>
+              <a:ext cx="842841" cy="365760"/>
+            </a:xfrm>
+            <a:prstGeom prst="round2SameRect">
+              <a:avLst>
+                <a:gd name="adj1" fmla="val 36979"/>
+                <a:gd name="adj2" fmla="val 0"/>
+              </a:avLst>
+            </a:prstGeom>
+            <a:ln w="28575">
+              <a:solidFill>
+                <a:schemeClr val="tx1"/>
+              </a:solidFill>
+            </a:ln>
+          </p:spPr>
+          <p:style>
+            <a:lnRef idx="2">
+              <a:schemeClr val="accent1">
+                <a:shade val="50000"/>
+              </a:schemeClr>
+            </a:lnRef>
+            <a:fillRef idx="1">
+              <a:schemeClr val="accent1"/>
+            </a:fillRef>
+            <a:effectRef idx="0">
+              <a:schemeClr val="accent1"/>
+            </a:effectRef>
+            <a:fontRef idx="minor">
+              <a:schemeClr val="lt1"/>
+            </a:fontRef>
+          </p:style>
+          <p:txBody>
+            <a:bodyPr rtlCol="0" anchor="ctr"/>
+            <a:lstStyle/>
+            <a:p>
+              <a:pPr algn="ctr"/>
+              <a:endParaRPr kumimoji="1" lang="ja-JP" altLang="en-US" b="1"/>
+            </a:p>
+          </p:txBody>
+        </p:sp>
+        <p:sp>
+          <p:nvSpPr>
+            <p:cNvPr id="7" name="四角形: 上の 2 つの角を丸める 6">
+              <a:extLst>
+                <a:ext uri="{FF2B5EF4-FFF2-40B4-BE49-F238E27FC236}">
+                  <a16:creationId xmlns:a16="http://schemas.microsoft.com/office/drawing/2014/main" id="{4C3E30CB-B2D9-4438-B1A9-6579BA4737E5}"/>
+                </a:ext>
+              </a:extLst>
+            </p:cNvPr>
+            <p:cNvSpPr/>
+            <p:nvPr/>
+          </p:nvSpPr>
+          <p:spPr>
+            <a:xfrm rot="10800000">
+              <a:off x="4023942" y="3877306"/>
+              <a:ext cx="842842" cy="365760"/>
+            </a:xfrm>
+            <a:prstGeom prst="round2SameRect">
+              <a:avLst>
+                <a:gd name="adj1" fmla="val 31771"/>
+                <a:gd name="adj2" fmla="val 0"/>
+              </a:avLst>
+            </a:prstGeom>
+            <a:ln w="28575">
+              <a:solidFill>
+                <a:schemeClr val="tx1"/>
+              </a:solidFill>
+            </a:ln>
+          </p:spPr>
+          <p:style>
+            <a:lnRef idx="2">
+              <a:schemeClr val="accent1">
+                <a:shade val="50000"/>
+              </a:schemeClr>
+            </a:lnRef>
+            <a:fillRef idx="1">
+              <a:schemeClr val="accent1"/>
+            </a:fillRef>
+            <a:effectRef idx="0">
+              <a:schemeClr val="accent1"/>
+            </a:effectRef>
+            <a:fontRef idx="minor">
+              <a:schemeClr val="lt1"/>
+            </a:fontRef>
+          </p:style>
+          <p:txBody>
+            <a:bodyPr rtlCol="0" anchor="ctr"/>
+            <a:lstStyle/>
+            <a:p>
+              <a:pPr algn="ctr"/>
+              <a:endParaRPr kumimoji="1" lang="ja-JP" altLang="en-US" b="1"/>
+            </a:p>
+          </p:txBody>
+        </p:sp>
+        <p:sp>
+          <p:nvSpPr>
+            <p:cNvPr id="8" name="正方形/長方形 7">
+              <a:extLst>
+                <a:ext uri="{FF2B5EF4-FFF2-40B4-BE49-F238E27FC236}">
+                  <a16:creationId xmlns:a16="http://schemas.microsoft.com/office/drawing/2014/main" id="{C82422B8-9535-4A4D-96CE-D1043EBB588D}"/>
+                </a:ext>
+              </a:extLst>
+            </p:cNvPr>
+            <p:cNvSpPr/>
+            <p:nvPr/>
+          </p:nvSpPr>
+          <p:spPr>
+            <a:xfrm>
+              <a:off x="2620537" y="3703526"/>
+              <a:ext cx="1630017" cy="173778"/>
+            </a:xfrm>
+            <a:prstGeom prst="rect">
+              <a:avLst/>
+            </a:prstGeom>
+            <a:ln w="28575">
+              <a:solidFill>
+                <a:schemeClr val="tx1"/>
+              </a:solidFill>
+            </a:ln>
+          </p:spPr>
+          <p:style>
+            <a:lnRef idx="1">
+              <a:schemeClr val="accent1"/>
+            </a:lnRef>
+            <a:fillRef idx="2">
+              <a:schemeClr val="accent1"/>
+            </a:fillRef>
+            <a:effectRef idx="1">
+              <a:schemeClr val="accent1"/>
+            </a:effectRef>
+            <a:fontRef idx="minor">
+              <a:schemeClr val="dk1"/>
+            </a:fontRef>
+          </p:style>
+          <p:txBody>
+            <a:bodyPr rtlCol="0" anchor="ctr"/>
+            <a:lstStyle/>
+            <a:p>
+              <a:pPr algn="ctr"/>
+              <a:endParaRPr kumimoji="1" lang="ja-JP" altLang="en-US" b="1"/>
+            </a:p>
+          </p:txBody>
+        </p:sp>
+        <p:sp>
+          <p:nvSpPr>
+            <p:cNvPr id="9" name="正方形/長方形 8">
+              <a:extLst>
+                <a:ext uri="{FF2B5EF4-FFF2-40B4-BE49-F238E27FC236}">
+                  <a16:creationId xmlns:a16="http://schemas.microsoft.com/office/drawing/2014/main" id="{FF918F27-5EAF-4508-97B1-4535B19CD0D7}"/>
+                </a:ext>
+              </a:extLst>
+            </p:cNvPr>
+            <p:cNvSpPr/>
+            <p:nvPr/>
+          </p:nvSpPr>
+          <p:spPr>
+            <a:xfrm>
+              <a:off x="2763660" y="3529747"/>
+              <a:ext cx="1343769" cy="173778"/>
+            </a:xfrm>
+            <a:prstGeom prst="rect">
+              <a:avLst/>
+            </a:prstGeom>
+            <a:solidFill>
+              <a:schemeClr val="bg1"/>
+            </a:solidFill>
+            <a:ln w="28575">
+              <a:solidFill>
+                <a:schemeClr val="tx1"/>
+              </a:solidFill>
+            </a:ln>
+          </p:spPr>
+          <p:style>
+            <a:lnRef idx="2">
+              <a:schemeClr val="accent1">
+                <a:shade val="50000"/>
+              </a:schemeClr>
+            </a:lnRef>
+            <a:fillRef idx="1">
+              <a:schemeClr val="accent1"/>
+            </a:fillRef>
+            <a:effectRef idx="0">
+              <a:schemeClr val="accent1"/>
+            </a:effectRef>
+            <a:fontRef idx="minor">
+              <a:schemeClr val="lt1"/>
+            </a:fontRef>
+          </p:style>
+          <p:txBody>
+            <a:bodyPr rtlCol="0" anchor="ctr"/>
+            <a:lstStyle/>
+            <a:p>
+              <a:pPr algn="ctr"/>
+              <a:endParaRPr kumimoji="1" lang="ja-JP" altLang="en-US" b="1"/>
+            </a:p>
+          </p:txBody>
+        </p:sp>
+        <p:sp>
+          <p:nvSpPr>
+            <p:cNvPr id="10" name="テキスト ボックス 9">
+              <a:extLst>
+                <a:ext uri="{FF2B5EF4-FFF2-40B4-BE49-F238E27FC236}">
+                  <a16:creationId xmlns:a16="http://schemas.microsoft.com/office/drawing/2014/main" id="{3EE0FA1A-7394-4C56-A172-5BDEF62475A0}"/>
+                </a:ext>
+              </a:extLst>
+            </p:cNvPr>
+            <p:cNvSpPr txBox="1"/>
+            <p:nvPr/>
+          </p:nvSpPr>
+          <p:spPr>
+            <a:xfrm>
+              <a:off x="2121341" y="3864023"/>
+              <a:ext cx="712635" cy="461665"/>
+            </a:xfrm>
+            <a:prstGeom prst="rect">
+              <a:avLst/>
+            </a:prstGeom>
+            <a:noFill/>
+            <a:ln w="28575">
+              <a:noFill/>
+            </a:ln>
+          </p:spPr>
+          <p:txBody>
+            <a:bodyPr wrap="square" rtlCol="0">
+              <a:spAutoFit/>
+            </a:bodyPr>
+            <a:lstStyle/>
+            <a:p>
+              <a:r>
+                <a:rPr kumimoji="1" lang="en-US" altLang="ja-JP" sz="2400" b="1" dirty="0"/>
+                <a:t>n</a:t>
+              </a:r>
+              <a:r>
+                <a:rPr kumimoji="1" lang="ja-JP" altLang="en-US" sz="2400" b="1" dirty="0"/>
+                <a:t>型</a:t>
+              </a:r>
+            </a:p>
+          </p:txBody>
+        </p:sp>
+        <p:sp>
+          <p:nvSpPr>
+            <p:cNvPr id="11" name="テキスト ボックス 10">
+              <a:extLst>
+                <a:ext uri="{FF2B5EF4-FFF2-40B4-BE49-F238E27FC236}">
+                  <a16:creationId xmlns:a16="http://schemas.microsoft.com/office/drawing/2014/main" id="{A1FAE3ED-F58C-4D95-9378-B7D638BD05DF}"/>
+                </a:ext>
+              </a:extLst>
+            </p:cNvPr>
+            <p:cNvSpPr txBox="1"/>
+            <p:nvPr/>
+          </p:nvSpPr>
+          <p:spPr>
+            <a:xfrm>
+              <a:off x="2987832" y="4589640"/>
+              <a:ext cx="1439186" cy="461665"/>
+            </a:xfrm>
+            <a:prstGeom prst="rect">
+              <a:avLst/>
+            </a:prstGeom>
+            <a:noFill/>
+            <a:ln w="28575">
+              <a:noFill/>
+            </a:ln>
+          </p:spPr>
+          <p:txBody>
+            <a:bodyPr wrap="square" rtlCol="0">
+              <a:spAutoFit/>
+            </a:bodyPr>
+            <a:lstStyle/>
+            <a:p>
+              <a:r>
+                <a:rPr kumimoji="1" lang="en-US" altLang="ja-JP" sz="2400" b="1" dirty="0"/>
+                <a:t>p</a:t>
+              </a:r>
+              <a:r>
+                <a:rPr kumimoji="1" lang="ja-JP" altLang="en-US" sz="2400" b="1" dirty="0"/>
+                <a:t>型</a:t>
+              </a:r>
+            </a:p>
+          </p:txBody>
+        </p:sp>
+        <p:sp>
+          <p:nvSpPr>
+            <p:cNvPr id="17" name="正方形/長方形 16">
+              <a:extLst>
+                <a:ext uri="{FF2B5EF4-FFF2-40B4-BE49-F238E27FC236}">
+                  <a16:creationId xmlns:a16="http://schemas.microsoft.com/office/drawing/2014/main" id="{78C88D1B-0D21-4957-8516-4AD88BB07529}"/>
+                </a:ext>
+              </a:extLst>
+            </p:cNvPr>
+            <p:cNvSpPr/>
+            <p:nvPr/>
+          </p:nvSpPr>
+          <p:spPr>
+            <a:xfrm>
+              <a:off x="6041835" y="3877305"/>
+              <a:ext cx="3498576" cy="1193846"/>
+            </a:xfrm>
+            <a:prstGeom prst="rect">
+              <a:avLst/>
+            </a:prstGeom>
+            <a:solidFill>
+              <a:schemeClr val="accent1">
+                <a:lumMod val="20000"/>
+                <a:lumOff val="80000"/>
+              </a:schemeClr>
+            </a:solidFill>
+            <a:ln w="28575">
+              <a:solidFill>
+                <a:schemeClr val="tx1"/>
+              </a:solidFill>
+            </a:ln>
+          </p:spPr>
+          <p:style>
+            <a:lnRef idx="2">
+              <a:schemeClr val="accent1">
+                <a:shade val="50000"/>
+              </a:schemeClr>
+            </a:lnRef>
+            <a:fillRef idx="1">
+              <a:schemeClr val="accent1"/>
+            </a:fillRef>
+            <a:effectRef idx="0">
+              <a:schemeClr val="accent1"/>
+            </a:effectRef>
+            <a:fontRef idx="minor">
+              <a:schemeClr val="lt1"/>
+            </a:fontRef>
+          </p:style>
+          <p:txBody>
+            <a:bodyPr rtlCol="0" anchor="ctr"/>
+            <a:lstStyle/>
+            <a:p>
+              <a:pPr algn="ctr"/>
+              <a:endParaRPr kumimoji="1" lang="ja-JP" altLang="en-US" b="1" dirty="0"/>
+            </a:p>
+          </p:txBody>
+        </p:sp>
+        <p:sp>
+          <p:nvSpPr>
+            <p:cNvPr id="18" name="四角形: 上の 2 つの角を丸める 17">
+              <a:extLst>
+                <a:ext uri="{FF2B5EF4-FFF2-40B4-BE49-F238E27FC236}">
+                  <a16:creationId xmlns:a16="http://schemas.microsoft.com/office/drawing/2014/main" id="{5053F676-C0B0-4EAC-8ACD-880EE16D6674}"/>
+                </a:ext>
+              </a:extLst>
+            </p:cNvPr>
+            <p:cNvSpPr/>
+            <p:nvPr/>
+          </p:nvSpPr>
+          <p:spPr>
+            <a:xfrm rot="10800000">
+              <a:off x="6345973" y="3877307"/>
+              <a:ext cx="842841" cy="365760"/>
+            </a:xfrm>
+            <a:prstGeom prst="round2SameRect">
+              <a:avLst>
+                <a:gd name="adj1" fmla="val 16146"/>
+                <a:gd name="adj2" fmla="val 0"/>
+              </a:avLst>
+            </a:prstGeom>
+            <a:ln w="28575">
+              <a:solidFill>
+                <a:schemeClr val="tx1"/>
+              </a:solidFill>
+            </a:ln>
+          </p:spPr>
+          <p:style>
+            <a:lnRef idx="2">
+              <a:schemeClr val="accent1">
+                <a:shade val="50000"/>
+              </a:schemeClr>
+            </a:lnRef>
+            <a:fillRef idx="1">
+              <a:schemeClr val="accent1"/>
+            </a:fillRef>
+            <a:effectRef idx="0">
+              <a:schemeClr val="accent1"/>
+            </a:effectRef>
+            <a:fontRef idx="minor">
+              <a:schemeClr val="lt1"/>
+            </a:fontRef>
+          </p:style>
+          <p:txBody>
+            <a:bodyPr rtlCol="0" anchor="ctr"/>
+            <a:lstStyle/>
+            <a:p>
+              <a:pPr algn="ctr"/>
+              <a:endParaRPr kumimoji="1" lang="ja-JP" altLang="en-US" b="1"/>
+            </a:p>
+          </p:txBody>
+        </p:sp>
+        <p:sp>
+          <p:nvSpPr>
+            <p:cNvPr id="19" name="四角形: 上の 2 つの角を丸める 18">
+              <a:extLst>
+                <a:ext uri="{FF2B5EF4-FFF2-40B4-BE49-F238E27FC236}">
+                  <a16:creationId xmlns:a16="http://schemas.microsoft.com/office/drawing/2014/main" id="{DF589AE7-4074-49DC-9AF6-13F87DB1059C}"/>
+                </a:ext>
+              </a:extLst>
+            </p:cNvPr>
+            <p:cNvSpPr/>
+            <p:nvPr/>
+          </p:nvSpPr>
+          <p:spPr>
+            <a:xfrm rot="10800000">
+              <a:off x="8335790" y="3877306"/>
+              <a:ext cx="842842" cy="365760"/>
+            </a:xfrm>
+            <a:prstGeom prst="round2SameRect">
+              <a:avLst>
+                <a:gd name="adj1" fmla="val 16146"/>
+                <a:gd name="adj2" fmla="val 0"/>
+              </a:avLst>
+            </a:prstGeom>
+            <a:ln w="28575">
+              <a:solidFill>
+                <a:schemeClr val="tx1"/>
+              </a:solidFill>
+            </a:ln>
+          </p:spPr>
+          <p:style>
+            <a:lnRef idx="2">
+              <a:schemeClr val="accent1">
+                <a:shade val="50000"/>
+              </a:schemeClr>
+            </a:lnRef>
+            <a:fillRef idx="1">
+              <a:schemeClr val="accent1"/>
+            </a:fillRef>
+            <a:effectRef idx="0">
+              <a:schemeClr val="accent1"/>
+            </a:effectRef>
+            <a:fontRef idx="minor">
+              <a:schemeClr val="lt1"/>
+            </a:fontRef>
+          </p:style>
+          <p:txBody>
+            <a:bodyPr rtlCol="0" anchor="ctr"/>
+            <a:lstStyle/>
+            <a:p>
+              <a:pPr algn="ctr"/>
+              <a:endParaRPr kumimoji="1" lang="ja-JP" altLang="en-US" b="1"/>
+            </a:p>
+          </p:txBody>
+        </p:sp>
+        <p:sp>
+          <p:nvSpPr>
+            <p:cNvPr id="20" name="正方形/長方形 19">
+              <a:extLst>
+                <a:ext uri="{FF2B5EF4-FFF2-40B4-BE49-F238E27FC236}">
+                  <a16:creationId xmlns:a16="http://schemas.microsoft.com/office/drawing/2014/main" id="{4B801BAC-377F-493F-A825-926266A9B37B}"/>
+                </a:ext>
+              </a:extLst>
+            </p:cNvPr>
+            <p:cNvSpPr/>
+            <p:nvPr/>
+          </p:nvSpPr>
+          <p:spPr>
+            <a:xfrm>
+              <a:off x="6932385" y="3703526"/>
+              <a:ext cx="1630017" cy="173778"/>
+            </a:xfrm>
+            <a:prstGeom prst="rect">
+              <a:avLst/>
+            </a:prstGeom>
+            <a:ln w="28575">
+              <a:solidFill>
+                <a:schemeClr val="tx1"/>
+              </a:solidFill>
+            </a:ln>
+          </p:spPr>
+          <p:style>
+            <a:lnRef idx="1">
+              <a:schemeClr val="accent1"/>
+            </a:lnRef>
+            <a:fillRef idx="2">
+              <a:schemeClr val="accent1"/>
+            </a:fillRef>
+            <a:effectRef idx="1">
+              <a:schemeClr val="accent1"/>
+            </a:effectRef>
+            <a:fontRef idx="minor">
+              <a:schemeClr val="dk1"/>
+            </a:fontRef>
+          </p:style>
+          <p:txBody>
+            <a:bodyPr rtlCol="0" anchor="ctr"/>
+            <a:lstStyle/>
+            <a:p>
+              <a:pPr algn="ctr"/>
+              <a:endParaRPr kumimoji="1" lang="ja-JP" altLang="en-US" b="1"/>
+            </a:p>
+          </p:txBody>
+        </p:sp>
+        <p:sp>
+          <p:nvSpPr>
+            <p:cNvPr id="21" name="正方形/長方形 20">
+              <a:extLst>
+                <a:ext uri="{FF2B5EF4-FFF2-40B4-BE49-F238E27FC236}">
+                  <a16:creationId xmlns:a16="http://schemas.microsoft.com/office/drawing/2014/main" id="{E6227E26-2128-457B-988F-BB4F0C04AF32}"/>
+                </a:ext>
+              </a:extLst>
+            </p:cNvPr>
+            <p:cNvSpPr/>
+            <p:nvPr/>
+          </p:nvSpPr>
+          <p:spPr>
+            <a:xfrm>
+              <a:off x="7075508" y="3529747"/>
+              <a:ext cx="1343769" cy="173778"/>
+            </a:xfrm>
+            <a:prstGeom prst="rect">
+              <a:avLst/>
+            </a:prstGeom>
+            <a:solidFill>
+              <a:schemeClr val="bg1"/>
+            </a:solidFill>
+            <a:ln w="28575">
+              <a:solidFill>
+                <a:schemeClr val="tx1"/>
+              </a:solidFill>
+            </a:ln>
+          </p:spPr>
+          <p:style>
+            <a:lnRef idx="2">
+              <a:schemeClr val="accent1">
+                <a:shade val="50000"/>
+              </a:schemeClr>
+            </a:lnRef>
+            <a:fillRef idx="1">
+              <a:schemeClr val="accent1"/>
+            </a:fillRef>
+            <a:effectRef idx="0">
+              <a:schemeClr val="accent1"/>
+            </a:effectRef>
+            <a:fontRef idx="minor">
+              <a:schemeClr val="lt1"/>
+            </a:fontRef>
+          </p:style>
+          <p:txBody>
+            <a:bodyPr rtlCol="0" anchor="ctr"/>
+            <a:lstStyle/>
+            <a:p>
+              <a:pPr algn="ctr"/>
+              <a:endParaRPr kumimoji="1" lang="ja-JP" altLang="en-US" b="1"/>
+            </a:p>
+          </p:txBody>
+        </p:sp>
+        <p:cxnSp>
+          <p:nvCxnSpPr>
+            <p:cNvPr id="22" name="コネクタ: カギ線 21">
+              <a:extLst>
+                <a:ext uri="{FF2B5EF4-FFF2-40B4-BE49-F238E27FC236}">
+                  <a16:creationId xmlns:a16="http://schemas.microsoft.com/office/drawing/2014/main" id="{1C57D77B-1707-4E40-9454-27B5E54E9764}"/>
+                </a:ext>
+              </a:extLst>
+            </p:cNvPr>
+            <p:cNvCxnSpPr>
+              <a:cxnSpLocks/>
+            </p:cNvCxnSpPr>
+            <p:nvPr/>
+          </p:nvCxnSpPr>
+          <p:spPr>
+            <a:xfrm rot="5400000" flipH="1" flipV="1">
+              <a:off x="6400705" y="2588274"/>
+              <a:ext cx="1436811" cy="1141259"/>
+            </a:xfrm>
+            <a:prstGeom prst="bentConnector3">
+              <a:avLst>
+                <a:gd name="adj1" fmla="val 98699"/>
+              </a:avLst>
+            </a:prstGeom>
+            <a:ln w="28575">
+              <a:solidFill>
+                <a:schemeClr val="tx1"/>
+              </a:solidFill>
+            </a:ln>
+          </p:spPr>
+          <p:style>
+            <a:lnRef idx="1">
+              <a:schemeClr val="accent1"/>
+            </a:lnRef>
+            <a:fillRef idx="0">
+              <a:schemeClr val="accent1"/>
+            </a:fillRef>
+            <a:effectRef idx="0">
+              <a:schemeClr val="accent1"/>
+            </a:effectRef>
+            <a:fontRef idx="minor">
               <a:schemeClr val="tx1"/>
+            </a:fontRef>
+          </p:style>
+        </p:cxnSp>
+        <p:cxnSp>
+          <p:nvCxnSpPr>
+            <p:cNvPr id="23" name="コネクタ: カギ線 22">
+              <a:extLst>
+                <a:ext uri="{FF2B5EF4-FFF2-40B4-BE49-F238E27FC236}">
+                  <a16:creationId xmlns:a16="http://schemas.microsoft.com/office/drawing/2014/main" id="{B3ECFE3C-8E64-4799-BFA7-174E393192A4}"/>
+                </a:ext>
+              </a:extLst>
+            </p:cNvPr>
+            <p:cNvCxnSpPr>
+              <a:cxnSpLocks/>
+            </p:cNvCxnSpPr>
+            <p:nvPr/>
+          </p:nvCxnSpPr>
+          <p:spPr>
+            <a:xfrm rot="16200000" flipH="1">
+              <a:off x="7639129" y="2639077"/>
+              <a:ext cx="1433963" cy="1042490"/>
+            </a:xfrm>
+            <a:prstGeom prst="bentConnector3">
+              <a:avLst>
+                <a:gd name="adj1" fmla="val 650"/>
+              </a:avLst>
+            </a:prstGeom>
+            <a:ln w="28575">
+              <a:solidFill>
+                <a:schemeClr val="tx1"/>
+              </a:solidFill>
+            </a:ln>
+          </p:spPr>
+          <p:style>
+            <a:lnRef idx="1">
+              <a:schemeClr val="accent1"/>
+            </a:lnRef>
+            <a:fillRef idx="0">
+              <a:schemeClr val="accent1"/>
+            </a:fillRef>
+            <a:effectRef idx="0">
+              <a:schemeClr val="accent1"/>
+            </a:effectRef>
+            <a:fontRef idx="minor">
+              <a:schemeClr val="tx1"/>
+            </a:fontRef>
+          </p:style>
+        </p:cxnSp>
+        <p:cxnSp>
+          <p:nvCxnSpPr>
+            <p:cNvPr id="24" name="直線コネクタ 23">
+              <a:extLst>
+                <a:ext uri="{FF2B5EF4-FFF2-40B4-BE49-F238E27FC236}">
+                  <a16:creationId xmlns:a16="http://schemas.microsoft.com/office/drawing/2014/main" id="{9E87E2DC-31EC-4FB3-B250-9CB49863D692}"/>
+                </a:ext>
+              </a:extLst>
+            </p:cNvPr>
+            <p:cNvCxnSpPr>
+              <a:cxnSpLocks/>
+            </p:cNvCxnSpPr>
+            <p:nvPr/>
+          </p:nvCxnSpPr>
+          <p:spPr>
+            <a:xfrm>
+              <a:off x="7834863" y="2232625"/>
+              <a:ext cx="0" cy="421430"/>
+            </a:xfrm>
+            <a:prstGeom prst="line">
+              <a:avLst/>
+            </a:prstGeom>
+            <a:ln w="28575">
+              <a:solidFill>
+                <a:schemeClr val="tx1"/>
+              </a:solidFill>
+            </a:ln>
+          </p:spPr>
+          <p:style>
+            <a:lnRef idx="1">
+              <a:schemeClr val="accent1"/>
+            </a:lnRef>
+            <a:fillRef idx="0">
+              <a:schemeClr val="accent1"/>
+            </a:fillRef>
+            <a:effectRef idx="0">
+              <a:schemeClr val="accent1"/>
+            </a:effectRef>
+            <a:fontRef idx="minor">
+              <a:schemeClr val="tx1"/>
+            </a:fontRef>
+          </p:style>
+        </p:cxnSp>
+        <p:cxnSp>
+          <p:nvCxnSpPr>
+            <p:cNvPr id="25" name="直線コネクタ 24">
+              <a:extLst>
+                <a:ext uri="{FF2B5EF4-FFF2-40B4-BE49-F238E27FC236}">
+                  <a16:creationId xmlns:a16="http://schemas.microsoft.com/office/drawing/2014/main" id="{B9745C61-8858-4567-AF1A-21617EC5CF32}"/>
+                </a:ext>
+              </a:extLst>
+            </p:cNvPr>
+            <p:cNvCxnSpPr>
+              <a:cxnSpLocks/>
+            </p:cNvCxnSpPr>
+            <p:nvPr/>
+          </p:nvCxnSpPr>
+          <p:spPr>
+            <a:xfrm>
+              <a:off x="7691320" y="2337984"/>
+              <a:ext cx="0" cy="210715"/>
+            </a:xfrm>
+            <a:prstGeom prst="line">
+              <a:avLst/>
+            </a:prstGeom>
+            <a:ln w="28575">
+              <a:solidFill>
+                <a:schemeClr val="tx1"/>
+              </a:solidFill>
+            </a:ln>
+          </p:spPr>
+          <p:style>
+            <a:lnRef idx="1">
+              <a:schemeClr val="accent1"/>
+            </a:lnRef>
+            <a:fillRef idx="0">
+              <a:schemeClr val="accent1"/>
+            </a:fillRef>
+            <a:effectRef idx="0">
+              <a:schemeClr val="accent1"/>
+            </a:effectRef>
+            <a:fontRef idx="minor">
+              <a:schemeClr val="tx1"/>
+            </a:fontRef>
+          </p:style>
+        </p:cxnSp>
+        <p:cxnSp>
+          <p:nvCxnSpPr>
+            <p:cNvPr id="26" name="コネクタ: カギ線 25">
+              <a:extLst>
+                <a:ext uri="{FF2B5EF4-FFF2-40B4-BE49-F238E27FC236}">
+                  <a16:creationId xmlns:a16="http://schemas.microsoft.com/office/drawing/2014/main" id="{5F62B03D-154F-4340-9536-CC7329AE14C2}"/>
+                </a:ext>
+              </a:extLst>
+            </p:cNvPr>
+            <p:cNvCxnSpPr>
+              <a:cxnSpLocks/>
+              <a:endCxn id="21" idx="0"/>
+            </p:cNvCxnSpPr>
+            <p:nvPr/>
+          </p:nvCxnSpPr>
+          <p:spPr>
+            <a:xfrm rot="16200000" flipH="1">
+              <a:off x="7349795" y="3132149"/>
+              <a:ext cx="371339" cy="423857"/>
+            </a:xfrm>
+            <a:prstGeom prst="bentConnector3">
+              <a:avLst>
+                <a:gd name="adj1" fmla="val -2219"/>
+              </a:avLst>
+            </a:prstGeom>
+            <a:ln w="28575">
+              <a:solidFill>
+                <a:schemeClr val="tx1"/>
+              </a:solidFill>
+            </a:ln>
+          </p:spPr>
+          <p:style>
+            <a:lnRef idx="1">
+              <a:schemeClr val="accent1"/>
+            </a:lnRef>
+            <a:fillRef idx="0">
+              <a:schemeClr val="accent1"/>
+            </a:fillRef>
+            <a:effectRef idx="0">
+              <a:schemeClr val="accent1"/>
+            </a:effectRef>
+            <a:fontRef idx="minor">
+              <a:schemeClr val="tx1"/>
+            </a:fontRef>
+          </p:style>
+        </p:cxnSp>
+        <p:cxnSp>
+          <p:nvCxnSpPr>
+            <p:cNvPr id="27" name="直線コネクタ 26">
+              <a:extLst>
+                <a:ext uri="{FF2B5EF4-FFF2-40B4-BE49-F238E27FC236}">
+                  <a16:creationId xmlns:a16="http://schemas.microsoft.com/office/drawing/2014/main" id="{8FA056B0-4CBF-49B8-BF2F-631AB6D09D43}"/>
+                </a:ext>
+              </a:extLst>
+            </p:cNvPr>
+            <p:cNvCxnSpPr>
+              <a:cxnSpLocks/>
+            </p:cNvCxnSpPr>
+            <p:nvPr/>
+          </p:nvCxnSpPr>
+          <p:spPr>
+            <a:xfrm>
+              <a:off x="7317369" y="2914721"/>
+              <a:ext cx="0" cy="421430"/>
+            </a:xfrm>
+            <a:prstGeom prst="line">
+              <a:avLst/>
+            </a:prstGeom>
+            <a:ln w="28575">
+              <a:solidFill>
+                <a:schemeClr val="tx1"/>
+              </a:solidFill>
+            </a:ln>
+          </p:spPr>
+          <p:style>
+            <a:lnRef idx="1">
+              <a:schemeClr val="accent1"/>
+            </a:lnRef>
+            <a:fillRef idx="0">
+              <a:schemeClr val="accent1"/>
+            </a:fillRef>
+            <a:effectRef idx="0">
+              <a:schemeClr val="accent1"/>
+            </a:effectRef>
+            <a:fontRef idx="minor">
+              <a:schemeClr val="tx1"/>
+            </a:fontRef>
+          </p:style>
+        </p:cxnSp>
+        <p:cxnSp>
+          <p:nvCxnSpPr>
+            <p:cNvPr id="28" name="直線コネクタ 27">
+              <a:extLst>
+                <a:ext uri="{FF2B5EF4-FFF2-40B4-BE49-F238E27FC236}">
+                  <a16:creationId xmlns:a16="http://schemas.microsoft.com/office/drawing/2014/main" id="{B840EF72-3945-4CFA-B621-F4031676A7FD}"/>
+                </a:ext>
+              </a:extLst>
+            </p:cNvPr>
+            <p:cNvCxnSpPr>
+              <a:cxnSpLocks/>
+            </p:cNvCxnSpPr>
+            <p:nvPr/>
+          </p:nvCxnSpPr>
+          <p:spPr>
+            <a:xfrm>
+              <a:off x="7178412" y="3028351"/>
+              <a:ext cx="0" cy="210715"/>
+            </a:xfrm>
+            <a:prstGeom prst="line">
+              <a:avLst/>
+            </a:prstGeom>
+            <a:ln w="28575">
+              <a:solidFill>
+                <a:schemeClr val="tx1"/>
+              </a:solidFill>
+            </a:ln>
+          </p:spPr>
+          <p:style>
+            <a:lnRef idx="1">
+              <a:schemeClr val="accent1"/>
+            </a:lnRef>
+            <a:fillRef idx="0">
+              <a:schemeClr val="accent1"/>
+            </a:fillRef>
+            <a:effectRef idx="0">
+              <a:schemeClr val="accent1"/>
+            </a:effectRef>
+            <a:fontRef idx="minor">
+              <a:schemeClr val="tx1"/>
+            </a:fontRef>
+          </p:style>
+        </p:cxnSp>
+        <p:cxnSp>
+          <p:nvCxnSpPr>
+            <p:cNvPr id="31" name="直線コネクタ 30">
+              <a:extLst>
+                <a:ext uri="{FF2B5EF4-FFF2-40B4-BE49-F238E27FC236}">
+                  <a16:creationId xmlns:a16="http://schemas.microsoft.com/office/drawing/2014/main" id="{1E4D2A6E-89F9-4252-B03A-76819437D25A}"/>
+                </a:ext>
+              </a:extLst>
+            </p:cNvPr>
+            <p:cNvCxnSpPr>
+              <a:cxnSpLocks/>
+            </p:cNvCxnSpPr>
+            <p:nvPr/>
+          </p:nvCxnSpPr>
+          <p:spPr>
+            <a:xfrm>
+              <a:off x="6548479" y="3158901"/>
+              <a:ext cx="629933" cy="0"/>
+            </a:xfrm>
+            <a:prstGeom prst="line">
+              <a:avLst/>
+            </a:prstGeom>
+            <a:ln w="28575">
+              <a:solidFill>
+                <a:schemeClr val="tx1"/>
+              </a:solidFill>
+            </a:ln>
+          </p:spPr>
+          <p:style>
+            <a:lnRef idx="1">
+              <a:schemeClr val="accent1"/>
+            </a:lnRef>
+            <a:fillRef idx="0">
+              <a:schemeClr val="accent1"/>
+            </a:fillRef>
+            <a:effectRef idx="0">
+              <a:schemeClr val="accent1"/>
+            </a:effectRef>
+            <a:fontRef idx="minor">
+              <a:schemeClr val="tx1"/>
+            </a:fontRef>
+          </p:style>
+        </p:cxnSp>
+        <p:sp>
+          <p:nvSpPr>
+            <p:cNvPr id="32" name="テキスト ボックス 31">
+              <a:extLst>
+                <a:ext uri="{FF2B5EF4-FFF2-40B4-BE49-F238E27FC236}">
+                  <a16:creationId xmlns:a16="http://schemas.microsoft.com/office/drawing/2014/main" id="{D423CD77-B69C-46F9-8671-4305E90CD88C}"/>
+                </a:ext>
+              </a:extLst>
+            </p:cNvPr>
+            <p:cNvSpPr txBox="1"/>
+            <p:nvPr/>
+          </p:nvSpPr>
+          <p:spPr>
+            <a:xfrm>
+              <a:off x="6775088" y="2517364"/>
+              <a:ext cx="1439186" cy="461665"/>
+            </a:xfrm>
+            <a:prstGeom prst="rect">
+              <a:avLst/>
+            </a:prstGeom>
+            <a:noFill/>
+            <a:ln w="28575">
+              <a:noFill/>
+            </a:ln>
+          </p:spPr>
+          <p:txBody>
+            <a:bodyPr wrap="square" rtlCol="0">
+              <a:spAutoFit/>
+            </a:bodyPr>
+            <a:lstStyle/>
+            <a:p>
+              <a:r>
+                <a:rPr kumimoji="1" lang="en-US" altLang="ja-JP" sz="2400" b="1" dirty="0"/>
+                <a:t>V</a:t>
+              </a:r>
+              <a:r>
+                <a:rPr kumimoji="1" lang="en-US" altLang="ja-JP" b="1" dirty="0"/>
+                <a:t>GS</a:t>
+              </a:r>
+              <a:endParaRPr kumimoji="1" lang="ja-JP" altLang="en-US" sz="2400" b="1" dirty="0"/>
+            </a:p>
+          </p:txBody>
+        </p:sp>
+        <p:sp>
+          <p:nvSpPr>
+            <p:cNvPr id="35" name="テキスト ボックス 34">
+              <a:extLst>
+                <a:ext uri="{FF2B5EF4-FFF2-40B4-BE49-F238E27FC236}">
+                  <a16:creationId xmlns:a16="http://schemas.microsoft.com/office/drawing/2014/main" id="{791872FE-720A-4F6D-AFAD-86DD82381831}"/>
+                </a:ext>
+              </a:extLst>
+            </p:cNvPr>
+            <p:cNvSpPr txBox="1"/>
+            <p:nvPr/>
+          </p:nvSpPr>
+          <p:spPr>
+            <a:xfrm>
+              <a:off x="7684203" y="3149678"/>
+              <a:ext cx="1637697" cy="400110"/>
+            </a:xfrm>
+            <a:prstGeom prst="rect">
+              <a:avLst/>
+            </a:prstGeom>
+            <a:noFill/>
+            <a:ln w="28575">
+              <a:noFill/>
+            </a:ln>
+          </p:spPr>
+          <p:txBody>
+            <a:bodyPr wrap="square" rtlCol="0">
+              <a:spAutoFit/>
+            </a:bodyPr>
+            <a:lstStyle/>
+            <a:p>
+              <a:r>
+                <a:rPr kumimoji="1" lang="en-US" altLang="ja-JP" sz="2000" b="1" dirty="0"/>
+                <a:t>G</a:t>
+              </a:r>
+              <a:r>
+                <a:rPr kumimoji="1" lang="en-US" altLang="ja-JP" b="1" dirty="0"/>
+                <a:t>(</a:t>
+              </a:r>
+              <a:r>
+                <a:rPr kumimoji="1" lang="ja-JP" altLang="en-US" b="1" dirty="0"/>
+                <a:t>ゲート</a:t>
+              </a:r>
+              <a:r>
+                <a:rPr kumimoji="1" lang="en-US" altLang="ja-JP" b="1" dirty="0"/>
+                <a:t>)</a:t>
+              </a:r>
+              <a:endParaRPr kumimoji="1" lang="ja-JP" altLang="en-US" sz="2000" b="1" dirty="0"/>
+            </a:p>
+          </p:txBody>
+        </p:sp>
+        <p:sp>
+          <p:nvSpPr>
+            <p:cNvPr id="37" name="正方形/長方形 36">
+              <a:extLst>
+                <a:ext uri="{FF2B5EF4-FFF2-40B4-BE49-F238E27FC236}">
+                  <a16:creationId xmlns:a16="http://schemas.microsoft.com/office/drawing/2014/main" id="{D8F5434D-4F5D-48AE-99DB-01CD0ECC7B0F}"/>
+                </a:ext>
+              </a:extLst>
+            </p:cNvPr>
+            <p:cNvSpPr/>
+            <p:nvPr/>
+          </p:nvSpPr>
+          <p:spPr>
+            <a:xfrm>
+              <a:off x="7209562" y="3867051"/>
+              <a:ext cx="1126229" cy="173778"/>
+            </a:xfrm>
+            <a:prstGeom prst="rect">
+              <a:avLst/>
+            </a:prstGeom>
+            <a:solidFill>
+              <a:srgbClr val="00B0F0"/>
             </a:solidFill>
-          </a:ln>
-        </p:spPr>
-        <p:style>
-          <a:lnRef idx="2">
-            <a:schemeClr val="accent1">
-              <a:shade val="50000"/>
-            </a:schemeClr>
-          </a:lnRef>
-          <a:fillRef idx="1">
-            <a:schemeClr val="accent1"/>
-          </a:fillRef>
-          <a:effectRef idx="0">
-            <a:schemeClr val="accent1"/>
-          </a:effectRef>
-          <a:fontRef idx="minor">
-            <a:schemeClr val="lt1"/>
-          </a:fontRef>
-        </p:style>
-        <p:txBody>
-          <a:bodyPr rtlCol="0" anchor="ctr"/>
-          <a:lstStyle/>
-          <a:p>
-            <a:pPr algn="ctr"/>
-            <a:endParaRPr kumimoji="1" lang="ja-JP" altLang="en-US" b="1"/>
-          </a:p>
-        </p:txBody>
-      </p:sp>
-      <p:sp>
-        <p:nvSpPr>
-          <p:cNvPr id="6" name="四角形: 上の 2 つの角を丸める 5">
-            <a:extLst>
-              <a:ext uri="{FF2B5EF4-FFF2-40B4-BE49-F238E27FC236}">
-                <a16:creationId xmlns:a16="http://schemas.microsoft.com/office/drawing/2014/main" id="{3660B88C-772D-410C-B4AA-DAB3035D611B}"/>
-              </a:ext>
-            </a:extLst>
-          </p:cNvPr>
-          <p:cNvSpPr/>
-          <p:nvPr/>
-        </p:nvSpPr>
-        <p:spPr>
-          <a:xfrm rot="10800000">
-            <a:off x="2034125" y="3877307"/>
-            <a:ext cx="842841" cy="365760"/>
-          </a:xfrm>
-          <a:prstGeom prst="round2SameRect">
-            <a:avLst>
-              <a:gd name="adj1" fmla="val 36979"/>
-              <a:gd name="adj2" fmla="val 0"/>
-            </a:avLst>
-          </a:prstGeom>
-          <a:ln w="28575">
-            <a:solidFill>
-              <a:schemeClr val="tx1"/>
-            </a:solidFill>
-          </a:ln>
-        </p:spPr>
-        <p:style>
-          <a:lnRef idx="2">
-            <a:schemeClr val="accent1">
-              <a:shade val="50000"/>
-            </a:schemeClr>
-          </a:lnRef>
-          <a:fillRef idx="1">
-            <a:schemeClr val="accent1"/>
-          </a:fillRef>
-          <a:effectRef idx="0">
-            <a:schemeClr val="accent1"/>
-          </a:effectRef>
-          <a:fontRef idx="minor">
-            <a:schemeClr val="lt1"/>
-          </a:fontRef>
-        </p:style>
-        <p:txBody>
-          <a:bodyPr rtlCol="0" anchor="ctr"/>
-          <a:lstStyle/>
-          <a:p>
-            <a:pPr algn="ctr"/>
-            <a:endParaRPr kumimoji="1" lang="ja-JP" altLang="en-US" b="1"/>
-          </a:p>
-        </p:txBody>
-      </p:sp>
-      <p:sp>
-        <p:nvSpPr>
-          <p:cNvPr id="7" name="四角形: 上の 2 つの角を丸める 6">
-            <a:extLst>
-              <a:ext uri="{FF2B5EF4-FFF2-40B4-BE49-F238E27FC236}">
-                <a16:creationId xmlns:a16="http://schemas.microsoft.com/office/drawing/2014/main" id="{4C3E30CB-B2D9-4438-B1A9-6579BA4737E5}"/>
-              </a:ext>
-            </a:extLst>
-          </p:cNvPr>
-          <p:cNvSpPr/>
-          <p:nvPr/>
-        </p:nvSpPr>
-        <p:spPr>
-          <a:xfrm rot="10800000">
-            <a:off x="4023942" y="3877306"/>
-            <a:ext cx="842842" cy="365760"/>
-          </a:xfrm>
-          <a:prstGeom prst="round2SameRect">
-            <a:avLst>
-              <a:gd name="adj1" fmla="val 31771"/>
-              <a:gd name="adj2" fmla="val 0"/>
-            </a:avLst>
-          </a:prstGeom>
-          <a:ln w="28575">
-            <a:solidFill>
-              <a:schemeClr val="tx1"/>
-            </a:solidFill>
-          </a:ln>
-        </p:spPr>
-        <p:style>
-          <a:lnRef idx="2">
-            <a:schemeClr val="accent1">
-              <a:shade val="50000"/>
-            </a:schemeClr>
-          </a:lnRef>
-          <a:fillRef idx="1">
-            <a:schemeClr val="accent1"/>
-          </a:fillRef>
-          <a:effectRef idx="0">
-            <a:schemeClr val="accent1"/>
-          </a:effectRef>
-          <a:fontRef idx="minor">
-            <a:schemeClr val="lt1"/>
-          </a:fontRef>
-        </p:style>
-        <p:txBody>
-          <a:bodyPr rtlCol="0" anchor="ctr"/>
-          <a:lstStyle/>
-          <a:p>
-            <a:pPr algn="ctr"/>
-            <a:endParaRPr kumimoji="1" lang="ja-JP" altLang="en-US" b="1"/>
-          </a:p>
-        </p:txBody>
-      </p:sp>
-      <p:sp>
-        <p:nvSpPr>
-          <p:cNvPr id="8" name="正方形/長方形 7">
-            <a:extLst>
-              <a:ext uri="{FF2B5EF4-FFF2-40B4-BE49-F238E27FC236}">
-                <a16:creationId xmlns:a16="http://schemas.microsoft.com/office/drawing/2014/main" id="{C82422B8-9535-4A4D-96CE-D1043EBB588D}"/>
-              </a:ext>
-            </a:extLst>
-          </p:cNvPr>
-          <p:cNvSpPr/>
-          <p:nvPr/>
-        </p:nvSpPr>
-        <p:spPr>
-          <a:xfrm>
-            <a:off x="2620537" y="3703526"/>
-            <a:ext cx="1630017" cy="173778"/>
-          </a:xfrm>
-          <a:prstGeom prst="rect">
-            <a:avLst/>
-          </a:prstGeom>
-          <a:ln w="28575">
-            <a:solidFill>
-              <a:schemeClr val="tx1"/>
-            </a:solidFill>
-          </a:ln>
-        </p:spPr>
-        <p:style>
-          <a:lnRef idx="1">
-            <a:schemeClr val="accent1"/>
-          </a:lnRef>
-          <a:fillRef idx="2">
-            <a:schemeClr val="accent1"/>
-          </a:fillRef>
-          <a:effectRef idx="1">
-            <a:schemeClr val="accent1"/>
-          </a:effectRef>
-          <a:fontRef idx="minor">
-            <a:schemeClr val="dk1"/>
-          </a:fontRef>
-        </p:style>
-        <p:txBody>
-          <a:bodyPr rtlCol="0" anchor="ctr"/>
-          <a:lstStyle/>
-          <a:p>
-            <a:pPr algn="ctr"/>
-            <a:endParaRPr kumimoji="1" lang="ja-JP" altLang="en-US" b="1"/>
-          </a:p>
-        </p:txBody>
-      </p:sp>
-      <p:sp>
-        <p:nvSpPr>
-          <p:cNvPr id="9" name="正方形/長方形 8">
-            <a:extLst>
-              <a:ext uri="{FF2B5EF4-FFF2-40B4-BE49-F238E27FC236}">
-                <a16:creationId xmlns:a16="http://schemas.microsoft.com/office/drawing/2014/main" id="{FF918F27-5EAF-4508-97B1-4535B19CD0D7}"/>
-              </a:ext>
-            </a:extLst>
-          </p:cNvPr>
-          <p:cNvSpPr/>
-          <p:nvPr/>
-        </p:nvSpPr>
-        <p:spPr>
-          <a:xfrm>
-            <a:off x="2763660" y="3529747"/>
-            <a:ext cx="1343769" cy="173778"/>
-          </a:xfrm>
-          <a:prstGeom prst="rect">
-            <a:avLst/>
-          </a:prstGeom>
-          <a:solidFill>
-            <a:schemeClr val="bg1"/>
-          </a:solidFill>
-          <a:ln w="28575">
-            <a:solidFill>
-              <a:schemeClr val="tx1"/>
-            </a:solidFill>
-          </a:ln>
-        </p:spPr>
-        <p:style>
-          <a:lnRef idx="2">
-            <a:schemeClr val="accent1">
-              <a:shade val="50000"/>
-            </a:schemeClr>
-          </a:lnRef>
-          <a:fillRef idx="1">
-            <a:schemeClr val="accent1"/>
-          </a:fillRef>
-          <a:effectRef idx="0">
-            <a:schemeClr val="accent1"/>
-          </a:effectRef>
-          <a:fontRef idx="minor">
-            <a:schemeClr val="lt1"/>
-          </a:fontRef>
-        </p:style>
-        <p:txBody>
-          <a:bodyPr rtlCol="0" anchor="ctr"/>
-          <a:lstStyle/>
-          <a:p>
-            <a:pPr algn="ctr"/>
-            <a:endParaRPr kumimoji="1" lang="ja-JP" altLang="en-US" b="1"/>
-          </a:p>
-        </p:txBody>
-      </p:sp>
-      <p:sp>
-        <p:nvSpPr>
-          <p:cNvPr id="10" name="テキスト ボックス 9">
-            <a:extLst>
-              <a:ext uri="{FF2B5EF4-FFF2-40B4-BE49-F238E27FC236}">
-                <a16:creationId xmlns:a16="http://schemas.microsoft.com/office/drawing/2014/main" id="{3EE0FA1A-7394-4C56-A172-5BDEF62475A0}"/>
-              </a:ext>
-            </a:extLst>
-          </p:cNvPr>
-          <p:cNvSpPr txBox="1"/>
-          <p:nvPr/>
-        </p:nvSpPr>
-        <p:spPr>
-          <a:xfrm>
-            <a:off x="2121341" y="3864023"/>
-            <a:ext cx="712635" cy="461665"/>
-          </a:xfrm>
-          <a:prstGeom prst="rect">
-            <a:avLst/>
-          </a:prstGeom>
-          <a:noFill/>
-          <a:ln w="28575">
+            <a:ln w="28575">
+              <a:solidFill>
+                <a:schemeClr val="tx1"/>
+              </a:solidFill>
+            </a:ln>
+          </p:spPr>
+          <p:style>
+            <a:lnRef idx="2">
+              <a:schemeClr val="accent1">
+                <a:shade val="50000"/>
+              </a:schemeClr>
+            </a:lnRef>
+            <a:fillRef idx="1">
+              <a:schemeClr val="accent1"/>
+            </a:fillRef>
+            <a:effectRef idx="0">
+              <a:schemeClr val="accent1"/>
+            </a:effectRef>
+            <a:fontRef idx="minor">
+              <a:schemeClr val="lt1"/>
+            </a:fontRef>
+          </p:style>
+          <p:txBody>
+            <a:bodyPr rtlCol="0" anchor="ctr"/>
+            <a:lstStyle/>
+            <a:p>
+              <a:pPr algn="ctr"/>
+              <a:endParaRPr kumimoji="1" lang="ja-JP" altLang="en-US" b="1"/>
+            </a:p>
+          </p:txBody>
+        </p:sp>
+        <p:sp>
+          <p:nvSpPr>
+            <p:cNvPr id="38" name="テキスト ボックス 37">
+              <a:extLst>
+                <a:ext uri="{FF2B5EF4-FFF2-40B4-BE49-F238E27FC236}">
+                  <a16:creationId xmlns:a16="http://schemas.microsoft.com/office/drawing/2014/main" id="{DBCFC6C9-7A09-4C0D-A5A0-C0B83A9BDE91}"/>
+                </a:ext>
+              </a:extLst>
+            </p:cNvPr>
+            <p:cNvSpPr txBox="1"/>
+            <p:nvPr/>
+          </p:nvSpPr>
+          <p:spPr>
+            <a:xfrm>
+              <a:off x="7410896" y="4021730"/>
+              <a:ext cx="1126229" cy="276999"/>
+            </a:xfrm>
+            <a:prstGeom prst="rect">
+              <a:avLst/>
+            </a:prstGeom>
             <a:noFill/>
-          </a:ln>
-        </p:spPr>
-        <p:txBody>
-          <a:bodyPr wrap="square" rtlCol="0">
-            <a:spAutoFit/>
-          </a:bodyPr>
-          <a:lstStyle/>
-          <a:p>
-            <a:r>
-              <a:rPr kumimoji="1" lang="en-US" altLang="ja-JP" sz="2400" b="1" dirty="0"/>
-              <a:t>n</a:t>
-            </a:r>
-            <a:r>
-              <a:rPr kumimoji="1" lang="ja-JP" altLang="en-US" sz="2400" b="1" dirty="0"/>
-              <a:t>型</a:t>
-            </a:r>
-          </a:p>
-        </p:txBody>
-      </p:sp>
-      <p:sp>
-        <p:nvSpPr>
-          <p:cNvPr id="11" name="テキスト ボックス 10">
-            <a:extLst>
-              <a:ext uri="{FF2B5EF4-FFF2-40B4-BE49-F238E27FC236}">
-                <a16:creationId xmlns:a16="http://schemas.microsoft.com/office/drawing/2014/main" id="{A1FAE3ED-F58C-4D95-9378-B7D638BD05DF}"/>
-              </a:ext>
-            </a:extLst>
-          </p:cNvPr>
-          <p:cNvSpPr txBox="1"/>
-          <p:nvPr/>
-        </p:nvSpPr>
-        <p:spPr>
-          <a:xfrm>
-            <a:off x="2987832" y="4589640"/>
-            <a:ext cx="1439186" cy="461665"/>
-          </a:xfrm>
-          <a:prstGeom prst="rect">
-            <a:avLst/>
-          </a:prstGeom>
-          <a:noFill/>
-          <a:ln w="28575">
+            <a:ln w="28575">
+              <a:noFill/>
+            </a:ln>
+          </p:spPr>
+          <p:txBody>
+            <a:bodyPr wrap="square" rtlCol="0">
+              <a:spAutoFit/>
+            </a:bodyPr>
+            <a:lstStyle/>
+            <a:p>
+              <a:r>
+                <a:rPr kumimoji="1" lang="en-US" altLang="ja-JP" sz="1200" b="1" dirty="0"/>
+                <a:t>n</a:t>
+              </a:r>
+              <a:r>
+                <a:rPr kumimoji="1" lang="ja-JP" altLang="en-US" sz="1200" b="1" dirty="0"/>
+                <a:t>型反転層</a:t>
+              </a:r>
+              <a:endParaRPr kumimoji="1" lang="ja-JP" altLang="en-US" sz="2000" b="1" dirty="0"/>
+            </a:p>
+          </p:txBody>
+        </p:sp>
+        <p:sp>
+          <p:nvSpPr>
+            <p:cNvPr id="40" name="テキスト ボックス 39">
+              <a:extLst>
+                <a:ext uri="{FF2B5EF4-FFF2-40B4-BE49-F238E27FC236}">
+                  <a16:creationId xmlns:a16="http://schemas.microsoft.com/office/drawing/2014/main" id="{5D55D2B9-6930-4CE7-A60E-14B32A255094}"/>
+                </a:ext>
+              </a:extLst>
+            </p:cNvPr>
+            <p:cNvSpPr txBox="1"/>
+            <p:nvPr/>
+          </p:nvSpPr>
+          <p:spPr>
+            <a:xfrm>
+              <a:off x="4124578" y="3890586"/>
+              <a:ext cx="712635" cy="461665"/>
+            </a:xfrm>
+            <a:prstGeom prst="rect">
+              <a:avLst/>
+            </a:prstGeom>
             <a:noFill/>
-          </a:ln>
-        </p:spPr>
-        <p:txBody>
-          <a:bodyPr wrap="square" rtlCol="0">
-            <a:spAutoFit/>
-          </a:bodyPr>
-          <a:lstStyle/>
-          <a:p>
-            <a:r>
-              <a:rPr kumimoji="1" lang="en-US" altLang="ja-JP" sz="2400" b="1" dirty="0"/>
-              <a:t>p</a:t>
-            </a:r>
-            <a:r>
-              <a:rPr kumimoji="1" lang="ja-JP" altLang="en-US" sz="2400" b="1" dirty="0"/>
-              <a:t>型</a:t>
-            </a:r>
-          </a:p>
-        </p:txBody>
-      </p:sp>
-      <p:sp>
-        <p:nvSpPr>
-          <p:cNvPr id="17" name="正方形/長方形 16">
-            <a:extLst>
-              <a:ext uri="{FF2B5EF4-FFF2-40B4-BE49-F238E27FC236}">
-                <a16:creationId xmlns:a16="http://schemas.microsoft.com/office/drawing/2014/main" id="{78C88D1B-0D21-4957-8516-4AD88BB07529}"/>
-              </a:ext>
-            </a:extLst>
-          </p:cNvPr>
-          <p:cNvSpPr/>
-          <p:nvPr/>
-        </p:nvSpPr>
-        <p:spPr>
-          <a:xfrm>
-            <a:off x="6041835" y="3877305"/>
-            <a:ext cx="3498576" cy="1193846"/>
-          </a:xfrm>
-          <a:prstGeom prst="rect">
-            <a:avLst/>
-          </a:prstGeom>
-          <a:solidFill>
-            <a:schemeClr val="accent1">
-              <a:lumMod val="20000"/>
-              <a:lumOff val="80000"/>
-            </a:schemeClr>
-          </a:solidFill>
-          <a:ln w="28575">
-            <a:solidFill>
-              <a:schemeClr val="tx1"/>
-            </a:solidFill>
-          </a:ln>
-        </p:spPr>
-        <p:style>
-          <a:lnRef idx="2">
-            <a:schemeClr val="accent1">
-              <a:shade val="50000"/>
-            </a:schemeClr>
-          </a:lnRef>
-          <a:fillRef idx="1">
-            <a:schemeClr val="accent1"/>
-          </a:fillRef>
-          <a:effectRef idx="0">
-            <a:schemeClr val="accent1"/>
-          </a:effectRef>
-          <a:fontRef idx="minor">
-            <a:schemeClr val="lt1"/>
-          </a:fontRef>
-        </p:style>
-        <p:txBody>
-          <a:bodyPr rtlCol="0" anchor="ctr"/>
-          <a:lstStyle/>
-          <a:p>
-            <a:pPr algn="ctr"/>
-            <a:endParaRPr kumimoji="1" lang="ja-JP" altLang="en-US" b="1"/>
-          </a:p>
-        </p:txBody>
-      </p:sp>
-      <p:sp>
-        <p:nvSpPr>
-          <p:cNvPr id="18" name="四角形: 上の 2 つの角を丸める 17">
-            <a:extLst>
-              <a:ext uri="{FF2B5EF4-FFF2-40B4-BE49-F238E27FC236}">
-                <a16:creationId xmlns:a16="http://schemas.microsoft.com/office/drawing/2014/main" id="{5053F676-C0B0-4EAC-8ACD-880EE16D6674}"/>
-              </a:ext>
-            </a:extLst>
-          </p:cNvPr>
-          <p:cNvSpPr/>
-          <p:nvPr/>
-        </p:nvSpPr>
-        <p:spPr>
-          <a:xfrm rot="10800000">
-            <a:off x="6345973" y="3877307"/>
-            <a:ext cx="842841" cy="365760"/>
-          </a:xfrm>
-          <a:prstGeom prst="round2SameRect">
-            <a:avLst>
-              <a:gd name="adj1" fmla="val 16146"/>
-              <a:gd name="adj2" fmla="val 0"/>
-            </a:avLst>
-          </a:prstGeom>
-          <a:ln w="28575">
-            <a:solidFill>
-              <a:schemeClr val="tx1"/>
-            </a:solidFill>
-          </a:ln>
-        </p:spPr>
-        <p:style>
-          <a:lnRef idx="2">
-            <a:schemeClr val="accent1">
-              <a:shade val="50000"/>
-            </a:schemeClr>
-          </a:lnRef>
-          <a:fillRef idx="1">
-            <a:schemeClr val="accent1"/>
-          </a:fillRef>
-          <a:effectRef idx="0">
-            <a:schemeClr val="accent1"/>
-          </a:effectRef>
-          <a:fontRef idx="minor">
-            <a:schemeClr val="lt1"/>
-          </a:fontRef>
-        </p:style>
-        <p:txBody>
-          <a:bodyPr rtlCol="0" anchor="ctr"/>
-          <a:lstStyle/>
-          <a:p>
-            <a:pPr algn="ctr"/>
-            <a:endParaRPr kumimoji="1" lang="ja-JP" altLang="en-US" b="1"/>
-          </a:p>
-        </p:txBody>
-      </p:sp>
-      <p:sp>
-        <p:nvSpPr>
-          <p:cNvPr id="19" name="四角形: 上の 2 つの角を丸める 18">
-            <a:extLst>
-              <a:ext uri="{FF2B5EF4-FFF2-40B4-BE49-F238E27FC236}">
-                <a16:creationId xmlns:a16="http://schemas.microsoft.com/office/drawing/2014/main" id="{DF589AE7-4074-49DC-9AF6-13F87DB1059C}"/>
-              </a:ext>
-            </a:extLst>
-          </p:cNvPr>
-          <p:cNvSpPr/>
-          <p:nvPr/>
-        </p:nvSpPr>
-        <p:spPr>
-          <a:xfrm rot="10800000">
-            <a:off x="8335790" y="3877306"/>
-            <a:ext cx="842842" cy="365760"/>
-          </a:xfrm>
-          <a:prstGeom prst="round2SameRect">
-            <a:avLst>
-              <a:gd name="adj1" fmla="val 16146"/>
-              <a:gd name="adj2" fmla="val 0"/>
-            </a:avLst>
-          </a:prstGeom>
-          <a:ln w="28575">
-            <a:solidFill>
-              <a:schemeClr val="tx1"/>
-            </a:solidFill>
-          </a:ln>
-        </p:spPr>
-        <p:style>
-          <a:lnRef idx="2">
-            <a:schemeClr val="accent1">
-              <a:shade val="50000"/>
-            </a:schemeClr>
-          </a:lnRef>
-          <a:fillRef idx="1">
-            <a:schemeClr val="accent1"/>
-          </a:fillRef>
-          <a:effectRef idx="0">
-            <a:schemeClr val="accent1"/>
-          </a:effectRef>
-          <a:fontRef idx="minor">
-            <a:schemeClr val="lt1"/>
-          </a:fontRef>
-        </p:style>
-        <p:txBody>
-          <a:bodyPr rtlCol="0" anchor="ctr"/>
-          <a:lstStyle/>
-          <a:p>
-            <a:pPr algn="ctr"/>
-            <a:endParaRPr kumimoji="1" lang="ja-JP" altLang="en-US" b="1"/>
-          </a:p>
-        </p:txBody>
-      </p:sp>
-      <p:sp>
-        <p:nvSpPr>
-          <p:cNvPr id="20" name="正方形/長方形 19">
-            <a:extLst>
-              <a:ext uri="{FF2B5EF4-FFF2-40B4-BE49-F238E27FC236}">
-                <a16:creationId xmlns:a16="http://schemas.microsoft.com/office/drawing/2014/main" id="{4B801BAC-377F-493F-A825-926266A9B37B}"/>
-              </a:ext>
-            </a:extLst>
-          </p:cNvPr>
-          <p:cNvSpPr/>
-          <p:nvPr/>
-        </p:nvSpPr>
-        <p:spPr>
-          <a:xfrm>
-            <a:off x="6932385" y="3703526"/>
-            <a:ext cx="1630017" cy="173778"/>
-          </a:xfrm>
-          <a:prstGeom prst="rect">
-            <a:avLst/>
-          </a:prstGeom>
-          <a:ln w="28575">
-            <a:solidFill>
-              <a:schemeClr val="tx1"/>
-            </a:solidFill>
-          </a:ln>
-        </p:spPr>
-        <p:style>
-          <a:lnRef idx="1">
-            <a:schemeClr val="accent1"/>
-          </a:lnRef>
-          <a:fillRef idx="2">
-            <a:schemeClr val="accent1"/>
-          </a:fillRef>
-          <a:effectRef idx="1">
-            <a:schemeClr val="accent1"/>
-          </a:effectRef>
-          <a:fontRef idx="minor">
-            <a:schemeClr val="dk1"/>
-          </a:fontRef>
-        </p:style>
-        <p:txBody>
-          <a:bodyPr rtlCol="0" anchor="ctr"/>
-          <a:lstStyle/>
-          <a:p>
-            <a:pPr algn="ctr"/>
-            <a:endParaRPr kumimoji="1" lang="ja-JP" altLang="en-US" b="1"/>
-          </a:p>
-        </p:txBody>
-      </p:sp>
-      <p:sp>
-        <p:nvSpPr>
-          <p:cNvPr id="21" name="正方形/長方形 20">
-            <a:extLst>
-              <a:ext uri="{FF2B5EF4-FFF2-40B4-BE49-F238E27FC236}">
-                <a16:creationId xmlns:a16="http://schemas.microsoft.com/office/drawing/2014/main" id="{E6227E26-2128-457B-988F-BB4F0C04AF32}"/>
-              </a:ext>
-            </a:extLst>
-          </p:cNvPr>
-          <p:cNvSpPr/>
-          <p:nvPr/>
-        </p:nvSpPr>
-        <p:spPr>
-          <a:xfrm>
-            <a:off x="7075508" y="3529747"/>
-            <a:ext cx="1343769" cy="173778"/>
-          </a:xfrm>
-          <a:prstGeom prst="rect">
-            <a:avLst/>
-          </a:prstGeom>
-          <a:solidFill>
-            <a:schemeClr val="bg1"/>
-          </a:solidFill>
-          <a:ln w="28575">
-            <a:solidFill>
-              <a:schemeClr val="tx1"/>
-            </a:solidFill>
-          </a:ln>
-        </p:spPr>
-        <p:style>
-          <a:lnRef idx="2">
-            <a:schemeClr val="accent1">
-              <a:shade val="50000"/>
-            </a:schemeClr>
-          </a:lnRef>
-          <a:fillRef idx="1">
-            <a:schemeClr val="accent1"/>
-          </a:fillRef>
-          <a:effectRef idx="0">
-            <a:schemeClr val="accent1"/>
-          </a:effectRef>
-          <a:fontRef idx="minor">
-            <a:schemeClr val="lt1"/>
-          </a:fontRef>
-        </p:style>
-        <p:txBody>
-          <a:bodyPr rtlCol="0" anchor="ctr"/>
-          <a:lstStyle/>
-          <a:p>
-            <a:pPr algn="ctr"/>
-            <a:endParaRPr kumimoji="1" lang="ja-JP" altLang="en-US" b="1"/>
-          </a:p>
-        </p:txBody>
-      </p:sp>
-      <p:cxnSp>
-        <p:nvCxnSpPr>
-          <p:cNvPr id="22" name="コネクタ: カギ線 21">
-            <a:extLst>
-              <a:ext uri="{FF2B5EF4-FFF2-40B4-BE49-F238E27FC236}">
-                <a16:creationId xmlns:a16="http://schemas.microsoft.com/office/drawing/2014/main" id="{1C57D77B-1707-4E40-9454-27B5E54E9764}"/>
-              </a:ext>
-            </a:extLst>
-          </p:cNvPr>
-          <p:cNvCxnSpPr>
-            <a:cxnSpLocks/>
-          </p:cNvCxnSpPr>
-          <p:nvPr/>
-        </p:nvCxnSpPr>
-        <p:spPr>
-          <a:xfrm rot="5400000" flipH="1" flipV="1">
-            <a:off x="6400705" y="2588274"/>
-            <a:ext cx="1436811" cy="1141259"/>
-          </a:xfrm>
-          <a:prstGeom prst="bentConnector3">
-            <a:avLst>
-              <a:gd name="adj1" fmla="val 98699"/>
-            </a:avLst>
-          </a:prstGeom>
-          <a:ln w="28575">
-            <a:solidFill>
-              <a:schemeClr val="tx1"/>
-            </a:solidFill>
-          </a:ln>
-        </p:spPr>
-        <p:style>
-          <a:lnRef idx="1">
-            <a:schemeClr val="accent1"/>
-          </a:lnRef>
-          <a:fillRef idx="0">
-            <a:schemeClr val="accent1"/>
-          </a:fillRef>
-          <a:effectRef idx="0">
-            <a:schemeClr val="accent1"/>
-          </a:effectRef>
-          <a:fontRef idx="minor">
-            <a:schemeClr val="tx1"/>
-          </a:fontRef>
-        </p:style>
-      </p:cxnSp>
-      <p:cxnSp>
-        <p:nvCxnSpPr>
-          <p:cNvPr id="23" name="コネクタ: カギ線 22">
-            <a:extLst>
-              <a:ext uri="{FF2B5EF4-FFF2-40B4-BE49-F238E27FC236}">
-                <a16:creationId xmlns:a16="http://schemas.microsoft.com/office/drawing/2014/main" id="{B3ECFE3C-8E64-4799-BFA7-174E393192A4}"/>
-              </a:ext>
-            </a:extLst>
-          </p:cNvPr>
-          <p:cNvCxnSpPr/>
-          <p:nvPr/>
-        </p:nvCxnSpPr>
-        <p:spPr>
-          <a:xfrm rot="16200000" flipH="1">
-            <a:off x="7639129" y="2639077"/>
-            <a:ext cx="1433963" cy="1042490"/>
-          </a:xfrm>
-          <a:prstGeom prst="bentConnector3">
-            <a:avLst>
-              <a:gd name="adj1" fmla="val 650"/>
-            </a:avLst>
-          </a:prstGeom>
-          <a:ln w="28575">
-            <a:solidFill>
-              <a:schemeClr val="tx1"/>
-            </a:solidFill>
-          </a:ln>
-        </p:spPr>
-        <p:style>
-          <a:lnRef idx="1">
-            <a:schemeClr val="accent1"/>
-          </a:lnRef>
-          <a:fillRef idx="0">
-            <a:schemeClr val="accent1"/>
-          </a:fillRef>
-          <a:effectRef idx="0">
-            <a:schemeClr val="accent1"/>
-          </a:effectRef>
-          <a:fontRef idx="minor">
-            <a:schemeClr val="tx1"/>
-          </a:fontRef>
-        </p:style>
-      </p:cxnSp>
-      <p:cxnSp>
-        <p:nvCxnSpPr>
-          <p:cNvPr id="24" name="直線コネクタ 23">
-            <a:extLst>
-              <a:ext uri="{FF2B5EF4-FFF2-40B4-BE49-F238E27FC236}">
-                <a16:creationId xmlns:a16="http://schemas.microsoft.com/office/drawing/2014/main" id="{9E87E2DC-31EC-4FB3-B250-9CB49863D692}"/>
-              </a:ext>
-            </a:extLst>
-          </p:cNvPr>
-          <p:cNvCxnSpPr/>
-          <p:nvPr/>
-        </p:nvCxnSpPr>
-        <p:spPr>
-          <a:xfrm>
-            <a:off x="7834863" y="2232625"/>
-            <a:ext cx="0" cy="421430"/>
-          </a:xfrm>
-          <a:prstGeom prst="line">
-            <a:avLst/>
-          </a:prstGeom>
-          <a:ln w="28575">
-            <a:solidFill>
-              <a:schemeClr val="tx1"/>
-            </a:solidFill>
-          </a:ln>
-        </p:spPr>
-        <p:style>
-          <a:lnRef idx="1">
-            <a:schemeClr val="accent1"/>
-          </a:lnRef>
-          <a:fillRef idx="0">
-            <a:schemeClr val="accent1"/>
-          </a:fillRef>
-          <a:effectRef idx="0">
-            <a:schemeClr val="accent1"/>
-          </a:effectRef>
-          <a:fontRef idx="minor">
-            <a:schemeClr val="tx1"/>
-          </a:fontRef>
-        </p:style>
-      </p:cxnSp>
-      <p:cxnSp>
-        <p:nvCxnSpPr>
-          <p:cNvPr id="25" name="直線コネクタ 24">
-            <a:extLst>
-              <a:ext uri="{FF2B5EF4-FFF2-40B4-BE49-F238E27FC236}">
-                <a16:creationId xmlns:a16="http://schemas.microsoft.com/office/drawing/2014/main" id="{B9745C61-8858-4567-AF1A-21617EC5CF32}"/>
-              </a:ext>
-            </a:extLst>
-          </p:cNvPr>
-          <p:cNvCxnSpPr>
-            <a:cxnSpLocks/>
-          </p:cNvCxnSpPr>
-          <p:nvPr/>
-        </p:nvCxnSpPr>
-        <p:spPr>
-          <a:xfrm>
-            <a:off x="7691320" y="2337984"/>
-            <a:ext cx="0" cy="210715"/>
-          </a:xfrm>
-          <a:prstGeom prst="line">
-            <a:avLst/>
-          </a:prstGeom>
-          <a:ln w="28575">
-            <a:solidFill>
-              <a:schemeClr val="tx1"/>
-            </a:solidFill>
-          </a:ln>
-        </p:spPr>
-        <p:style>
-          <a:lnRef idx="1">
-            <a:schemeClr val="accent1"/>
-          </a:lnRef>
-          <a:fillRef idx="0">
-            <a:schemeClr val="accent1"/>
-          </a:fillRef>
-          <a:effectRef idx="0">
-            <a:schemeClr val="accent1"/>
-          </a:effectRef>
-          <a:fontRef idx="minor">
-            <a:schemeClr val="tx1"/>
-          </a:fontRef>
-        </p:style>
-      </p:cxnSp>
-      <p:cxnSp>
-        <p:nvCxnSpPr>
-          <p:cNvPr id="26" name="コネクタ: カギ線 25">
-            <a:extLst>
-              <a:ext uri="{FF2B5EF4-FFF2-40B4-BE49-F238E27FC236}">
-                <a16:creationId xmlns:a16="http://schemas.microsoft.com/office/drawing/2014/main" id="{5F62B03D-154F-4340-9536-CC7329AE14C2}"/>
-              </a:ext>
-            </a:extLst>
-          </p:cNvPr>
-          <p:cNvCxnSpPr>
-            <a:cxnSpLocks/>
-            <a:endCxn id="21" idx="0"/>
-          </p:cNvCxnSpPr>
-          <p:nvPr/>
-        </p:nvCxnSpPr>
-        <p:spPr>
-          <a:xfrm>
-            <a:off x="7361107" y="3158411"/>
-            <a:ext cx="386286" cy="371336"/>
-          </a:xfrm>
-          <a:prstGeom prst="bentConnector2">
-            <a:avLst/>
-          </a:prstGeom>
-          <a:ln w="28575">
-            <a:solidFill>
-              <a:schemeClr val="tx1"/>
-            </a:solidFill>
-          </a:ln>
-        </p:spPr>
-        <p:style>
-          <a:lnRef idx="1">
-            <a:schemeClr val="accent1"/>
-          </a:lnRef>
-          <a:fillRef idx="0">
-            <a:schemeClr val="accent1"/>
-          </a:fillRef>
-          <a:effectRef idx="0">
-            <a:schemeClr val="accent1"/>
-          </a:effectRef>
-          <a:fontRef idx="minor">
-            <a:schemeClr val="tx1"/>
-          </a:fontRef>
-        </p:style>
-      </p:cxnSp>
-      <p:cxnSp>
-        <p:nvCxnSpPr>
-          <p:cNvPr id="27" name="直線コネクタ 26">
-            <a:extLst>
-              <a:ext uri="{FF2B5EF4-FFF2-40B4-BE49-F238E27FC236}">
-                <a16:creationId xmlns:a16="http://schemas.microsoft.com/office/drawing/2014/main" id="{8FA056B0-4CBF-49B8-BF2F-631AB6D09D43}"/>
-              </a:ext>
-            </a:extLst>
-          </p:cNvPr>
-          <p:cNvCxnSpPr/>
-          <p:nvPr/>
-        </p:nvCxnSpPr>
-        <p:spPr>
-          <a:xfrm>
-            <a:off x="7317369" y="2914721"/>
-            <a:ext cx="0" cy="421430"/>
-          </a:xfrm>
-          <a:prstGeom prst="line">
-            <a:avLst/>
-          </a:prstGeom>
-          <a:ln w="28575">
-            <a:solidFill>
-              <a:schemeClr val="tx1"/>
-            </a:solidFill>
-          </a:ln>
-        </p:spPr>
-        <p:style>
-          <a:lnRef idx="1">
-            <a:schemeClr val="accent1"/>
-          </a:lnRef>
-          <a:fillRef idx="0">
-            <a:schemeClr val="accent1"/>
-          </a:fillRef>
-          <a:effectRef idx="0">
-            <a:schemeClr val="accent1"/>
-          </a:effectRef>
-          <a:fontRef idx="minor">
-            <a:schemeClr val="tx1"/>
-          </a:fontRef>
-        </p:style>
-      </p:cxnSp>
-      <p:cxnSp>
-        <p:nvCxnSpPr>
-          <p:cNvPr id="28" name="直線コネクタ 27">
-            <a:extLst>
-              <a:ext uri="{FF2B5EF4-FFF2-40B4-BE49-F238E27FC236}">
-                <a16:creationId xmlns:a16="http://schemas.microsoft.com/office/drawing/2014/main" id="{B840EF72-3945-4CFA-B621-F4031676A7FD}"/>
-              </a:ext>
-            </a:extLst>
-          </p:cNvPr>
-          <p:cNvCxnSpPr>
-            <a:cxnSpLocks/>
-          </p:cNvCxnSpPr>
-          <p:nvPr/>
-        </p:nvCxnSpPr>
-        <p:spPr>
-          <a:xfrm>
-            <a:off x="7088798" y="3026204"/>
-            <a:ext cx="0" cy="210715"/>
-          </a:xfrm>
-          <a:prstGeom prst="line">
-            <a:avLst/>
-          </a:prstGeom>
-          <a:ln w="28575">
-            <a:solidFill>
-              <a:schemeClr val="tx1"/>
-            </a:solidFill>
-          </a:ln>
-        </p:spPr>
-        <p:style>
-          <a:lnRef idx="1">
-            <a:schemeClr val="accent1"/>
-          </a:lnRef>
-          <a:fillRef idx="0">
-            <a:schemeClr val="accent1"/>
-          </a:fillRef>
-          <a:effectRef idx="0">
-            <a:schemeClr val="accent1"/>
-          </a:effectRef>
-          <a:fontRef idx="minor">
-            <a:schemeClr val="tx1"/>
-          </a:fontRef>
-        </p:style>
-      </p:cxnSp>
-      <p:cxnSp>
-        <p:nvCxnSpPr>
-          <p:cNvPr id="31" name="直線コネクタ 30">
-            <a:extLst>
-              <a:ext uri="{FF2B5EF4-FFF2-40B4-BE49-F238E27FC236}">
-                <a16:creationId xmlns:a16="http://schemas.microsoft.com/office/drawing/2014/main" id="{1E4D2A6E-89F9-4252-B03A-76819437D25A}"/>
-              </a:ext>
-            </a:extLst>
-          </p:cNvPr>
-          <p:cNvCxnSpPr>
-            <a:cxnSpLocks/>
-          </p:cNvCxnSpPr>
-          <p:nvPr/>
-        </p:nvCxnSpPr>
-        <p:spPr>
-          <a:xfrm>
-            <a:off x="6548479" y="3158901"/>
-            <a:ext cx="527029" cy="2"/>
-          </a:xfrm>
-          <a:prstGeom prst="line">
-            <a:avLst/>
-          </a:prstGeom>
-          <a:ln w="28575">
-            <a:solidFill>
-              <a:schemeClr val="tx1"/>
-            </a:solidFill>
-          </a:ln>
-        </p:spPr>
-        <p:style>
-          <a:lnRef idx="1">
-            <a:schemeClr val="accent1"/>
-          </a:lnRef>
-          <a:fillRef idx="0">
-            <a:schemeClr val="accent1"/>
-          </a:fillRef>
-          <a:effectRef idx="0">
-            <a:schemeClr val="accent1"/>
-          </a:effectRef>
-          <a:fontRef idx="minor">
-            <a:schemeClr val="tx1"/>
-          </a:fontRef>
-        </p:style>
-      </p:cxnSp>
-      <p:sp>
-        <p:nvSpPr>
-          <p:cNvPr id="32" name="テキスト ボックス 31">
-            <a:extLst>
-              <a:ext uri="{FF2B5EF4-FFF2-40B4-BE49-F238E27FC236}">
-                <a16:creationId xmlns:a16="http://schemas.microsoft.com/office/drawing/2014/main" id="{D423CD77-B69C-46F9-8671-4305E90CD88C}"/>
-              </a:ext>
-            </a:extLst>
-          </p:cNvPr>
-          <p:cNvSpPr txBox="1"/>
-          <p:nvPr/>
-        </p:nvSpPr>
-        <p:spPr>
-          <a:xfrm>
-            <a:off x="6775088" y="2517364"/>
-            <a:ext cx="1439186" cy="461665"/>
-          </a:xfrm>
-          <a:prstGeom prst="rect">
-            <a:avLst/>
-          </a:prstGeom>
-          <a:noFill/>
-          <a:ln w="28575">
+            <a:ln w="28575">
+              <a:noFill/>
+            </a:ln>
+          </p:spPr>
+          <p:txBody>
+            <a:bodyPr wrap="square" rtlCol="0">
+              <a:spAutoFit/>
+            </a:bodyPr>
+            <a:lstStyle/>
+            <a:p>
+              <a:r>
+                <a:rPr kumimoji="1" lang="en-US" altLang="ja-JP" sz="2400" b="1" dirty="0"/>
+                <a:t>n</a:t>
+              </a:r>
+              <a:r>
+                <a:rPr kumimoji="1" lang="ja-JP" altLang="en-US" sz="2400" b="1" dirty="0"/>
+                <a:t>型</a:t>
+              </a:r>
+            </a:p>
+          </p:txBody>
+        </p:sp>
+        <p:sp>
+          <p:nvSpPr>
+            <p:cNvPr id="44" name="テキスト ボックス 43">
+              <a:extLst>
+                <a:ext uri="{FF2B5EF4-FFF2-40B4-BE49-F238E27FC236}">
+                  <a16:creationId xmlns:a16="http://schemas.microsoft.com/office/drawing/2014/main" id="{3EDF5B0D-1F5E-466C-BF49-5D038A2D308A}"/>
+                </a:ext>
+              </a:extLst>
+            </p:cNvPr>
+            <p:cNvSpPr txBox="1"/>
+            <p:nvPr/>
+          </p:nvSpPr>
+          <p:spPr>
+            <a:xfrm>
+              <a:off x="2057658" y="3575312"/>
+              <a:ext cx="646331" cy="276999"/>
+            </a:xfrm>
+            <a:prstGeom prst="rect">
+              <a:avLst/>
+            </a:prstGeom>
             <a:noFill/>
-          </a:ln>
-        </p:spPr>
-        <p:txBody>
-          <a:bodyPr wrap="square" rtlCol="0">
-            <a:spAutoFit/>
-          </a:bodyPr>
-          <a:lstStyle/>
-          <a:p>
-            <a:r>
-              <a:rPr kumimoji="1" lang="en-US" altLang="ja-JP" sz="2400" b="1" dirty="0"/>
-              <a:t>V</a:t>
-            </a:r>
-            <a:r>
-              <a:rPr kumimoji="1" lang="en-US" altLang="ja-JP" b="1" dirty="0"/>
-              <a:t>GS</a:t>
-            </a:r>
-            <a:endParaRPr kumimoji="1" lang="ja-JP" altLang="en-US" sz="2400" b="1" dirty="0"/>
-          </a:p>
-        </p:txBody>
-      </p:sp>
-      <p:sp>
-        <p:nvSpPr>
-          <p:cNvPr id="35" name="テキスト ボックス 34">
-            <a:extLst>
-              <a:ext uri="{FF2B5EF4-FFF2-40B4-BE49-F238E27FC236}">
-                <a16:creationId xmlns:a16="http://schemas.microsoft.com/office/drawing/2014/main" id="{791872FE-720A-4F6D-AFAD-86DD82381831}"/>
-              </a:ext>
-            </a:extLst>
-          </p:cNvPr>
-          <p:cNvSpPr txBox="1"/>
-          <p:nvPr/>
-        </p:nvSpPr>
-        <p:spPr>
-          <a:xfrm>
-            <a:off x="7684203" y="3149678"/>
-            <a:ext cx="1637697" cy="400110"/>
-          </a:xfrm>
-          <a:prstGeom prst="rect">
-            <a:avLst/>
-          </a:prstGeom>
-          <a:noFill/>
-          <a:ln w="28575">
+          </p:spPr>
+          <p:txBody>
+            <a:bodyPr wrap="square" rtlCol="0">
+              <a:spAutoFit/>
+            </a:bodyPr>
+            <a:lstStyle/>
+            <a:p>
+              <a:r>
+                <a:rPr kumimoji="1" lang="ja-JP" altLang="en-US" sz="1200" b="1" dirty="0"/>
+                <a:t>絶縁層</a:t>
+              </a:r>
+            </a:p>
+          </p:txBody>
+        </p:sp>
+        <p:sp>
+          <p:nvSpPr>
+            <p:cNvPr id="30" name="テキスト ボックス 29">
+              <a:extLst>
+                <a:ext uri="{FF2B5EF4-FFF2-40B4-BE49-F238E27FC236}">
+                  <a16:creationId xmlns:a16="http://schemas.microsoft.com/office/drawing/2014/main" id="{54973540-1036-4C70-A109-71999AAF65BF}"/>
+                </a:ext>
+              </a:extLst>
+            </p:cNvPr>
+            <p:cNvSpPr txBox="1"/>
+            <p:nvPr/>
+          </p:nvSpPr>
+          <p:spPr>
+            <a:xfrm>
+              <a:off x="2052024" y="3301847"/>
+              <a:ext cx="800219" cy="276999"/>
+            </a:xfrm>
+            <a:prstGeom prst="rect">
+              <a:avLst/>
+            </a:prstGeom>
             <a:noFill/>
-          </a:ln>
-        </p:spPr>
-        <p:txBody>
-          <a:bodyPr wrap="square" rtlCol="0">
-            <a:spAutoFit/>
-          </a:bodyPr>
-          <a:lstStyle/>
-          <a:p>
-            <a:r>
-              <a:rPr kumimoji="1" lang="en-US" altLang="ja-JP" sz="2000" b="1" dirty="0"/>
-              <a:t>G</a:t>
-            </a:r>
-            <a:r>
-              <a:rPr kumimoji="1" lang="en-US" altLang="ja-JP" b="1" dirty="0"/>
-              <a:t>(</a:t>
-            </a:r>
-            <a:r>
-              <a:rPr kumimoji="1" lang="ja-JP" altLang="en-US" b="1" dirty="0"/>
-              <a:t>ゲート</a:t>
-            </a:r>
-            <a:r>
-              <a:rPr kumimoji="1" lang="en-US" altLang="ja-JP" b="1" dirty="0"/>
-              <a:t>)</a:t>
-            </a:r>
-            <a:endParaRPr kumimoji="1" lang="ja-JP" altLang="en-US" sz="2000" b="1" dirty="0"/>
-          </a:p>
-        </p:txBody>
-      </p:sp>
-      <p:sp>
-        <p:nvSpPr>
-          <p:cNvPr id="37" name="正方形/長方形 36">
-            <a:extLst>
-              <a:ext uri="{FF2B5EF4-FFF2-40B4-BE49-F238E27FC236}">
-                <a16:creationId xmlns:a16="http://schemas.microsoft.com/office/drawing/2014/main" id="{D8F5434D-4F5D-48AE-99DB-01CD0ECC7B0F}"/>
-              </a:ext>
-            </a:extLst>
-          </p:cNvPr>
-          <p:cNvSpPr/>
-          <p:nvPr/>
-        </p:nvSpPr>
-        <p:spPr>
-          <a:xfrm>
-            <a:off x="7209562" y="3867051"/>
-            <a:ext cx="1126229" cy="173778"/>
-          </a:xfrm>
-          <a:prstGeom prst="rect">
-            <a:avLst/>
-          </a:prstGeom>
-          <a:solidFill>
-            <a:srgbClr val="00B0F0"/>
-          </a:solidFill>
-          <a:ln w="28575">
-            <a:solidFill>
-              <a:schemeClr val="tx1"/>
-            </a:solidFill>
-          </a:ln>
-        </p:spPr>
-        <p:style>
-          <a:lnRef idx="2">
-            <a:schemeClr val="accent1">
-              <a:shade val="50000"/>
-            </a:schemeClr>
-          </a:lnRef>
-          <a:fillRef idx="1">
-            <a:schemeClr val="accent1"/>
-          </a:fillRef>
-          <a:effectRef idx="0">
-            <a:schemeClr val="accent1"/>
-          </a:effectRef>
-          <a:fontRef idx="minor">
-            <a:schemeClr val="lt1"/>
-          </a:fontRef>
-        </p:style>
-        <p:txBody>
-          <a:bodyPr rtlCol="0" anchor="ctr"/>
-          <a:lstStyle/>
-          <a:p>
-            <a:pPr algn="ctr"/>
-            <a:endParaRPr kumimoji="1" lang="ja-JP" altLang="en-US" b="1"/>
-          </a:p>
-        </p:txBody>
-      </p:sp>
-      <p:sp>
-        <p:nvSpPr>
-          <p:cNvPr id="38" name="テキスト ボックス 37">
-            <a:extLst>
-              <a:ext uri="{FF2B5EF4-FFF2-40B4-BE49-F238E27FC236}">
-                <a16:creationId xmlns:a16="http://schemas.microsoft.com/office/drawing/2014/main" id="{DBCFC6C9-7A09-4C0D-A5A0-C0B83A9BDE91}"/>
-              </a:ext>
-            </a:extLst>
-          </p:cNvPr>
-          <p:cNvSpPr txBox="1"/>
-          <p:nvPr/>
-        </p:nvSpPr>
-        <p:spPr>
-          <a:xfrm>
-            <a:off x="7410896" y="4021730"/>
-            <a:ext cx="1126229" cy="276999"/>
-          </a:xfrm>
-          <a:prstGeom prst="rect">
-            <a:avLst/>
-          </a:prstGeom>
-          <a:noFill/>
-          <a:ln w="28575">
-            <a:noFill/>
-          </a:ln>
-        </p:spPr>
-        <p:txBody>
-          <a:bodyPr wrap="square" rtlCol="0">
-            <a:spAutoFit/>
-          </a:bodyPr>
-          <a:lstStyle/>
-          <a:p>
-            <a:r>
-              <a:rPr kumimoji="1" lang="en-US" altLang="ja-JP" sz="1200" b="1" dirty="0"/>
-              <a:t>n</a:t>
-            </a:r>
-            <a:r>
-              <a:rPr kumimoji="1" lang="ja-JP" altLang="en-US" sz="1200" b="1" dirty="0"/>
-              <a:t>型反転層</a:t>
-            </a:r>
-            <a:endParaRPr kumimoji="1" lang="ja-JP" altLang="en-US" sz="2000" b="1" dirty="0"/>
-          </a:p>
-        </p:txBody>
-      </p:sp>
-      <p:sp>
-        <p:nvSpPr>
-          <p:cNvPr id="40" name="テキスト ボックス 39">
-            <a:extLst>
-              <a:ext uri="{FF2B5EF4-FFF2-40B4-BE49-F238E27FC236}">
-                <a16:creationId xmlns:a16="http://schemas.microsoft.com/office/drawing/2014/main" id="{5D55D2B9-6930-4CE7-A60E-14B32A255094}"/>
-              </a:ext>
-            </a:extLst>
-          </p:cNvPr>
-          <p:cNvSpPr txBox="1"/>
-          <p:nvPr/>
-        </p:nvSpPr>
-        <p:spPr>
-          <a:xfrm>
-            <a:off x="4124578" y="3890586"/>
-            <a:ext cx="712635" cy="461665"/>
-          </a:xfrm>
-          <a:prstGeom prst="rect">
-            <a:avLst/>
-          </a:prstGeom>
-          <a:noFill/>
-          <a:ln w="28575">
-            <a:noFill/>
-          </a:ln>
-        </p:spPr>
-        <p:txBody>
-          <a:bodyPr wrap="square" rtlCol="0">
-            <a:spAutoFit/>
-          </a:bodyPr>
-          <a:lstStyle/>
-          <a:p>
-            <a:r>
-              <a:rPr kumimoji="1" lang="en-US" altLang="ja-JP" sz="2400" b="1" dirty="0"/>
-              <a:t>n</a:t>
-            </a:r>
-            <a:r>
-              <a:rPr kumimoji="1" lang="ja-JP" altLang="en-US" sz="2400" b="1" dirty="0"/>
-              <a:t>型</a:t>
-            </a:r>
-          </a:p>
-        </p:txBody>
-      </p:sp>
-      <p:sp>
-        <p:nvSpPr>
-          <p:cNvPr id="44" name="テキスト ボックス 43">
-            <a:extLst>
-              <a:ext uri="{FF2B5EF4-FFF2-40B4-BE49-F238E27FC236}">
-                <a16:creationId xmlns:a16="http://schemas.microsoft.com/office/drawing/2014/main" id="{3EDF5B0D-1F5E-466C-BF49-5D038A2D308A}"/>
-              </a:ext>
-            </a:extLst>
-          </p:cNvPr>
-          <p:cNvSpPr txBox="1"/>
-          <p:nvPr/>
-        </p:nvSpPr>
-        <p:spPr>
-          <a:xfrm>
-            <a:off x="2057658" y="3575312"/>
-            <a:ext cx="646331" cy="276999"/>
-          </a:xfrm>
-          <a:prstGeom prst="rect">
-            <a:avLst/>
-          </a:prstGeom>
-          <a:noFill/>
-        </p:spPr>
-        <p:txBody>
-          <a:bodyPr wrap="none" rtlCol="0">
-            <a:spAutoFit/>
-          </a:bodyPr>
-          <a:lstStyle/>
-          <a:p>
-            <a:r>
-              <a:rPr kumimoji="1" lang="ja-JP" altLang="en-US" sz="1200" b="1" dirty="0"/>
-              <a:t>絶縁層</a:t>
-            </a:r>
-          </a:p>
-        </p:txBody>
-      </p:sp>
-      <p:sp>
-        <p:nvSpPr>
-          <p:cNvPr id="30" name="テキスト ボックス 29">
-            <a:extLst>
-              <a:ext uri="{FF2B5EF4-FFF2-40B4-BE49-F238E27FC236}">
-                <a16:creationId xmlns:a16="http://schemas.microsoft.com/office/drawing/2014/main" id="{54973540-1036-4C70-A109-71999AAF65BF}"/>
-              </a:ext>
-            </a:extLst>
-          </p:cNvPr>
-          <p:cNvSpPr txBox="1"/>
-          <p:nvPr/>
-        </p:nvSpPr>
-        <p:spPr>
-          <a:xfrm>
-            <a:off x="2052024" y="3301847"/>
-            <a:ext cx="800219" cy="276999"/>
-          </a:xfrm>
-          <a:prstGeom prst="rect">
-            <a:avLst/>
-          </a:prstGeom>
-          <a:noFill/>
-        </p:spPr>
-        <p:txBody>
-          <a:bodyPr wrap="none" rtlCol="0">
-            <a:spAutoFit/>
-          </a:bodyPr>
-          <a:lstStyle/>
-          <a:p>
-            <a:r>
-              <a:rPr lang="ja-JP" altLang="en-US" sz="1200" b="1" dirty="0"/>
-              <a:t>金属電極</a:t>
-            </a:r>
-            <a:endParaRPr kumimoji="1" lang="ja-JP" altLang="en-US" sz="1200" b="1" dirty="0"/>
-          </a:p>
-        </p:txBody>
-      </p:sp>
+          </p:spPr>
+          <p:txBody>
+            <a:bodyPr wrap="square" rtlCol="0">
+              <a:spAutoFit/>
+            </a:bodyPr>
+            <a:lstStyle/>
+            <a:p>
+              <a:r>
+                <a:rPr lang="ja-JP" altLang="en-US" sz="1200" b="1" dirty="0"/>
+                <a:t>金属電極</a:t>
+              </a:r>
+              <a:endParaRPr kumimoji="1" lang="ja-JP" altLang="en-US" sz="1200" b="1" dirty="0"/>
+            </a:p>
+          </p:txBody>
+        </p:sp>
+      </p:grpSp>
     </p:spTree>
     <p:extLst>
       <p:ext uri="{BB962C8B-B14F-4D97-AF65-F5344CB8AC3E}">
@@ -13438,7 +13519,7 @@
         </p:spPr>
         <p:txBody>
           <a:bodyPr>
-            <a:normAutofit lnSpcReduction="10000"/>
+            <a:normAutofit fontScale="77500" lnSpcReduction="20000"/>
           </a:bodyPr>
           <a:lstStyle/>
           <a:p>
@@ -13461,7 +13542,7 @@
             </a:r>
           </a:p>
           <a:p>
-            <a:pPr marL="0" indent="0">
+            <a:pPr marL="0" indent="0" algn="ctr">
               <a:buNone/>
             </a:pPr>
             <a:r>
@@ -13469,21 +13550,133 @@
                 <a:latin typeface="Times New Roman" panose="02020603050405020304" pitchFamily="18" charset="0"/>
                 <a:cs typeface="Times New Roman" panose="02020603050405020304" pitchFamily="18" charset="0"/>
               </a:rPr>
-              <a:t>	R</a:t>
-            </a:r>
-            <a:r>
-              <a:rPr lang="en-US" altLang="ja-JP" sz="1800" dirty="0">
+              <a:t>	</a:t>
+            </a:r>
+            <a:r>
+              <a:rPr lang="en-US" altLang="ja-JP" b="1" i="1" dirty="0">
+                <a:latin typeface="Times New Roman" panose="02020603050405020304" pitchFamily="18" charset="0"/>
+                <a:cs typeface="Times New Roman" panose="02020603050405020304" pitchFamily="18" charset="0"/>
+              </a:rPr>
+              <a:t>R</a:t>
+            </a:r>
+            <a:r>
+              <a:rPr lang="en-US" altLang="ja-JP" sz="1800" b="1" i="1" dirty="0">
                 <a:latin typeface="Times New Roman" panose="02020603050405020304" pitchFamily="18" charset="0"/>
                 <a:cs typeface="Times New Roman" panose="02020603050405020304" pitchFamily="18" charset="0"/>
               </a:rPr>
               <a:t>D</a:t>
             </a:r>
             <a:r>
+              <a:rPr lang="en-US" altLang="ja-JP" b="1" dirty="0">
+                <a:latin typeface="Times New Roman" panose="02020603050405020304" pitchFamily="18" charset="0"/>
+                <a:cs typeface="Times New Roman" panose="02020603050405020304" pitchFamily="18" charset="0"/>
+              </a:rPr>
+              <a:t> = 4.67 </a:t>
+            </a:r>
+            <a:r>
+              <a:rPr lang="en-US" altLang="ja-JP" b="1" dirty="0" err="1">
+                <a:latin typeface="Times New Roman" panose="02020603050405020304" pitchFamily="18" charset="0"/>
+                <a:cs typeface="Times New Roman" panose="02020603050405020304" pitchFamily="18" charset="0"/>
+              </a:rPr>
+              <a:t>kΩ</a:t>
+            </a:r>
+            <a:r>
+              <a:rPr lang="en-US" altLang="ja-JP" b="1" dirty="0">
+                <a:latin typeface="Times New Roman" panose="02020603050405020304" pitchFamily="18" charset="0"/>
+                <a:cs typeface="Times New Roman" panose="02020603050405020304" pitchFamily="18" charset="0"/>
+              </a:rPr>
+              <a:t> </a:t>
+            </a:r>
+            <a:r>
               <a:rPr lang="en-US" altLang="ja-JP" dirty="0">
                 <a:latin typeface="Times New Roman" panose="02020603050405020304" pitchFamily="18" charset="0"/>
                 <a:cs typeface="Times New Roman" panose="02020603050405020304" pitchFamily="18" charset="0"/>
               </a:rPr>
-              <a:t> = 4.67 </a:t>
+              <a:t>, </a:t>
+            </a:r>
+            <a:r>
+              <a:rPr lang="en-US" altLang="ja-JP" i="1" dirty="0" err="1">
+                <a:latin typeface="Times New Roman" panose="02020603050405020304" pitchFamily="18" charset="0"/>
+                <a:cs typeface="Times New Roman" panose="02020603050405020304" pitchFamily="18" charset="0"/>
+              </a:rPr>
+              <a:t>C</a:t>
+            </a:r>
+            <a:r>
+              <a:rPr lang="en-US" altLang="ja-JP" sz="2000" i="1" dirty="0" err="1">
+                <a:latin typeface="Times New Roman" panose="02020603050405020304" pitchFamily="18" charset="0"/>
+                <a:cs typeface="Times New Roman" panose="02020603050405020304" pitchFamily="18" charset="0"/>
+              </a:rPr>
+              <a:t>in</a:t>
+            </a:r>
+            <a:r>
+              <a:rPr lang="en-US" altLang="ja-JP" dirty="0">
+                <a:latin typeface="Times New Roman" panose="02020603050405020304" pitchFamily="18" charset="0"/>
+                <a:cs typeface="Times New Roman" panose="02020603050405020304" pitchFamily="18" charset="0"/>
+              </a:rPr>
+              <a:t> = 10 .65μF, </a:t>
+            </a:r>
+            <a:r>
+              <a:rPr lang="en-US" altLang="ja-JP" i="1" dirty="0" err="1">
+                <a:latin typeface="Times New Roman" panose="02020603050405020304" pitchFamily="18" charset="0"/>
+                <a:cs typeface="Times New Roman" panose="02020603050405020304" pitchFamily="18" charset="0"/>
+              </a:rPr>
+              <a:t>C</a:t>
+            </a:r>
+            <a:r>
+              <a:rPr lang="en-US" altLang="ja-JP" sz="2000" i="1" dirty="0" err="1">
+                <a:latin typeface="Times New Roman" panose="02020603050405020304" pitchFamily="18" charset="0"/>
+                <a:cs typeface="Times New Roman" panose="02020603050405020304" pitchFamily="18" charset="0"/>
+              </a:rPr>
+              <a:t>out</a:t>
+            </a:r>
+            <a:r>
+              <a:rPr lang="en-US" altLang="ja-JP" i="1" dirty="0">
+                <a:latin typeface="Times New Roman" panose="02020603050405020304" pitchFamily="18" charset="0"/>
+                <a:cs typeface="Times New Roman" panose="02020603050405020304" pitchFamily="18" charset="0"/>
+              </a:rPr>
+              <a:t> </a:t>
+            </a:r>
+            <a:r>
+              <a:rPr lang="en-US" altLang="ja-JP" dirty="0">
+                <a:latin typeface="Times New Roman" panose="02020603050405020304" pitchFamily="18" charset="0"/>
+                <a:cs typeface="Times New Roman" panose="02020603050405020304" pitchFamily="18" charset="0"/>
+              </a:rPr>
+              <a:t>= 10.22 </a:t>
+            </a:r>
+            <a:r>
+              <a:rPr lang="en-US" altLang="ja-JP" dirty="0" err="1">
+                <a:latin typeface="Times New Roman" panose="02020603050405020304" pitchFamily="18" charset="0"/>
+                <a:cs typeface="Times New Roman" panose="02020603050405020304" pitchFamily="18" charset="0"/>
+              </a:rPr>
+              <a:t>μF</a:t>
+            </a:r>
+            <a:r>
+              <a:rPr lang="en-US" altLang="ja-JP" dirty="0">
+                <a:latin typeface="Times New Roman" panose="02020603050405020304" pitchFamily="18" charset="0"/>
+                <a:cs typeface="Times New Roman" panose="02020603050405020304" pitchFamily="18" charset="0"/>
+              </a:rPr>
+              <a:t>, </a:t>
+            </a:r>
+            <a:r>
+              <a:rPr lang="en-US" altLang="ja-JP" i="1" dirty="0">
+                <a:latin typeface="Times New Roman" panose="02020603050405020304" pitchFamily="18" charset="0"/>
+                <a:cs typeface="Times New Roman" panose="02020603050405020304" pitchFamily="18" charset="0"/>
+              </a:rPr>
+              <a:t>R</a:t>
+            </a:r>
+            <a:r>
+              <a:rPr lang="en-US" altLang="ja-JP" sz="2000" i="1" dirty="0">
+                <a:latin typeface="Times New Roman" panose="02020603050405020304" pitchFamily="18" charset="0"/>
+                <a:cs typeface="Times New Roman" panose="02020603050405020304" pitchFamily="18" charset="0"/>
+              </a:rPr>
+              <a:t>2</a:t>
+            </a:r>
+            <a:r>
+              <a:rPr lang="en-US" altLang="ja-JP" dirty="0">
+                <a:latin typeface="Times New Roman" panose="02020603050405020304" pitchFamily="18" charset="0"/>
+                <a:cs typeface="Times New Roman" panose="02020603050405020304" pitchFamily="18" charset="0"/>
+              </a:rPr>
+              <a:t>= 10.00 </a:t>
             </a:r>
             <a:r>
               <a:rPr lang="en-US" altLang="ja-JP" dirty="0" err="1">
@@ -13492,90 +13685,15 @@
               </a:rPr>
               <a:t>kΩ</a:t>
             </a:r>
-            <a:r>
-              <a:rPr lang="en-US" altLang="ja-JP" dirty="0">
-                <a:latin typeface="Times New Roman" panose="02020603050405020304" pitchFamily="18" charset="0"/>
-                <a:cs typeface="Times New Roman" panose="02020603050405020304" pitchFamily="18" charset="0"/>
-              </a:rPr>
-              <a:t> , </a:t>
-            </a:r>
-            <a:r>
-              <a:rPr lang="en-US" altLang="ja-JP" dirty="0" err="1">
-                <a:latin typeface="Times New Roman" panose="02020603050405020304" pitchFamily="18" charset="0"/>
-                <a:cs typeface="Times New Roman" panose="02020603050405020304" pitchFamily="18" charset="0"/>
-              </a:rPr>
-              <a:t>C</a:t>
-            </a:r>
-            <a:r>
-              <a:rPr lang="en-US" altLang="ja-JP" sz="2000" dirty="0" err="1">
-                <a:latin typeface="Times New Roman" panose="02020603050405020304" pitchFamily="18" charset="0"/>
-                <a:cs typeface="Times New Roman" panose="02020603050405020304" pitchFamily="18" charset="0"/>
-              </a:rPr>
-              <a:t>in</a:t>
-            </a:r>
-            <a:r>
-              <a:rPr lang="en-US" altLang="ja-JP" dirty="0">
-                <a:latin typeface="Times New Roman" panose="02020603050405020304" pitchFamily="18" charset="0"/>
-                <a:cs typeface="Times New Roman" panose="02020603050405020304" pitchFamily="18" charset="0"/>
-              </a:rPr>
-              <a:t> = 10 .65μF, </a:t>
-            </a:r>
-            <a:r>
-              <a:rPr lang="en-US" altLang="ja-JP" dirty="0" err="1">
-                <a:latin typeface="Times New Roman" panose="02020603050405020304" pitchFamily="18" charset="0"/>
-                <a:cs typeface="Times New Roman" panose="02020603050405020304" pitchFamily="18" charset="0"/>
-              </a:rPr>
-              <a:t>C</a:t>
-            </a:r>
-            <a:r>
-              <a:rPr lang="en-US" altLang="ja-JP" sz="2000" dirty="0" err="1">
-                <a:latin typeface="Times New Roman" panose="02020603050405020304" pitchFamily="18" charset="0"/>
-                <a:cs typeface="Times New Roman" panose="02020603050405020304" pitchFamily="18" charset="0"/>
-              </a:rPr>
-              <a:t>out</a:t>
-            </a:r>
-            <a:r>
-              <a:rPr lang="en-US" altLang="ja-JP" dirty="0">
-                <a:latin typeface="Times New Roman" panose="02020603050405020304" pitchFamily="18" charset="0"/>
-                <a:cs typeface="Times New Roman" panose="02020603050405020304" pitchFamily="18" charset="0"/>
-              </a:rPr>
-              <a:t> = 10.22 </a:t>
-            </a:r>
-            <a:r>
-              <a:rPr lang="en-US" altLang="ja-JP" dirty="0" err="1">
-                <a:latin typeface="Times New Roman" panose="02020603050405020304" pitchFamily="18" charset="0"/>
-                <a:cs typeface="Times New Roman" panose="02020603050405020304" pitchFamily="18" charset="0"/>
-              </a:rPr>
-              <a:t>μF</a:t>
-            </a:r>
-            <a:r>
-              <a:rPr lang="en-US" altLang="ja-JP" dirty="0">
-                <a:latin typeface="Times New Roman" panose="02020603050405020304" pitchFamily="18" charset="0"/>
-                <a:cs typeface="Times New Roman" panose="02020603050405020304" pitchFamily="18" charset="0"/>
-              </a:rPr>
-              <a:t>, R</a:t>
-            </a:r>
-            <a:r>
-              <a:rPr lang="en-US" altLang="ja-JP" sz="2000" dirty="0">
-                <a:latin typeface="Times New Roman" panose="02020603050405020304" pitchFamily="18" charset="0"/>
-                <a:cs typeface="Times New Roman" panose="02020603050405020304" pitchFamily="18" charset="0"/>
-              </a:rPr>
-              <a:t>2</a:t>
-            </a:r>
-            <a:r>
-              <a:rPr lang="en-US" altLang="ja-JP" dirty="0">
-                <a:latin typeface="Times New Roman" panose="02020603050405020304" pitchFamily="18" charset="0"/>
-                <a:cs typeface="Times New Roman" panose="02020603050405020304" pitchFamily="18" charset="0"/>
-              </a:rPr>
-              <a:t>= 10.00 </a:t>
-            </a:r>
-            <a:r>
-              <a:rPr lang="en-US" altLang="ja-JP" dirty="0" err="1">
-                <a:latin typeface="Times New Roman" panose="02020603050405020304" pitchFamily="18" charset="0"/>
-                <a:cs typeface="Times New Roman" panose="02020603050405020304" pitchFamily="18" charset="0"/>
-              </a:rPr>
-              <a:t>kΩ</a:t>
-            </a:r>
+            <a:endParaRPr lang="en-US" altLang="ja-JP" dirty="0">
+              <a:latin typeface="Times New Roman" panose="02020603050405020304" pitchFamily="18" charset="0"/>
+              <a:cs typeface="Times New Roman" panose="02020603050405020304" pitchFamily="18" charset="0"/>
+            </a:endParaRPr>
+          </a:p>
+          <a:p>
+            <a:pPr marL="0" indent="0">
+              <a:buNone/>
+            </a:pPr>
             <a:endParaRPr lang="en-US" altLang="ja-JP" dirty="0">
               <a:latin typeface="Times New Roman" panose="02020603050405020304" pitchFamily="18" charset="0"/>
               <a:cs typeface="Times New Roman" panose="02020603050405020304" pitchFamily="18" charset="0"/>
@@ -13601,250 +13719,81 @@
             <a:pPr marL="0" indent="0">
               <a:buNone/>
             </a:pPr>
+            <a:endParaRPr lang="en-US" altLang="ja-JP" dirty="0">
+              <a:latin typeface="Times New Roman" panose="02020603050405020304" pitchFamily="18" charset="0"/>
+              <a:cs typeface="Times New Roman" panose="02020603050405020304" pitchFamily="18" charset="0"/>
+            </a:endParaRPr>
+          </a:p>
+          <a:p>
+            <a:pPr marL="0" indent="0">
+              <a:buNone/>
+            </a:pPr>
             <a:r>
               <a:rPr lang="en-US" altLang="ja-JP" dirty="0">
                 <a:latin typeface="Times New Roman" panose="02020603050405020304" pitchFamily="18" charset="0"/>
                 <a:cs typeface="Times New Roman" panose="02020603050405020304" pitchFamily="18" charset="0"/>
               </a:rPr>
-              <a:t>	V</a:t>
-            </a:r>
-            <a:r>
-              <a:rPr lang="en-US" altLang="ja-JP" sz="1800" dirty="0">
+              <a:t>	</a:t>
+            </a:r>
+          </a:p>
+          <a:p>
+            <a:pPr marL="0" indent="0">
+              <a:buNone/>
+            </a:pPr>
+            <a:endParaRPr lang="en-US" altLang="ja-JP" dirty="0"/>
+          </a:p>
+          <a:p>
+            <a:pPr marL="0" indent="0">
+              <a:buNone/>
+            </a:pPr>
+            <a:r>
+              <a:rPr lang="en-US" altLang="ja-JP" dirty="0"/>
+              <a:t>	</a:t>
+            </a:r>
+          </a:p>
+          <a:p>
+            <a:pPr marL="0" indent="0" algn="ctr">
+              <a:buNone/>
+            </a:pPr>
+            <a:r>
+              <a:rPr lang="en-US" altLang="ja-JP" dirty="0"/>
+              <a:t>	</a:t>
+            </a:r>
+            <a:r>
+              <a:rPr lang="ja-JP" altLang="en-US" dirty="0"/>
+              <a:t>∴</a:t>
+            </a:r>
+            <a:r>
+              <a:rPr lang="ja-JP" altLang="ja-JP" dirty="0"/>
+              <a:t>相互コンダクタンス</a:t>
+            </a:r>
+            <a:r>
+              <a:rPr lang="en-US" altLang="ja-JP" dirty="0"/>
+              <a:t> </a:t>
+            </a:r>
+            <a:r>
+              <a:rPr lang="en-US" altLang="ja-JP" b="1" i="1" dirty="0">
                 <a:latin typeface="Times New Roman" panose="02020603050405020304" pitchFamily="18" charset="0"/>
                 <a:cs typeface="Times New Roman" panose="02020603050405020304" pitchFamily="18" charset="0"/>
               </a:rPr>
-              <a:t>GSA </a:t>
-            </a:r>
-            <a:r>
-              <a:rPr lang="en-US" altLang="ja-JP" dirty="0">
+              <a:t>g</a:t>
+            </a:r>
+            <a:r>
+              <a:rPr lang="en-US" altLang="ja-JP" b="1" i="1" baseline="-25000" dirty="0">
                 <a:latin typeface="Times New Roman" panose="02020603050405020304" pitchFamily="18" charset="0"/>
                 <a:cs typeface="Times New Roman" panose="02020603050405020304" pitchFamily="18" charset="0"/>
               </a:rPr>
-              <a:t>= 1.989 V,</a:t>
-            </a:r>
-            <a:r>
-              <a:rPr lang="en-US" altLang="ja-JP" dirty="0">
-                <a:solidFill>
-                  <a:prstClr val="black"/>
-                </a:solidFill>
+              <a:t>m</a:t>
+            </a:r>
+            <a:r>
+              <a:rPr lang="en-US" altLang="ja-JP" b="1" baseline="-25000" dirty="0">
                 <a:latin typeface="Times New Roman" panose="02020603050405020304" pitchFamily="18" charset="0"/>
                 <a:cs typeface="Times New Roman" panose="02020603050405020304" pitchFamily="18" charset="0"/>
               </a:rPr>
               <a:t> </a:t>
             </a:r>
             <a:r>
-              <a:rPr lang="en-US" altLang="ja-JP" dirty="0" err="1">
-                <a:solidFill>
-                  <a:prstClr val="black"/>
-                </a:solidFill>
-                <a:latin typeface="Times New Roman" panose="02020603050405020304" pitchFamily="18" charset="0"/>
-                <a:cs typeface="Times New Roman" panose="02020603050405020304" pitchFamily="18" charset="0"/>
-              </a:rPr>
-              <a:t>V</a:t>
-            </a:r>
-            <a:r>
-              <a:rPr lang="en-US" altLang="ja-JP" sz="1800" dirty="0" err="1">
-                <a:solidFill>
-                  <a:prstClr val="black"/>
-                </a:solidFill>
-                <a:latin typeface="Times New Roman" panose="02020603050405020304" pitchFamily="18" charset="0"/>
-                <a:cs typeface="Times New Roman" panose="02020603050405020304" pitchFamily="18" charset="0"/>
-              </a:rPr>
-              <a:t>GSAm</a:t>
-            </a:r>
-            <a:r>
-              <a:rPr lang="en-US" altLang="ja-JP" sz="1800" dirty="0">
-                <a:solidFill>
-                  <a:prstClr val="black"/>
-                </a:solidFill>
-                <a:latin typeface="Times New Roman" panose="02020603050405020304" pitchFamily="18" charset="0"/>
-                <a:cs typeface="Times New Roman" panose="02020603050405020304" pitchFamily="18" charset="0"/>
-              </a:rPr>
-              <a:t> </a:t>
-            </a:r>
-            <a:r>
-              <a:rPr lang="en-US" altLang="ja-JP" dirty="0">
-                <a:solidFill>
-                  <a:prstClr val="black"/>
-                </a:solidFill>
-                <a:latin typeface="Times New Roman" panose="02020603050405020304" pitchFamily="18" charset="0"/>
-                <a:cs typeface="Times New Roman" panose="02020603050405020304" pitchFamily="18" charset="0"/>
-              </a:rPr>
-              <a:t>= 1.962 V, </a:t>
-            </a:r>
-            <a:r>
-              <a:rPr lang="en-US" altLang="ja-JP" dirty="0" err="1">
-                <a:solidFill>
-                  <a:prstClr val="black"/>
-                </a:solidFill>
-                <a:latin typeface="Times New Roman" panose="02020603050405020304" pitchFamily="18" charset="0"/>
-                <a:cs typeface="Times New Roman" panose="02020603050405020304" pitchFamily="18" charset="0"/>
-              </a:rPr>
-              <a:t>V</a:t>
-            </a:r>
-            <a:r>
-              <a:rPr lang="en-US" altLang="ja-JP" sz="1800" dirty="0" err="1">
-                <a:solidFill>
-                  <a:prstClr val="black"/>
-                </a:solidFill>
-                <a:latin typeface="Times New Roman" panose="02020603050405020304" pitchFamily="18" charset="0"/>
-                <a:cs typeface="Times New Roman" panose="02020603050405020304" pitchFamily="18" charset="0"/>
-              </a:rPr>
-              <a:t>GSAp</a:t>
-            </a:r>
-            <a:r>
-              <a:rPr lang="en-US" altLang="ja-JP" sz="1800" dirty="0">
-                <a:solidFill>
-                  <a:prstClr val="black"/>
-                </a:solidFill>
-                <a:latin typeface="Times New Roman" panose="02020603050405020304" pitchFamily="18" charset="0"/>
-                <a:cs typeface="Times New Roman" panose="02020603050405020304" pitchFamily="18" charset="0"/>
-              </a:rPr>
-              <a:t> </a:t>
-            </a:r>
-            <a:r>
-              <a:rPr lang="en-US" altLang="ja-JP" dirty="0">
-                <a:solidFill>
-                  <a:prstClr val="black"/>
-                </a:solidFill>
-                <a:latin typeface="Times New Roman" panose="02020603050405020304" pitchFamily="18" charset="0"/>
-                <a:cs typeface="Times New Roman" panose="02020603050405020304" pitchFamily="18" charset="0"/>
-              </a:rPr>
-              <a:t>= 2.008 V</a:t>
-            </a:r>
-          </a:p>
-          <a:p>
-            <a:pPr marL="0" indent="0">
-              <a:buNone/>
-            </a:pPr>
-            <a:r>
-              <a:rPr lang="en-US" altLang="ja-JP" dirty="0">
-                <a:solidFill>
-                  <a:prstClr val="black"/>
-                </a:solidFill>
-                <a:latin typeface="Times New Roman" panose="02020603050405020304" pitchFamily="18" charset="0"/>
-                <a:cs typeface="Times New Roman" panose="02020603050405020304" pitchFamily="18" charset="0"/>
-              </a:rPr>
-              <a:t>	I</a:t>
-            </a:r>
-            <a:r>
-              <a:rPr lang="en-US" altLang="ja-JP" sz="1800" dirty="0">
-                <a:solidFill>
-                  <a:prstClr val="black"/>
-                </a:solidFill>
-                <a:latin typeface="Times New Roman" panose="02020603050405020304" pitchFamily="18" charset="0"/>
-                <a:cs typeface="Times New Roman" panose="02020603050405020304" pitchFamily="18" charset="0"/>
-              </a:rPr>
-              <a:t>DA</a:t>
-            </a:r>
-            <a:r>
-              <a:rPr lang="en-US" altLang="ja-JP" dirty="0">
-                <a:solidFill>
-                  <a:prstClr val="black"/>
-                </a:solidFill>
-                <a:latin typeface="Times New Roman" panose="02020603050405020304" pitchFamily="18" charset="0"/>
-                <a:cs typeface="Times New Roman" panose="02020603050405020304" pitchFamily="18" charset="0"/>
-              </a:rPr>
-              <a:t> = 1.28 mA, </a:t>
-            </a:r>
-            <a:r>
-              <a:rPr lang="en-US" altLang="ja-JP" dirty="0" err="1">
-                <a:solidFill>
-                  <a:prstClr val="black"/>
-                </a:solidFill>
-                <a:latin typeface="Times New Roman" panose="02020603050405020304" pitchFamily="18" charset="0"/>
-                <a:cs typeface="Times New Roman" panose="02020603050405020304" pitchFamily="18" charset="0"/>
-              </a:rPr>
-              <a:t>I</a:t>
-            </a:r>
-            <a:r>
-              <a:rPr lang="en-US" altLang="ja-JP" sz="1800" dirty="0" err="1">
-                <a:solidFill>
-                  <a:prstClr val="black"/>
-                </a:solidFill>
-                <a:latin typeface="Times New Roman" panose="02020603050405020304" pitchFamily="18" charset="0"/>
-                <a:cs typeface="Times New Roman" panose="02020603050405020304" pitchFamily="18" charset="0"/>
-              </a:rPr>
-              <a:t>DAm</a:t>
-            </a:r>
-            <a:r>
-              <a:rPr lang="en-US" altLang="ja-JP" dirty="0">
-                <a:solidFill>
-                  <a:prstClr val="black"/>
-                </a:solidFill>
-                <a:latin typeface="Times New Roman" panose="02020603050405020304" pitchFamily="18" charset="0"/>
-                <a:cs typeface="Times New Roman" panose="02020603050405020304" pitchFamily="18" charset="0"/>
-              </a:rPr>
-              <a:t> = 1.05 mA, </a:t>
-            </a:r>
-            <a:r>
-              <a:rPr lang="en-US" altLang="ja-JP" dirty="0" err="1">
-                <a:solidFill>
-                  <a:prstClr val="black"/>
-                </a:solidFill>
-                <a:latin typeface="Times New Roman" panose="02020603050405020304" pitchFamily="18" charset="0"/>
-                <a:cs typeface="Times New Roman" panose="02020603050405020304" pitchFamily="18" charset="0"/>
-              </a:rPr>
-              <a:t>I</a:t>
-            </a:r>
-            <a:r>
-              <a:rPr lang="en-US" altLang="ja-JP" sz="1800" dirty="0" err="1">
-                <a:solidFill>
-                  <a:prstClr val="black"/>
-                </a:solidFill>
-                <a:latin typeface="Times New Roman" panose="02020603050405020304" pitchFamily="18" charset="0"/>
-                <a:cs typeface="Times New Roman" panose="02020603050405020304" pitchFamily="18" charset="0"/>
-              </a:rPr>
-              <a:t>DAp</a:t>
-            </a:r>
-            <a:r>
-              <a:rPr lang="en-US" altLang="ja-JP" dirty="0">
-                <a:solidFill>
-                  <a:prstClr val="black"/>
-                </a:solidFill>
-                <a:latin typeface="Times New Roman" panose="02020603050405020304" pitchFamily="18" charset="0"/>
-                <a:cs typeface="Times New Roman" panose="02020603050405020304" pitchFamily="18" charset="0"/>
-              </a:rPr>
-              <a:t> = 1.42 mA </a:t>
-            </a:r>
-            <a:endParaRPr lang="en-US" altLang="ja-JP" dirty="0"/>
-          </a:p>
-          <a:p>
-            <a:pPr marL="0" indent="0">
-              <a:buNone/>
-            </a:pPr>
-            <a:r>
-              <a:rPr lang="en-US" altLang="ja-JP" dirty="0"/>
-              <a:t>	</a:t>
-            </a:r>
-            <a:r>
-              <a:rPr lang="ja-JP" altLang="en-US" dirty="0"/>
-              <a:t>∴</a:t>
-            </a:r>
-            <a:r>
-              <a:rPr lang="ja-JP" altLang="ja-JP" dirty="0"/>
-              <a:t>相互コンダクタンス</a:t>
-            </a:r>
-            <a:r>
-              <a:rPr lang="en-US" altLang="ja-JP" dirty="0"/>
-              <a:t> </a:t>
-            </a:r>
-            <a:r>
-              <a:rPr lang="en-US" altLang="ja-JP" dirty="0">
-                <a:latin typeface="Times New Roman" panose="02020603050405020304" pitchFamily="18" charset="0"/>
-                <a:cs typeface="Times New Roman" panose="02020603050405020304" pitchFamily="18" charset="0"/>
-              </a:rPr>
-              <a:t>g</a:t>
-            </a:r>
-            <a:r>
-              <a:rPr lang="en-US" altLang="ja-JP" baseline="-25000" dirty="0">
-                <a:latin typeface="Times New Roman" panose="02020603050405020304" pitchFamily="18" charset="0"/>
-                <a:cs typeface="Times New Roman" panose="02020603050405020304" pitchFamily="18" charset="0"/>
-              </a:rPr>
-              <a:t>m </a:t>
-            </a:r>
-            <a:r>
-              <a:rPr kumimoji="1" lang="en-US" altLang="ja-JP" dirty="0">
+              <a:rPr kumimoji="1" lang="en-US" altLang="ja-JP" b="1" dirty="0">
                 <a:latin typeface="Times New Roman" panose="02020603050405020304" pitchFamily="18" charset="0"/>
                 <a:cs typeface="Times New Roman" panose="02020603050405020304" pitchFamily="18" charset="0"/>
               </a:rPr>
@@ -13877,7 +13826,7 @@
             </a:endParaRPr>
           </a:p>
           <a:p>
-            <a:pPr marL="0" indent="0" fontAlgn="ctr">
+            <a:pPr marL="0" indent="0" algn="ctr" fontAlgn="ctr">
               <a:buNone/>
             </a:pPr>
             <a:r>
@@ -13885,7 +13834,21 @@
                 <a:latin typeface="Times New Roman" panose="02020603050405020304" pitchFamily="18" charset="0"/>
                 <a:cs typeface="Times New Roman" panose="02020603050405020304" pitchFamily="18" charset="0"/>
               </a:rPr>
-              <a:t>	ΔT = 50 </a:t>
+              <a:t>	</a:t>
+            </a:r>
+            <a:r>
+              <a:rPr lang="en-US" altLang="ja-JP" i="1" dirty="0">
+                <a:latin typeface="Times New Roman" panose="02020603050405020304" pitchFamily="18" charset="0"/>
+                <a:cs typeface="Times New Roman" panose="02020603050405020304" pitchFamily="18" charset="0"/>
+              </a:rPr>
+              <a:t>ΔT</a:t>
+            </a:r>
+            <a:r>
+              <a:rPr lang="en-US" altLang="ja-JP" dirty="0">
+                <a:latin typeface="Times New Roman" panose="02020603050405020304" pitchFamily="18" charset="0"/>
+                <a:cs typeface="Times New Roman" panose="02020603050405020304" pitchFamily="18" charset="0"/>
+              </a:rPr>
+              <a:t> = 50 </a:t>
             </a:r>
             <a:r>
               <a:rPr lang="en-US" altLang="ja-JP" dirty="0" err="1">
@@ -13899,10 +13862,17 @@
                 <a:latin typeface="Times New Roman" panose="02020603050405020304" pitchFamily="18" charset="0"/>
                 <a:cs typeface="Times New Roman" panose="02020603050405020304" pitchFamily="18" charset="0"/>
               </a:rPr>
-              <a:t>,  v</a:t>
-            </a:r>
-            <a:r>
-              <a:rPr lang="en-US" altLang="ja-JP" sz="2300" dirty="0">
+              <a:t>,  </a:t>
+            </a:r>
+            <a:r>
+              <a:rPr lang="en-US" altLang="ja-JP" i="1" dirty="0">
+                <a:latin typeface="Times New Roman" panose="02020603050405020304" pitchFamily="18" charset="0"/>
+                <a:cs typeface="Times New Roman" panose="02020603050405020304" pitchFamily="18" charset="0"/>
+              </a:rPr>
+              <a:t>v</a:t>
+            </a:r>
+            <a:r>
+              <a:rPr lang="en-US" altLang="ja-JP" sz="2300" i="1" dirty="0">
                 <a:latin typeface="Times New Roman" panose="02020603050405020304" pitchFamily="18" charset="0"/>
                 <a:cs typeface="Times New Roman" panose="02020603050405020304" pitchFamily="18" charset="0"/>
               </a:rPr>
@@ -13930,14 +13900,14 @@
               <a:t> </a:t>
             </a:r>
             <a:r>
-              <a:rPr lang="en-US" altLang="ja-JP" dirty="0" err="1">
+              <a:rPr lang="en-US" altLang="ja-JP" i="1" dirty="0" err="1">
                 <a:latin typeface="Times New Roman" panose="02020603050405020304" pitchFamily="18" charset="0"/>
                 <a:cs typeface="Times New Roman" panose="02020603050405020304" pitchFamily="18" charset="0"/>
               </a:rPr>
               <a:t>η</a:t>
             </a:r>
             <a:r>
-              <a:rPr lang="en-US" altLang="ja-JP" sz="2300" dirty="0" err="1">
+              <a:rPr lang="en-US" altLang="ja-JP" sz="2300" i="1" dirty="0" err="1">
                 <a:latin typeface="Times New Roman" panose="02020603050405020304" pitchFamily="18" charset="0"/>
                 <a:cs typeface="Times New Roman" panose="02020603050405020304" pitchFamily="18" charset="0"/>
               </a:rPr>
@@ -13955,7 +13925,7 @@
                 <a:latin typeface="Times New Roman" panose="02020603050405020304" pitchFamily="18" charset="0"/>
                 <a:cs typeface="Times New Roman" panose="02020603050405020304" pitchFamily="18" charset="0"/>
               </a:rPr>
-              <a:t>= </a:t>
+              <a:t>= 20log(35) = </a:t>
             </a:r>
             <a:r>
               <a:rPr lang="en-US" altLang="ja-JP" b="1" dirty="0">
@@ -13972,11 +13942,18 @@
               <a:t>, </a:t>
             </a:r>
             <a:r>
+              <a:rPr lang="en-US" altLang="ja-JP" i="1" dirty="0">
+                <a:latin typeface="Times New Roman" panose="02020603050405020304" pitchFamily="18" charset="0"/>
+                <a:cs typeface="Times New Roman" panose="02020603050405020304" pitchFamily="18" charset="0"/>
+              </a:rPr>
+              <a:t>θ</a:t>
+            </a:r>
+            <a:r>
               <a:rPr lang="en-US" altLang="ja-JP" dirty="0">
                 <a:latin typeface="Times New Roman" panose="02020603050405020304" pitchFamily="18" charset="0"/>
                 <a:cs typeface="Times New Roman" panose="02020603050405020304" pitchFamily="18" charset="0"/>
               </a:rPr>
-              <a:t>θ = </a:t>
+              <a:t> = </a:t>
             </a:r>
             <a:r>
               <a:rPr lang="ja-JP" altLang="en-US" b="1" dirty="0">
@@ -14072,6 +14049,298 @@
           </a:p>
         </p:txBody>
       </p:sp>
+      <p:graphicFrame>
+        <p:nvGraphicFramePr>
+          <p:cNvPr id="2" name="表 1">
+            <a:extLst>
+              <a:ext uri="{FF2B5EF4-FFF2-40B4-BE49-F238E27FC236}">
+                <a16:creationId xmlns:a16="http://schemas.microsoft.com/office/drawing/2014/main" id="{45BFADC9-669E-48E6-91EC-933100042DEB}"/>
+              </a:ext>
+            </a:extLst>
+          </p:cNvPr>
+          <p:cNvGraphicFramePr>
+            <a:graphicFrameLocks noGrp="1"/>
+          </p:cNvGraphicFramePr>
+          <p:nvPr>
+            <p:extLst>
+              <p:ext uri="{D42A27DB-BD31-4B8C-83A1-F6EECF244321}">
+                <p14:modId xmlns:p14="http://schemas.microsoft.com/office/powerpoint/2010/main" val="139342039"/>
+              </p:ext>
+            </p:extLst>
+          </p:nvPr>
+        </p:nvGraphicFramePr>
+        <p:xfrm>
+          <a:off x="3778250" y="3318510"/>
+          <a:ext cx="4635500" cy="1097280"/>
+        </p:xfrm>
+        <a:graphic>
+          <a:graphicData uri="http://schemas.openxmlformats.org/drawingml/2006/table">
+            <a:tbl>
+              <a:tblPr firstRow="1" bandRow="1">
+                <a:tableStyleId>{5940675A-B579-460E-94D1-54222C63F5DA}</a:tableStyleId>
+              </a:tblPr>
+              <a:tblGrid>
+                <a:gridCol w="835025">
+                  <a:extLst>
+                    <a:ext uri="{9D8B030D-6E8A-4147-A177-3AD203B41FA5}">
+                      <a16:colId xmlns:a16="http://schemas.microsoft.com/office/drawing/2014/main" val="299361164"/>
+                    </a:ext>
+                  </a:extLst>
+                </a:gridCol>
+                <a:gridCol w="1228725">
+                  <a:extLst>
+                    <a:ext uri="{9D8B030D-6E8A-4147-A177-3AD203B41FA5}">
+                      <a16:colId xmlns:a16="http://schemas.microsoft.com/office/drawing/2014/main" val="2048229462"/>
+                    </a:ext>
+                  </a:extLst>
+                </a:gridCol>
+                <a:gridCol w="1362075">
+                  <a:extLst>
+                    <a:ext uri="{9D8B030D-6E8A-4147-A177-3AD203B41FA5}">
+                      <a16:colId xmlns:a16="http://schemas.microsoft.com/office/drawing/2014/main" val="3202190217"/>
+                    </a:ext>
+                  </a:extLst>
+                </a:gridCol>
+                <a:gridCol w="1209675">
+                  <a:extLst>
+                    <a:ext uri="{9D8B030D-6E8A-4147-A177-3AD203B41FA5}">
+                      <a16:colId xmlns:a16="http://schemas.microsoft.com/office/drawing/2014/main" val="3001711985"/>
+                    </a:ext>
+                  </a:extLst>
+                </a:gridCol>
+              </a:tblGrid>
+              <a:tr h="296016">
+                <a:tc>
+                  <a:txBody>
+                    <a:bodyPr/>
+                    <a:lstStyle/>
+                    <a:p>
+                      <a:endParaRPr kumimoji="1" lang="ja-JP" altLang="en-US" dirty="0"/>
+                    </a:p>
+                  </a:txBody>
+                  <a:tcPr/>
+                </a:tc>
+                <a:tc>
+                  <a:txBody>
+                    <a:bodyPr/>
+                    <a:lstStyle/>
+                    <a:p>
+                      <a:r>
+                        <a:rPr kumimoji="1" lang="ja-JP" altLang="en-US" dirty="0"/>
+                        <a:t>下側</a:t>
+                      </a:r>
+                      <a:r>
+                        <a:rPr kumimoji="1" lang="en-US" altLang="ja-JP" dirty="0"/>
+                        <a:t>(m)</a:t>
+                      </a:r>
+                      <a:endParaRPr kumimoji="1" lang="ja-JP" altLang="en-US" dirty="0"/>
+                    </a:p>
+                  </a:txBody>
+                  <a:tcPr/>
+                </a:tc>
+                <a:tc>
+                  <a:txBody>
+                    <a:bodyPr/>
+                    <a:lstStyle/>
+                    <a:p>
+                      <a:r>
+                        <a:rPr kumimoji="1" lang="ja-JP" altLang="en-US" dirty="0"/>
+                        <a:t>中心 </a:t>
+                      </a:r>
+                      <a:r>
+                        <a:rPr kumimoji="1" lang="en-US" altLang="ja-JP" dirty="0"/>
+                        <a:t>(A)</a:t>
+                      </a:r>
+                      <a:endParaRPr kumimoji="1" lang="ja-JP" altLang="en-US" dirty="0"/>
+                    </a:p>
+                  </a:txBody>
+                  <a:tcPr/>
+                </a:tc>
+                <a:tc>
+                  <a:txBody>
+                    <a:bodyPr/>
+                    <a:lstStyle/>
+                    <a:p>
+                      <a:r>
+                        <a:rPr kumimoji="1" lang="ja-JP" altLang="en-US" dirty="0"/>
+                        <a:t>上側</a:t>
+                      </a:r>
+                      <a:r>
+                        <a:rPr kumimoji="1" lang="en-US" altLang="ja-JP" dirty="0"/>
+                        <a:t>(p)</a:t>
+                      </a:r>
+                      <a:endParaRPr kumimoji="1" lang="ja-JP" altLang="en-US" dirty="0"/>
+                    </a:p>
+                  </a:txBody>
+                  <a:tcPr/>
+                </a:tc>
+                <a:extLst>
+                  <a:ext uri="{0D108BD9-81ED-4DB2-BD59-A6C34878D82A}">
+                    <a16:rowId xmlns:a16="http://schemas.microsoft.com/office/drawing/2014/main" val="2308914914"/>
+                  </a:ext>
+                </a:extLst>
+              </a:tr>
+              <a:tr h="296016">
+                <a:tc>
+                  <a:txBody>
+                    <a:bodyPr/>
+                    <a:lstStyle/>
+                    <a:p>
+                      <a:r>
+                        <a:rPr kumimoji="1" lang="ja-JP" altLang="en-US" dirty="0"/>
+                        <a:t>電圧 </a:t>
+                      </a:r>
+                    </a:p>
+                  </a:txBody>
+                  <a:tcPr/>
+                </a:tc>
+                <a:tc>
+                  <a:txBody>
+                    <a:bodyPr/>
+                    <a:lstStyle/>
+                    <a:p>
+                      <a:r>
+                        <a:rPr lang="en-US" altLang="ja-JP" dirty="0">
+                          <a:solidFill>
+                            <a:prstClr val="black"/>
+                          </a:solidFill>
+                          <a:latin typeface="Times New Roman" panose="02020603050405020304" pitchFamily="18" charset="0"/>
+                          <a:cs typeface="Times New Roman" panose="02020603050405020304" pitchFamily="18" charset="0"/>
+                        </a:rPr>
+                        <a:t>1.962  [V]</a:t>
+                      </a:r>
+                      <a:endParaRPr kumimoji="1" lang="ja-JP" altLang="en-US" dirty="0"/>
+                    </a:p>
+                  </a:txBody>
+                  <a:tcPr/>
+                </a:tc>
+                <a:tc>
+                  <a:txBody>
+                    <a:bodyPr/>
+                    <a:lstStyle/>
+                    <a:p>
+                      <a:r>
+                        <a:rPr lang="en-US" altLang="ja-JP" dirty="0">
+                          <a:latin typeface="Times New Roman" panose="02020603050405020304" pitchFamily="18" charset="0"/>
+                          <a:cs typeface="Times New Roman" panose="02020603050405020304" pitchFamily="18" charset="0"/>
+                        </a:rPr>
+                        <a:t>1.989  [V]</a:t>
+                      </a:r>
+                      <a:endParaRPr kumimoji="1" lang="ja-JP" altLang="en-US" dirty="0"/>
+                    </a:p>
+                  </a:txBody>
+                  <a:tcPr/>
+                </a:tc>
+                <a:tc>
+                  <a:txBody>
+                    <a:bodyPr/>
+                    <a:lstStyle/>
+                    <a:p>
+                      <a:r>
+                        <a:rPr lang="en-US" altLang="ja-JP" dirty="0">
+                          <a:solidFill>
+                            <a:prstClr val="black"/>
+                          </a:solidFill>
+                          <a:latin typeface="Times New Roman" panose="02020603050405020304" pitchFamily="18" charset="0"/>
+                          <a:cs typeface="Times New Roman" panose="02020603050405020304" pitchFamily="18" charset="0"/>
+                        </a:rPr>
+                        <a:t>2.008  [V] </a:t>
+                      </a:r>
+                      <a:endParaRPr kumimoji="1" lang="ja-JP" altLang="en-US" dirty="0"/>
+                    </a:p>
+                  </a:txBody>
+                  <a:tcPr/>
+                </a:tc>
+                <a:extLst>
+                  <a:ext uri="{0D108BD9-81ED-4DB2-BD59-A6C34878D82A}">
+                    <a16:rowId xmlns:a16="http://schemas.microsoft.com/office/drawing/2014/main" val="2117038556"/>
+                  </a:ext>
+                </a:extLst>
+              </a:tr>
+              <a:tr h="296016">
+                <a:tc>
+                  <a:txBody>
+                    <a:bodyPr/>
+                    <a:lstStyle/>
+                    <a:p>
+                      <a:r>
+                        <a:rPr kumimoji="1" lang="ja-JP" altLang="en-US" dirty="0"/>
+                        <a:t>電流</a:t>
+                      </a:r>
+                    </a:p>
+                  </a:txBody>
+                  <a:tcPr/>
+                </a:tc>
+                <a:tc>
+                  <a:txBody>
+                    <a:bodyPr/>
+                    <a:lstStyle/>
+                    <a:p>
+                      <a:r>
+                        <a:rPr lang="en-US" altLang="ja-JP" dirty="0">
+                          <a:solidFill>
+                            <a:prstClr val="black"/>
+                          </a:solidFill>
+                          <a:latin typeface="Times New Roman" panose="02020603050405020304" pitchFamily="18" charset="0"/>
+                          <a:cs typeface="Times New Roman" panose="02020603050405020304" pitchFamily="18" charset="0"/>
+                        </a:rPr>
+                        <a:t>1.05 [mA]</a:t>
+                      </a:r>
+                      <a:endParaRPr kumimoji="1" lang="ja-JP" altLang="en-US" dirty="0"/>
+                    </a:p>
+                  </a:txBody>
+                  <a:tcPr/>
+                </a:tc>
+                <a:tc>
+                  <a:txBody>
+                    <a:bodyPr/>
+                    <a:lstStyle/>
+                    <a:p>
+                      <a:r>
+                        <a:rPr lang="en-US" altLang="ja-JP" dirty="0">
+                          <a:solidFill>
+                            <a:prstClr val="black"/>
+                          </a:solidFill>
+                          <a:latin typeface="Times New Roman" panose="02020603050405020304" pitchFamily="18" charset="0"/>
+                          <a:cs typeface="Times New Roman" panose="02020603050405020304" pitchFamily="18" charset="0"/>
+                        </a:rPr>
+                        <a:t>1.28 [mA]</a:t>
+                      </a:r>
+                      <a:endParaRPr kumimoji="1" lang="ja-JP" altLang="en-US" dirty="0"/>
+                    </a:p>
+                  </a:txBody>
+                  <a:tcPr/>
+                </a:tc>
+                <a:tc>
+                  <a:txBody>
+                    <a:bodyPr/>
+                    <a:lstStyle/>
+                    <a:p>
+                      <a:r>
+                        <a:rPr lang="en-US" altLang="ja-JP" dirty="0">
+                          <a:solidFill>
+                            <a:prstClr val="black"/>
+                          </a:solidFill>
+                          <a:latin typeface="Times New Roman" panose="02020603050405020304" pitchFamily="18" charset="0"/>
+                          <a:cs typeface="Times New Roman" panose="02020603050405020304" pitchFamily="18" charset="0"/>
+                        </a:rPr>
+                        <a:t>1.42 [mA]</a:t>
+                      </a:r>
+                      <a:endParaRPr kumimoji="1" lang="ja-JP" altLang="en-US" dirty="0"/>
+                    </a:p>
+                  </a:txBody>
+                  <a:tcPr/>
+                </a:tc>
+                <a:extLst>
+                  <a:ext uri="{0D108BD9-81ED-4DB2-BD59-A6C34878D82A}">
+                    <a16:rowId xmlns:a16="http://schemas.microsoft.com/office/drawing/2014/main" val="3337493310"/>
+                  </a:ext>
+                </a:extLst>
+              </a:tr>
+            </a:tbl>
+          </a:graphicData>
+        </a:graphic>
+      </p:graphicFrame>
     </p:spTree>
     <p:extLst>
       <p:ext uri="{BB962C8B-B14F-4D97-AF65-F5344CB8AC3E}">
@@ -14157,14 +14426,14 @@
               <a:t>電流</a:t>
             </a:r>
             <a:r>
-              <a:rPr kumimoji="1" lang="en-US" altLang="ja-JP" dirty="0">
+              <a:rPr kumimoji="1" lang="en-US" altLang="ja-JP" i="1" dirty="0">
                 <a:latin typeface="Times New Roman" panose="02020603050405020304" pitchFamily="18" charset="0"/>
                 <a:cs typeface="Times New Roman" panose="02020603050405020304" pitchFamily="18" charset="0"/>
               </a:rPr>
               <a:t>I</a:t>
             </a:r>
             <a:r>
-              <a:rPr kumimoji="1" lang="en-US" altLang="ja-JP" sz="1400" dirty="0">
+              <a:rPr kumimoji="1" lang="en-US" altLang="ja-JP" sz="1400" i="1" dirty="0">
                 <a:latin typeface="Times New Roman" panose="02020603050405020304" pitchFamily="18" charset="0"/>
                 <a:cs typeface="Times New Roman" panose="02020603050405020304" pitchFamily="18" charset="0"/>
               </a:rPr>
@@ -14179,14 +14448,14 @@
               <a:t>は入力電圧の振幅の</a:t>
             </a:r>
             <a:r>
-              <a:rPr lang="en-US" altLang="ja-JP" dirty="0">
+              <a:rPr lang="en-US" altLang="ja-JP" i="1" dirty="0">
                 <a:latin typeface="Times New Roman" panose="02020603050405020304" pitchFamily="18" charset="0"/>
                 <a:cs typeface="Times New Roman" panose="02020603050405020304" pitchFamily="18" charset="0"/>
               </a:rPr>
               <a:t>g</a:t>
             </a:r>
             <a:r>
-              <a:rPr lang="en-US" altLang="ja-JP" sz="1400" dirty="0">
+              <a:rPr lang="en-US" altLang="ja-JP" sz="1400" i="1" dirty="0">
                 <a:latin typeface="Times New Roman" panose="02020603050405020304" pitchFamily="18" charset="0"/>
                 <a:cs typeface="Times New Roman" panose="02020603050405020304" pitchFamily="18" charset="0"/>
               </a:rPr>
@@ -14207,14 +14476,14 @@
               <a:t>出力電流の振幅は</a:t>
             </a:r>
             <a:r>
-              <a:rPr lang="en-US" altLang="ja-JP" dirty="0">
+              <a:rPr lang="en-US" altLang="ja-JP" i="1" dirty="0">
                 <a:latin typeface="Times New Roman" panose="02020603050405020304" pitchFamily="18" charset="0"/>
                 <a:cs typeface="Times New Roman" panose="02020603050405020304" pitchFamily="18" charset="0"/>
               </a:rPr>
               <a:t>I</a:t>
             </a:r>
             <a:r>
-              <a:rPr lang="en-US" altLang="ja-JP" sz="1400" dirty="0">
+              <a:rPr lang="en-US" altLang="ja-JP" sz="1400" i="1" dirty="0">
                 <a:latin typeface="Times New Roman" panose="02020603050405020304" pitchFamily="18" charset="0"/>
                 <a:cs typeface="Times New Roman" panose="02020603050405020304" pitchFamily="18" charset="0"/>
               </a:rPr>
@@ -14225,7 +14494,7 @@
               <a:t>の</a:t>
             </a:r>
             <a:r>
-              <a:rPr lang="en-US" altLang="ja-JP" dirty="0">
+              <a:rPr lang="en-US" altLang="ja-JP" i="1" dirty="0">
                 <a:solidFill>
                   <a:srgbClr val="FF0000"/>
                 </a:solidFill>
@@ -14233,14 +14502,14 @@
               <a:t>-</a:t>
             </a:r>
             <a:r>
-              <a:rPr lang="en-US" altLang="ja-JP" dirty="0">
+              <a:rPr lang="en-US" altLang="ja-JP" i="1" dirty="0">
                 <a:latin typeface="Times New Roman" panose="02020603050405020304" pitchFamily="18" charset="0"/>
                 <a:cs typeface="Times New Roman" panose="02020603050405020304" pitchFamily="18" charset="0"/>
               </a:rPr>
               <a:t>R</a:t>
             </a:r>
             <a:r>
-              <a:rPr lang="en-US" altLang="ja-JP" sz="1400" dirty="0">
+              <a:rPr lang="en-US" altLang="ja-JP" sz="1400" i="1" dirty="0">
                 <a:latin typeface="Times New Roman" panose="02020603050405020304" pitchFamily="18" charset="0"/>
                 <a:cs typeface="Times New Roman" panose="02020603050405020304" pitchFamily="18" charset="0"/>
               </a:rPr>
@@ -14269,28 +14538,35 @@
               <a:t>は</a:t>
             </a:r>
             <a:r>
+              <a:rPr lang="en-US" altLang="ja-JP" i="1" dirty="0" err="1">
+                <a:latin typeface="Times New Roman" panose="02020603050405020304" pitchFamily="18" charset="0"/>
+                <a:cs typeface="Times New Roman" panose="02020603050405020304" pitchFamily="18" charset="0"/>
+              </a:rPr>
+              <a:t>g</a:t>
+            </a:r>
+            <a:r>
+              <a:rPr lang="en-US" altLang="ja-JP" sz="1400" i="1" dirty="0" err="1">
+                <a:latin typeface="Times New Roman" panose="02020603050405020304" pitchFamily="18" charset="0"/>
+                <a:cs typeface="Times New Roman" panose="02020603050405020304" pitchFamily="18" charset="0"/>
+              </a:rPr>
+              <a:t>m</a:t>
+            </a:r>
+            <a:r>
               <a:rPr lang="en-US" altLang="ja-JP" dirty="0" err="1">
                 <a:latin typeface="Times New Roman" panose="02020603050405020304" pitchFamily="18" charset="0"/>
                 <a:cs typeface="Times New Roman" panose="02020603050405020304" pitchFamily="18" charset="0"/>
               </a:rPr>
-              <a:t>g</a:t>
-            </a:r>
-            <a:r>
-              <a:rPr lang="en-US" altLang="ja-JP" sz="1400" dirty="0" err="1">
+              <a:t>×</a:t>
+            </a:r>
+            <a:r>
+              <a:rPr lang="en-US" altLang="ja-JP" i="1" dirty="0" err="1">
                 <a:latin typeface="Times New Roman" panose="02020603050405020304" pitchFamily="18" charset="0"/>
                 <a:cs typeface="Times New Roman" panose="02020603050405020304" pitchFamily="18" charset="0"/>
               </a:rPr>
-              <a:t>m</a:t>
-            </a:r>
-            <a:r>
-              <a:rPr lang="en-US" altLang="ja-JP" dirty="0" err="1">
-                <a:latin typeface="Times New Roman" panose="02020603050405020304" pitchFamily="18" charset="0"/>
-                <a:cs typeface="Times New Roman" panose="02020603050405020304" pitchFamily="18" charset="0"/>
-              </a:rPr>
-              <a:t>×R</a:t>
-            </a:r>
-            <a:r>
-              <a:rPr lang="en-US" altLang="ja-JP" sz="1400" dirty="0" err="1">
+              <a:t>R</a:t>
+            </a:r>
+            <a:r>
+              <a:rPr lang="en-US" altLang="ja-JP" sz="1400" i="1" dirty="0" err="1">
                 <a:latin typeface="Times New Roman" panose="02020603050405020304" pitchFamily="18" charset="0"/>
                 <a:cs typeface="Times New Roman" panose="02020603050405020304" pitchFamily="18" charset="0"/>
               </a:rPr>
@@ -14312,7 +14588,7 @@
                 <a:latin typeface="Times New Roman" panose="02020603050405020304" pitchFamily="18" charset="0"/>
                 <a:cs typeface="Times New Roman" panose="02020603050405020304" pitchFamily="18" charset="0"/>
               </a:rPr>
-              <a:t>NaN</a:t>
+              <a:t>37.55</a:t>
             </a:r>
             <a:r>
               <a:rPr kumimoji="1" lang="ja-JP" altLang="en-US" dirty="0"/>
@@ -14336,28 +14612,35 @@
               <a:t>20log(</a:t>
             </a:r>
             <a:r>
+              <a:rPr lang="en-US" altLang="ja-JP" i="1" dirty="0" err="1">
+                <a:latin typeface="Times New Roman" panose="02020603050405020304" pitchFamily="18" charset="0"/>
+                <a:cs typeface="Times New Roman" panose="02020603050405020304" pitchFamily="18" charset="0"/>
+              </a:rPr>
+              <a:t>g</a:t>
+            </a:r>
+            <a:r>
+              <a:rPr lang="en-US" altLang="ja-JP" sz="1600" i="1" dirty="0" err="1">
+                <a:latin typeface="Times New Roman" panose="02020603050405020304" pitchFamily="18" charset="0"/>
+                <a:cs typeface="Times New Roman" panose="02020603050405020304" pitchFamily="18" charset="0"/>
+              </a:rPr>
+              <a:t>m</a:t>
+            </a:r>
+            <a:r>
               <a:rPr lang="en-US" altLang="ja-JP" dirty="0" err="1">
                 <a:latin typeface="Times New Roman" panose="02020603050405020304" pitchFamily="18" charset="0"/>
                 <a:cs typeface="Times New Roman" panose="02020603050405020304" pitchFamily="18" charset="0"/>
               </a:rPr>
-              <a:t>g</a:t>
-            </a:r>
-            <a:r>
-              <a:rPr lang="en-US" altLang="ja-JP" sz="1600" dirty="0" err="1">
+              <a:t>×</a:t>
+            </a:r>
+            <a:r>
+              <a:rPr lang="en-US" altLang="ja-JP" i="1" dirty="0" err="1">
                 <a:latin typeface="Times New Roman" panose="02020603050405020304" pitchFamily="18" charset="0"/>
                 <a:cs typeface="Times New Roman" panose="02020603050405020304" pitchFamily="18" charset="0"/>
               </a:rPr>
-              <a:t>m</a:t>
-            </a:r>
-            <a:r>
-              <a:rPr lang="en-US" altLang="ja-JP" dirty="0" err="1">
-                <a:latin typeface="Times New Roman" panose="02020603050405020304" pitchFamily="18" charset="0"/>
-                <a:cs typeface="Times New Roman" panose="02020603050405020304" pitchFamily="18" charset="0"/>
-              </a:rPr>
-              <a:t>×R</a:t>
-            </a:r>
-            <a:r>
-              <a:rPr lang="en-US" altLang="ja-JP" sz="1600" dirty="0" err="1">
+              <a:t>R</a:t>
+            </a:r>
+            <a:r>
+              <a:rPr lang="en-US" altLang="ja-JP" sz="1600" i="1" dirty="0" err="1">
                 <a:latin typeface="Times New Roman" panose="02020603050405020304" pitchFamily="18" charset="0"/>
                 <a:cs typeface="Times New Roman" panose="02020603050405020304" pitchFamily="18" charset="0"/>
               </a:rPr>
@@ -14368,19 +14651,8 @@
                 <a:latin typeface="Times New Roman" panose="02020603050405020304" pitchFamily="18" charset="0"/>
                 <a:cs typeface="Times New Roman" panose="02020603050405020304" pitchFamily="18" charset="0"/>
               </a:rPr>
-              <a:t>) = NaN </a:t>
-            </a:r>
-            <a:r>
-              <a:rPr lang="ja-JP" altLang="en-US" dirty="0">
-                <a:latin typeface="Times New Roman" panose="02020603050405020304" pitchFamily="18" charset="0"/>
-                <a:cs typeface="Times New Roman" panose="02020603050405020304" pitchFamily="18" charset="0"/>
-              </a:rPr>
-              <a:t>倍</a:t>
-            </a:r>
-            <a:endParaRPr lang="en-US" altLang="ja-JP" dirty="0">
-              <a:latin typeface="Times New Roman" panose="02020603050405020304" pitchFamily="18" charset="0"/>
-              <a:cs typeface="Times New Roman" panose="02020603050405020304" pitchFamily="18" charset="0"/>
-            </a:endParaRPr>
+              <a:t>) = 31.49 [dB]</a:t>
+            </a:r>
           </a:p>
           <a:p>
             <a:pPr marL="457200" lvl="1" indent="0">
@@ -14421,26 +14693,40 @@
                 <a:latin typeface="Times New Roman" panose="02020603050405020304" pitchFamily="18" charset="0"/>
                 <a:cs typeface="Times New Roman" panose="02020603050405020304" pitchFamily="18" charset="0"/>
               </a:rPr>
-              <a:t>30.88136 [dB]</a:t>
-            </a:r>
-          </a:p>
-          <a:p>
-            <a:pPr marL="0" indent="0">
-              <a:buNone/>
-            </a:pPr>
+              <a:t>35 [</a:t>
+            </a:r>
             <a:r>
               <a:rPr lang="ja-JP" altLang="en-US" dirty="0">
                 <a:latin typeface="Times New Roman" panose="02020603050405020304" pitchFamily="18" charset="0"/>
                 <a:cs typeface="Times New Roman" panose="02020603050405020304" pitchFamily="18" charset="0"/>
               </a:rPr>
-              <a:t>誤差率 </a:t>
+              <a:t>倍</a:t>
             </a:r>
             <a:r>
               <a:rPr lang="en-US" altLang="ja-JP" dirty="0">
                 <a:latin typeface="Times New Roman" panose="02020603050405020304" pitchFamily="18" charset="0"/>
                 <a:cs typeface="Times New Roman" panose="02020603050405020304" pitchFamily="18" charset="0"/>
               </a:rPr>
-              <a:t>: NaN%</a:t>
+              <a:t>], 30.88136 [dB]</a:t>
+            </a:r>
+          </a:p>
+          <a:p>
+            <a:pPr marL="0" indent="0">
+              <a:buNone/>
+            </a:pPr>
+            <a:r>
+              <a:rPr lang="ja-JP" altLang="en-US" dirty="0">
+                <a:latin typeface="Times New Roman" panose="02020603050405020304" pitchFamily="18" charset="0"/>
+                <a:cs typeface="Times New Roman" panose="02020603050405020304" pitchFamily="18" charset="0"/>
+              </a:rPr>
+              <a:t>差率 </a:t>
+            </a:r>
+            <a:r>
+              <a:rPr lang="en-US" altLang="ja-JP" dirty="0">
+                <a:latin typeface="Times New Roman" panose="02020603050405020304" pitchFamily="18" charset="0"/>
+                <a:cs typeface="Times New Roman" panose="02020603050405020304" pitchFamily="18" charset="0"/>
+              </a:rPr>
+              <a:t>: 7.3%</a:t>
             </a:r>
           </a:p>
         </p:txBody>

</xml_diff>

<commit_message>
deleted about error notation
</commit_message>
<xml_diff>
--- a/design_project1.pptx
+++ b/design_project1.pptx
@@ -5587,7 +5587,21 @@
                 <a:latin typeface="Times New Roman" panose="02020603050405020304" pitchFamily="18" charset="0"/>
                 <a:cs typeface="Times New Roman" panose="02020603050405020304" pitchFamily="18" charset="0"/>
               </a:rPr>
-              <a:t>差は小さく正確な測定ができたといえる</a:t>
+              <a:t>この時の差は二倍と小さく</a:t>
+            </a:r>
+            <a:r>
+              <a:rPr lang="en-US" altLang="ja-JP" dirty="0">
+                <a:latin typeface="Times New Roman" panose="02020603050405020304" pitchFamily="18" charset="0"/>
+                <a:cs typeface="Times New Roman" panose="02020603050405020304" pitchFamily="18" charset="0"/>
+              </a:rPr>
+              <a:t>, </a:t>
+            </a:r>
+            <a:r>
+              <a:rPr lang="ja-JP" altLang="en-US" dirty="0">
+                <a:latin typeface="Times New Roman" panose="02020603050405020304" pitchFamily="18" charset="0"/>
+                <a:cs typeface="Times New Roman" panose="02020603050405020304" pitchFamily="18" charset="0"/>
+              </a:rPr>
+              <a:t>正確な測定ができたといえる</a:t>
             </a:r>
             <a:r>
               <a:rPr lang="en-US" altLang="ja-JP" dirty="0">
@@ -5649,6 +5663,32 @@
                 <a:cs typeface="Times New Roman" panose="02020603050405020304" pitchFamily="18" charset="0"/>
               </a:rPr>
               <a:t>.</a:t>
+            </a:r>
+          </a:p>
+          <a:p>
+            <a:pPr marL="0" marR="0" lvl="0" indent="0" algn="l" defTabSz="914400" rtl="0" eaLnBrk="1" fontAlgn="auto" latinLnBrk="0" hangingPunct="1">
+              <a:lnSpc>
+                <a:spcPct val="100000"/>
+              </a:lnSpc>
+              <a:spcBef>
+                <a:spcPts val="0"/>
+              </a:spcBef>
+              <a:spcAft>
+                <a:spcPts val="0"/>
+              </a:spcAft>
+              <a:buClrTx/>
+              <a:buSzTx/>
+              <a:buFontTx/>
+              <a:buNone/>
+              <a:tabLst/>
+              <a:defRPr/>
+            </a:pPr>
+            <a:r>
+              <a:rPr kumimoji="1" lang="ja-JP" altLang="en-US" dirty="0">
+                <a:latin typeface="Times New Roman" panose="02020603050405020304" pitchFamily="18" charset="0"/>
+                <a:cs typeface="Times New Roman" panose="02020603050405020304" pitchFamily="18" charset="0"/>
+              </a:rPr>
+              <a:t>位相が反転した</a:t>
             </a:r>
             <a:endParaRPr kumimoji="1" lang="ja-JP" altLang="en-US" dirty="0"/>
           </a:p>
@@ -9500,72 +9540,74 @@
               <a:buNone/>
             </a:pPr>
             <a:r>
-              <a:rPr lang="ja-JP" altLang="en-US" dirty="0"/>
+              <a:rPr lang="ja-JP" altLang="en-US" sz="3200" dirty="0"/>
               <a:t>ソース接地増幅回路では</a:t>
             </a:r>
-            <a:endParaRPr lang="en-US" altLang="ja-JP" dirty="0"/>
+            <a:endParaRPr lang="en-US" altLang="ja-JP" sz="3200" dirty="0"/>
           </a:p>
           <a:p>
             <a:pPr lvl="1"/>
             <a:r>
-              <a:rPr lang="ja-JP" altLang="en-US" dirty="0"/>
+              <a:rPr lang="ja-JP" altLang="en-US" sz="2800" dirty="0"/>
               <a:t>位相反転で増幅される</a:t>
             </a:r>
-            <a:endParaRPr lang="en-US" altLang="ja-JP" dirty="0"/>
+            <a:endParaRPr lang="en-US" altLang="ja-JP" sz="2800" dirty="0"/>
           </a:p>
           <a:p>
             <a:pPr lvl="1"/>
             <a:r>
-              <a:rPr lang="ja-JP" altLang="en-US" dirty="0"/>
+              <a:rPr lang="ja-JP" altLang="en-US" sz="2800" dirty="0"/>
               <a:t>電圧増幅率 </a:t>
             </a:r>
             <a:r>
-              <a:rPr lang="en-US" altLang="ja-JP" dirty="0"/>
+              <a:rPr lang="en-US" altLang="ja-JP" sz="2800" dirty="0"/>
               <a:t>= </a:t>
             </a:r>
             <a:r>
-              <a:rPr lang="en-US" altLang="ja-JP" i="1" dirty="0" err="1"/>
+              <a:rPr lang="en-US" altLang="ja-JP" sz="2800" i="1" dirty="0" err="1"/>
               <a:t>g</a:t>
             </a:r>
             <a:r>
-              <a:rPr lang="en-US" altLang="ja-JP" sz="1600" i="1" dirty="0" err="1"/>
+              <a:rPr lang="en-US" altLang="ja-JP" sz="1800" i="1" dirty="0" err="1"/>
               <a:t>m</a:t>
             </a:r>
             <a:r>
-              <a:rPr lang="en-US" altLang="ja-JP" dirty="0" err="1"/>
+              <a:rPr lang="en-US" altLang="ja-JP" sz="2800" dirty="0" err="1"/>
               <a:t>×</a:t>
             </a:r>
             <a:r>
-              <a:rPr lang="en-US" altLang="ja-JP" i="1" dirty="0" err="1"/>
+              <a:rPr lang="en-US" altLang="ja-JP" sz="2800" i="1" dirty="0" err="1"/>
               <a:t>R</a:t>
             </a:r>
             <a:r>
-              <a:rPr lang="en-US" altLang="ja-JP" sz="1600" i="1" dirty="0" err="1"/>
+              <a:rPr lang="en-US" altLang="ja-JP" sz="1800" i="1" dirty="0" err="1"/>
               <a:t>D</a:t>
             </a:r>
-            <a:endParaRPr kumimoji="1" lang="en-US" altLang="ja-JP" dirty="0"/>
+            <a:endParaRPr kumimoji="1" lang="en-US" altLang="ja-JP" sz="2800" dirty="0"/>
           </a:p>
           <a:p>
             <a:pPr lvl="1"/>
             <a:r>
-              <a:rPr lang="ja-JP" altLang="en-US" dirty="0"/>
+              <a:rPr lang="ja-JP" altLang="en-US" sz="2800" dirty="0"/>
               <a:t>高周波になると増幅率が低下</a:t>
             </a:r>
-            <a:endParaRPr lang="en-US" altLang="ja-JP" dirty="0"/>
-          </a:p>
-          <a:p>
-            <a:pPr marL="457200" lvl="1" indent="0">
+            <a:endParaRPr lang="en-US" altLang="ja-JP" sz="2800" dirty="0"/>
+          </a:p>
+          <a:p>
+            <a:pPr marL="914400" lvl="2" indent="0">
               <a:buNone/>
             </a:pPr>
             <a:r>
-              <a:rPr lang="en-US" altLang="ja-JP" dirty="0"/>
-              <a:t>	</a:t>
-            </a:r>
-            <a:r>
-              <a:rPr lang="ja-JP" altLang="en-US" dirty="0"/>
-              <a:t>⇒寄生容量の影響</a:t>
-            </a:r>
-            <a:endParaRPr lang="en-US" altLang="ja-JP" dirty="0"/>
+              <a:rPr lang="ja-JP" altLang="en-US" sz="2400" dirty="0"/>
+              <a:t>寄生容量の影響</a:t>
+            </a:r>
+            <a:endParaRPr lang="en-US" altLang="ja-JP" sz="2400" dirty="0"/>
+          </a:p>
+          <a:p>
+            <a:pPr marL="914400" lvl="2" indent="0">
+              <a:buNone/>
+            </a:pPr>
+            <a:endParaRPr lang="en-US" altLang="ja-JP" sz="2400" dirty="0"/>
           </a:p>
         </p:txBody>
       </p:sp>
@@ -15096,20 +15138,10 @@
             <a:pPr marL="0" indent="0">
               <a:buNone/>
             </a:pPr>
-            <a:r>
-              <a:rPr lang="ja-JP" altLang="en-US" dirty="0">
-                <a:latin typeface="Times New Roman" panose="02020603050405020304" pitchFamily="18" charset="0"/>
-                <a:cs typeface="Times New Roman" panose="02020603050405020304" pitchFamily="18" charset="0"/>
-              </a:rPr>
-              <a:t>差率 </a:t>
-            </a:r>
-            <a:r>
-              <a:rPr lang="en-US" altLang="ja-JP" dirty="0">
-                <a:latin typeface="Times New Roman" panose="02020603050405020304" pitchFamily="18" charset="0"/>
-                <a:cs typeface="Times New Roman" panose="02020603050405020304" pitchFamily="18" charset="0"/>
-              </a:rPr>
-              <a:t>: 7.3%</a:t>
-            </a:r>
+            <a:endParaRPr lang="en-US" altLang="ja-JP" dirty="0">
+              <a:latin typeface="Times New Roman" panose="02020603050405020304" pitchFamily="18" charset="0"/>
+              <a:cs typeface="Times New Roman" panose="02020603050405020304" pitchFamily="18" charset="0"/>
+            </a:endParaRPr>
           </a:p>
         </p:txBody>
       </p:sp>

</xml_diff>

<commit_message>
append voltage name in FET principle figure
</commit_message>
<xml_diff>
--- a/design_project1.pptx
+++ b/design_project1.pptx
@@ -11755,6 +11755,58 @@
           </p:txBody>
         </p:sp>
       </p:grpSp>
+      <p:sp>
+        <p:nvSpPr>
+          <p:cNvPr id="33" name="テキスト ボックス 32">
+            <a:extLst>
+              <a:ext uri="{FF2B5EF4-FFF2-40B4-BE49-F238E27FC236}">
+                <a16:creationId xmlns:a16="http://schemas.microsoft.com/office/drawing/2014/main" id="{9BFB907E-582C-4BCF-BCDA-E0A4ABECDF8D}"/>
+              </a:ext>
+            </a:extLst>
+          </p:cNvPr>
+          <p:cNvSpPr txBox="1"/>
+          <p:nvPr/>
+        </p:nvSpPr>
+        <p:spPr>
+          <a:xfrm>
+            <a:off x="8295393" y="1278237"/>
+            <a:ext cx="1468204" cy="461665"/>
+          </a:xfrm>
+          <a:prstGeom prst="rect">
+            <a:avLst/>
+          </a:prstGeom>
+          <a:noFill/>
+          <a:ln w="28575">
+            <a:noFill/>
+          </a:ln>
+        </p:spPr>
+        <p:txBody>
+          <a:bodyPr wrap="square" rtlCol="0">
+            <a:spAutoFit/>
+          </a:bodyPr>
+          <a:lstStyle/>
+          <a:p>
+            <a:r>
+              <a:rPr kumimoji="1" lang="en-US" altLang="ja-JP" sz="2400" b="1" i="1" dirty="0">
+                <a:latin typeface="Times New Roman" panose="02020603050405020304" pitchFamily="18" charset="0"/>
+                <a:cs typeface="Times New Roman" panose="02020603050405020304" pitchFamily="18" charset="0"/>
+              </a:rPr>
+              <a:t>V</a:t>
+            </a:r>
+            <a:r>
+              <a:rPr kumimoji="1" lang="en-US" altLang="ja-JP" b="1" i="1" dirty="0">
+                <a:latin typeface="Times New Roman" panose="02020603050405020304" pitchFamily="18" charset="0"/>
+                <a:cs typeface="Times New Roman" panose="02020603050405020304" pitchFamily="18" charset="0"/>
+              </a:rPr>
+              <a:t>DS</a:t>
+            </a:r>
+            <a:endParaRPr kumimoji="1" lang="ja-JP" altLang="en-US" sz="2400" b="1" i="1" dirty="0">
+              <a:latin typeface="Times New Roman" panose="02020603050405020304" pitchFamily="18" charset="0"/>
+              <a:cs typeface="Times New Roman" panose="02020603050405020304" pitchFamily="18" charset="0"/>
+            </a:endParaRPr>
+          </a:p>
+        </p:txBody>
+      </p:sp>
     </p:spTree>
     <p:extLst>
       <p:ext uri="{BB962C8B-B14F-4D97-AF65-F5344CB8AC3E}">

</xml_diff>

<commit_message>
about slide of experiment content,change slide flow and add note
</commit_message>
<xml_diff>
--- a/design_project1.pptx
+++ b/design_project1.pptx
@@ -10,9 +10,9 @@
   <p:sldIdLst>
     <p:sldId id="256" r:id="rId2"/>
     <p:sldId id="257" r:id="rId3"/>
-    <p:sldId id="262" r:id="rId4"/>
-    <p:sldId id="264" r:id="rId5"/>
-    <p:sldId id="260" r:id="rId6"/>
+    <p:sldId id="264" r:id="rId4"/>
+    <p:sldId id="260" r:id="rId5"/>
+    <p:sldId id="262" r:id="rId6"/>
     <p:sldId id="263" r:id="rId7"/>
     <p:sldId id="265" r:id="rId8"/>
     <p:sldId id="261" r:id="rId9"/>
@@ -4821,6 +4821,135 @@
           <a:bodyPr/>
           <a:lstStyle/>
           <a:p>
+            <a:pPr marL="0" marR="0" lvl="0" indent="0" algn="l" defTabSz="914400" rtl="0" eaLnBrk="1" fontAlgn="auto" latinLnBrk="0" hangingPunct="1">
+              <a:lnSpc>
+                <a:spcPct val="100000"/>
+              </a:lnSpc>
+              <a:spcBef>
+                <a:spcPts val="0"/>
+              </a:spcBef>
+              <a:spcAft>
+                <a:spcPts val="0"/>
+              </a:spcAft>
+              <a:buClrTx/>
+              <a:buSzTx/>
+              <a:buFontTx/>
+              <a:buNone/>
+              <a:tabLst/>
+              <a:defRPr/>
+            </a:pPr>
+            <a:r>
+              <a:rPr lang="en-US" altLang="ja-JP" dirty="0"/>
+              <a:t>FET</a:t>
+            </a:r>
+            <a:r>
+              <a:rPr lang="ja-JP" altLang="ja-JP" dirty="0"/>
+              <a:t>は、左の図のように、</a:t>
+            </a:r>
+            <a:r>
+              <a:rPr lang="en-US" altLang="ja-JP" dirty="0"/>
+              <a:t>p</a:t>
+            </a:r>
+            <a:r>
+              <a:rPr lang="ja-JP" altLang="ja-JP" dirty="0"/>
+              <a:t>型半導体とｎ型半導体を接合したものに絶縁膜、金属電極を張り付けたような形状をしてい</a:t>
+            </a:r>
+            <a:r>
+              <a:rPr lang="ja-JP" altLang="en-US" dirty="0"/>
+              <a:t>る</a:t>
+            </a:r>
+            <a:r>
+              <a:rPr lang="ja-JP" altLang="ja-JP" dirty="0"/>
+              <a:t>。</a:t>
+            </a:r>
+            <a:endParaRPr lang="en-US" altLang="ja-JP" dirty="0"/>
+          </a:p>
+          <a:p>
+            <a:pPr marL="0" marR="0" lvl="0" indent="0" algn="l" defTabSz="914400" rtl="0" eaLnBrk="1" fontAlgn="auto" latinLnBrk="0" hangingPunct="1">
+              <a:lnSpc>
+                <a:spcPct val="100000"/>
+              </a:lnSpc>
+              <a:spcBef>
+                <a:spcPts val="0"/>
+              </a:spcBef>
+              <a:spcAft>
+                <a:spcPts val="0"/>
+              </a:spcAft>
+              <a:buClrTx/>
+              <a:buSzTx/>
+              <a:buFontTx/>
+              <a:buNone/>
+              <a:tabLst/>
+              <a:defRPr/>
+            </a:pPr>
+            <a:r>
+              <a:rPr lang="ja-JP" altLang="ja-JP" dirty="0"/>
+              <a:t>右図のように電源を接続し、</a:t>
+            </a:r>
+            <a:r>
+              <a:rPr lang="en-US" altLang="ja-JP" dirty="0"/>
+              <a:t>VDS</a:t>
+            </a:r>
+            <a:r>
+              <a:rPr lang="ja-JP" altLang="ja-JP" dirty="0"/>
+              <a:t>を印加した状態でゲートソース間電圧</a:t>
+            </a:r>
+            <a:r>
+              <a:rPr lang="en-US" altLang="ja-JP" dirty="0"/>
+              <a:t>VGS</a:t>
+            </a:r>
+            <a:r>
+              <a:rPr lang="ja-JP" altLang="ja-JP" dirty="0"/>
+              <a:t>がある程度印加されると</a:t>
+            </a:r>
+            <a:r>
+              <a:rPr lang="en-US" altLang="ja-JP" dirty="0"/>
+              <a:t>n</a:t>
+            </a:r>
+            <a:r>
+              <a:rPr lang="ja-JP" altLang="en-US" dirty="0"/>
+              <a:t>型反転層が現れ</a:t>
+            </a:r>
+            <a:r>
+              <a:rPr lang="en-US" altLang="ja-JP" dirty="0"/>
+              <a:t>, </a:t>
+            </a:r>
+            <a:r>
+              <a:rPr lang="ja-JP" altLang="ja-JP" dirty="0"/>
+              <a:t>ドレイン電流</a:t>
+            </a:r>
+            <a:r>
+              <a:rPr lang="en-US" altLang="ja-JP" dirty="0"/>
+              <a:t>IDS</a:t>
+            </a:r>
+            <a:r>
+              <a:rPr lang="ja-JP" altLang="ja-JP" dirty="0"/>
+              <a:t>が流れるようになる。</a:t>
+            </a:r>
+            <a:endParaRPr lang="en-US" altLang="ja-JP" dirty="0"/>
+          </a:p>
+          <a:p>
+            <a:pPr marL="0" marR="0" lvl="0" indent="0" algn="l" defTabSz="914400" rtl="0" eaLnBrk="1" fontAlgn="auto" latinLnBrk="0" hangingPunct="1">
+              <a:lnSpc>
+                <a:spcPct val="100000"/>
+              </a:lnSpc>
+              <a:spcBef>
+                <a:spcPts val="0"/>
+              </a:spcBef>
+              <a:spcAft>
+                <a:spcPts val="0"/>
+              </a:spcAft>
+              <a:buClrTx/>
+              <a:buSzTx/>
+              <a:buFontTx/>
+              <a:buNone/>
+              <a:tabLst/>
+              <a:defRPr/>
+            </a:pPr>
+            <a:r>
+              <a:rPr lang="ja-JP" altLang="ja-JP" dirty="0"/>
+              <a:t>この性質を利用して、スイッチングや信号増幅に用いられる</a:t>
+            </a:r>
             <a:endParaRPr kumimoji="1" lang="ja-JP" altLang="en-US" dirty="0"/>
           </a:p>
         </p:txBody>
@@ -4851,7 +4980,7 @@
     </p:spTree>
     <p:extLst>
       <p:ext uri="{BB962C8B-B14F-4D97-AF65-F5344CB8AC3E}">
-        <p14:creationId xmlns:p14="http://schemas.microsoft.com/office/powerpoint/2010/main" val="390113210"/>
+        <p14:creationId xmlns:p14="http://schemas.microsoft.com/office/powerpoint/2010/main" val="3623981710"/>
       </p:ext>
     </p:extLst>
   </p:cSld>
@@ -4923,30 +5052,13 @@
               <a:defRPr/>
             </a:pPr>
             <a:r>
+              <a:rPr lang="ja-JP" altLang="en-US" dirty="0"/>
+              <a:t>ドレイン電流はゲート電圧と左の図のような関係で表される</a:t>
+            </a:r>
+            <a:r>
               <a:rPr lang="en-US" altLang="ja-JP" dirty="0"/>
-              <a:t>FET</a:t>
-            </a:r>
-            <a:r>
-              <a:rPr lang="ja-JP" altLang="ja-JP" dirty="0"/>
-              <a:t>は、左の図のように、</a:t>
-            </a:r>
-            <a:r>
-              <a:rPr lang="en-US" altLang="ja-JP" dirty="0"/>
-              <a:t>p</a:t>
-            </a:r>
-            <a:r>
-              <a:rPr lang="ja-JP" altLang="ja-JP" dirty="0"/>
-              <a:t>型半導体とｎ型半導体を接合したものに絶縁膜、金属電極を張り付けたような形状をしてい</a:t>
-            </a:r>
-            <a:r>
-              <a:rPr lang="ja-JP" altLang="en-US" dirty="0"/>
-              <a:t>る</a:t>
-            </a:r>
-            <a:r>
-              <a:rPr lang="ja-JP" altLang="ja-JP" dirty="0"/>
-              <a:t>。</a:t>
-            </a:r>
-            <a:endParaRPr lang="en-US" altLang="ja-JP" dirty="0"/>
+              <a:t>.</a:t>
+            </a:r>
           </a:p>
           <a:p>
             <a:pPr marL="0" marR="0" lvl="0" indent="0" algn="l" defTabSz="914400" rtl="0" eaLnBrk="1" fontAlgn="auto" latinLnBrk="0" hangingPunct="1">
@@ -4967,50 +5079,21 @@
               <a:defRPr/>
             </a:pPr>
             <a:r>
-              <a:rPr lang="ja-JP" altLang="ja-JP" dirty="0"/>
-              <a:t>右図のように電源を接続し、</a:t>
-            </a:r>
-            <a:r>
-              <a:rPr lang="en-US" altLang="ja-JP" dirty="0"/>
-              <a:t>VDS</a:t>
-            </a:r>
-            <a:r>
-              <a:rPr lang="ja-JP" altLang="ja-JP" dirty="0"/>
-              <a:t>を印加した状態でゲートソース間電圧</a:t>
-            </a:r>
-            <a:r>
-              <a:rPr lang="en-US" altLang="ja-JP" dirty="0"/>
-              <a:t>VGS</a:t>
-            </a:r>
-            <a:r>
-              <a:rPr lang="ja-JP" altLang="ja-JP" dirty="0"/>
-              <a:t>がある程度印加されると</a:t>
-            </a:r>
-            <a:r>
-              <a:rPr lang="en-US" altLang="ja-JP" dirty="0"/>
-              <a:t>n</a:t>
-            </a:r>
-            <a:r>
               <a:rPr lang="ja-JP" altLang="en-US" dirty="0"/>
-              <a:t>型反転層が現れ</a:t>
+              <a:t>そのため</a:t>
             </a:r>
             <a:r>
               <a:rPr lang="en-US" altLang="ja-JP" dirty="0"/>
               <a:t>, </a:t>
             </a:r>
             <a:r>
-              <a:rPr lang="ja-JP" altLang="ja-JP" dirty="0"/>
-              <a:t>ドレイン電流</a:t>
+              <a:rPr lang="ja-JP" altLang="en-US" dirty="0"/>
+              <a:t>ゲート電圧に図のような信号を入力するとドレイン電流がこのように出力される</a:t>
             </a:r>
             <a:r>
               <a:rPr lang="en-US" altLang="ja-JP" dirty="0"/>
-              <a:t>IDS</a:t>
-            </a:r>
-            <a:r>
-              <a:rPr lang="ja-JP" altLang="ja-JP" dirty="0"/>
-              <a:t>が流れるようになる。</a:t>
-            </a:r>
-            <a:endParaRPr lang="en-US" altLang="ja-JP" dirty="0"/>
+              <a:t>.</a:t>
+            </a:r>
           </a:p>
           <a:p>
             <a:pPr marL="0" marR="0" lvl="0" indent="0" algn="l" defTabSz="914400" rtl="0" eaLnBrk="1" fontAlgn="auto" latinLnBrk="0" hangingPunct="1">
@@ -5031,10 +5114,154 @@
               <a:defRPr/>
             </a:pPr>
             <a:r>
-              <a:rPr lang="ja-JP" altLang="ja-JP" dirty="0"/>
-              <a:t>この性質を利用して、スイッチングや信号増幅に用いられる</a:t>
-            </a:r>
-            <a:endParaRPr kumimoji="1" lang="ja-JP" altLang="en-US" dirty="0"/>
+              <a:rPr lang="ja-JP" altLang="en-US" dirty="0"/>
+              <a:t>この時ここの傾きを相互コンダクタンスといい</a:t>
+            </a:r>
+            <a:r>
+              <a:rPr lang="en-US" altLang="ja-JP" dirty="0"/>
+              <a:t>gm</a:t>
+            </a:r>
+            <a:r>
+              <a:rPr lang="ja-JP" altLang="en-US" dirty="0"/>
+              <a:t>で表す</a:t>
+            </a:r>
+            <a:r>
+              <a:rPr lang="en-US" altLang="ja-JP" dirty="0"/>
+              <a:t>.</a:t>
+            </a:r>
+          </a:p>
+          <a:p>
+            <a:pPr marL="0" marR="0" lvl="0" indent="0" algn="l" defTabSz="914400" rtl="0" eaLnBrk="1" fontAlgn="auto" latinLnBrk="0" hangingPunct="1">
+              <a:lnSpc>
+                <a:spcPct val="100000"/>
+              </a:lnSpc>
+              <a:spcBef>
+                <a:spcPts val="0"/>
+              </a:spcBef>
+              <a:spcAft>
+                <a:spcPts val="0"/>
+              </a:spcAft>
+              <a:buClrTx/>
+              <a:buSzTx/>
+              <a:buFontTx/>
+              <a:buNone/>
+              <a:tabLst/>
+              <a:defRPr/>
+            </a:pPr>
+            <a:r>
+              <a:rPr lang="ja-JP" altLang="en-US" dirty="0"/>
+              <a:t>一方でドレインソース間の電圧は</a:t>
+            </a:r>
+            <a:r>
+              <a:rPr lang="en-US" altLang="ja-JP" dirty="0"/>
+              <a:t>, </a:t>
+            </a:r>
+            <a:r>
+              <a:rPr lang="ja-JP" altLang="en-US" dirty="0"/>
+              <a:t>電流量とゲート電圧の関数である</a:t>
+            </a:r>
+            <a:r>
+              <a:rPr lang="en-US" altLang="ja-JP" dirty="0"/>
+              <a:t>, </a:t>
+            </a:r>
+            <a:r>
+              <a:rPr lang="ja-JP" altLang="en-US" dirty="0"/>
+              <a:t>右の図のような関係になる</a:t>
+            </a:r>
+            <a:r>
+              <a:rPr lang="en-US" altLang="ja-JP" dirty="0"/>
+              <a:t>.</a:t>
+            </a:r>
+          </a:p>
+          <a:p>
+            <a:pPr marL="0" marR="0" lvl="0" indent="0" algn="l" defTabSz="914400" rtl="0" eaLnBrk="1" fontAlgn="auto" latinLnBrk="0" hangingPunct="1">
+              <a:lnSpc>
+                <a:spcPct val="100000"/>
+              </a:lnSpc>
+              <a:spcBef>
+                <a:spcPts val="0"/>
+              </a:spcBef>
+              <a:spcAft>
+                <a:spcPts val="0"/>
+              </a:spcAft>
+              <a:buClrTx/>
+              <a:buSzTx/>
+              <a:buFontTx/>
+              <a:buNone/>
+              <a:tabLst/>
+              <a:defRPr/>
+            </a:pPr>
+            <a:r>
+              <a:rPr lang="ja-JP" altLang="en-US" dirty="0"/>
+              <a:t>この関係は線形領域と飽和領域に分けられ</a:t>
+            </a:r>
+            <a:r>
+              <a:rPr lang="en-US" altLang="ja-JP" dirty="0"/>
+              <a:t>, </a:t>
+            </a:r>
+            <a:r>
+              <a:rPr lang="ja-JP" altLang="en-US" dirty="0"/>
+              <a:t>飽和領域ではドレイン電流がドレインソース電圧に依存しない</a:t>
+            </a:r>
+            <a:r>
+              <a:rPr lang="en-US" altLang="ja-JP" dirty="0"/>
+              <a:t>.</a:t>
+            </a:r>
+          </a:p>
+          <a:p>
+            <a:pPr marL="0" marR="0" lvl="0" indent="0" algn="l" defTabSz="914400" rtl="0" eaLnBrk="1" fontAlgn="auto" latinLnBrk="0" hangingPunct="1">
+              <a:lnSpc>
+                <a:spcPct val="100000"/>
+              </a:lnSpc>
+              <a:spcBef>
+                <a:spcPts val="0"/>
+              </a:spcBef>
+              <a:spcAft>
+                <a:spcPts val="0"/>
+              </a:spcAft>
+              <a:buClrTx/>
+              <a:buSzTx/>
+              <a:buFontTx/>
+              <a:buNone/>
+              <a:tabLst/>
+              <a:defRPr/>
+            </a:pPr>
+            <a:r>
+              <a:rPr lang="ja-JP" altLang="en-US" dirty="0"/>
+              <a:t>そのため</a:t>
+            </a:r>
+            <a:r>
+              <a:rPr lang="en-US" altLang="ja-JP" dirty="0"/>
+              <a:t>, </a:t>
+            </a:r>
+            <a:r>
+              <a:rPr lang="ja-JP" altLang="en-US" dirty="0"/>
+              <a:t>飽和領域の範囲であれば出力波形はドレイン電流と負荷によって決定される</a:t>
+            </a:r>
+            <a:r>
+              <a:rPr lang="en-US" altLang="ja-JP" dirty="0"/>
+              <a:t>.</a:t>
+            </a:r>
+          </a:p>
+          <a:p>
+            <a:pPr marL="0" marR="0" lvl="0" indent="0" algn="l" defTabSz="914400" rtl="0" eaLnBrk="1" fontAlgn="auto" latinLnBrk="0" hangingPunct="1">
+              <a:lnSpc>
+                <a:spcPct val="100000"/>
+              </a:lnSpc>
+              <a:spcBef>
+                <a:spcPts val="0"/>
+              </a:spcBef>
+              <a:spcAft>
+                <a:spcPts val="0"/>
+              </a:spcAft>
+              <a:buClrTx/>
+              <a:buSzTx/>
+              <a:buFontTx/>
+              <a:buNone/>
+              <a:tabLst/>
+              <a:defRPr/>
+            </a:pPr>
+            <a:endParaRPr lang="en-US" altLang="ja-JP" dirty="0"/>
           </a:p>
         </p:txBody>
       </p:sp>
@@ -5064,7 +5291,7 @@
     </p:spTree>
     <p:extLst>
       <p:ext uri="{BB962C8B-B14F-4D97-AF65-F5344CB8AC3E}">
-        <p14:creationId xmlns:p14="http://schemas.microsoft.com/office/powerpoint/2010/main" val="3623981710"/>
+        <p14:creationId xmlns:p14="http://schemas.microsoft.com/office/powerpoint/2010/main" val="1821417718"/>
       </p:ext>
     </p:extLst>
   </p:cSld>
@@ -5118,234 +5345,128 @@
           <a:bodyPr/>
           <a:lstStyle/>
           <a:p>
-            <a:pPr marL="0" marR="0" lvl="0" indent="0" algn="l" defTabSz="914400" rtl="0" eaLnBrk="1" fontAlgn="auto" latinLnBrk="0" hangingPunct="1">
-              <a:lnSpc>
-                <a:spcPct val="100000"/>
-              </a:lnSpc>
-              <a:spcBef>
-                <a:spcPts val="0"/>
-              </a:spcBef>
-              <a:spcAft>
-                <a:spcPts val="0"/>
-              </a:spcAft>
-              <a:buClrTx/>
-              <a:buSzTx/>
-              <a:buFontTx/>
-              <a:buNone/>
-              <a:tabLst/>
-              <a:defRPr/>
-            </a:pPr>
-            <a:r>
-              <a:rPr lang="ja-JP" altLang="en-US" dirty="0"/>
-              <a:t>ドレイン電流はゲート電圧と左の図のような関係で表される</a:t>
-            </a:r>
-            <a:r>
-              <a:rPr lang="en-US" altLang="ja-JP" dirty="0"/>
+            <a:r>
+              <a:rPr kumimoji="1" lang="ja-JP" altLang="en-US" dirty="0"/>
+              <a:t>実験</a:t>
+            </a:r>
+            <a:r>
+              <a:rPr kumimoji="1" lang="en-US" altLang="ja-JP" dirty="0"/>
+              <a:t>1</a:t>
+            </a:r>
+            <a:r>
+              <a:rPr kumimoji="1" lang="ja-JP" altLang="en-US" dirty="0"/>
+              <a:t>では使う素子の値と動作させる電圧</a:t>
+            </a:r>
+            <a:r>
+              <a:rPr kumimoji="1" lang="en-US" altLang="ja-JP" dirty="0"/>
+              <a:t>VGS</a:t>
+            </a:r>
+            <a:r>
+              <a:rPr kumimoji="1" lang="ja-JP" altLang="en-US" dirty="0"/>
+              <a:t>とドレイン電流</a:t>
+            </a:r>
+            <a:r>
+              <a:rPr kumimoji="1" lang="en-US" altLang="ja-JP" dirty="0"/>
+              <a:t>Id</a:t>
+            </a:r>
+            <a:r>
+              <a:rPr kumimoji="1" lang="ja-JP" altLang="en-US" dirty="0"/>
+              <a:t>を測定して</a:t>
+            </a:r>
+            <a:r>
+              <a:rPr kumimoji="1" lang="en-US" altLang="ja-JP" dirty="0"/>
+              <a:t>, </a:t>
+            </a:r>
+            <a:r>
+              <a:rPr kumimoji="1" lang="ja-JP" altLang="en-US" dirty="0"/>
+              <a:t>その結果をから相互インダクタンスを求めました</a:t>
+            </a:r>
+            <a:r>
+              <a:rPr kumimoji="1" lang="en-US" altLang="ja-JP" dirty="0"/>
               <a:t>.</a:t>
             </a:r>
           </a:p>
           <a:p>
-            <a:pPr marL="0" marR="0" lvl="0" indent="0" algn="l" defTabSz="914400" rtl="0" eaLnBrk="1" fontAlgn="auto" latinLnBrk="0" hangingPunct="1">
-              <a:lnSpc>
-                <a:spcPct val="100000"/>
-              </a:lnSpc>
-              <a:spcBef>
-                <a:spcPts val="0"/>
-              </a:spcBef>
-              <a:spcAft>
-                <a:spcPts val="0"/>
-              </a:spcAft>
-              <a:buClrTx/>
-              <a:buSzTx/>
-              <a:buFontTx/>
-              <a:buNone/>
-              <a:tabLst/>
-              <a:defRPr/>
-            </a:pPr>
-            <a:r>
-              <a:rPr lang="ja-JP" altLang="en-US" dirty="0"/>
-              <a:t>そのため</a:t>
-            </a:r>
-            <a:r>
-              <a:rPr lang="en-US" altLang="ja-JP" dirty="0"/>
+            <a:r>
+              <a:rPr kumimoji="1" lang="ja-JP" altLang="en-US" dirty="0"/>
+              <a:t>また</a:t>
+            </a:r>
+            <a:r>
+              <a:rPr kumimoji="1" lang="en-US" altLang="ja-JP" dirty="0"/>
+              <a:t>, 10kHz</a:t>
+            </a:r>
+            <a:r>
+              <a:rPr kumimoji="1" lang="ja-JP" altLang="en-US" dirty="0" err="1"/>
+              <a:t>にて</a:t>
+            </a:r>
+            <a:r>
+              <a:rPr kumimoji="1" lang="ja-JP" altLang="en-US" dirty="0"/>
+              <a:t>増幅を確認し</a:t>
+            </a:r>
+            <a:r>
+              <a:rPr kumimoji="1" lang="en-US" altLang="ja-JP" dirty="0"/>
               <a:t>, </a:t>
             </a:r>
             <a:r>
-              <a:rPr lang="ja-JP" altLang="en-US" dirty="0"/>
-              <a:t>ゲート電圧に図のような信号を入力するとドレイン電流がこのように出力される</a:t>
-            </a:r>
-            <a:r>
-              <a:rPr lang="en-US" altLang="ja-JP" dirty="0"/>
+              <a:rPr kumimoji="1" lang="ja-JP" altLang="en-US" dirty="0"/>
+              <a:t>その時の増幅率と位相差を求めました</a:t>
+            </a:r>
+            <a:r>
+              <a:rPr kumimoji="1" lang="en-US" altLang="ja-JP" dirty="0"/>
               <a:t>.</a:t>
             </a:r>
           </a:p>
           <a:p>
-            <a:pPr marL="0" marR="0" lvl="0" indent="0" algn="l" defTabSz="914400" rtl="0" eaLnBrk="1" fontAlgn="auto" latinLnBrk="0" hangingPunct="1">
-              <a:lnSpc>
-                <a:spcPct val="100000"/>
-              </a:lnSpc>
-              <a:spcBef>
-                <a:spcPts val="0"/>
-              </a:spcBef>
-              <a:spcAft>
-                <a:spcPts val="0"/>
-              </a:spcAft>
-              <a:buClrTx/>
-              <a:buSzTx/>
-              <a:buFontTx/>
-              <a:buNone/>
-              <a:tabLst/>
-              <a:defRPr/>
-            </a:pPr>
-            <a:r>
-              <a:rPr lang="ja-JP" altLang="en-US" dirty="0"/>
-              <a:t>この時ここの傾きを相互コンダクタンスといい</a:t>
-            </a:r>
-            <a:r>
-              <a:rPr lang="en-US" altLang="ja-JP" dirty="0"/>
-              <a:t>gm</a:t>
-            </a:r>
-            <a:r>
-              <a:rPr lang="ja-JP" altLang="en-US" dirty="0"/>
-              <a:t>で表す</a:t>
-            </a:r>
-            <a:r>
-              <a:rPr lang="en-US" altLang="ja-JP" dirty="0"/>
+            <a:r>
+              <a:rPr kumimoji="1" lang="ja-JP" altLang="en-US" dirty="0"/>
+              <a:t>実験</a:t>
+            </a:r>
+            <a:r>
+              <a:rPr kumimoji="1" lang="en-US" altLang="ja-JP" dirty="0"/>
+              <a:t>2</a:t>
+            </a:r>
+            <a:r>
+              <a:rPr kumimoji="1" lang="ja-JP" altLang="en-US" dirty="0"/>
+              <a:t>では</a:t>
+            </a:r>
+            <a:r>
+              <a:rPr kumimoji="1" lang="en-US" altLang="ja-JP" dirty="0"/>
+              <a:t>100Hz</a:t>
+            </a:r>
+            <a:r>
+              <a:rPr kumimoji="1" lang="ja-JP" altLang="en-US" dirty="0"/>
+              <a:t>から</a:t>
+            </a:r>
+            <a:r>
+              <a:rPr kumimoji="1" lang="en-US" altLang="ja-JP" dirty="0"/>
+              <a:t>1MHz</a:t>
+            </a:r>
+            <a:r>
+              <a:rPr kumimoji="1" lang="ja-JP" altLang="en-US" dirty="0" err="1"/>
+              <a:t>まで</a:t>
+            </a:r>
+            <a:r>
+              <a:rPr kumimoji="1" lang="ja-JP" altLang="en-US" dirty="0"/>
+              <a:t>信号周波数を変更して増幅率と位相差を求めました</a:t>
+            </a:r>
+            <a:r>
+              <a:rPr kumimoji="1" lang="en-US" altLang="ja-JP" dirty="0"/>
               <a:t>.</a:t>
             </a:r>
           </a:p>
           <a:p>
-            <a:pPr marL="0" marR="0" lvl="0" indent="0" algn="l" defTabSz="914400" rtl="0" eaLnBrk="1" fontAlgn="auto" latinLnBrk="0" hangingPunct="1">
-              <a:lnSpc>
-                <a:spcPct val="100000"/>
-              </a:lnSpc>
-              <a:spcBef>
-                <a:spcPts val="0"/>
-              </a:spcBef>
-              <a:spcAft>
-                <a:spcPts val="0"/>
-              </a:spcAft>
-              <a:buClrTx/>
-              <a:buSzTx/>
-              <a:buFontTx/>
-              <a:buNone/>
-              <a:tabLst/>
-              <a:defRPr/>
-            </a:pPr>
-            <a:r>
-              <a:rPr lang="ja-JP" altLang="en-US" dirty="0"/>
-              <a:t>一方でドレインソース間の電圧は</a:t>
-            </a:r>
-            <a:r>
-              <a:rPr lang="en-US" altLang="ja-JP" dirty="0"/>
-              <a:t>, </a:t>
-            </a:r>
-            <a:r>
-              <a:rPr lang="ja-JP" altLang="en-US" dirty="0"/>
-              <a:t>電流量とゲート電圧の関数である</a:t>
-            </a:r>
-            <a:r>
-              <a:rPr lang="en-US" altLang="ja-JP" dirty="0"/>
-              <a:t>, </a:t>
-            </a:r>
-            <a:r>
-              <a:rPr lang="ja-JP" altLang="en-US" dirty="0"/>
-              <a:t>右の図のような関係になる</a:t>
-            </a:r>
-            <a:r>
-              <a:rPr lang="en-US" altLang="ja-JP" dirty="0"/>
+            <a:r>
+              <a:rPr kumimoji="1" lang="ja-JP" altLang="en-US" dirty="0"/>
+              <a:t>そしてその結果を表、グラフにまとめました</a:t>
+            </a:r>
+            <a:r>
+              <a:rPr kumimoji="1" lang="en-US" altLang="ja-JP" dirty="0"/>
               <a:t>.</a:t>
             </a:r>
-          </a:p>
-          <a:p>
-            <a:pPr marL="0" marR="0" lvl="0" indent="0" algn="l" defTabSz="914400" rtl="0" eaLnBrk="1" fontAlgn="auto" latinLnBrk="0" hangingPunct="1">
-              <a:lnSpc>
-                <a:spcPct val="100000"/>
-              </a:lnSpc>
-              <a:spcBef>
-                <a:spcPts val="0"/>
-              </a:spcBef>
-              <a:spcAft>
-                <a:spcPts val="0"/>
-              </a:spcAft>
-              <a:buClrTx/>
-              <a:buSzTx/>
-              <a:buFontTx/>
-              <a:buNone/>
-              <a:tabLst/>
-              <a:defRPr/>
-            </a:pPr>
-            <a:r>
-              <a:rPr lang="ja-JP" altLang="en-US" dirty="0"/>
-              <a:t>この関係は線形領域と飽和領域に分けられ</a:t>
-            </a:r>
-            <a:r>
-              <a:rPr lang="en-US" altLang="ja-JP" dirty="0"/>
-              <a:t>, </a:t>
-            </a:r>
-            <a:r>
-              <a:rPr lang="ja-JP" altLang="en-US" dirty="0"/>
-              <a:t>飽和領域ではドレイン電流がドレインソース電圧に依存しない</a:t>
-            </a:r>
-            <a:r>
-              <a:rPr lang="en-US" altLang="ja-JP" dirty="0"/>
-              <a:t>.</a:t>
-            </a:r>
-          </a:p>
-          <a:p>
-            <a:pPr marL="0" marR="0" lvl="0" indent="0" algn="l" defTabSz="914400" rtl="0" eaLnBrk="1" fontAlgn="auto" latinLnBrk="0" hangingPunct="1">
-              <a:lnSpc>
-                <a:spcPct val="100000"/>
-              </a:lnSpc>
-              <a:spcBef>
-                <a:spcPts val="0"/>
-              </a:spcBef>
-              <a:spcAft>
-                <a:spcPts val="0"/>
-              </a:spcAft>
-              <a:buClrTx/>
-              <a:buSzTx/>
-              <a:buFontTx/>
-              <a:buNone/>
-              <a:tabLst/>
-              <a:defRPr/>
-            </a:pPr>
-            <a:r>
-              <a:rPr lang="ja-JP" altLang="en-US" dirty="0"/>
-              <a:t>そのため</a:t>
-            </a:r>
-            <a:r>
-              <a:rPr lang="en-US" altLang="ja-JP" dirty="0"/>
-              <a:t>, </a:t>
-            </a:r>
-            <a:r>
-              <a:rPr lang="ja-JP" altLang="en-US" dirty="0"/>
-              <a:t>飽和領域の範囲であれば出力波形はドレイン電流と負荷によって決定される</a:t>
-            </a:r>
-            <a:r>
-              <a:rPr lang="en-US" altLang="ja-JP" dirty="0"/>
-              <a:t>.</a:t>
-            </a:r>
-          </a:p>
-          <a:p>
-            <a:pPr marL="0" marR="0" lvl="0" indent="0" algn="l" defTabSz="914400" rtl="0" eaLnBrk="1" fontAlgn="auto" latinLnBrk="0" hangingPunct="1">
-              <a:lnSpc>
-                <a:spcPct val="100000"/>
-              </a:lnSpc>
-              <a:spcBef>
-                <a:spcPts val="0"/>
-              </a:spcBef>
-              <a:spcAft>
-                <a:spcPts val="0"/>
-              </a:spcAft>
-              <a:buClrTx/>
-              <a:buSzTx/>
-              <a:buFontTx/>
-              <a:buNone/>
-              <a:tabLst/>
-              <a:defRPr/>
-            </a:pPr>
-            <a:endParaRPr lang="en-US" altLang="ja-JP" dirty="0"/>
+            <a:endParaRPr kumimoji="1" lang="ja-JP" altLang="en-US"/>
+          </a:p>
+          <a:p>
+            <a:endParaRPr kumimoji="1" lang="ja-JP" altLang="en-US" dirty="0"/>
           </a:p>
         </p:txBody>
       </p:sp>
@@ -5375,7 +5496,7 @@
     </p:spTree>
     <p:extLst>
       <p:ext uri="{BB962C8B-B14F-4D97-AF65-F5344CB8AC3E}">
-        <p14:creationId xmlns:p14="http://schemas.microsoft.com/office/powerpoint/2010/main" val="1821417718"/>
+        <p14:creationId xmlns:p14="http://schemas.microsoft.com/office/powerpoint/2010/main" val="390113210"/>
       </p:ext>
     </p:extLst>
   </p:cSld>
@@ -10187,215 +10308,6 @@
           <p:cNvPr id="2" name="タイトル 1">
             <a:extLst>
               <a:ext uri="{FF2B5EF4-FFF2-40B4-BE49-F238E27FC236}">
-                <a16:creationId xmlns:a16="http://schemas.microsoft.com/office/drawing/2014/main" id="{16E01921-AD22-444E-A4EB-3B1E256D8A04}"/>
-              </a:ext>
-            </a:extLst>
-          </p:cNvPr>
-          <p:cNvSpPr>
-            <a:spLocks noGrp="1"/>
-          </p:cNvSpPr>
-          <p:nvPr>
-            <p:ph type="title"/>
-          </p:nvPr>
-        </p:nvSpPr>
-        <p:spPr/>
-        <p:txBody>
-          <a:bodyPr/>
-          <a:lstStyle/>
-          <a:p>
-            <a:r>
-              <a:rPr lang="ja-JP" altLang="en-US" dirty="0"/>
-              <a:t>実験内容</a:t>
-            </a:r>
-            <a:endParaRPr kumimoji="1" lang="ja-JP" altLang="en-US" dirty="0"/>
-          </a:p>
-        </p:txBody>
-      </p:sp>
-      <p:sp>
-        <p:nvSpPr>
-          <p:cNvPr id="3" name="コンテンツ プレースホルダー 2">
-            <a:extLst>
-              <a:ext uri="{FF2B5EF4-FFF2-40B4-BE49-F238E27FC236}">
-                <a16:creationId xmlns:a16="http://schemas.microsoft.com/office/drawing/2014/main" id="{0015D4B7-7D63-4907-934C-5C69A2A1A8DD}"/>
-              </a:ext>
-            </a:extLst>
-          </p:cNvPr>
-          <p:cNvSpPr>
-            <a:spLocks noGrp="1"/>
-          </p:cNvSpPr>
-          <p:nvPr>
-            <p:ph idx="1"/>
-          </p:nvPr>
-        </p:nvSpPr>
-        <p:spPr/>
-        <p:txBody>
-          <a:bodyPr/>
-          <a:lstStyle/>
-          <a:p>
-            <a:pPr marL="514350" indent="-514350">
-              <a:buFont typeface="+mj-lt"/>
-              <a:buAutoNum type="arabicPeriod"/>
-            </a:pPr>
-            <a:r>
-              <a:rPr lang="ja-JP" altLang="en-US" dirty="0"/>
-              <a:t>ソース接地小信号増幅回路の動作確認</a:t>
-            </a:r>
-            <a:endParaRPr lang="en-US" altLang="ja-JP" dirty="0"/>
-          </a:p>
-          <a:p>
-            <a:pPr marL="971550" lvl="1" indent="-514350">
-              <a:buFont typeface="+mj-lt"/>
-              <a:buAutoNum type="arabicPeriod"/>
-            </a:pPr>
-            <a:endParaRPr lang="en-US" altLang="ja-JP" dirty="0"/>
-          </a:p>
-          <a:p>
-            <a:pPr marL="514350" indent="-514350">
-              <a:buFont typeface="+mj-lt"/>
-              <a:buAutoNum type="arabicPeriod"/>
-            </a:pPr>
-            <a:r>
-              <a:rPr lang="ja-JP" altLang="en-US" dirty="0"/>
-              <a:t>ソース接地小信号増幅回路の周波数特性の測定</a:t>
-            </a:r>
-            <a:endParaRPr lang="en-US" altLang="ja-JP" dirty="0"/>
-          </a:p>
-          <a:p>
-            <a:pPr marL="0" indent="0">
-              <a:buNone/>
-            </a:pPr>
-            <a:endParaRPr kumimoji="1" lang="ja-JP" altLang="en-US" dirty="0"/>
-          </a:p>
-        </p:txBody>
-      </p:sp>
-      <p:sp>
-        <p:nvSpPr>
-          <p:cNvPr id="4" name="スライド番号プレースホルダー 3">
-            <a:extLst>
-              <a:ext uri="{FF2B5EF4-FFF2-40B4-BE49-F238E27FC236}">
-                <a16:creationId xmlns:a16="http://schemas.microsoft.com/office/drawing/2014/main" id="{F9A94B56-AFE5-4457-9EAB-0E32A0CD34F0}"/>
-              </a:ext>
-            </a:extLst>
-          </p:cNvPr>
-          <p:cNvSpPr>
-            <a:spLocks noGrp="1"/>
-          </p:cNvSpPr>
-          <p:nvPr>
-            <p:ph type="sldNum" sz="quarter" idx="12"/>
-          </p:nvPr>
-        </p:nvSpPr>
-        <p:spPr/>
-        <p:txBody>
-          <a:bodyPr/>
-          <a:lstStyle/>
-          <a:p>
-            <a:fld id="{EC2563BA-9F6D-4C2C-B042-56816E50B4B9}" type="slidenum">
-              <a:rPr kumimoji="1" lang="ja-JP" altLang="en-US" smtClean="0"/>
-              <a:t>3</a:t>
-            </a:fld>
-            <a:endParaRPr kumimoji="1" lang="ja-JP" altLang="en-US" dirty="0"/>
-          </a:p>
-        </p:txBody>
-      </p:sp>
-      <p:pic>
-        <p:nvPicPr>
-          <p:cNvPr id="5" name="図 4">
-            <a:extLst>
-              <a:ext uri="{FF2B5EF4-FFF2-40B4-BE49-F238E27FC236}">
-                <a16:creationId xmlns:a16="http://schemas.microsoft.com/office/drawing/2014/main" id="{B7EB4B76-08A7-459C-BFE1-14E6FF15F911}"/>
-              </a:ext>
-            </a:extLst>
-          </p:cNvPr>
-          <p:cNvPicPr>
-            <a:picLocks noChangeAspect="1"/>
-          </p:cNvPicPr>
-          <p:nvPr/>
-        </p:nvPicPr>
-        <p:blipFill rotWithShape="1">
-          <a:blip r:embed="rId3"/>
-          <a:srcRect l="8883" t="16771" r="11728" b="14752"/>
-          <a:stretch/>
-        </p:blipFill>
-        <p:spPr>
-          <a:xfrm>
-            <a:off x="3261179" y="3429001"/>
-            <a:ext cx="5669642" cy="2882900"/>
-          </a:xfrm>
-          <a:prstGeom prst="rect">
-            <a:avLst/>
-          </a:prstGeom>
-        </p:spPr>
-      </p:pic>
-      <p:sp>
-        <p:nvSpPr>
-          <p:cNvPr id="6" name="テキスト ボックス 5">
-            <a:extLst>
-              <a:ext uri="{FF2B5EF4-FFF2-40B4-BE49-F238E27FC236}">
-                <a16:creationId xmlns:a16="http://schemas.microsoft.com/office/drawing/2014/main" id="{5BD90EC6-9C70-43CC-8C40-4615DA72910C}"/>
-              </a:ext>
-            </a:extLst>
-          </p:cNvPr>
-          <p:cNvSpPr txBox="1"/>
-          <p:nvPr/>
-        </p:nvSpPr>
-        <p:spPr>
-          <a:xfrm>
-            <a:off x="4816643" y="6308090"/>
-            <a:ext cx="2558714" cy="369332"/>
-          </a:xfrm>
-          <a:prstGeom prst="rect">
-            <a:avLst/>
-          </a:prstGeom>
-          <a:noFill/>
-        </p:spPr>
-        <p:txBody>
-          <a:bodyPr wrap="none" rtlCol="0">
-            <a:spAutoFit/>
-          </a:bodyPr>
-          <a:lstStyle/>
-          <a:p>
-            <a:r>
-              <a:rPr kumimoji="1" lang="ja-JP" altLang="en-US" dirty="0"/>
-              <a:t>図 ソース接地増幅回路</a:t>
-            </a:r>
-          </a:p>
-        </p:txBody>
-      </p:sp>
-    </p:spTree>
-    <p:extLst>
-      <p:ext uri="{BB962C8B-B14F-4D97-AF65-F5344CB8AC3E}">
-        <p14:creationId xmlns:p14="http://schemas.microsoft.com/office/powerpoint/2010/main" val="876462258"/>
-      </p:ext>
-    </p:extLst>
-  </p:cSld>
-  <p:clrMapOvr>
-    <a:masterClrMapping/>
-  </p:clrMapOvr>
-</p:sld>
-</file>
-
-<file path=ppt/slides/slide4.xml><?xml version="1.0" encoding="utf-8"?>
-<p:sld xmlns:a="http://schemas.openxmlformats.org/drawingml/2006/main" xmlns:r="http://schemas.openxmlformats.org/officeDocument/2006/relationships" xmlns:p="http://schemas.openxmlformats.org/presentationml/2006/main">
-  <p:cSld>
-    <p:spTree>
-      <p:nvGrpSpPr>
-        <p:cNvPr id="1" name=""/>
-        <p:cNvGrpSpPr/>
-        <p:nvPr/>
-      </p:nvGrpSpPr>
-      <p:grpSpPr>
-        <a:xfrm>
-          <a:off x="0" y="0"/>
-          <a:ext cx="0" cy="0"/>
-          <a:chOff x="0" y="0"/>
-          <a:chExt cx="0" cy="0"/>
-        </a:xfrm>
-      </p:grpSpPr>
-      <p:sp>
-        <p:nvSpPr>
-          <p:cNvPr id="2" name="タイトル 1">
-            <a:extLst>
-              <a:ext uri="{FF2B5EF4-FFF2-40B4-BE49-F238E27FC236}">
                 <a16:creationId xmlns:a16="http://schemas.microsoft.com/office/drawing/2014/main" id="{79E6E4B1-DAF5-49FC-8972-274A3D15ED33}"/>
               </a:ext>
             </a:extLst>
@@ -10456,7 +10368,7 @@
           <a:p>
             <a:fld id="{EC2563BA-9F6D-4C2C-B042-56816E50B4B9}" type="slidenum">
               <a:rPr kumimoji="1" lang="ja-JP" altLang="en-US" smtClean="0"/>
-              <a:t>4</a:t>
+              <a:t>3</a:t>
             </a:fld>
             <a:endParaRPr kumimoji="1" lang="ja-JP" altLang="en-US"/>
           </a:p>
@@ -11820,7 +11732,7 @@
 </p:sld>
 </file>
 
-<file path=ppt/slides/slide5.xml><?xml version="1.0" encoding="utf-8"?>
+<file path=ppt/slides/slide4.xml><?xml version="1.0" encoding="utf-8"?>
 <p:sld xmlns:a="http://schemas.openxmlformats.org/drawingml/2006/main" xmlns:r="http://schemas.openxmlformats.org/officeDocument/2006/relationships" xmlns:p="http://schemas.openxmlformats.org/presentationml/2006/main">
   <p:cSld>
     <p:spTree>
@@ -11907,7 +11819,7 @@
           <a:p>
             <a:fld id="{EC2563BA-9F6D-4C2C-B042-56816E50B4B9}" type="slidenum">
               <a:rPr kumimoji="1" lang="ja-JP" altLang="en-US" smtClean="0"/>
-              <a:t>5</a:t>
+              <a:t>4</a:t>
             </a:fld>
             <a:endParaRPr kumimoji="1" lang="ja-JP" altLang="en-US" dirty="0"/>
           </a:p>
@@ -14038,6 +13950,215 @@
     <p:extLst>
       <p:ext uri="{BB962C8B-B14F-4D97-AF65-F5344CB8AC3E}">
         <p14:creationId xmlns:p14="http://schemas.microsoft.com/office/powerpoint/2010/main" val="712570408"/>
+      </p:ext>
+    </p:extLst>
+  </p:cSld>
+  <p:clrMapOvr>
+    <a:masterClrMapping/>
+  </p:clrMapOvr>
+</p:sld>
+</file>
+
+<file path=ppt/slides/slide5.xml><?xml version="1.0" encoding="utf-8"?>
+<p:sld xmlns:a="http://schemas.openxmlformats.org/drawingml/2006/main" xmlns:r="http://schemas.openxmlformats.org/officeDocument/2006/relationships" xmlns:p="http://schemas.openxmlformats.org/presentationml/2006/main">
+  <p:cSld>
+    <p:spTree>
+      <p:nvGrpSpPr>
+        <p:cNvPr id="1" name=""/>
+        <p:cNvGrpSpPr/>
+        <p:nvPr/>
+      </p:nvGrpSpPr>
+      <p:grpSpPr>
+        <a:xfrm>
+          <a:off x="0" y="0"/>
+          <a:ext cx="0" cy="0"/>
+          <a:chOff x="0" y="0"/>
+          <a:chExt cx="0" cy="0"/>
+        </a:xfrm>
+      </p:grpSpPr>
+      <p:sp>
+        <p:nvSpPr>
+          <p:cNvPr id="2" name="タイトル 1">
+            <a:extLst>
+              <a:ext uri="{FF2B5EF4-FFF2-40B4-BE49-F238E27FC236}">
+                <a16:creationId xmlns:a16="http://schemas.microsoft.com/office/drawing/2014/main" id="{16E01921-AD22-444E-A4EB-3B1E256D8A04}"/>
+              </a:ext>
+            </a:extLst>
+          </p:cNvPr>
+          <p:cNvSpPr>
+            <a:spLocks noGrp="1"/>
+          </p:cNvSpPr>
+          <p:nvPr>
+            <p:ph type="title"/>
+          </p:nvPr>
+        </p:nvSpPr>
+        <p:spPr/>
+        <p:txBody>
+          <a:bodyPr/>
+          <a:lstStyle/>
+          <a:p>
+            <a:r>
+              <a:rPr lang="ja-JP" altLang="en-US" dirty="0"/>
+              <a:t>実験内容</a:t>
+            </a:r>
+            <a:endParaRPr kumimoji="1" lang="ja-JP" altLang="en-US" dirty="0"/>
+          </a:p>
+        </p:txBody>
+      </p:sp>
+      <p:sp>
+        <p:nvSpPr>
+          <p:cNvPr id="3" name="コンテンツ プレースホルダー 2">
+            <a:extLst>
+              <a:ext uri="{FF2B5EF4-FFF2-40B4-BE49-F238E27FC236}">
+                <a16:creationId xmlns:a16="http://schemas.microsoft.com/office/drawing/2014/main" id="{0015D4B7-7D63-4907-934C-5C69A2A1A8DD}"/>
+              </a:ext>
+            </a:extLst>
+          </p:cNvPr>
+          <p:cNvSpPr>
+            <a:spLocks noGrp="1"/>
+          </p:cNvSpPr>
+          <p:nvPr>
+            <p:ph idx="1"/>
+          </p:nvPr>
+        </p:nvSpPr>
+        <p:spPr/>
+        <p:txBody>
+          <a:bodyPr/>
+          <a:lstStyle/>
+          <a:p>
+            <a:pPr marL="514350" indent="-514350">
+              <a:buFont typeface="+mj-lt"/>
+              <a:buAutoNum type="arabicPeriod"/>
+            </a:pPr>
+            <a:r>
+              <a:rPr lang="ja-JP" altLang="en-US" dirty="0"/>
+              <a:t>ソース接地小信号増幅回路の動作確認</a:t>
+            </a:r>
+            <a:endParaRPr lang="en-US" altLang="ja-JP" dirty="0"/>
+          </a:p>
+          <a:p>
+            <a:pPr marL="971550" lvl="1" indent="-514350">
+              <a:buFont typeface="+mj-lt"/>
+              <a:buAutoNum type="arabicPeriod"/>
+            </a:pPr>
+            <a:endParaRPr lang="en-US" altLang="ja-JP" dirty="0"/>
+          </a:p>
+          <a:p>
+            <a:pPr marL="514350" indent="-514350">
+              <a:buFont typeface="+mj-lt"/>
+              <a:buAutoNum type="arabicPeriod"/>
+            </a:pPr>
+            <a:r>
+              <a:rPr lang="ja-JP" altLang="en-US" dirty="0"/>
+              <a:t>ソース接地小信号増幅回路の周波数特性の測定</a:t>
+            </a:r>
+            <a:endParaRPr lang="en-US" altLang="ja-JP" dirty="0"/>
+          </a:p>
+          <a:p>
+            <a:pPr marL="0" indent="0">
+              <a:buNone/>
+            </a:pPr>
+            <a:endParaRPr kumimoji="1" lang="ja-JP" altLang="en-US" dirty="0"/>
+          </a:p>
+        </p:txBody>
+      </p:sp>
+      <p:sp>
+        <p:nvSpPr>
+          <p:cNvPr id="4" name="スライド番号プレースホルダー 3">
+            <a:extLst>
+              <a:ext uri="{FF2B5EF4-FFF2-40B4-BE49-F238E27FC236}">
+                <a16:creationId xmlns:a16="http://schemas.microsoft.com/office/drawing/2014/main" id="{F9A94B56-AFE5-4457-9EAB-0E32A0CD34F0}"/>
+              </a:ext>
+            </a:extLst>
+          </p:cNvPr>
+          <p:cNvSpPr>
+            <a:spLocks noGrp="1"/>
+          </p:cNvSpPr>
+          <p:nvPr>
+            <p:ph type="sldNum" sz="quarter" idx="12"/>
+          </p:nvPr>
+        </p:nvSpPr>
+        <p:spPr/>
+        <p:txBody>
+          <a:bodyPr/>
+          <a:lstStyle/>
+          <a:p>
+            <a:fld id="{EC2563BA-9F6D-4C2C-B042-56816E50B4B9}" type="slidenum">
+              <a:rPr kumimoji="1" lang="ja-JP" altLang="en-US" smtClean="0"/>
+              <a:t>5</a:t>
+            </a:fld>
+            <a:endParaRPr kumimoji="1" lang="ja-JP" altLang="en-US" dirty="0"/>
+          </a:p>
+        </p:txBody>
+      </p:sp>
+      <p:pic>
+        <p:nvPicPr>
+          <p:cNvPr id="5" name="図 4">
+            <a:extLst>
+              <a:ext uri="{FF2B5EF4-FFF2-40B4-BE49-F238E27FC236}">
+                <a16:creationId xmlns:a16="http://schemas.microsoft.com/office/drawing/2014/main" id="{B7EB4B76-08A7-459C-BFE1-14E6FF15F911}"/>
+              </a:ext>
+            </a:extLst>
+          </p:cNvPr>
+          <p:cNvPicPr>
+            <a:picLocks noChangeAspect="1"/>
+          </p:cNvPicPr>
+          <p:nvPr/>
+        </p:nvPicPr>
+        <p:blipFill rotWithShape="1">
+          <a:blip r:embed="rId3"/>
+          <a:srcRect l="8883" t="16771" r="11728" b="14752"/>
+          <a:stretch/>
+        </p:blipFill>
+        <p:spPr>
+          <a:xfrm>
+            <a:off x="3261179" y="3429001"/>
+            <a:ext cx="5669642" cy="2882900"/>
+          </a:xfrm>
+          <a:prstGeom prst="rect">
+            <a:avLst/>
+          </a:prstGeom>
+        </p:spPr>
+      </p:pic>
+      <p:sp>
+        <p:nvSpPr>
+          <p:cNvPr id="6" name="テキスト ボックス 5">
+            <a:extLst>
+              <a:ext uri="{FF2B5EF4-FFF2-40B4-BE49-F238E27FC236}">
+                <a16:creationId xmlns:a16="http://schemas.microsoft.com/office/drawing/2014/main" id="{5BD90EC6-9C70-43CC-8C40-4615DA72910C}"/>
+              </a:ext>
+            </a:extLst>
+          </p:cNvPr>
+          <p:cNvSpPr txBox="1"/>
+          <p:nvPr/>
+        </p:nvSpPr>
+        <p:spPr>
+          <a:xfrm>
+            <a:off x="4816643" y="6308090"/>
+            <a:ext cx="2558714" cy="369332"/>
+          </a:xfrm>
+          <a:prstGeom prst="rect">
+            <a:avLst/>
+          </a:prstGeom>
+          <a:noFill/>
+        </p:spPr>
+        <p:txBody>
+          <a:bodyPr wrap="none" rtlCol="0">
+            <a:spAutoFit/>
+          </a:bodyPr>
+          <a:lstStyle/>
+          <a:p>
+            <a:r>
+              <a:rPr kumimoji="1" lang="ja-JP" altLang="en-US" dirty="0"/>
+              <a:t>図 ソース接地増幅回路</a:t>
+            </a:r>
+          </a:p>
+        </p:txBody>
+      </p:sp>
+    </p:spTree>
+    <p:extLst>
+      <p:ext uri="{BB962C8B-B14F-4D97-AF65-F5344CB8AC3E}">
+        <p14:creationId xmlns:p14="http://schemas.microsoft.com/office/powerpoint/2010/main" val="876462258"/>
       </p:ext>
     </p:extLst>
   </p:cSld>

</xml_diff>